<commit_message>
Momentum of a body @ theory section
</commit_message>
<xml_diff>
--- a/theory/lecture-drawings.pptx
+++ b/theory/lecture-drawings.pptx
@@ -27,6 +27,7 @@
     <p:sldId id="276" r:id="rId21"/>
     <p:sldId id="277" r:id="rId22"/>
     <p:sldId id="278" r:id="rId23"/>
+    <p:sldId id="279" r:id="rId24"/>
   </p:sldIdLst>
   <p:sldSz cx="12192000" cy="6858000"/>
   <p:notesSz cx="6858000" cy="9144000"/>
@@ -18310,8 +18311,8 @@
           </a:fontRef>
         </p:style>
       </p:cxnSp>
-      <mc:AlternateContent xmlns:mc="http://schemas.openxmlformats.org/markup-compatibility/2006">
-        <mc:Choice xmlns:a14="http://schemas.microsoft.com/office/drawing/2010/main" Requires="a14">
+      <mc:AlternateContent xmlns:mc="http://schemas.openxmlformats.org/markup-compatibility/2006" xmlns:a14="http://schemas.microsoft.com/office/drawing/2010/main">
+        <mc:Choice Requires="a14">
           <p:sp>
             <p:nvSpPr>
               <p:cNvPr id="20" name="TextBox 19">
@@ -18373,7 +18374,7 @@
             </p:txBody>
           </p:sp>
         </mc:Choice>
-        <mc:Fallback>
+        <mc:Fallback xmlns="">
           <p:sp>
             <p:nvSpPr>
               <p:cNvPr id="20" name="TextBox 19">
@@ -18613,8 +18614,8 @@
           </a:p>
         </p:txBody>
       </p:sp>
-      <mc:AlternateContent xmlns:mc="http://schemas.openxmlformats.org/markup-compatibility/2006">
-        <mc:Choice xmlns:a14="http://schemas.microsoft.com/office/drawing/2010/main" Requires="a14">
+      <mc:AlternateContent xmlns:mc="http://schemas.openxmlformats.org/markup-compatibility/2006" xmlns:a14="http://schemas.microsoft.com/office/drawing/2010/main">
+        <mc:Choice Requires="a14">
           <p:sp>
             <p:nvSpPr>
               <p:cNvPr id="38" name="TextBox 37">
@@ -18665,7 +18666,7 @@
             </p:txBody>
           </p:sp>
         </mc:Choice>
-        <mc:Fallback>
+        <mc:Fallback xmlns="">
           <p:sp>
             <p:nvSpPr>
               <p:cNvPr id="38" name="TextBox 37">
@@ -18710,8 +18711,8 @@
           </p:sp>
         </mc:Fallback>
       </mc:AlternateContent>
-      <mc:AlternateContent xmlns:mc="http://schemas.openxmlformats.org/markup-compatibility/2006">
-        <mc:Choice xmlns:a14="http://schemas.microsoft.com/office/drawing/2010/main" Requires="a14">
+      <mc:AlternateContent xmlns:mc="http://schemas.openxmlformats.org/markup-compatibility/2006" xmlns:a14="http://schemas.microsoft.com/office/drawing/2010/main">
+        <mc:Choice Requires="a14">
           <p:sp>
             <p:nvSpPr>
               <p:cNvPr id="39" name="TextBox 38">
@@ -18762,7 +18763,7 @@
             </p:txBody>
           </p:sp>
         </mc:Choice>
-        <mc:Fallback>
+        <mc:Fallback xmlns="">
           <p:sp>
             <p:nvSpPr>
               <p:cNvPr id="39" name="TextBox 38">
@@ -18928,8 +18929,8 @@
           </a:fontRef>
         </p:style>
       </p:cxnSp>
-      <mc:AlternateContent xmlns:mc="http://schemas.openxmlformats.org/markup-compatibility/2006">
-        <mc:Choice xmlns:a14="http://schemas.microsoft.com/office/drawing/2010/main" Requires="a14">
+      <mc:AlternateContent xmlns:mc="http://schemas.openxmlformats.org/markup-compatibility/2006" xmlns:a14="http://schemas.microsoft.com/office/drawing/2010/main">
+        <mc:Choice Requires="a14">
           <p:sp>
             <p:nvSpPr>
               <p:cNvPr id="10" name="TextBox 9">
@@ -18993,7 +18994,7 @@
             </p:txBody>
           </p:sp>
         </mc:Choice>
-        <mc:Fallback>
+        <mc:Fallback xmlns="">
           <p:sp>
             <p:nvSpPr>
               <p:cNvPr id="10" name="TextBox 9">
@@ -19135,8 +19136,8 @@
           </a:p>
         </p:txBody>
       </p:sp>
-      <mc:AlternateContent xmlns:mc="http://schemas.openxmlformats.org/markup-compatibility/2006">
-        <mc:Choice xmlns:a14="http://schemas.microsoft.com/office/drawing/2010/main" Requires="a14">
+      <mc:AlternateContent xmlns:mc="http://schemas.openxmlformats.org/markup-compatibility/2006" xmlns:a14="http://schemas.microsoft.com/office/drawing/2010/main">
+        <mc:Choice Requires="a14">
           <p:sp>
             <p:nvSpPr>
               <p:cNvPr id="14" name="TextBox 13">
@@ -19187,7 +19188,7 @@
             </p:txBody>
           </p:sp>
         </mc:Choice>
-        <mc:Fallback>
+        <mc:Fallback xmlns="">
           <p:sp>
             <p:nvSpPr>
               <p:cNvPr id="14" name="TextBox 13">
@@ -19286,8 +19287,8 @@
           </a:p>
         </p:txBody>
       </p:sp>
-      <mc:AlternateContent xmlns:mc="http://schemas.openxmlformats.org/markup-compatibility/2006">
-        <mc:Choice xmlns:a14="http://schemas.microsoft.com/office/drawing/2010/main" Requires="a14">
+      <mc:AlternateContent xmlns:mc="http://schemas.openxmlformats.org/markup-compatibility/2006" xmlns:a14="http://schemas.microsoft.com/office/drawing/2010/main">
+        <mc:Choice Requires="a14">
           <p:sp>
             <p:nvSpPr>
               <p:cNvPr id="16" name="TextBox 15">
@@ -19338,7 +19339,7 @@
             </p:txBody>
           </p:sp>
         </mc:Choice>
-        <mc:Fallback>
+        <mc:Fallback xmlns="">
           <p:sp>
             <p:nvSpPr>
               <p:cNvPr id="16" name="TextBox 15">
@@ -19479,8 +19480,8 @@
           </a:p>
         </p:txBody>
       </p:sp>
-      <mc:AlternateContent xmlns:mc="http://schemas.openxmlformats.org/markup-compatibility/2006">
-        <mc:Choice xmlns:a14="http://schemas.microsoft.com/office/drawing/2010/main" Requires="a14">
+      <mc:AlternateContent xmlns:mc="http://schemas.openxmlformats.org/markup-compatibility/2006" xmlns:a14="http://schemas.microsoft.com/office/drawing/2010/main">
+        <mc:Choice Requires="a14">
           <p:sp>
             <p:nvSpPr>
               <p:cNvPr id="24" name="TextBox 23">
@@ -19531,7 +19532,7 @@
             </p:txBody>
           </p:sp>
         </mc:Choice>
-        <mc:Fallback>
+        <mc:Fallback xmlns="">
           <p:sp>
             <p:nvSpPr>
               <p:cNvPr id="24" name="TextBox 23">
@@ -20143,8 +20144,8 @@
           </p:style>
         </p:cxnSp>
       </p:grpSp>
-      <mc:AlternateContent xmlns:mc="http://schemas.openxmlformats.org/markup-compatibility/2006">
-        <mc:Choice xmlns:a14="http://schemas.microsoft.com/office/drawing/2010/main" Requires="a14">
+      <mc:AlternateContent xmlns:mc="http://schemas.openxmlformats.org/markup-compatibility/2006" xmlns:a14="http://schemas.microsoft.com/office/drawing/2010/main">
+        <mc:Choice Requires="a14">
           <p:sp>
             <p:nvSpPr>
               <p:cNvPr id="51" name="TextBox 50">
@@ -20216,7 +20217,7 @@
             </p:txBody>
           </p:sp>
         </mc:Choice>
-        <mc:Fallback>
+        <mc:Fallback xmlns="">
           <p:sp>
             <p:nvSpPr>
               <p:cNvPr id="51" name="TextBox 50">
@@ -20668,8 +20669,8 @@
           </a:fontRef>
         </p:style>
       </p:cxnSp>
-      <mc:AlternateContent xmlns:mc="http://schemas.openxmlformats.org/markup-compatibility/2006">
-        <mc:Choice xmlns:a14="http://schemas.microsoft.com/office/drawing/2010/main" Requires="a14">
+      <mc:AlternateContent xmlns:mc="http://schemas.openxmlformats.org/markup-compatibility/2006" xmlns:a14="http://schemas.microsoft.com/office/drawing/2010/main">
+        <mc:Choice Requires="a14">
           <p:sp>
             <p:nvSpPr>
               <p:cNvPr id="91" name="TextBox 90">
@@ -20719,7 +20720,7 @@
             </p:txBody>
           </p:sp>
         </mc:Choice>
-        <mc:Fallback>
+        <mc:Fallback xmlns="">
           <p:sp>
             <p:nvSpPr>
               <p:cNvPr id="91" name="TextBox 90">
@@ -20764,8 +20765,8 @@
           </p:sp>
         </mc:Fallback>
       </mc:AlternateContent>
-      <mc:AlternateContent xmlns:mc="http://schemas.openxmlformats.org/markup-compatibility/2006">
-        <mc:Choice xmlns:a14="http://schemas.microsoft.com/office/drawing/2010/main" Requires="a14">
+      <mc:AlternateContent xmlns:mc="http://schemas.openxmlformats.org/markup-compatibility/2006" xmlns:a14="http://schemas.microsoft.com/office/drawing/2010/main">
+        <mc:Choice Requires="a14">
           <p:sp>
             <p:nvSpPr>
               <p:cNvPr id="92" name="TextBox 91">
@@ -20822,7 +20823,7 @@
             </p:txBody>
           </p:sp>
         </mc:Choice>
-        <mc:Fallback>
+        <mc:Fallback xmlns="">
           <p:sp>
             <p:nvSpPr>
               <p:cNvPr id="92" name="TextBox 91">
@@ -20929,8 +20930,8 @@
           </a:p>
         </p:txBody>
       </p:sp>
-      <mc:AlternateContent xmlns:mc="http://schemas.openxmlformats.org/markup-compatibility/2006">
-        <mc:Choice xmlns:a14="http://schemas.microsoft.com/office/drawing/2010/main" Requires="a14">
+      <mc:AlternateContent xmlns:mc="http://schemas.openxmlformats.org/markup-compatibility/2006" xmlns:a14="http://schemas.microsoft.com/office/drawing/2010/main">
+        <mc:Choice Requires="a14">
           <p:sp>
             <p:nvSpPr>
               <p:cNvPr id="95" name="TextBox 94">
@@ -21016,7 +21017,7 @@
             </p:txBody>
           </p:sp>
         </mc:Choice>
-        <mc:Fallback>
+        <mc:Fallback xmlns="">
           <p:sp>
             <p:nvSpPr>
               <p:cNvPr id="95" name="TextBox 94">
@@ -21061,8 +21062,8 @@
           </p:sp>
         </mc:Fallback>
       </mc:AlternateContent>
-      <mc:AlternateContent xmlns:mc="http://schemas.openxmlformats.org/markup-compatibility/2006">
-        <mc:Choice xmlns:a14="http://schemas.microsoft.com/office/drawing/2010/main" Requires="a14">
+      <mc:AlternateContent xmlns:mc="http://schemas.openxmlformats.org/markup-compatibility/2006" xmlns:a14="http://schemas.microsoft.com/office/drawing/2010/main">
+        <mc:Choice Requires="a14">
           <p:sp>
             <p:nvSpPr>
               <p:cNvPr id="96" name="TextBox 95">
@@ -21141,7 +21142,7 @@
             </p:txBody>
           </p:sp>
         </mc:Choice>
-        <mc:Fallback>
+        <mc:Fallback xmlns="">
           <p:sp>
             <p:nvSpPr>
               <p:cNvPr id="96" name="TextBox 95">
@@ -21469,8 +21470,8 @@
           </a:p>
         </p:txBody>
       </p:sp>
-      <mc:AlternateContent xmlns:mc="http://schemas.openxmlformats.org/markup-compatibility/2006">
-        <mc:Choice xmlns:a14="http://schemas.microsoft.com/office/drawing/2010/main" Requires="a14">
+      <mc:AlternateContent xmlns:mc="http://schemas.openxmlformats.org/markup-compatibility/2006" xmlns:a14="http://schemas.microsoft.com/office/drawing/2010/main">
+        <mc:Choice Requires="a14">
           <p:sp>
             <p:nvSpPr>
               <p:cNvPr id="10" name="TextBox 9">
@@ -21521,7 +21522,7 @@
             </p:txBody>
           </p:sp>
         </mc:Choice>
-        <mc:Fallback>
+        <mc:Fallback xmlns="">
           <p:sp>
             <p:nvSpPr>
               <p:cNvPr id="10" name="TextBox 9">
@@ -21717,8 +21718,8 @@
           </a:p>
         </p:txBody>
       </p:sp>
-      <mc:AlternateContent xmlns:mc="http://schemas.openxmlformats.org/markup-compatibility/2006">
-        <mc:Choice xmlns:a14="http://schemas.microsoft.com/office/drawing/2010/main" Requires="a14">
+      <mc:AlternateContent xmlns:mc="http://schemas.openxmlformats.org/markup-compatibility/2006" xmlns:a14="http://schemas.microsoft.com/office/drawing/2010/main">
+        <mc:Choice Requires="a14">
           <p:sp>
             <p:nvSpPr>
               <p:cNvPr id="15" name="TextBox 14">
@@ -21769,7 +21770,7 @@
             </p:txBody>
           </p:sp>
         </mc:Choice>
-        <mc:Fallback>
+        <mc:Fallback xmlns="">
           <p:sp>
             <p:nvSpPr>
               <p:cNvPr id="15" name="TextBox 14">
@@ -21950,8 +21951,8 @@
           </a:fontRef>
         </p:style>
       </p:cxnSp>
-      <mc:AlternateContent xmlns:mc="http://schemas.openxmlformats.org/markup-compatibility/2006">
-        <mc:Choice xmlns:a14="http://schemas.microsoft.com/office/drawing/2010/main" Requires="a14">
+      <mc:AlternateContent xmlns:mc="http://schemas.openxmlformats.org/markup-compatibility/2006" xmlns:a14="http://schemas.microsoft.com/office/drawing/2010/main">
+        <mc:Choice Requires="a14">
           <p:sp>
             <p:nvSpPr>
               <p:cNvPr id="25" name="TextBox 24">
@@ -22002,7 +22003,7 @@
             </p:txBody>
           </p:sp>
         </mc:Choice>
-        <mc:Fallback>
+        <mc:Fallback xmlns="">
           <p:sp>
             <p:nvSpPr>
               <p:cNvPr id="25" name="TextBox 24">
@@ -23494,8 +23495,8 @@
           </a:p>
         </p:txBody>
       </p:sp>
-      <mc:AlternateContent xmlns:mc="http://schemas.openxmlformats.org/markup-compatibility/2006">
-        <mc:Choice xmlns:a14="http://schemas.microsoft.com/office/drawing/2010/main" Requires="a14">
+      <mc:AlternateContent xmlns:mc="http://schemas.openxmlformats.org/markup-compatibility/2006" xmlns:a14="http://schemas.microsoft.com/office/drawing/2010/main">
+        <mc:Choice Requires="a14">
           <p:sp>
             <p:nvSpPr>
               <p:cNvPr id="5" name="TextBox 4">
@@ -23546,7 +23547,7 @@
             </p:txBody>
           </p:sp>
         </mc:Choice>
-        <mc:Fallback>
+        <mc:Fallback xmlns="">
           <p:sp>
             <p:nvSpPr>
               <p:cNvPr id="5" name="TextBox 4">
@@ -23922,8 +23923,8 @@
           </a:fontRef>
         </p:style>
       </p:cxnSp>
-      <mc:AlternateContent xmlns:mc="http://schemas.openxmlformats.org/markup-compatibility/2006">
-        <mc:Choice xmlns:a14="http://schemas.microsoft.com/office/drawing/2010/main" Requires="a14">
+      <mc:AlternateContent xmlns:mc="http://schemas.openxmlformats.org/markup-compatibility/2006" xmlns:a14="http://schemas.microsoft.com/office/drawing/2010/main">
+        <mc:Choice Requires="a14">
           <p:sp>
             <p:nvSpPr>
               <p:cNvPr id="21" name="TextBox 20">
@@ -23974,7 +23975,7 @@
             </p:txBody>
           </p:sp>
         </mc:Choice>
-        <mc:Fallback>
+        <mc:Fallback xmlns="">
           <p:sp>
             <p:nvSpPr>
               <p:cNvPr id="21" name="TextBox 20">
@@ -24019,8 +24020,8 @@
           </p:sp>
         </mc:Fallback>
       </mc:AlternateContent>
-      <mc:AlternateContent xmlns:mc="http://schemas.openxmlformats.org/markup-compatibility/2006">
-        <mc:Choice xmlns:a14="http://schemas.microsoft.com/office/drawing/2010/main" Requires="a14">
+      <mc:AlternateContent xmlns:mc="http://schemas.openxmlformats.org/markup-compatibility/2006" xmlns:a14="http://schemas.microsoft.com/office/drawing/2010/main">
+        <mc:Choice Requires="a14">
           <p:sp>
             <p:nvSpPr>
               <p:cNvPr id="22" name="TextBox 21">
@@ -24071,7 +24072,7 @@
             </p:txBody>
           </p:sp>
         </mc:Choice>
-        <mc:Fallback>
+        <mc:Fallback xmlns="">
           <p:sp>
             <p:nvSpPr>
               <p:cNvPr id="22" name="TextBox 21">
@@ -24116,8 +24117,8 @@
           </p:sp>
         </mc:Fallback>
       </mc:AlternateContent>
-      <mc:AlternateContent xmlns:mc="http://schemas.openxmlformats.org/markup-compatibility/2006">
-        <mc:Choice xmlns:a14="http://schemas.microsoft.com/office/drawing/2010/main" Requires="a14">
+      <mc:AlternateContent xmlns:mc="http://schemas.openxmlformats.org/markup-compatibility/2006" xmlns:a14="http://schemas.microsoft.com/office/drawing/2010/main">
+        <mc:Choice Requires="a14">
           <p:sp>
             <p:nvSpPr>
               <p:cNvPr id="23" name="TextBox 22">
@@ -24168,7 +24169,7 @@
             </p:txBody>
           </p:sp>
         </mc:Choice>
-        <mc:Fallback>
+        <mc:Fallback xmlns="">
           <p:sp>
             <p:nvSpPr>
               <p:cNvPr id="23" name="TextBox 22">
@@ -24626,8 +24627,8 @@
           </a:fontRef>
         </p:style>
       </p:cxnSp>
-      <mc:AlternateContent xmlns:mc="http://schemas.openxmlformats.org/markup-compatibility/2006">
-        <mc:Choice xmlns:a14="http://schemas.microsoft.com/office/drawing/2010/main" Requires="a14">
+      <mc:AlternateContent xmlns:mc="http://schemas.openxmlformats.org/markup-compatibility/2006" xmlns:a14="http://schemas.microsoft.com/office/drawing/2010/main">
+        <mc:Choice Requires="a14">
           <p:sp>
             <p:nvSpPr>
               <p:cNvPr id="20" name="TextBox 19">
@@ -24678,7 +24679,7 @@
             </p:txBody>
           </p:sp>
         </mc:Choice>
-        <mc:Fallback>
+        <mc:Fallback xmlns="">
           <p:sp>
             <p:nvSpPr>
               <p:cNvPr id="20" name="TextBox 19">
@@ -24723,8 +24724,8 @@
           </p:sp>
         </mc:Fallback>
       </mc:AlternateContent>
-      <mc:AlternateContent xmlns:mc="http://schemas.openxmlformats.org/markup-compatibility/2006">
-        <mc:Choice xmlns:a14="http://schemas.microsoft.com/office/drawing/2010/main" Requires="a14">
+      <mc:AlternateContent xmlns:mc="http://schemas.openxmlformats.org/markup-compatibility/2006" xmlns:a14="http://schemas.microsoft.com/office/drawing/2010/main">
+        <mc:Choice Requires="a14">
           <p:sp>
             <p:nvSpPr>
               <p:cNvPr id="21" name="TextBox 20">
@@ -24775,7 +24776,7 @@
             </p:txBody>
           </p:sp>
         </mc:Choice>
-        <mc:Fallback>
+        <mc:Fallback xmlns="">
           <p:sp>
             <p:nvSpPr>
               <p:cNvPr id="21" name="TextBox 20">
@@ -24820,8 +24821,8 @@
           </p:sp>
         </mc:Fallback>
       </mc:AlternateContent>
-      <mc:AlternateContent xmlns:mc="http://schemas.openxmlformats.org/markup-compatibility/2006">
-        <mc:Choice xmlns:a14="http://schemas.microsoft.com/office/drawing/2010/main" Requires="a14">
+      <mc:AlternateContent xmlns:mc="http://schemas.openxmlformats.org/markup-compatibility/2006" xmlns:a14="http://schemas.microsoft.com/office/drawing/2010/main">
+        <mc:Choice Requires="a14">
           <p:sp>
             <p:nvSpPr>
               <p:cNvPr id="22" name="TextBox 21">
@@ -24872,7 +24873,7 @@
             </p:txBody>
           </p:sp>
         </mc:Choice>
-        <mc:Fallback>
+        <mc:Fallback xmlns="">
           <p:sp>
             <p:nvSpPr>
               <p:cNvPr id="22" name="TextBox 21">
@@ -25015,8 +25016,8 @@
           </a:p>
         </p:txBody>
       </p:sp>
-      <mc:AlternateContent xmlns:mc="http://schemas.openxmlformats.org/markup-compatibility/2006">
-        <mc:Choice xmlns:a14="http://schemas.microsoft.com/office/drawing/2010/main" Requires="a14">
+      <mc:AlternateContent xmlns:mc="http://schemas.openxmlformats.org/markup-compatibility/2006" xmlns:a14="http://schemas.microsoft.com/office/drawing/2010/main">
+        <mc:Choice Requires="a14">
           <p:sp>
             <p:nvSpPr>
               <p:cNvPr id="27" name="TextBox 26">
@@ -25067,7 +25068,7 @@
             </p:txBody>
           </p:sp>
         </mc:Choice>
-        <mc:Fallback>
+        <mc:Fallback xmlns="">
           <p:sp>
             <p:nvSpPr>
               <p:cNvPr id="27" name="TextBox 26">
@@ -25158,8 +25159,8 @@
           </a:fontRef>
         </p:style>
       </p:cxnSp>
-      <mc:AlternateContent xmlns:mc="http://schemas.openxmlformats.org/markup-compatibility/2006">
-        <mc:Choice xmlns:a14="http://schemas.microsoft.com/office/drawing/2010/main" Requires="a14">
+      <mc:AlternateContent xmlns:mc="http://schemas.openxmlformats.org/markup-compatibility/2006" xmlns:a14="http://schemas.microsoft.com/office/drawing/2010/main">
+        <mc:Choice Requires="a14">
           <p:sp>
             <p:nvSpPr>
               <p:cNvPr id="29" name="TextBox 28">
@@ -25223,7 +25224,7 @@
             </p:txBody>
           </p:sp>
         </mc:Choice>
-        <mc:Fallback>
+        <mc:Fallback xmlns="">
           <p:sp>
             <p:nvSpPr>
               <p:cNvPr id="29" name="TextBox 28">
@@ -25268,8 +25269,8 @@
           </p:sp>
         </mc:Fallback>
       </mc:AlternateContent>
-      <mc:AlternateContent xmlns:mc="http://schemas.openxmlformats.org/markup-compatibility/2006">
-        <mc:Choice xmlns:a14="http://schemas.microsoft.com/office/drawing/2010/main" Requires="a14">
+      <mc:AlternateContent xmlns:mc="http://schemas.openxmlformats.org/markup-compatibility/2006" xmlns:a14="http://schemas.microsoft.com/office/drawing/2010/main">
+        <mc:Choice Requires="a14">
           <p:sp>
             <p:nvSpPr>
               <p:cNvPr id="31" name="TextBox 30">
@@ -25333,7 +25334,7 @@
             </p:txBody>
           </p:sp>
         </mc:Choice>
-        <mc:Fallback>
+        <mc:Fallback xmlns="">
           <p:sp>
             <p:nvSpPr>
               <p:cNvPr id="31" name="TextBox 30">
@@ -25378,8 +25379,8 @@
           </p:sp>
         </mc:Fallback>
       </mc:AlternateContent>
-      <mc:AlternateContent xmlns:mc="http://schemas.openxmlformats.org/markup-compatibility/2006">
-        <mc:Choice xmlns:a14="http://schemas.microsoft.com/office/drawing/2010/main" Requires="a14">
+      <mc:AlternateContent xmlns:mc="http://schemas.openxmlformats.org/markup-compatibility/2006" xmlns:a14="http://schemas.microsoft.com/office/drawing/2010/main">
+        <mc:Choice Requires="a14">
           <p:sp>
             <p:nvSpPr>
               <p:cNvPr id="32" name="TextBox 31">
@@ -25450,7 +25451,7 @@
             </p:txBody>
           </p:sp>
         </mc:Choice>
-        <mc:Fallback>
+        <mc:Fallback xmlns="">
           <p:sp>
             <p:nvSpPr>
               <p:cNvPr id="32" name="TextBox 31">
@@ -25627,7 +25628,11 @@
           <a:lstStyle/>
           <a:p>
             <a:pPr algn="ctr"/>
-            <a:endParaRPr lang="en-US"/>
+            <a:r>
+              <a:rPr lang="ru-RU" dirty="0"/>
+              <a:t> </a:t>
+            </a:r>
+            <a:endParaRPr lang="en-US" dirty="0"/>
           </a:p>
         </p:txBody>
       </p:sp>
@@ -25723,8 +25728,8 @@
           </a:fontRef>
         </p:style>
       </p:cxnSp>
-      <mc:AlternateContent xmlns:mc="http://schemas.openxmlformats.org/markup-compatibility/2006">
-        <mc:Choice xmlns:a14="http://schemas.microsoft.com/office/drawing/2010/main" Requires="a14">
+      <mc:AlternateContent xmlns:mc="http://schemas.openxmlformats.org/markup-compatibility/2006" xmlns:a14="http://schemas.microsoft.com/office/drawing/2010/main">
+        <mc:Choice Requires="a14">
           <p:sp>
             <p:nvSpPr>
               <p:cNvPr id="9" name="TextBox 8">
@@ -25774,7 +25779,7 @@
             </p:txBody>
           </p:sp>
         </mc:Choice>
-        <mc:Fallback>
+        <mc:Fallback xmlns="">
           <p:sp>
             <p:nvSpPr>
               <p:cNvPr id="9" name="TextBox 8">
@@ -25819,8 +25824,8 @@
           </p:sp>
         </mc:Fallback>
       </mc:AlternateContent>
-      <mc:AlternateContent xmlns:mc="http://schemas.openxmlformats.org/markup-compatibility/2006">
-        <mc:Choice xmlns:a14="http://schemas.microsoft.com/office/drawing/2010/main" Requires="a14">
+      <mc:AlternateContent xmlns:mc="http://schemas.openxmlformats.org/markup-compatibility/2006" xmlns:a14="http://schemas.microsoft.com/office/drawing/2010/main">
+        <mc:Choice Requires="a14">
           <p:sp>
             <p:nvSpPr>
               <p:cNvPr id="10" name="TextBox 9">
@@ -25870,7 +25875,7 @@
             </p:txBody>
           </p:sp>
         </mc:Choice>
-        <mc:Fallback>
+        <mc:Fallback xmlns="">
           <p:sp>
             <p:nvSpPr>
               <p:cNvPr id="10" name="TextBox 9">
@@ -25961,8 +25966,8 @@
           </a:fontRef>
         </p:style>
       </p:cxnSp>
-      <mc:AlternateContent xmlns:mc="http://schemas.openxmlformats.org/markup-compatibility/2006">
-        <mc:Choice xmlns:a14="http://schemas.microsoft.com/office/drawing/2010/main" Requires="a14">
+      <mc:AlternateContent xmlns:mc="http://schemas.openxmlformats.org/markup-compatibility/2006" xmlns:a14="http://schemas.microsoft.com/office/drawing/2010/main">
+        <mc:Choice Requires="a14">
           <p:sp>
             <p:nvSpPr>
               <p:cNvPr id="14" name="TextBox 13">
@@ -26043,7 +26048,7 @@
             </p:txBody>
           </p:sp>
         </mc:Choice>
-        <mc:Fallback>
+        <mc:Fallback xmlns="">
           <p:sp>
             <p:nvSpPr>
               <p:cNvPr id="14" name="TextBox 13">
@@ -26188,8 +26193,8 @@
           </a:p>
         </p:txBody>
       </p:sp>
-      <mc:AlternateContent xmlns:mc="http://schemas.openxmlformats.org/markup-compatibility/2006">
-        <mc:Choice xmlns:a14="http://schemas.microsoft.com/office/drawing/2010/main" Requires="a14">
+      <mc:AlternateContent xmlns:mc="http://schemas.openxmlformats.org/markup-compatibility/2006" xmlns:a14="http://schemas.microsoft.com/office/drawing/2010/main">
+        <mc:Choice Requires="a14">
           <p:sp>
             <p:nvSpPr>
               <p:cNvPr id="18" name="TextBox 17">
@@ -26240,7 +26245,7 @@
             </p:txBody>
           </p:sp>
         </mc:Choice>
-        <mc:Fallback>
+        <mc:Fallback xmlns="">
           <p:sp>
             <p:nvSpPr>
               <p:cNvPr id="18" name="TextBox 17">
@@ -26383,8 +26388,8 @@
           </a:p>
         </p:txBody>
       </p:sp>
-      <mc:AlternateContent xmlns:mc="http://schemas.openxmlformats.org/markup-compatibility/2006">
-        <mc:Choice xmlns:a14="http://schemas.microsoft.com/office/drawing/2010/main" Requires="a14">
+      <mc:AlternateContent xmlns:mc="http://schemas.openxmlformats.org/markup-compatibility/2006" xmlns:a14="http://schemas.microsoft.com/office/drawing/2010/main">
+        <mc:Choice Requires="a14">
           <p:sp>
             <p:nvSpPr>
               <p:cNvPr id="25" name="TextBox 24">
@@ -26446,7 +26451,7 @@
             </p:txBody>
           </p:sp>
         </mc:Choice>
-        <mc:Fallback>
+        <mc:Fallback xmlns="">
           <p:sp>
             <p:nvSpPr>
               <p:cNvPr id="25" name="TextBox 24">
@@ -26491,8 +26496,8 @@
           </p:sp>
         </mc:Fallback>
       </mc:AlternateContent>
-      <mc:AlternateContent xmlns:mc="http://schemas.openxmlformats.org/markup-compatibility/2006">
-        <mc:Choice xmlns:a14="http://schemas.microsoft.com/office/drawing/2010/main" Requires="a14">
+      <mc:AlternateContent xmlns:mc="http://schemas.openxmlformats.org/markup-compatibility/2006" xmlns:a14="http://schemas.microsoft.com/office/drawing/2010/main">
+        <mc:Choice Requires="a14">
           <p:sp>
             <p:nvSpPr>
               <p:cNvPr id="26" name="TextBox 25">
@@ -26560,7 +26565,7 @@
             </p:txBody>
           </p:sp>
         </mc:Choice>
-        <mc:Fallback>
+        <mc:Fallback xmlns="">
           <p:sp>
             <p:nvSpPr>
               <p:cNvPr id="26" name="TextBox 25">
@@ -26654,8 +26659,8 @@
           </a:p>
         </p:txBody>
       </p:sp>
-      <mc:AlternateContent xmlns:mc="http://schemas.openxmlformats.org/markup-compatibility/2006">
-        <mc:Choice xmlns:a14="http://schemas.microsoft.com/office/drawing/2010/main" Requires="a14">
+      <mc:AlternateContent xmlns:mc="http://schemas.openxmlformats.org/markup-compatibility/2006" xmlns:a14="http://schemas.microsoft.com/office/drawing/2010/main">
+        <mc:Choice Requires="a14">
           <p:sp>
             <p:nvSpPr>
               <p:cNvPr id="29" name="TextBox 28">
@@ -26706,7 +26711,7 @@
             </p:txBody>
           </p:sp>
         </mc:Choice>
-        <mc:Fallback>
+        <mc:Fallback xmlns="">
           <p:sp>
             <p:nvSpPr>
               <p:cNvPr id="29" name="TextBox 28">
@@ -26755,6 +26760,2630 @@
     <p:extLst>
       <p:ext uri="{BB962C8B-B14F-4D97-AF65-F5344CB8AC3E}">
         <p14:creationId xmlns:p14="http://schemas.microsoft.com/office/powerpoint/2010/main" val="4123084914"/>
+      </p:ext>
+    </p:extLst>
+  </p:cSld>
+  <p:clrMapOvr>
+    <a:masterClrMapping/>
+  </p:clrMapOvr>
+</p:sld>
+</file>
+
+<file path=ppt/slides/slide23.xml><?xml version="1.0" encoding="utf-8"?>
+<p:sld xmlns:a="http://schemas.openxmlformats.org/drawingml/2006/main" xmlns:r="http://schemas.openxmlformats.org/officeDocument/2006/relationships" xmlns:p="http://schemas.openxmlformats.org/presentationml/2006/main">
+  <p:cSld>
+    <p:spTree>
+      <p:nvGrpSpPr>
+        <p:cNvPr id="1" name=""/>
+        <p:cNvGrpSpPr/>
+        <p:nvPr/>
+      </p:nvGrpSpPr>
+      <p:grpSpPr>
+        <a:xfrm>
+          <a:off x="0" y="0"/>
+          <a:ext cx="0" cy="0"/>
+          <a:chOff x="0" y="0"/>
+          <a:chExt cx="0" cy="0"/>
+        </a:xfrm>
+      </p:grpSpPr>
+      <p:sp>
+        <p:nvSpPr>
+          <p:cNvPr id="4" name="Oval 3">
+            <a:extLst>
+              <a:ext uri="{FF2B5EF4-FFF2-40B4-BE49-F238E27FC236}">
+                <a16:creationId xmlns:a16="http://schemas.microsoft.com/office/drawing/2014/main" id="{F1723ED8-9EB5-8CEB-0A62-EFCB462C05CE}"/>
+              </a:ext>
+            </a:extLst>
+          </p:cNvPr>
+          <p:cNvSpPr/>
+          <p:nvPr/>
+        </p:nvSpPr>
+        <p:spPr>
+          <a:xfrm>
+            <a:off x="591113" y="341938"/>
+            <a:ext cx="826463" cy="826463"/>
+          </a:xfrm>
+          <a:custGeom>
+            <a:avLst/>
+            <a:gdLst>
+              <a:gd name="connsiteX0" fmla="*/ 0 w 826463"/>
+              <a:gd name="connsiteY0" fmla="*/ 413232 h 826463"/>
+              <a:gd name="connsiteX1" fmla="*/ 413232 w 826463"/>
+              <a:gd name="connsiteY1" fmla="*/ 0 h 826463"/>
+              <a:gd name="connsiteX2" fmla="*/ 826464 w 826463"/>
+              <a:gd name="connsiteY2" fmla="*/ 413232 h 826463"/>
+              <a:gd name="connsiteX3" fmla="*/ 413232 w 826463"/>
+              <a:gd name="connsiteY3" fmla="*/ 826464 h 826463"/>
+              <a:gd name="connsiteX4" fmla="*/ 0 w 826463"/>
+              <a:gd name="connsiteY4" fmla="*/ 413232 h 826463"/>
+            </a:gdLst>
+            <a:ahLst/>
+            <a:cxnLst>
+              <a:cxn ang="0">
+                <a:pos x="connsiteX0" y="connsiteY0"/>
+              </a:cxn>
+              <a:cxn ang="0">
+                <a:pos x="connsiteX1" y="connsiteY1"/>
+              </a:cxn>
+              <a:cxn ang="0">
+                <a:pos x="connsiteX2" y="connsiteY2"/>
+              </a:cxn>
+              <a:cxn ang="0">
+                <a:pos x="connsiteX3" y="connsiteY3"/>
+              </a:cxn>
+              <a:cxn ang="0">
+                <a:pos x="connsiteX4" y="connsiteY4"/>
+              </a:cxn>
+            </a:cxnLst>
+            <a:rect l="l" t="t" r="r" b="b"/>
+            <a:pathLst>
+              <a:path w="826463" h="826463" fill="none" extrusionOk="0">
+                <a:moveTo>
+                  <a:pt x="0" y="413232"/>
+                </a:moveTo>
+                <a:cubicBezTo>
+                  <a:pt x="3054" y="185372"/>
+                  <a:pt x="200301" y="-31468"/>
+                  <a:pt x="413232" y="0"/>
+                </a:cubicBezTo>
+                <a:cubicBezTo>
+                  <a:pt x="618906" y="-3453"/>
+                  <a:pt x="809145" y="201316"/>
+                  <a:pt x="826464" y="413232"/>
+                </a:cubicBezTo>
+                <a:cubicBezTo>
+                  <a:pt x="825818" y="635290"/>
+                  <a:pt x="619220" y="857363"/>
+                  <a:pt x="413232" y="826464"/>
+                </a:cubicBezTo>
+                <a:cubicBezTo>
+                  <a:pt x="209139" y="839972"/>
+                  <a:pt x="19563" y="646158"/>
+                  <a:pt x="0" y="413232"/>
+                </a:cubicBezTo>
+                <a:close/>
+              </a:path>
+              <a:path w="826463" h="826463" stroke="0" extrusionOk="0">
+                <a:moveTo>
+                  <a:pt x="0" y="413232"/>
+                </a:moveTo>
+                <a:cubicBezTo>
+                  <a:pt x="-30228" y="166365"/>
+                  <a:pt x="177966" y="2644"/>
+                  <a:pt x="413232" y="0"/>
+                </a:cubicBezTo>
+                <a:cubicBezTo>
+                  <a:pt x="653000" y="2431"/>
+                  <a:pt x="798226" y="185908"/>
+                  <a:pt x="826464" y="413232"/>
+                </a:cubicBezTo>
+                <a:cubicBezTo>
+                  <a:pt x="821990" y="645823"/>
+                  <a:pt x="638725" y="841547"/>
+                  <a:pt x="413232" y="826464"/>
+                </a:cubicBezTo>
+                <a:cubicBezTo>
+                  <a:pt x="160130" y="812851"/>
+                  <a:pt x="13582" y="647944"/>
+                  <a:pt x="0" y="413232"/>
+                </a:cubicBezTo>
+                <a:close/>
+              </a:path>
+            </a:pathLst>
+          </a:custGeom>
+          <a:solidFill>
+            <a:srgbClr val="0070C0">
+              <a:alpha val="53000"/>
+            </a:srgbClr>
+          </a:solidFill>
+          <a:ln>
+            <a:extLst>
+              <a:ext uri="{C807C97D-BFC1-408E-A445-0C87EB9F89A2}">
+                <ask:lineSketchStyleProps xmlns:ask="http://schemas.microsoft.com/office/drawing/2018/sketchyshapes" sd="1219033472">
+                  <a:prstGeom prst="ellipse">
+                    <a:avLst/>
+                  </a:prstGeom>
+                  <ask:type>
+                    <ask:lineSketchCurved/>
+                  </ask:type>
+                </ask:lineSketchStyleProps>
+              </a:ext>
+            </a:extLst>
+          </a:ln>
+        </p:spPr>
+        <p:style>
+          <a:lnRef idx="2">
+            <a:schemeClr val="accent1">
+              <a:shade val="15000"/>
+            </a:schemeClr>
+          </a:lnRef>
+          <a:fillRef idx="1">
+            <a:schemeClr val="accent1"/>
+          </a:fillRef>
+          <a:effectRef idx="0">
+            <a:schemeClr val="accent1"/>
+          </a:effectRef>
+          <a:fontRef idx="minor">
+            <a:schemeClr val="lt1"/>
+          </a:fontRef>
+        </p:style>
+        <p:txBody>
+          <a:bodyPr rtlCol="0" anchor="ctr"/>
+          <a:lstStyle/>
+          <a:p>
+            <a:pPr algn="ctr"/>
+            <a:r>
+              <a:rPr lang="ru-RU" dirty="0"/>
+              <a:t> </a:t>
+            </a:r>
+            <a:endParaRPr lang="en-US" dirty="0"/>
+          </a:p>
+        </p:txBody>
+      </p:sp>
+      <p:sp>
+        <p:nvSpPr>
+          <p:cNvPr id="10" name="Oval 9">
+            <a:extLst>
+              <a:ext uri="{FF2B5EF4-FFF2-40B4-BE49-F238E27FC236}">
+                <a16:creationId xmlns:a16="http://schemas.microsoft.com/office/drawing/2014/main" id="{B728F9A3-7472-1BD9-7D25-CB35325A4800}"/>
+              </a:ext>
+            </a:extLst>
+          </p:cNvPr>
+          <p:cNvSpPr/>
+          <p:nvPr/>
+        </p:nvSpPr>
+        <p:spPr>
+          <a:xfrm>
+            <a:off x="3294377" y="253803"/>
+            <a:ext cx="826463" cy="826463"/>
+          </a:xfrm>
+          <a:custGeom>
+            <a:avLst/>
+            <a:gdLst>
+              <a:gd name="connsiteX0" fmla="*/ 0 w 826463"/>
+              <a:gd name="connsiteY0" fmla="*/ 413232 h 826463"/>
+              <a:gd name="connsiteX1" fmla="*/ 413232 w 826463"/>
+              <a:gd name="connsiteY1" fmla="*/ 0 h 826463"/>
+              <a:gd name="connsiteX2" fmla="*/ 826464 w 826463"/>
+              <a:gd name="connsiteY2" fmla="*/ 413232 h 826463"/>
+              <a:gd name="connsiteX3" fmla="*/ 413232 w 826463"/>
+              <a:gd name="connsiteY3" fmla="*/ 826464 h 826463"/>
+              <a:gd name="connsiteX4" fmla="*/ 0 w 826463"/>
+              <a:gd name="connsiteY4" fmla="*/ 413232 h 826463"/>
+            </a:gdLst>
+            <a:ahLst/>
+            <a:cxnLst>
+              <a:cxn ang="0">
+                <a:pos x="connsiteX0" y="connsiteY0"/>
+              </a:cxn>
+              <a:cxn ang="0">
+                <a:pos x="connsiteX1" y="connsiteY1"/>
+              </a:cxn>
+              <a:cxn ang="0">
+                <a:pos x="connsiteX2" y="connsiteY2"/>
+              </a:cxn>
+              <a:cxn ang="0">
+                <a:pos x="connsiteX3" y="connsiteY3"/>
+              </a:cxn>
+              <a:cxn ang="0">
+                <a:pos x="connsiteX4" y="connsiteY4"/>
+              </a:cxn>
+            </a:cxnLst>
+            <a:rect l="l" t="t" r="r" b="b"/>
+            <a:pathLst>
+              <a:path w="826463" h="826463" fill="none" extrusionOk="0">
+                <a:moveTo>
+                  <a:pt x="0" y="413232"/>
+                </a:moveTo>
+                <a:cubicBezTo>
+                  <a:pt x="3054" y="185372"/>
+                  <a:pt x="200301" y="-31468"/>
+                  <a:pt x="413232" y="0"/>
+                </a:cubicBezTo>
+                <a:cubicBezTo>
+                  <a:pt x="618906" y="-3453"/>
+                  <a:pt x="809145" y="201316"/>
+                  <a:pt x="826464" y="413232"/>
+                </a:cubicBezTo>
+                <a:cubicBezTo>
+                  <a:pt x="825818" y="635290"/>
+                  <a:pt x="619220" y="857363"/>
+                  <a:pt x="413232" y="826464"/>
+                </a:cubicBezTo>
+                <a:cubicBezTo>
+                  <a:pt x="209139" y="839972"/>
+                  <a:pt x="19563" y="646158"/>
+                  <a:pt x="0" y="413232"/>
+                </a:cubicBezTo>
+                <a:close/>
+              </a:path>
+              <a:path w="826463" h="826463" stroke="0" extrusionOk="0">
+                <a:moveTo>
+                  <a:pt x="0" y="413232"/>
+                </a:moveTo>
+                <a:cubicBezTo>
+                  <a:pt x="-30228" y="166365"/>
+                  <a:pt x="177966" y="2644"/>
+                  <a:pt x="413232" y="0"/>
+                </a:cubicBezTo>
+                <a:cubicBezTo>
+                  <a:pt x="653000" y="2431"/>
+                  <a:pt x="798226" y="185908"/>
+                  <a:pt x="826464" y="413232"/>
+                </a:cubicBezTo>
+                <a:cubicBezTo>
+                  <a:pt x="821990" y="645823"/>
+                  <a:pt x="638725" y="841547"/>
+                  <a:pt x="413232" y="826464"/>
+                </a:cubicBezTo>
+                <a:cubicBezTo>
+                  <a:pt x="160130" y="812851"/>
+                  <a:pt x="13582" y="647944"/>
+                  <a:pt x="0" y="413232"/>
+                </a:cubicBezTo>
+                <a:close/>
+              </a:path>
+            </a:pathLst>
+          </a:custGeom>
+          <a:solidFill>
+            <a:schemeClr val="accent5">
+              <a:lumMod val="60000"/>
+              <a:lumOff val="40000"/>
+              <a:alpha val="55000"/>
+            </a:schemeClr>
+          </a:solidFill>
+          <a:ln>
+            <a:extLst>
+              <a:ext uri="{C807C97D-BFC1-408E-A445-0C87EB9F89A2}">
+                <ask:lineSketchStyleProps xmlns:ask="http://schemas.microsoft.com/office/drawing/2018/sketchyshapes" sd="1219033472">
+                  <a:prstGeom prst="ellipse">
+                    <a:avLst/>
+                  </a:prstGeom>
+                  <ask:type>
+                    <ask:lineSketchCurved/>
+                  </ask:type>
+                </ask:lineSketchStyleProps>
+              </a:ext>
+            </a:extLst>
+          </a:ln>
+        </p:spPr>
+        <p:style>
+          <a:lnRef idx="2">
+            <a:schemeClr val="accent1">
+              <a:shade val="15000"/>
+            </a:schemeClr>
+          </a:lnRef>
+          <a:fillRef idx="1">
+            <a:schemeClr val="accent1"/>
+          </a:fillRef>
+          <a:effectRef idx="0">
+            <a:schemeClr val="accent1"/>
+          </a:effectRef>
+          <a:fontRef idx="minor">
+            <a:schemeClr val="lt1"/>
+          </a:fontRef>
+        </p:style>
+        <p:txBody>
+          <a:bodyPr rtlCol="0" anchor="ctr"/>
+          <a:lstStyle/>
+          <a:p>
+            <a:pPr algn="ctr"/>
+            <a:r>
+              <a:rPr lang="ru-RU" dirty="0"/>
+              <a:t> </a:t>
+            </a:r>
+            <a:endParaRPr lang="en-US" dirty="0"/>
+          </a:p>
+        </p:txBody>
+      </p:sp>
+      <p:sp>
+        <p:nvSpPr>
+          <p:cNvPr id="11" name="Oval 10">
+            <a:extLst>
+              <a:ext uri="{FF2B5EF4-FFF2-40B4-BE49-F238E27FC236}">
+                <a16:creationId xmlns:a16="http://schemas.microsoft.com/office/drawing/2014/main" id="{D1AE508A-F6F2-DDF4-CD2C-C7F721319E4A}"/>
+              </a:ext>
+            </a:extLst>
+          </p:cNvPr>
+          <p:cNvSpPr/>
+          <p:nvPr/>
+        </p:nvSpPr>
+        <p:spPr>
+          <a:xfrm>
+            <a:off x="2122655" y="2174181"/>
+            <a:ext cx="795285" cy="795285"/>
+          </a:xfrm>
+          <a:custGeom>
+            <a:avLst/>
+            <a:gdLst>
+              <a:gd name="connsiteX0" fmla="*/ 0 w 795285"/>
+              <a:gd name="connsiteY0" fmla="*/ 397643 h 795285"/>
+              <a:gd name="connsiteX1" fmla="*/ 397643 w 795285"/>
+              <a:gd name="connsiteY1" fmla="*/ 0 h 795285"/>
+              <a:gd name="connsiteX2" fmla="*/ 795286 w 795285"/>
+              <a:gd name="connsiteY2" fmla="*/ 397643 h 795285"/>
+              <a:gd name="connsiteX3" fmla="*/ 397643 w 795285"/>
+              <a:gd name="connsiteY3" fmla="*/ 795286 h 795285"/>
+              <a:gd name="connsiteX4" fmla="*/ 0 w 795285"/>
+              <a:gd name="connsiteY4" fmla="*/ 397643 h 795285"/>
+            </a:gdLst>
+            <a:ahLst/>
+            <a:cxnLst>
+              <a:cxn ang="0">
+                <a:pos x="connsiteX0" y="connsiteY0"/>
+              </a:cxn>
+              <a:cxn ang="0">
+                <a:pos x="connsiteX1" y="connsiteY1"/>
+              </a:cxn>
+              <a:cxn ang="0">
+                <a:pos x="connsiteX2" y="connsiteY2"/>
+              </a:cxn>
+              <a:cxn ang="0">
+                <a:pos x="connsiteX3" y="connsiteY3"/>
+              </a:cxn>
+              <a:cxn ang="0">
+                <a:pos x="connsiteX4" y="connsiteY4"/>
+              </a:cxn>
+            </a:cxnLst>
+            <a:rect l="l" t="t" r="r" b="b"/>
+            <a:pathLst>
+              <a:path w="795285" h="795285" fill="none" extrusionOk="0">
+                <a:moveTo>
+                  <a:pt x="0" y="397643"/>
+                </a:moveTo>
+                <a:cubicBezTo>
+                  <a:pt x="25562" y="181063"/>
+                  <a:pt x="195906" y="-36787"/>
+                  <a:pt x="397643" y="0"/>
+                </a:cubicBezTo>
+                <a:cubicBezTo>
+                  <a:pt x="582115" y="-5381"/>
+                  <a:pt x="781964" y="190574"/>
+                  <a:pt x="795286" y="397643"/>
+                </a:cubicBezTo>
+                <a:cubicBezTo>
+                  <a:pt x="791130" y="577617"/>
+                  <a:pt x="591918" y="830498"/>
+                  <a:pt x="397643" y="795286"/>
+                </a:cubicBezTo>
+                <a:cubicBezTo>
+                  <a:pt x="211370" y="813951"/>
+                  <a:pt x="34429" y="625533"/>
+                  <a:pt x="0" y="397643"/>
+                </a:cubicBezTo>
+                <a:close/>
+              </a:path>
+              <a:path w="795285" h="795285" stroke="0" extrusionOk="0">
+                <a:moveTo>
+                  <a:pt x="0" y="397643"/>
+                </a:moveTo>
+                <a:cubicBezTo>
+                  <a:pt x="-6487" y="174030"/>
+                  <a:pt x="160821" y="6459"/>
+                  <a:pt x="397643" y="0"/>
+                </a:cubicBezTo>
+                <a:cubicBezTo>
+                  <a:pt x="659521" y="8898"/>
+                  <a:pt x="781005" y="178485"/>
+                  <a:pt x="795286" y="397643"/>
+                </a:cubicBezTo>
+                <a:cubicBezTo>
+                  <a:pt x="790801" y="621635"/>
+                  <a:pt x="614354" y="811323"/>
+                  <a:pt x="397643" y="795286"/>
+                </a:cubicBezTo>
+                <a:cubicBezTo>
+                  <a:pt x="160977" y="785955"/>
+                  <a:pt x="7796" y="620980"/>
+                  <a:pt x="0" y="397643"/>
+                </a:cubicBezTo>
+                <a:close/>
+              </a:path>
+            </a:pathLst>
+          </a:custGeom>
+          <a:solidFill>
+            <a:schemeClr val="accent6">
+              <a:lumMod val="60000"/>
+              <a:lumOff val="40000"/>
+              <a:alpha val="41000"/>
+            </a:schemeClr>
+          </a:solidFill>
+          <a:ln>
+            <a:extLst>
+              <a:ext uri="{C807C97D-BFC1-408E-A445-0C87EB9F89A2}">
+                <ask:lineSketchStyleProps xmlns:ask="http://schemas.microsoft.com/office/drawing/2018/sketchyshapes" sd="1219033472">
+                  <a:prstGeom prst="ellipse">
+                    <a:avLst/>
+                  </a:prstGeom>
+                  <ask:type>
+                    <ask:lineSketchCurved/>
+                  </ask:type>
+                </ask:lineSketchStyleProps>
+              </a:ext>
+            </a:extLst>
+          </a:ln>
+        </p:spPr>
+        <p:style>
+          <a:lnRef idx="2">
+            <a:schemeClr val="accent1">
+              <a:shade val="15000"/>
+            </a:schemeClr>
+          </a:lnRef>
+          <a:fillRef idx="1">
+            <a:schemeClr val="accent1"/>
+          </a:fillRef>
+          <a:effectRef idx="0">
+            <a:schemeClr val="accent1"/>
+          </a:effectRef>
+          <a:fontRef idx="minor">
+            <a:schemeClr val="lt1"/>
+          </a:fontRef>
+        </p:style>
+        <p:txBody>
+          <a:bodyPr rtlCol="0" anchor="ctr"/>
+          <a:lstStyle/>
+          <a:p>
+            <a:pPr algn="ctr"/>
+            <a:r>
+              <a:rPr lang="ru-RU" dirty="0"/>
+              <a:t> </a:t>
+            </a:r>
+            <a:endParaRPr lang="en-US" dirty="0"/>
+          </a:p>
+        </p:txBody>
+      </p:sp>
+      <mc:AlternateContent xmlns:mc="http://schemas.openxmlformats.org/markup-compatibility/2006">
+        <mc:Choice xmlns:a14="http://schemas.microsoft.com/office/drawing/2010/main" Requires="a14">
+          <p:sp>
+            <p:nvSpPr>
+              <p:cNvPr id="12" name="TextBox 11">
+                <a:extLst>
+                  <a:ext uri="{FF2B5EF4-FFF2-40B4-BE49-F238E27FC236}">
+                    <a16:creationId xmlns:a16="http://schemas.microsoft.com/office/drawing/2014/main" id="{94E15961-74CF-6E56-BC2B-ED74AE9F2986}"/>
+                  </a:ext>
+                </a:extLst>
+              </p:cNvPr>
+              <p:cNvSpPr txBox="1"/>
+              <p:nvPr/>
+            </p:nvSpPr>
+            <p:spPr>
+              <a:xfrm>
+                <a:off x="829616" y="478170"/>
+                <a:ext cx="349455" cy="553998"/>
+              </a:xfrm>
+              <a:prstGeom prst="rect">
+                <a:avLst/>
+              </a:prstGeom>
+              <a:noFill/>
+            </p:spPr>
+            <p:txBody>
+              <a:bodyPr wrap="none" lIns="0" tIns="0" rIns="0" bIns="0" rtlCol="0">
+                <a:spAutoFit/>
+              </a:bodyPr>
+              <a:lstStyle/>
+              <a:p>
+                <a14:m>
+                  <m:oMathPara xmlns:m="http://schemas.openxmlformats.org/officeDocument/2006/math">
+                    <m:oMathParaPr>
+                      <m:jc m:val="centerGroup"/>
+                    </m:oMathParaPr>
+                    <m:oMath xmlns:m="http://schemas.openxmlformats.org/officeDocument/2006/math">
+                      <m:r>
+                        <a:rPr lang="ru-RU" sz="3600" b="0" i="1" smtClean="0">
+                          <a:latin typeface="Cambria Math" panose="02040503050406030204" pitchFamily="18" charset="0"/>
+                        </a:rPr>
+                        <m:t>1</m:t>
+                      </m:r>
+                    </m:oMath>
+                  </m:oMathPara>
+                </a14:m>
+                <a:endParaRPr lang="en-US" sz="3600" dirty="0"/>
+              </a:p>
+            </p:txBody>
+          </p:sp>
+        </mc:Choice>
+        <mc:Fallback>
+          <p:sp>
+            <p:nvSpPr>
+              <p:cNvPr id="12" name="TextBox 11">
+                <a:extLst>
+                  <a:ext uri="{FF2B5EF4-FFF2-40B4-BE49-F238E27FC236}">
+                    <a16:creationId xmlns:a16="http://schemas.microsoft.com/office/drawing/2014/main" id="{94E15961-74CF-6E56-BC2B-ED74AE9F2986}"/>
+                  </a:ext>
+                </a:extLst>
+              </p:cNvPr>
+              <p:cNvSpPr txBox="1">
+                <a:spLocks noRot="1" noChangeAspect="1" noMove="1" noResize="1" noEditPoints="1" noAdjustHandles="1" noChangeArrowheads="1" noChangeShapeType="1" noTextEdit="1"/>
+              </p:cNvSpPr>
+              <p:nvPr/>
+            </p:nvSpPr>
+            <p:spPr>
+              <a:xfrm>
+                <a:off x="829616" y="478170"/>
+                <a:ext cx="349455" cy="553998"/>
+              </a:xfrm>
+              <a:prstGeom prst="rect">
+                <a:avLst/>
+              </a:prstGeom>
+              <a:blipFill>
+                <a:blip r:embed="rId2"/>
+                <a:stretch>
+                  <a:fillRect/>
+                </a:stretch>
+              </a:blipFill>
+            </p:spPr>
+            <p:txBody>
+              <a:bodyPr/>
+              <a:lstStyle/>
+              <a:p>
+                <a:r>
+                  <a:rPr lang="en-US">
+                    <a:noFill/>
+                  </a:rPr>
+                  <a:t> </a:t>
+                </a:r>
+              </a:p>
+            </p:txBody>
+          </p:sp>
+        </mc:Fallback>
+      </mc:AlternateContent>
+      <mc:AlternateContent xmlns:mc="http://schemas.openxmlformats.org/markup-compatibility/2006">
+        <mc:Choice xmlns:a14="http://schemas.microsoft.com/office/drawing/2010/main" Requires="a14">
+          <p:sp>
+            <p:nvSpPr>
+              <p:cNvPr id="13" name="TextBox 12">
+                <a:extLst>
+                  <a:ext uri="{FF2B5EF4-FFF2-40B4-BE49-F238E27FC236}">
+                    <a16:creationId xmlns:a16="http://schemas.microsoft.com/office/drawing/2014/main" id="{1F773556-E970-0980-A39F-7A218427A271}"/>
+                  </a:ext>
+                </a:extLst>
+              </p:cNvPr>
+              <p:cNvSpPr txBox="1"/>
+              <p:nvPr/>
+            </p:nvSpPr>
+            <p:spPr>
+              <a:xfrm>
+                <a:off x="3532880" y="414822"/>
+                <a:ext cx="349455" cy="553998"/>
+              </a:xfrm>
+              <a:prstGeom prst="rect">
+                <a:avLst/>
+              </a:prstGeom>
+              <a:noFill/>
+            </p:spPr>
+            <p:txBody>
+              <a:bodyPr wrap="none" lIns="0" tIns="0" rIns="0" bIns="0" rtlCol="0">
+                <a:spAutoFit/>
+              </a:bodyPr>
+              <a:lstStyle/>
+              <a:p>
+                <a14:m>
+                  <m:oMathPara xmlns:m="http://schemas.openxmlformats.org/officeDocument/2006/math">
+                    <m:oMathParaPr>
+                      <m:jc m:val="centerGroup"/>
+                    </m:oMathParaPr>
+                    <m:oMath xmlns:m="http://schemas.openxmlformats.org/officeDocument/2006/math">
+                      <m:r>
+                        <a:rPr lang="ru-RU" sz="3600" b="0" i="1" smtClean="0">
+                          <a:latin typeface="Cambria Math" panose="02040503050406030204" pitchFamily="18" charset="0"/>
+                        </a:rPr>
+                        <m:t>3</m:t>
+                      </m:r>
+                    </m:oMath>
+                  </m:oMathPara>
+                </a14:m>
+                <a:endParaRPr lang="en-US" sz="3600" dirty="0"/>
+              </a:p>
+            </p:txBody>
+          </p:sp>
+        </mc:Choice>
+        <mc:Fallback>
+          <p:sp>
+            <p:nvSpPr>
+              <p:cNvPr id="13" name="TextBox 12">
+                <a:extLst>
+                  <a:ext uri="{FF2B5EF4-FFF2-40B4-BE49-F238E27FC236}">
+                    <a16:creationId xmlns:a16="http://schemas.microsoft.com/office/drawing/2014/main" id="{1F773556-E970-0980-A39F-7A218427A271}"/>
+                  </a:ext>
+                </a:extLst>
+              </p:cNvPr>
+              <p:cNvSpPr txBox="1">
+                <a:spLocks noRot="1" noChangeAspect="1" noMove="1" noResize="1" noEditPoints="1" noAdjustHandles="1" noChangeArrowheads="1" noChangeShapeType="1" noTextEdit="1"/>
+              </p:cNvSpPr>
+              <p:nvPr/>
+            </p:nvSpPr>
+            <p:spPr>
+              <a:xfrm>
+                <a:off x="3532880" y="414822"/>
+                <a:ext cx="349455" cy="553998"/>
+              </a:xfrm>
+              <a:prstGeom prst="rect">
+                <a:avLst/>
+              </a:prstGeom>
+              <a:blipFill>
+                <a:blip r:embed="rId3"/>
+                <a:stretch>
+                  <a:fillRect/>
+                </a:stretch>
+              </a:blipFill>
+            </p:spPr>
+            <p:txBody>
+              <a:bodyPr/>
+              <a:lstStyle/>
+              <a:p>
+                <a:r>
+                  <a:rPr lang="en-US">
+                    <a:noFill/>
+                  </a:rPr>
+                  <a:t> </a:t>
+                </a:r>
+              </a:p>
+            </p:txBody>
+          </p:sp>
+        </mc:Fallback>
+      </mc:AlternateContent>
+      <mc:AlternateContent xmlns:mc="http://schemas.openxmlformats.org/markup-compatibility/2006">
+        <mc:Choice xmlns:a14="http://schemas.microsoft.com/office/drawing/2010/main" Requires="a14">
+          <p:sp>
+            <p:nvSpPr>
+              <p:cNvPr id="14" name="TextBox 13">
+                <a:extLst>
+                  <a:ext uri="{FF2B5EF4-FFF2-40B4-BE49-F238E27FC236}">
+                    <a16:creationId xmlns:a16="http://schemas.microsoft.com/office/drawing/2014/main" id="{07ED562E-C46A-DC06-7795-AF81909D8B12}"/>
+                  </a:ext>
+                </a:extLst>
+              </p:cNvPr>
+              <p:cNvSpPr txBox="1"/>
+              <p:nvPr/>
+            </p:nvSpPr>
+            <p:spPr>
+              <a:xfrm>
+                <a:off x="2345569" y="2294824"/>
+                <a:ext cx="349455" cy="553998"/>
+              </a:xfrm>
+              <a:prstGeom prst="rect">
+                <a:avLst/>
+              </a:prstGeom>
+              <a:noFill/>
+            </p:spPr>
+            <p:txBody>
+              <a:bodyPr wrap="none" lIns="0" tIns="0" rIns="0" bIns="0" rtlCol="0">
+                <a:spAutoFit/>
+              </a:bodyPr>
+              <a:lstStyle/>
+              <a:p>
+                <a14:m>
+                  <m:oMathPara xmlns:m="http://schemas.openxmlformats.org/officeDocument/2006/math">
+                    <m:oMathParaPr>
+                      <m:jc m:val="centerGroup"/>
+                    </m:oMathParaPr>
+                    <m:oMath xmlns:m="http://schemas.openxmlformats.org/officeDocument/2006/math">
+                      <m:r>
+                        <a:rPr lang="ru-RU" sz="3600" b="0" i="1" smtClean="0">
+                          <a:latin typeface="Cambria Math" panose="02040503050406030204" pitchFamily="18" charset="0"/>
+                        </a:rPr>
+                        <m:t>2</m:t>
+                      </m:r>
+                    </m:oMath>
+                  </m:oMathPara>
+                </a14:m>
+                <a:endParaRPr lang="en-US" sz="3600" dirty="0"/>
+              </a:p>
+            </p:txBody>
+          </p:sp>
+        </mc:Choice>
+        <mc:Fallback>
+          <p:sp>
+            <p:nvSpPr>
+              <p:cNvPr id="14" name="TextBox 13">
+                <a:extLst>
+                  <a:ext uri="{FF2B5EF4-FFF2-40B4-BE49-F238E27FC236}">
+                    <a16:creationId xmlns:a16="http://schemas.microsoft.com/office/drawing/2014/main" id="{07ED562E-C46A-DC06-7795-AF81909D8B12}"/>
+                  </a:ext>
+                </a:extLst>
+              </p:cNvPr>
+              <p:cNvSpPr txBox="1">
+                <a:spLocks noRot="1" noChangeAspect="1" noMove="1" noResize="1" noEditPoints="1" noAdjustHandles="1" noChangeArrowheads="1" noChangeShapeType="1" noTextEdit="1"/>
+              </p:cNvSpPr>
+              <p:nvPr/>
+            </p:nvSpPr>
+            <p:spPr>
+              <a:xfrm>
+                <a:off x="2345569" y="2294824"/>
+                <a:ext cx="349455" cy="553998"/>
+              </a:xfrm>
+              <a:prstGeom prst="rect">
+                <a:avLst/>
+              </a:prstGeom>
+              <a:blipFill>
+                <a:blip r:embed="rId4"/>
+                <a:stretch>
+                  <a:fillRect/>
+                </a:stretch>
+              </a:blipFill>
+            </p:spPr>
+            <p:txBody>
+              <a:bodyPr/>
+              <a:lstStyle/>
+              <a:p>
+                <a:r>
+                  <a:rPr lang="en-US">
+                    <a:noFill/>
+                  </a:rPr>
+                  <a:t> </a:t>
+                </a:r>
+              </a:p>
+            </p:txBody>
+          </p:sp>
+        </mc:Fallback>
+      </mc:AlternateContent>
+      <p:grpSp>
+        <p:nvGrpSpPr>
+          <p:cNvPr id="22" name="Group 21">
+            <a:extLst>
+              <a:ext uri="{FF2B5EF4-FFF2-40B4-BE49-F238E27FC236}">
+                <a16:creationId xmlns:a16="http://schemas.microsoft.com/office/drawing/2014/main" id="{70C79A22-0DF9-B953-BFAE-0836C0518806}"/>
+              </a:ext>
+            </a:extLst>
+          </p:cNvPr>
+          <p:cNvGrpSpPr/>
+          <p:nvPr/>
+        </p:nvGrpSpPr>
+        <p:grpSpPr>
+          <a:xfrm>
+            <a:off x="1775846" y="517071"/>
+            <a:ext cx="1160260" cy="309203"/>
+            <a:chOff x="4696846" y="2777670"/>
+            <a:chExt cx="1160260" cy="309203"/>
+          </a:xfrm>
+        </p:grpSpPr>
+        <p:cxnSp>
+          <p:nvCxnSpPr>
+            <p:cNvPr id="16" name="Straight Arrow Connector 15">
+              <a:extLst>
+                <a:ext uri="{FF2B5EF4-FFF2-40B4-BE49-F238E27FC236}">
+                  <a16:creationId xmlns:a16="http://schemas.microsoft.com/office/drawing/2014/main" id="{4A6A505A-A195-8F1F-2F9F-DD9772927E23}"/>
+                </a:ext>
+              </a:extLst>
+            </p:cNvPr>
+            <p:cNvCxnSpPr>
+              <a:cxnSpLocks/>
+            </p:cNvCxnSpPr>
+            <p:nvPr/>
+          </p:nvCxnSpPr>
+          <p:spPr>
+            <a:xfrm flipV="1">
+              <a:off x="4696846" y="2777670"/>
+              <a:ext cx="1160260" cy="57619"/>
+            </a:xfrm>
+            <a:prstGeom prst="straightConnector1">
+              <a:avLst/>
+            </a:prstGeom>
+            <a:ln w="41275">
+              <a:solidFill>
+                <a:schemeClr val="tx1"/>
+              </a:solidFill>
+              <a:tailEnd type="stealth" w="med" len="lg"/>
+            </a:ln>
+          </p:spPr>
+          <p:style>
+            <a:lnRef idx="2">
+              <a:schemeClr val="accent1"/>
+            </a:lnRef>
+            <a:fillRef idx="0">
+              <a:schemeClr val="accent1"/>
+            </a:fillRef>
+            <a:effectRef idx="1">
+              <a:schemeClr val="accent1"/>
+            </a:effectRef>
+            <a:fontRef idx="minor">
+              <a:schemeClr val="tx1"/>
+            </a:fontRef>
+          </p:style>
+        </p:cxnSp>
+        <p:cxnSp>
+          <p:nvCxnSpPr>
+            <p:cNvPr id="19" name="Straight Arrow Connector 18">
+              <a:extLst>
+                <a:ext uri="{FF2B5EF4-FFF2-40B4-BE49-F238E27FC236}">
+                  <a16:creationId xmlns:a16="http://schemas.microsoft.com/office/drawing/2014/main" id="{FC34E0FD-32EC-9EEB-C798-0A4F3587EF20}"/>
+                </a:ext>
+              </a:extLst>
+            </p:cNvPr>
+            <p:cNvCxnSpPr>
+              <a:cxnSpLocks/>
+            </p:cNvCxnSpPr>
+            <p:nvPr/>
+          </p:nvCxnSpPr>
+          <p:spPr>
+            <a:xfrm flipH="1">
+              <a:off x="4733179" y="3048940"/>
+              <a:ext cx="1050787" cy="37933"/>
+            </a:xfrm>
+            <a:prstGeom prst="straightConnector1">
+              <a:avLst/>
+            </a:prstGeom>
+            <a:ln w="41275">
+              <a:solidFill>
+                <a:schemeClr val="tx1"/>
+              </a:solidFill>
+              <a:tailEnd type="stealth" w="med" len="lg"/>
+            </a:ln>
+          </p:spPr>
+          <p:style>
+            <a:lnRef idx="2">
+              <a:schemeClr val="accent1"/>
+            </a:lnRef>
+            <a:fillRef idx="0">
+              <a:schemeClr val="accent1"/>
+            </a:fillRef>
+            <a:effectRef idx="1">
+              <a:schemeClr val="accent1"/>
+            </a:effectRef>
+            <a:fontRef idx="minor">
+              <a:schemeClr val="tx1"/>
+            </a:fontRef>
+          </p:style>
+        </p:cxnSp>
+      </p:grpSp>
+      <p:grpSp>
+        <p:nvGrpSpPr>
+          <p:cNvPr id="23" name="Group 22">
+            <a:extLst>
+              <a:ext uri="{FF2B5EF4-FFF2-40B4-BE49-F238E27FC236}">
+                <a16:creationId xmlns:a16="http://schemas.microsoft.com/office/drawing/2014/main" id="{5D4D3C4C-A571-0E5B-8AD0-C420F7970E25}"/>
+              </a:ext>
+            </a:extLst>
+          </p:cNvPr>
+          <p:cNvGrpSpPr/>
+          <p:nvPr/>
+        </p:nvGrpSpPr>
+        <p:grpSpPr>
+          <a:xfrm rot="18444105">
+            <a:off x="2498541" y="1466270"/>
+            <a:ext cx="1160260" cy="309203"/>
+            <a:chOff x="4696846" y="2777670"/>
+            <a:chExt cx="1160260" cy="309203"/>
+          </a:xfrm>
+        </p:grpSpPr>
+        <p:cxnSp>
+          <p:nvCxnSpPr>
+            <p:cNvPr id="24" name="Straight Arrow Connector 23">
+              <a:extLst>
+                <a:ext uri="{FF2B5EF4-FFF2-40B4-BE49-F238E27FC236}">
+                  <a16:creationId xmlns:a16="http://schemas.microsoft.com/office/drawing/2014/main" id="{B992C2EF-C03E-E273-5D4D-B483778CA118}"/>
+                </a:ext>
+              </a:extLst>
+            </p:cNvPr>
+            <p:cNvCxnSpPr>
+              <a:cxnSpLocks/>
+            </p:cNvCxnSpPr>
+            <p:nvPr/>
+          </p:nvCxnSpPr>
+          <p:spPr>
+            <a:xfrm flipV="1">
+              <a:off x="4696846" y="2777670"/>
+              <a:ext cx="1160260" cy="57619"/>
+            </a:xfrm>
+            <a:prstGeom prst="straightConnector1">
+              <a:avLst/>
+            </a:prstGeom>
+            <a:ln w="41275">
+              <a:solidFill>
+                <a:schemeClr val="tx1"/>
+              </a:solidFill>
+              <a:tailEnd type="stealth" w="med" len="lg"/>
+            </a:ln>
+          </p:spPr>
+          <p:style>
+            <a:lnRef idx="2">
+              <a:schemeClr val="accent1"/>
+            </a:lnRef>
+            <a:fillRef idx="0">
+              <a:schemeClr val="accent1"/>
+            </a:fillRef>
+            <a:effectRef idx="1">
+              <a:schemeClr val="accent1"/>
+            </a:effectRef>
+            <a:fontRef idx="minor">
+              <a:schemeClr val="tx1"/>
+            </a:fontRef>
+          </p:style>
+        </p:cxnSp>
+        <p:cxnSp>
+          <p:nvCxnSpPr>
+            <p:cNvPr id="25" name="Straight Arrow Connector 24">
+              <a:extLst>
+                <a:ext uri="{FF2B5EF4-FFF2-40B4-BE49-F238E27FC236}">
+                  <a16:creationId xmlns:a16="http://schemas.microsoft.com/office/drawing/2014/main" id="{C64F1477-EAB1-68BE-5ABE-CDDD0E36639D}"/>
+                </a:ext>
+              </a:extLst>
+            </p:cNvPr>
+            <p:cNvCxnSpPr>
+              <a:cxnSpLocks/>
+            </p:cNvCxnSpPr>
+            <p:nvPr/>
+          </p:nvCxnSpPr>
+          <p:spPr>
+            <a:xfrm flipH="1">
+              <a:off x="4733179" y="3048940"/>
+              <a:ext cx="1050787" cy="37933"/>
+            </a:xfrm>
+            <a:prstGeom prst="straightConnector1">
+              <a:avLst/>
+            </a:prstGeom>
+            <a:ln w="41275">
+              <a:solidFill>
+                <a:schemeClr val="tx1"/>
+              </a:solidFill>
+              <a:tailEnd type="stealth" w="med" len="lg"/>
+            </a:ln>
+          </p:spPr>
+          <p:style>
+            <a:lnRef idx="2">
+              <a:schemeClr val="accent1"/>
+            </a:lnRef>
+            <a:fillRef idx="0">
+              <a:schemeClr val="accent1"/>
+            </a:fillRef>
+            <a:effectRef idx="1">
+              <a:schemeClr val="accent1"/>
+            </a:effectRef>
+            <a:fontRef idx="minor">
+              <a:schemeClr val="tx1"/>
+            </a:fontRef>
+          </p:style>
+        </p:cxnSp>
+      </p:grpSp>
+      <p:grpSp>
+        <p:nvGrpSpPr>
+          <p:cNvPr id="26" name="Group 25">
+            <a:extLst>
+              <a:ext uri="{FF2B5EF4-FFF2-40B4-BE49-F238E27FC236}">
+                <a16:creationId xmlns:a16="http://schemas.microsoft.com/office/drawing/2014/main" id="{3ACF2471-EACD-20C8-BBA7-4351AC02F570}"/>
+              </a:ext>
+            </a:extLst>
+          </p:cNvPr>
+          <p:cNvGrpSpPr/>
+          <p:nvPr/>
+        </p:nvGrpSpPr>
+        <p:grpSpPr>
+          <a:xfrm rot="3056020">
+            <a:off x="1084585" y="1560263"/>
+            <a:ext cx="1160260" cy="309203"/>
+            <a:chOff x="4696846" y="2777670"/>
+            <a:chExt cx="1160260" cy="309203"/>
+          </a:xfrm>
+        </p:grpSpPr>
+        <p:cxnSp>
+          <p:nvCxnSpPr>
+            <p:cNvPr id="27" name="Straight Arrow Connector 26">
+              <a:extLst>
+                <a:ext uri="{FF2B5EF4-FFF2-40B4-BE49-F238E27FC236}">
+                  <a16:creationId xmlns:a16="http://schemas.microsoft.com/office/drawing/2014/main" id="{17DC1120-ED7B-B5B3-4CD2-6785C8740AF5}"/>
+                </a:ext>
+              </a:extLst>
+            </p:cNvPr>
+            <p:cNvCxnSpPr>
+              <a:cxnSpLocks/>
+            </p:cNvCxnSpPr>
+            <p:nvPr/>
+          </p:nvCxnSpPr>
+          <p:spPr>
+            <a:xfrm flipV="1">
+              <a:off x="4696846" y="2777670"/>
+              <a:ext cx="1160260" cy="57619"/>
+            </a:xfrm>
+            <a:prstGeom prst="straightConnector1">
+              <a:avLst/>
+            </a:prstGeom>
+            <a:ln w="41275">
+              <a:solidFill>
+                <a:schemeClr val="tx1"/>
+              </a:solidFill>
+              <a:tailEnd type="stealth" w="med" len="lg"/>
+            </a:ln>
+          </p:spPr>
+          <p:style>
+            <a:lnRef idx="2">
+              <a:schemeClr val="accent1"/>
+            </a:lnRef>
+            <a:fillRef idx="0">
+              <a:schemeClr val="accent1"/>
+            </a:fillRef>
+            <a:effectRef idx="1">
+              <a:schemeClr val="accent1"/>
+            </a:effectRef>
+            <a:fontRef idx="minor">
+              <a:schemeClr val="tx1"/>
+            </a:fontRef>
+          </p:style>
+        </p:cxnSp>
+        <p:cxnSp>
+          <p:nvCxnSpPr>
+            <p:cNvPr id="28" name="Straight Arrow Connector 27">
+              <a:extLst>
+                <a:ext uri="{FF2B5EF4-FFF2-40B4-BE49-F238E27FC236}">
+                  <a16:creationId xmlns:a16="http://schemas.microsoft.com/office/drawing/2014/main" id="{8DF5CB50-60AC-81FF-0801-C07AC1D49AEF}"/>
+                </a:ext>
+              </a:extLst>
+            </p:cNvPr>
+            <p:cNvCxnSpPr>
+              <a:cxnSpLocks/>
+            </p:cNvCxnSpPr>
+            <p:nvPr/>
+          </p:nvCxnSpPr>
+          <p:spPr>
+            <a:xfrm flipH="1">
+              <a:off x="4733179" y="3048940"/>
+              <a:ext cx="1050787" cy="37933"/>
+            </a:xfrm>
+            <a:prstGeom prst="straightConnector1">
+              <a:avLst/>
+            </a:prstGeom>
+            <a:ln w="41275">
+              <a:solidFill>
+                <a:schemeClr val="tx1"/>
+              </a:solidFill>
+              <a:tailEnd type="stealth" w="med" len="lg"/>
+            </a:ln>
+          </p:spPr>
+          <p:style>
+            <a:lnRef idx="2">
+              <a:schemeClr val="accent1"/>
+            </a:lnRef>
+            <a:fillRef idx="0">
+              <a:schemeClr val="accent1"/>
+            </a:fillRef>
+            <a:effectRef idx="1">
+              <a:schemeClr val="accent1"/>
+            </a:effectRef>
+            <a:fontRef idx="minor">
+              <a:schemeClr val="tx1"/>
+            </a:fontRef>
+          </p:style>
+        </p:cxnSp>
+      </p:grpSp>
+      <p:sp>
+        <p:nvSpPr>
+          <p:cNvPr id="43" name="Rectangle 42">
+            <a:extLst>
+              <a:ext uri="{FF2B5EF4-FFF2-40B4-BE49-F238E27FC236}">
+                <a16:creationId xmlns:a16="http://schemas.microsoft.com/office/drawing/2014/main" id="{0E1802B7-7DCF-D54C-AEFF-2C8CF5E4F9A2}"/>
+              </a:ext>
+            </a:extLst>
+          </p:cNvPr>
+          <p:cNvSpPr/>
+          <p:nvPr/>
+        </p:nvSpPr>
+        <p:spPr>
+          <a:xfrm>
+            <a:off x="8620393" y="470841"/>
+            <a:ext cx="1587500" cy="317500"/>
+          </a:xfrm>
+          <a:prstGeom prst="rect">
+            <a:avLst/>
+          </a:prstGeom>
+          <a:solidFill>
+            <a:schemeClr val="accent6">
+              <a:lumMod val="60000"/>
+              <a:lumOff val="40000"/>
+              <a:alpha val="31000"/>
+            </a:schemeClr>
+          </a:solidFill>
+        </p:spPr>
+        <p:style>
+          <a:lnRef idx="2">
+            <a:schemeClr val="accent1">
+              <a:shade val="15000"/>
+            </a:schemeClr>
+          </a:lnRef>
+          <a:fillRef idx="1">
+            <a:schemeClr val="accent1"/>
+          </a:fillRef>
+          <a:effectRef idx="0">
+            <a:schemeClr val="accent1"/>
+          </a:effectRef>
+          <a:fontRef idx="minor">
+            <a:schemeClr val="lt1"/>
+          </a:fontRef>
+        </p:style>
+        <p:txBody>
+          <a:bodyPr rtlCol="0" anchor="ctr"/>
+          <a:lstStyle/>
+          <a:p>
+            <a:pPr algn="ctr"/>
+            <a:endParaRPr lang="en-US"/>
+          </a:p>
+        </p:txBody>
+      </p:sp>
+      <p:cxnSp>
+        <p:nvCxnSpPr>
+          <p:cNvPr id="52" name="Straight Arrow Connector 51">
+            <a:extLst>
+              <a:ext uri="{FF2B5EF4-FFF2-40B4-BE49-F238E27FC236}">
+                <a16:creationId xmlns:a16="http://schemas.microsoft.com/office/drawing/2014/main" id="{87A8237C-1493-F931-3598-176E48C8C3D7}"/>
+              </a:ext>
+            </a:extLst>
+          </p:cNvPr>
+          <p:cNvCxnSpPr>
+            <a:cxnSpLocks/>
+          </p:cNvCxnSpPr>
+          <p:nvPr/>
+        </p:nvCxnSpPr>
+        <p:spPr>
+          <a:xfrm>
+            <a:off x="7481279" y="1398008"/>
+            <a:ext cx="1139114" cy="0"/>
+          </a:xfrm>
+          <a:prstGeom prst="straightConnector1">
+            <a:avLst/>
+          </a:prstGeom>
+          <a:ln w="38100">
+            <a:solidFill>
+              <a:schemeClr val="tx1"/>
+            </a:solidFill>
+            <a:prstDash val="solid"/>
+            <a:headEnd type="stealth" w="lg" len="lg"/>
+            <a:tailEnd type="none" w="med" len="sm"/>
+          </a:ln>
+        </p:spPr>
+        <p:style>
+          <a:lnRef idx="1">
+            <a:schemeClr val="accent1"/>
+          </a:lnRef>
+          <a:fillRef idx="0">
+            <a:schemeClr val="accent1"/>
+          </a:fillRef>
+          <a:effectRef idx="0">
+            <a:schemeClr val="accent1"/>
+          </a:effectRef>
+          <a:fontRef idx="minor">
+            <a:schemeClr val="tx1"/>
+          </a:fontRef>
+        </p:style>
+      </p:cxnSp>
+      <mc:AlternateContent xmlns:mc="http://schemas.openxmlformats.org/markup-compatibility/2006">
+        <mc:Choice xmlns:a14="http://schemas.microsoft.com/office/drawing/2010/main" Requires="a14">
+          <p:sp>
+            <p:nvSpPr>
+              <p:cNvPr id="53" name="TextBox 52">
+                <a:extLst>
+                  <a:ext uri="{FF2B5EF4-FFF2-40B4-BE49-F238E27FC236}">
+                    <a16:creationId xmlns:a16="http://schemas.microsoft.com/office/drawing/2014/main" id="{A5315A14-8877-D07C-5E31-E00FFBABEAC9}"/>
+                  </a:ext>
+                </a:extLst>
+              </p:cNvPr>
+              <p:cNvSpPr txBox="1"/>
+              <p:nvPr/>
+            </p:nvSpPr>
+            <p:spPr>
+              <a:xfrm>
+                <a:off x="7257113" y="879692"/>
+                <a:ext cx="1322743" cy="483146"/>
+              </a:xfrm>
+              <a:prstGeom prst="rect">
+                <a:avLst/>
+              </a:prstGeom>
+              <a:noFill/>
+            </p:spPr>
+            <p:txBody>
+              <a:bodyPr wrap="square" lIns="0" tIns="0" rIns="0" bIns="0" rtlCol="0">
+                <a:spAutoFit/>
+              </a:bodyPr>
+              <a:lstStyle/>
+              <a:p>
+                <a:pPr/>
+                <a14:m>
+                  <m:oMathPara xmlns:m="http://schemas.openxmlformats.org/officeDocument/2006/math">
+                    <m:oMathParaPr>
+                      <m:jc m:val="centerGroup"/>
+                    </m:oMathParaPr>
+                    <m:oMath xmlns:m="http://schemas.openxmlformats.org/officeDocument/2006/math">
+                      <m:r>
+                        <a:rPr lang="en-US" sz="2800" b="0" i="1" smtClean="0">
+                          <a:latin typeface="Cambria Math" panose="02040503050406030204" pitchFamily="18" charset="0"/>
+                        </a:rPr>
+                        <m:t>𝑀</m:t>
+                      </m:r>
+                      <m:acc>
+                        <m:accPr>
+                          <m:chr m:val="⃗"/>
+                          <m:ctrlPr>
+                            <a:rPr lang="en-US" sz="2800" b="0" i="1" smtClean="0">
+                              <a:latin typeface="Cambria Math" panose="02040503050406030204" pitchFamily="18" charset="0"/>
+                            </a:rPr>
+                          </m:ctrlPr>
+                        </m:accPr>
+                        <m:e>
+                          <m:r>
+                            <a:rPr lang="en-US" sz="2800" b="0" i="1" smtClean="0">
+                              <a:latin typeface="Cambria Math" panose="02040503050406030204" pitchFamily="18" charset="0"/>
+                            </a:rPr>
+                            <m:t>𝑉</m:t>
+                          </m:r>
+                        </m:e>
+                      </m:acc>
+                    </m:oMath>
+                  </m:oMathPara>
+                </a14:m>
+                <a:endParaRPr lang="en-US" sz="2800" dirty="0"/>
+              </a:p>
+            </p:txBody>
+          </p:sp>
+        </mc:Choice>
+        <mc:Fallback>
+          <p:sp>
+            <p:nvSpPr>
+              <p:cNvPr id="53" name="TextBox 52">
+                <a:extLst>
+                  <a:ext uri="{FF2B5EF4-FFF2-40B4-BE49-F238E27FC236}">
+                    <a16:creationId xmlns:a16="http://schemas.microsoft.com/office/drawing/2014/main" id="{A5315A14-8877-D07C-5E31-E00FFBABEAC9}"/>
+                  </a:ext>
+                </a:extLst>
+              </p:cNvPr>
+              <p:cNvSpPr txBox="1">
+                <a:spLocks noRot="1" noChangeAspect="1" noMove="1" noResize="1" noEditPoints="1" noAdjustHandles="1" noChangeArrowheads="1" noChangeShapeType="1" noTextEdit="1"/>
+              </p:cNvSpPr>
+              <p:nvPr/>
+            </p:nvSpPr>
+            <p:spPr>
+              <a:xfrm>
+                <a:off x="7257113" y="879692"/>
+                <a:ext cx="1322743" cy="483146"/>
+              </a:xfrm>
+              <a:prstGeom prst="rect">
+                <a:avLst/>
+              </a:prstGeom>
+              <a:blipFill>
+                <a:blip r:embed="rId5"/>
+                <a:stretch>
+                  <a:fillRect/>
+                </a:stretch>
+              </a:blipFill>
+            </p:spPr>
+            <p:txBody>
+              <a:bodyPr/>
+              <a:lstStyle/>
+              <a:p>
+                <a:r>
+                  <a:rPr lang="en-US">
+                    <a:noFill/>
+                  </a:rPr>
+                  <a:t> </a:t>
+                </a:r>
+              </a:p>
+            </p:txBody>
+          </p:sp>
+        </mc:Fallback>
+      </mc:AlternateContent>
+      <p:cxnSp>
+        <p:nvCxnSpPr>
+          <p:cNvPr id="54" name="Straight Arrow Connector 53">
+            <a:extLst>
+              <a:ext uri="{FF2B5EF4-FFF2-40B4-BE49-F238E27FC236}">
+                <a16:creationId xmlns:a16="http://schemas.microsoft.com/office/drawing/2014/main" id="{4EF2C298-1CBE-4094-8108-8824F4FB7C0F}"/>
+              </a:ext>
+            </a:extLst>
+          </p:cNvPr>
+          <p:cNvCxnSpPr>
+            <a:cxnSpLocks/>
+          </p:cNvCxnSpPr>
+          <p:nvPr/>
+        </p:nvCxnSpPr>
+        <p:spPr>
+          <a:xfrm flipH="1" flipV="1">
+            <a:off x="10278144" y="1386837"/>
+            <a:ext cx="860109" cy="11171"/>
+          </a:xfrm>
+          <a:prstGeom prst="straightConnector1">
+            <a:avLst/>
+          </a:prstGeom>
+          <a:ln w="38100">
+            <a:solidFill>
+              <a:schemeClr val="tx1"/>
+            </a:solidFill>
+            <a:prstDash val="solid"/>
+            <a:headEnd type="stealth" w="lg" len="lg"/>
+            <a:tailEnd type="none" w="med" len="sm"/>
+          </a:ln>
+        </p:spPr>
+        <p:style>
+          <a:lnRef idx="1">
+            <a:schemeClr val="accent1"/>
+          </a:lnRef>
+          <a:fillRef idx="0">
+            <a:schemeClr val="accent1"/>
+          </a:fillRef>
+          <a:effectRef idx="0">
+            <a:schemeClr val="accent1"/>
+          </a:effectRef>
+          <a:fontRef idx="minor">
+            <a:schemeClr val="tx1"/>
+          </a:fontRef>
+        </p:style>
+      </p:cxnSp>
+      <mc:AlternateContent xmlns:mc="http://schemas.openxmlformats.org/markup-compatibility/2006">
+        <mc:Choice xmlns:a14="http://schemas.microsoft.com/office/drawing/2010/main" Requires="a14">
+          <p:sp>
+            <p:nvSpPr>
+              <p:cNvPr id="55" name="TextBox 54">
+                <a:extLst>
+                  <a:ext uri="{FF2B5EF4-FFF2-40B4-BE49-F238E27FC236}">
+                    <a16:creationId xmlns:a16="http://schemas.microsoft.com/office/drawing/2014/main" id="{2621CD44-341E-FE1F-6632-D6B848E63A08}"/>
+                  </a:ext>
+                </a:extLst>
+              </p:cNvPr>
+              <p:cNvSpPr txBox="1"/>
+              <p:nvPr/>
+            </p:nvSpPr>
+            <p:spPr>
+              <a:xfrm>
+                <a:off x="10278144" y="986244"/>
+                <a:ext cx="1322743" cy="369332"/>
+              </a:xfrm>
+              <a:prstGeom prst="rect">
+                <a:avLst/>
+              </a:prstGeom>
+              <a:noFill/>
+            </p:spPr>
+            <p:txBody>
+              <a:bodyPr wrap="square" lIns="0" tIns="0" rIns="0" bIns="0" rtlCol="0">
+                <a:spAutoFit/>
+              </a:bodyPr>
+              <a:lstStyle/>
+              <a:p>
+                <a:pPr/>
+                <a14:m>
+                  <m:oMathPara xmlns:m="http://schemas.openxmlformats.org/officeDocument/2006/math">
+                    <m:oMathParaPr>
+                      <m:jc m:val="centerGroup"/>
+                    </m:oMathParaPr>
+                    <m:oMath xmlns:m="http://schemas.openxmlformats.org/officeDocument/2006/math">
+                      <m:r>
+                        <a:rPr lang="en-US" sz="2400" b="0" i="1" smtClean="0">
+                          <a:latin typeface="Cambria Math" panose="02040503050406030204" pitchFamily="18" charset="0"/>
+                        </a:rPr>
+                        <m:t>𝑚</m:t>
+                      </m:r>
+                      <m:acc>
+                        <m:accPr>
+                          <m:chr m:val="⃗"/>
+                          <m:ctrlPr>
+                            <a:rPr lang="en-US" sz="2400" i="1" smtClean="0">
+                              <a:latin typeface="Cambria Math" panose="02040503050406030204" pitchFamily="18" charset="0"/>
+                            </a:rPr>
+                          </m:ctrlPr>
+                        </m:accPr>
+                        <m:e>
+                          <m:r>
+                            <a:rPr lang="en-US" sz="2400" b="0" i="1" smtClean="0">
+                              <a:latin typeface="Cambria Math" panose="02040503050406030204" pitchFamily="18" charset="0"/>
+                            </a:rPr>
+                            <m:t>𝑣</m:t>
+                          </m:r>
+                        </m:e>
+                      </m:acc>
+                    </m:oMath>
+                  </m:oMathPara>
+                </a14:m>
+                <a:endParaRPr lang="en-US" sz="2400" dirty="0"/>
+              </a:p>
+            </p:txBody>
+          </p:sp>
+        </mc:Choice>
+        <mc:Fallback>
+          <p:sp>
+            <p:nvSpPr>
+              <p:cNvPr id="55" name="TextBox 54">
+                <a:extLst>
+                  <a:ext uri="{FF2B5EF4-FFF2-40B4-BE49-F238E27FC236}">
+                    <a16:creationId xmlns:a16="http://schemas.microsoft.com/office/drawing/2014/main" id="{2621CD44-341E-FE1F-6632-D6B848E63A08}"/>
+                  </a:ext>
+                </a:extLst>
+              </p:cNvPr>
+              <p:cNvSpPr txBox="1">
+                <a:spLocks noRot="1" noChangeAspect="1" noMove="1" noResize="1" noEditPoints="1" noAdjustHandles="1" noChangeArrowheads="1" noChangeShapeType="1" noTextEdit="1"/>
+              </p:cNvSpPr>
+              <p:nvPr/>
+            </p:nvSpPr>
+            <p:spPr>
+              <a:xfrm>
+                <a:off x="10278144" y="986244"/>
+                <a:ext cx="1322743" cy="369332"/>
+              </a:xfrm>
+              <a:prstGeom prst="rect">
+                <a:avLst/>
+              </a:prstGeom>
+              <a:blipFill>
+                <a:blip r:embed="rId6"/>
+                <a:stretch>
+                  <a:fillRect t="-40000" r="-4147" b="-1667"/>
+                </a:stretch>
+              </a:blipFill>
+            </p:spPr>
+            <p:txBody>
+              <a:bodyPr/>
+              <a:lstStyle/>
+              <a:p>
+                <a:r>
+                  <a:rPr lang="en-US">
+                    <a:noFill/>
+                  </a:rPr>
+                  <a:t> </a:t>
+                </a:r>
+              </a:p>
+            </p:txBody>
+          </p:sp>
+        </mc:Fallback>
+      </mc:AlternateContent>
+      <mc:AlternateContent xmlns:mc="http://schemas.openxmlformats.org/markup-compatibility/2006">
+        <mc:Choice xmlns:a14="http://schemas.microsoft.com/office/drawing/2010/main" Requires="a14">
+          <p:sp>
+            <p:nvSpPr>
+              <p:cNvPr id="56" name="TextBox 55">
+                <a:extLst>
+                  <a:ext uri="{FF2B5EF4-FFF2-40B4-BE49-F238E27FC236}">
+                    <a16:creationId xmlns:a16="http://schemas.microsoft.com/office/drawing/2014/main" id="{0AD614D9-6538-E744-B14A-A7D5ADB8A3BC}"/>
+                  </a:ext>
+                </a:extLst>
+              </p:cNvPr>
+              <p:cNvSpPr txBox="1"/>
+              <p:nvPr/>
+            </p:nvSpPr>
+            <p:spPr>
+              <a:xfrm>
+                <a:off x="8933384" y="1232943"/>
+                <a:ext cx="426075" cy="307777"/>
+              </a:xfrm>
+              <a:prstGeom prst="rect">
+                <a:avLst/>
+              </a:prstGeom>
+              <a:noFill/>
+            </p:spPr>
+            <p:txBody>
+              <a:bodyPr wrap="square" lIns="0" tIns="0" rIns="0" bIns="0" rtlCol="0">
+                <a:spAutoFit/>
+              </a:bodyPr>
+              <a:lstStyle/>
+              <a:p>
+                <a:pPr/>
+                <a14:m>
+                  <m:oMathPara xmlns:m="http://schemas.openxmlformats.org/officeDocument/2006/math">
+                    <m:oMathParaPr>
+                      <m:jc m:val="centerGroup"/>
+                    </m:oMathParaPr>
+                    <m:oMath xmlns:m="http://schemas.openxmlformats.org/officeDocument/2006/math">
+                      <m:r>
+                        <a:rPr lang="en-US" sz="2000" b="0" i="1" smtClean="0">
+                          <a:effectLst>
+                            <a:outerShdw blurRad="38100" dist="38100" dir="2700000" algn="tl">
+                              <a:srgbClr val="000000">
+                                <a:alpha val="43137"/>
+                              </a:srgbClr>
+                            </a:outerShdw>
+                          </a:effectLst>
+                          <a:latin typeface="Cambria Math" panose="02040503050406030204" pitchFamily="18" charset="0"/>
+                        </a:rPr>
+                        <m:t>𝑀</m:t>
+                      </m:r>
+                    </m:oMath>
+                  </m:oMathPara>
+                </a14:m>
+                <a:endParaRPr lang="en-US" sz="2000" dirty="0">
+                  <a:effectLst>
+                    <a:outerShdw blurRad="38100" dist="38100" dir="2700000" algn="tl">
+                      <a:srgbClr val="000000">
+                        <a:alpha val="43137"/>
+                      </a:srgbClr>
+                    </a:outerShdw>
+                  </a:effectLst>
+                </a:endParaRPr>
+              </a:p>
+            </p:txBody>
+          </p:sp>
+        </mc:Choice>
+        <mc:Fallback>
+          <p:sp>
+            <p:nvSpPr>
+              <p:cNvPr id="56" name="TextBox 55">
+                <a:extLst>
+                  <a:ext uri="{FF2B5EF4-FFF2-40B4-BE49-F238E27FC236}">
+                    <a16:creationId xmlns:a16="http://schemas.microsoft.com/office/drawing/2014/main" id="{0AD614D9-6538-E744-B14A-A7D5ADB8A3BC}"/>
+                  </a:ext>
+                </a:extLst>
+              </p:cNvPr>
+              <p:cNvSpPr txBox="1">
+                <a:spLocks noRot="1" noChangeAspect="1" noMove="1" noResize="1" noEditPoints="1" noAdjustHandles="1" noChangeArrowheads="1" noChangeShapeType="1" noTextEdit="1"/>
+              </p:cNvSpPr>
+              <p:nvPr/>
+            </p:nvSpPr>
+            <p:spPr>
+              <a:xfrm>
+                <a:off x="8933384" y="1232943"/>
+                <a:ext cx="426075" cy="307777"/>
+              </a:xfrm>
+              <a:prstGeom prst="rect">
+                <a:avLst/>
+              </a:prstGeom>
+              <a:blipFill>
+                <a:blip r:embed="rId7"/>
+                <a:stretch>
+                  <a:fillRect r="-2857" b="-13725"/>
+                </a:stretch>
+              </a:blipFill>
+            </p:spPr>
+            <p:txBody>
+              <a:bodyPr/>
+              <a:lstStyle/>
+              <a:p>
+                <a:r>
+                  <a:rPr lang="en-US">
+                    <a:noFill/>
+                  </a:rPr>
+                  <a:t> </a:t>
+                </a:r>
+              </a:p>
+            </p:txBody>
+          </p:sp>
+        </mc:Fallback>
+      </mc:AlternateContent>
+      <mc:AlternateContent xmlns:mc="http://schemas.openxmlformats.org/markup-compatibility/2006">
+        <mc:Choice xmlns:a14="http://schemas.microsoft.com/office/drawing/2010/main" Requires="a14">
+          <p:sp>
+            <p:nvSpPr>
+              <p:cNvPr id="58" name="TextBox 57">
+                <a:extLst>
+                  <a:ext uri="{FF2B5EF4-FFF2-40B4-BE49-F238E27FC236}">
+                    <a16:creationId xmlns:a16="http://schemas.microsoft.com/office/drawing/2014/main" id="{CFB2487F-4E9F-E981-EA2A-C8AEB6D86960}"/>
+                  </a:ext>
+                </a:extLst>
+              </p:cNvPr>
+              <p:cNvSpPr txBox="1"/>
+              <p:nvPr/>
+            </p:nvSpPr>
+            <p:spPr>
+              <a:xfrm>
+                <a:off x="9852068" y="1232942"/>
+                <a:ext cx="426075" cy="307777"/>
+              </a:xfrm>
+              <a:prstGeom prst="rect">
+                <a:avLst/>
+              </a:prstGeom>
+              <a:noFill/>
+            </p:spPr>
+            <p:txBody>
+              <a:bodyPr wrap="square" lIns="0" tIns="0" rIns="0" bIns="0" rtlCol="0">
+                <a:spAutoFit/>
+              </a:bodyPr>
+              <a:lstStyle/>
+              <a:p>
+                <a:pPr/>
+                <a14:m>
+                  <m:oMathPara xmlns:m="http://schemas.openxmlformats.org/officeDocument/2006/math">
+                    <m:oMathParaPr>
+                      <m:jc m:val="centerGroup"/>
+                    </m:oMathParaPr>
+                    <m:oMath xmlns:m="http://schemas.openxmlformats.org/officeDocument/2006/math">
+                      <m:r>
+                        <a:rPr lang="en-US" sz="2000" b="0" i="1" smtClean="0">
+                          <a:effectLst>
+                            <a:outerShdw blurRad="38100" dist="38100" dir="2700000" algn="tl">
+                              <a:srgbClr val="000000">
+                                <a:alpha val="43137"/>
+                              </a:srgbClr>
+                            </a:outerShdw>
+                          </a:effectLst>
+                          <a:latin typeface="Cambria Math" panose="02040503050406030204" pitchFamily="18" charset="0"/>
+                        </a:rPr>
+                        <m:t>𝑚</m:t>
+                      </m:r>
+                    </m:oMath>
+                  </m:oMathPara>
+                </a14:m>
+                <a:endParaRPr lang="en-US" sz="2000" dirty="0">
+                  <a:effectLst>
+                    <a:outerShdw blurRad="38100" dist="38100" dir="2700000" algn="tl">
+                      <a:srgbClr val="000000">
+                        <a:alpha val="43137"/>
+                      </a:srgbClr>
+                    </a:outerShdw>
+                  </a:effectLst>
+                </a:endParaRPr>
+              </a:p>
+            </p:txBody>
+          </p:sp>
+        </mc:Choice>
+        <mc:Fallback>
+          <p:sp>
+            <p:nvSpPr>
+              <p:cNvPr id="58" name="TextBox 57">
+                <a:extLst>
+                  <a:ext uri="{FF2B5EF4-FFF2-40B4-BE49-F238E27FC236}">
+                    <a16:creationId xmlns:a16="http://schemas.microsoft.com/office/drawing/2014/main" id="{CFB2487F-4E9F-E981-EA2A-C8AEB6D86960}"/>
+                  </a:ext>
+                </a:extLst>
+              </p:cNvPr>
+              <p:cNvSpPr txBox="1">
+                <a:spLocks noRot="1" noChangeAspect="1" noMove="1" noResize="1" noEditPoints="1" noAdjustHandles="1" noChangeArrowheads="1" noChangeShapeType="1" noTextEdit="1"/>
+              </p:cNvSpPr>
+              <p:nvPr/>
+            </p:nvSpPr>
+            <p:spPr>
+              <a:xfrm>
+                <a:off x="9852068" y="1232942"/>
+                <a:ext cx="426075" cy="307777"/>
+              </a:xfrm>
+              <a:prstGeom prst="rect">
+                <a:avLst/>
+              </a:prstGeom>
+              <a:blipFill>
+                <a:blip r:embed="rId8"/>
+                <a:stretch>
+                  <a:fillRect b="-5882"/>
+                </a:stretch>
+              </a:blipFill>
+            </p:spPr>
+            <p:txBody>
+              <a:bodyPr/>
+              <a:lstStyle/>
+              <a:p>
+                <a:r>
+                  <a:rPr lang="en-US">
+                    <a:noFill/>
+                  </a:rPr>
+                  <a:t> </a:t>
+                </a:r>
+              </a:p>
+            </p:txBody>
+          </p:sp>
+        </mc:Fallback>
+      </mc:AlternateContent>
+      <p:sp>
+        <p:nvSpPr>
+          <p:cNvPr id="62" name="Rectangle 61">
+            <a:extLst>
+              <a:ext uri="{FF2B5EF4-FFF2-40B4-BE49-F238E27FC236}">
+                <a16:creationId xmlns:a16="http://schemas.microsoft.com/office/drawing/2014/main" id="{416A3C0A-DE61-2289-F19F-A9C7EA6F946F}"/>
+              </a:ext>
+            </a:extLst>
+          </p:cNvPr>
+          <p:cNvSpPr/>
+          <p:nvPr/>
+        </p:nvSpPr>
+        <p:spPr>
+          <a:xfrm>
+            <a:off x="8635250" y="1210647"/>
+            <a:ext cx="985076" cy="352377"/>
+          </a:xfrm>
+          <a:prstGeom prst="rect">
+            <a:avLst/>
+          </a:prstGeom>
+          <a:solidFill>
+            <a:schemeClr val="accent6">
+              <a:lumMod val="60000"/>
+              <a:lumOff val="40000"/>
+              <a:alpha val="31000"/>
+            </a:schemeClr>
+          </a:solidFill>
+        </p:spPr>
+        <p:style>
+          <a:lnRef idx="2">
+            <a:schemeClr val="accent1">
+              <a:shade val="15000"/>
+            </a:schemeClr>
+          </a:lnRef>
+          <a:fillRef idx="1">
+            <a:schemeClr val="accent1"/>
+          </a:fillRef>
+          <a:effectRef idx="0">
+            <a:schemeClr val="accent1"/>
+          </a:effectRef>
+          <a:fontRef idx="minor">
+            <a:schemeClr val="lt1"/>
+          </a:fontRef>
+        </p:style>
+        <p:txBody>
+          <a:bodyPr rtlCol="0" anchor="ctr"/>
+          <a:lstStyle/>
+          <a:p>
+            <a:pPr algn="ctr"/>
+            <a:endParaRPr lang="en-US"/>
+          </a:p>
+        </p:txBody>
+      </p:sp>
+      <p:sp>
+        <p:nvSpPr>
+          <p:cNvPr id="63" name="Rectangle 62">
+            <a:extLst>
+              <a:ext uri="{FF2B5EF4-FFF2-40B4-BE49-F238E27FC236}">
+                <a16:creationId xmlns:a16="http://schemas.microsoft.com/office/drawing/2014/main" id="{3CD6DD70-DBFD-D9FB-BB51-6E7A963B15D6}"/>
+              </a:ext>
+            </a:extLst>
+          </p:cNvPr>
+          <p:cNvSpPr/>
+          <p:nvPr/>
+        </p:nvSpPr>
+        <p:spPr>
+          <a:xfrm>
+            <a:off x="9852067" y="1217586"/>
+            <a:ext cx="411220" cy="352377"/>
+          </a:xfrm>
+          <a:prstGeom prst="rect">
+            <a:avLst/>
+          </a:prstGeom>
+          <a:solidFill>
+            <a:schemeClr val="accent6">
+              <a:lumMod val="60000"/>
+              <a:lumOff val="40000"/>
+              <a:alpha val="31000"/>
+            </a:schemeClr>
+          </a:solidFill>
+        </p:spPr>
+        <p:style>
+          <a:lnRef idx="2">
+            <a:schemeClr val="accent1">
+              <a:shade val="15000"/>
+            </a:schemeClr>
+          </a:lnRef>
+          <a:fillRef idx="1">
+            <a:schemeClr val="accent1"/>
+          </a:fillRef>
+          <a:effectRef idx="0">
+            <a:schemeClr val="accent1"/>
+          </a:effectRef>
+          <a:fontRef idx="minor">
+            <a:schemeClr val="lt1"/>
+          </a:fontRef>
+        </p:style>
+        <p:txBody>
+          <a:bodyPr rtlCol="0" anchor="ctr"/>
+          <a:lstStyle/>
+          <a:p>
+            <a:pPr algn="ctr"/>
+            <a:endParaRPr lang="en-US"/>
+          </a:p>
+        </p:txBody>
+      </p:sp>
+      <p:sp>
+        <p:nvSpPr>
+          <p:cNvPr id="64" name="Rectangle 63">
+            <a:extLst>
+              <a:ext uri="{FF2B5EF4-FFF2-40B4-BE49-F238E27FC236}">
+                <a16:creationId xmlns:a16="http://schemas.microsoft.com/office/drawing/2014/main" id="{54BAAE84-38E3-8AD6-AB32-E8904730808A}"/>
+              </a:ext>
+            </a:extLst>
+          </p:cNvPr>
+          <p:cNvSpPr/>
+          <p:nvPr/>
+        </p:nvSpPr>
+        <p:spPr>
+          <a:xfrm>
+            <a:off x="8861355" y="3076623"/>
+            <a:ext cx="985076" cy="352377"/>
+          </a:xfrm>
+          <a:prstGeom prst="rect">
+            <a:avLst/>
+          </a:prstGeom>
+          <a:solidFill>
+            <a:schemeClr val="accent6">
+              <a:lumMod val="60000"/>
+              <a:lumOff val="40000"/>
+              <a:alpha val="31000"/>
+            </a:schemeClr>
+          </a:solidFill>
+        </p:spPr>
+        <p:style>
+          <a:lnRef idx="2">
+            <a:schemeClr val="accent1">
+              <a:shade val="15000"/>
+            </a:schemeClr>
+          </a:lnRef>
+          <a:fillRef idx="1">
+            <a:schemeClr val="accent1"/>
+          </a:fillRef>
+          <a:effectRef idx="0">
+            <a:schemeClr val="accent1"/>
+          </a:effectRef>
+          <a:fontRef idx="minor">
+            <a:schemeClr val="lt1"/>
+          </a:fontRef>
+        </p:style>
+        <p:txBody>
+          <a:bodyPr rtlCol="0" anchor="ctr"/>
+          <a:lstStyle/>
+          <a:p>
+            <a:pPr algn="ctr"/>
+            <a:endParaRPr lang="en-US"/>
+          </a:p>
+        </p:txBody>
+      </p:sp>
+      <mc:AlternateContent xmlns:mc="http://schemas.openxmlformats.org/markup-compatibility/2006">
+        <mc:Choice xmlns:a14="http://schemas.microsoft.com/office/drawing/2010/main" Requires="a14">
+          <p:sp>
+            <p:nvSpPr>
+              <p:cNvPr id="65" name="TextBox 64">
+                <a:extLst>
+                  <a:ext uri="{FF2B5EF4-FFF2-40B4-BE49-F238E27FC236}">
+                    <a16:creationId xmlns:a16="http://schemas.microsoft.com/office/drawing/2014/main" id="{99266A8B-6D72-088D-014A-44CF005ECE2B}"/>
+                  </a:ext>
+                </a:extLst>
+              </p:cNvPr>
+              <p:cNvSpPr txBox="1"/>
+              <p:nvPr/>
+            </p:nvSpPr>
+            <p:spPr>
+              <a:xfrm>
+                <a:off x="9147074" y="3079945"/>
+                <a:ext cx="426075" cy="307777"/>
+              </a:xfrm>
+              <a:prstGeom prst="rect">
+                <a:avLst/>
+              </a:prstGeom>
+              <a:noFill/>
+            </p:spPr>
+            <p:txBody>
+              <a:bodyPr wrap="square" lIns="0" tIns="0" rIns="0" bIns="0" rtlCol="0">
+                <a:spAutoFit/>
+              </a:bodyPr>
+              <a:lstStyle/>
+              <a:p>
+                <a:pPr/>
+                <a14:m>
+                  <m:oMathPara xmlns:m="http://schemas.openxmlformats.org/officeDocument/2006/math">
+                    <m:oMathParaPr>
+                      <m:jc m:val="centerGroup"/>
+                    </m:oMathParaPr>
+                    <m:oMath xmlns:m="http://schemas.openxmlformats.org/officeDocument/2006/math">
+                      <m:r>
+                        <a:rPr lang="en-US" sz="2000" b="0" i="1" smtClean="0">
+                          <a:effectLst>
+                            <a:outerShdw blurRad="38100" dist="38100" dir="2700000" algn="tl">
+                              <a:srgbClr val="000000">
+                                <a:alpha val="43137"/>
+                              </a:srgbClr>
+                            </a:outerShdw>
+                          </a:effectLst>
+                          <a:latin typeface="Cambria Math" panose="02040503050406030204" pitchFamily="18" charset="0"/>
+                        </a:rPr>
+                        <m:t>𝑀</m:t>
+                      </m:r>
+                    </m:oMath>
+                  </m:oMathPara>
+                </a14:m>
+                <a:endParaRPr lang="en-US" sz="2000" dirty="0">
+                  <a:effectLst>
+                    <a:outerShdw blurRad="38100" dist="38100" dir="2700000" algn="tl">
+                      <a:srgbClr val="000000">
+                        <a:alpha val="43137"/>
+                      </a:srgbClr>
+                    </a:outerShdw>
+                  </a:effectLst>
+                </a:endParaRPr>
+              </a:p>
+            </p:txBody>
+          </p:sp>
+        </mc:Choice>
+        <mc:Fallback>
+          <p:sp>
+            <p:nvSpPr>
+              <p:cNvPr id="65" name="TextBox 64">
+                <a:extLst>
+                  <a:ext uri="{FF2B5EF4-FFF2-40B4-BE49-F238E27FC236}">
+                    <a16:creationId xmlns:a16="http://schemas.microsoft.com/office/drawing/2014/main" id="{99266A8B-6D72-088D-014A-44CF005ECE2B}"/>
+                  </a:ext>
+                </a:extLst>
+              </p:cNvPr>
+              <p:cNvSpPr txBox="1">
+                <a:spLocks noRot="1" noChangeAspect="1" noMove="1" noResize="1" noEditPoints="1" noAdjustHandles="1" noChangeArrowheads="1" noChangeShapeType="1" noTextEdit="1"/>
+              </p:cNvSpPr>
+              <p:nvPr/>
+            </p:nvSpPr>
+            <p:spPr>
+              <a:xfrm>
+                <a:off x="9147074" y="3079945"/>
+                <a:ext cx="426075" cy="307777"/>
+              </a:xfrm>
+              <a:prstGeom prst="rect">
+                <a:avLst/>
+              </a:prstGeom>
+              <a:blipFill>
+                <a:blip r:embed="rId9"/>
+                <a:stretch>
+                  <a:fillRect r="-4348" b="-13725"/>
+                </a:stretch>
+              </a:blipFill>
+            </p:spPr>
+            <p:txBody>
+              <a:bodyPr/>
+              <a:lstStyle/>
+              <a:p>
+                <a:r>
+                  <a:rPr lang="en-US">
+                    <a:noFill/>
+                  </a:rPr>
+                  <a:t> </a:t>
+                </a:r>
+              </a:p>
+            </p:txBody>
+          </p:sp>
+        </mc:Fallback>
+      </mc:AlternateContent>
+      <p:cxnSp>
+        <p:nvCxnSpPr>
+          <p:cNvPr id="67" name="Straight Connector 66">
+            <a:extLst>
+              <a:ext uri="{FF2B5EF4-FFF2-40B4-BE49-F238E27FC236}">
+                <a16:creationId xmlns:a16="http://schemas.microsoft.com/office/drawing/2014/main" id="{34A06CE5-6F3B-CD22-22CE-0C8B78A870A1}"/>
+              </a:ext>
+            </a:extLst>
+          </p:cNvPr>
+          <p:cNvCxnSpPr>
+            <a:cxnSpLocks/>
+          </p:cNvCxnSpPr>
+          <p:nvPr/>
+        </p:nvCxnSpPr>
+        <p:spPr>
+          <a:xfrm flipH="1">
+            <a:off x="8252725" y="3429000"/>
+            <a:ext cx="2277313" cy="0"/>
+          </a:xfrm>
+          <a:prstGeom prst="line">
+            <a:avLst/>
+          </a:prstGeom>
+          <a:ln>
+            <a:solidFill>
+              <a:schemeClr val="tx1"/>
+            </a:solidFill>
+          </a:ln>
+        </p:spPr>
+        <p:style>
+          <a:lnRef idx="2">
+            <a:schemeClr val="accent1"/>
+          </a:lnRef>
+          <a:fillRef idx="0">
+            <a:schemeClr val="accent1"/>
+          </a:fillRef>
+          <a:effectRef idx="1">
+            <a:schemeClr val="accent1"/>
+          </a:effectRef>
+          <a:fontRef idx="minor">
+            <a:schemeClr val="tx1"/>
+          </a:fontRef>
+        </p:style>
+      </p:cxnSp>
+      <p:sp>
+        <p:nvSpPr>
+          <p:cNvPr id="70" name="Rectangle 69">
+            <a:extLst>
+              <a:ext uri="{FF2B5EF4-FFF2-40B4-BE49-F238E27FC236}">
+                <a16:creationId xmlns:a16="http://schemas.microsoft.com/office/drawing/2014/main" id="{4E013870-E6DC-FAC5-8E53-1E859D903EE0}"/>
+              </a:ext>
+            </a:extLst>
+          </p:cNvPr>
+          <p:cNvSpPr/>
+          <p:nvPr/>
+        </p:nvSpPr>
+        <p:spPr>
+          <a:xfrm>
+            <a:off x="8144775" y="3218329"/>
+            <a:ext cx="215901" cy="76736"/>
+          </a:xfrm>
+          <a:custGeom>
+            <a:avLst/>
+            <a:gdLst>
+              <a:gd name="connsiteX0" fmla="*/ 0 w 495300"/>
+              <a:gd name="connsiteY0" fmla="*/ 0 h 186574"/>
+              <a:gd name="connsiteX1" fmla="*/ 495300 w 495300"/>
+              <a:gd name="connsiteY1" fmla="*/ 0 h 186574"/>
+              <a:gd name="connsiteX2" fmla="*/ 495300 w 495300"/>
+              <a:gd name="connsiteY2" fmla="*/ 186574 h 186574"/>
+              <a:gd name="connsiteX3" fmla="*/ 0 w 495300"/>
+              <a:gd name="connsiteY3" fmla="*/ 186574 h 186574"/>
+              <a:gd name="connsiteX4" fmla="*/ 0 w 495300"/>
+              <a:gd name="connsiteY4" fmla="*/ 0 h 186574"/>
+              <a:gd name="connsiteX0" fmla="*/ 0 w 495300"/>
+              <a:gd name="connsiteY0" fmla="*/ 0 h 186574"/>
+              <a:gd name="connsiteX1" fmla="*/ 342900 w 495300"/>
+              <a:gd name="connsiteY1" fmla="*/ 2117 h 186574"/>
+              <a:gd name="connsiteX2" fmla="*/ 495300 w 495300"/>
+              <a:gd name="connsiteY2" fmla="*/ 186574 h 186574"/>
+              <a:gd name="connsiteX3" fmla="*/ 0 w 495300"/>
+              <a:gd name="connsiteY3" fmla="*/ 186574 h 186574"/>
+              <a:gd name="connsiteX4" fmla="*/ 0 w 495300"/>
+              <a:gd name="connsiteY4" fmla="*/ 0 h 186574"/>
+              <a:gd name="connsiteX0" fmla="*/ 0 w 522816"/>
+              <a:gd name="connsiteY0" fmla="*/ 0 h 186574"/>
+              <a:gd name="connsiteX1" fmla="*/ 342900 w 522816"/>
+              <a:gd name="connsiteY1" fmla="*/ 2117 h 186574"/>
+              <a:gd name="connsiteX2" fmla="*/ 522816 w 522816"/>
+              <a:gd name="connsiteY2" fmla="*/ 97674 h 186574"/>
+              <a:gd name="connsiteX3" fmla="*/ 0 w 522816"/>
+              <a:gd name="connsiteY3" fmla="*/ 186574 h 186574"/>
+              <a:gd name="connsiteX4" fmla="*/ 0 w 522816"/>
+              <a:gd name="connsiteY4" fmla="*/ 0 h 186574"/>
+              <a:gd name="connsiteX0" fmla="*/ 0 w 505883"/>
+              <a:gd name="connsiteY0" fmla="*/ 0 h 186574"/>
+              <a:gd name="connsiteX1" fmla="*/ 342900 w 505883"/>
+              <a:gd name="connsiteY1" fmla="*/ 2117 h 186574"/>
+              <a:gd name="connsiteX2" fmla="*/ 505883 w 505883"/>
+              <a:gd name="connsiteY2" fmla="*/ 84974 h 186574"/>
+              <a:gd name="connsiteX3" fmla="*/ 0 w 505883"/>
+              <a:gd name="connsiteY3" fmla="*/ 186574 h 186574"/>
+              <a:gd name="connsiteX4" fmla="*/ 0 w 505883"/>
+              <a:gd name="connsiteY4" fmla="*/ 0 h 186574"/>
+              <a:gd name="connsiteX0" fmla="*/ 0 w 505883"/>
+              <a:gd name="connsiteY0" fmla="*/ 0 h 186574"/>
+              <a:gd name="connsiteX1" fmla="*/ 342900 w 505883"/>
+              <a:gd name="connsiteY1" fmla="*/ 2117 h 186574"/>
+              <a:gd name="connsiteX2" fmla="*/ 505883 w 505883"/>
+              <a:gd name="connsiteY2" fmla="*/ 84974 h 186574"/>
+              <a:gd name="connsiteX3" fmla="*/ 0 w 505883"/>
+              <a:gd name="connsiteY3" fmla="*/ 186574 h 186574"/>
+              <a:gd name="connsiteX4" fmla="*/ 0 w 505883"/>
+              <a:gd name="connsiteY4" fmla="*/ 0 h 186574"/>
+              <a:gd name="connsiteX0" fmla="*/ 0 w 524933"/>
+              <a:gd name="connsiteY0" fmla="*/ 0 h 186574"/>
+              <a:gd name="connsiteX1" fmla="*/ 342900 w 524933"/>
+              <a:gd name="connsiteY1" fmla="*/ 2117 h 186574"/>
+              <a:gd name="connsiteX2" fmla="*/ 524933 w 524933"/>
+              <a:gd name="connsiteY2" fmla="*/ 84974 h 186574"/>
+              <a:gd name="connsiteX3" fmla="*/ 0 w 524933"/>
+              <a:gd name="connsiteY3" fmla="*/ 186574 h 186574"/>
+              <a:gd name="connsiteX4" fmla="*/ 0 w 524933"/>
+              <a:gd name="connsiteY4" fmla="*/ 0 h 186574"/>
+              <a:gd name="connsiteX0" fmla="*/ 0 w 524933"/>
+              <a:gd name="connsiteY0" fmla="*/ 0 h 186574"/>
+              <a:gd name="connsiteX1" fmla="*/ 342900 w 524933"/>
+              <a:gd name="connsiteY1" fmla="*/ 2117 h 186574"/>
+              <a:gd name="connsiteX2" fmla="*/ 524933 w 524933"/>
+              <a:gd name="connsiteY2" fmla="*/ 84974 h 186574"/>
+              <a:gd name="connsiteX3" fmla="*/ 0 w 524933"/>
+              <a:gd name="connsiteY3" fmla="*/ 186574 h 186574"/>
+              <a:gd name="connsiteX4" fmla="*/ 0 w 524933"/>
+              <a:gd name="connsiteY4" fmla="*/ 0 h 186574"/>
+              <a:gd name="connsiteX0" fmla="*/ 0 w 524933"/>
+              <a:gd name="connsiteY0" fmla="*/ 0 h 186574"/>
+              <a:gd name="connsiteX1" fmla="*/ 342900 w 524933"/>
+              <a:gd name="connsiteY1" fmla="*/ 2117 h 186574"/>
+              <a:gd name="connsiteX2" fmla="*/ 524933 w 524933"/>
+              <a:gd name="connsiteY2" fmla="*/ 84974 h 186574"/>
+              <a:gd name="connsiteX3" fmla="*/ 0 w 524933"/>
+              <a:gd name="connsiteY3" fmla="*/ 186574 h 186574"/>
+              <a:gd name="connsiteX4" fmla="*/ 0 w 524933"/>
+              <a:gd name="connsiteY4" fmla="*/ 0 h 186574"/>
+            </a:gdLst>
+            <a:ahLst/>
+            <a:cxnLst>
+              <a:cxn ang="0">
+                <a:pos x="connsiteX0" y="connsiteY0"/>
+              </a:cxn>
+              <a:cxn ang="0">
+                <a:pos x="connsiteX1" y="connsiteY1"/>
+              </a:cxn>
+              <a:cxn ang="0">
+                <a:pos x="connsiteX2" y="connsiteY2"/>
+              </a:cxn>
+              <a:cxn ang="0">
+                <a:pos x="connsiteX3" y="connsiteY3"/>
+              </a:cxn>
+              <a:cxn ang="0">
+                <a:pos x="connsiteX4" y="connsiteY4"/>
+              </a:cxn>
+            </a:cxnLst>
+            <a:rect l="l" t="t" r="r" b="b"/>
+            <a:pathLst>
+              <a:path w="524933" h="186574">
+                <a:moveTo>
+                  <a:pt x="0" y="0"/>
+                </a:moveTo>
+                <a:lnTo>
+                  <a:pt x="342900" y="2117"/>
+                </a:lnTo>
+                <a:cubicBezTo>
+                  <a:pt x="522111" y="40319"/>
+                  <a:pt x="517172" y="40422"/>
+                  <a:pt x="524933" y="84974"/>
+                </a:cubicBezTo>
+                <a:cubicBezTo>
+                  <a:pt x="449438" y="222557"/>
+                  <a:pt x="168628" y="152707"/>
+                  <a:pt x="0" y="186574"/>
+                </a:cubicBezTo>
+                <a:lnTo>
+                  <a:pt x="0" y="0"/>
+                </a:lnTo>
+                <a:close/>
+              </a:path>
+            </a:pathLst>
+          </a:custGeom>
+          <a:solidFill>
+            <a:srgbClr val="7030A0">
+              <a:alpha val="37000"/>
+            </a:srgbClr>
+          </a:solidFill>
+          <a:ln w="12700"/>
+        </p:spPr>
+        <p:style>
+          <a:lnRef idx="2">
+            <a:schemeClr val="accent1">
+              <a:shade val="15000"/>
+            </a:schemeClr>
+          </a:lnRef>
+          <a:fillRef idx="1">
+            <a:schemeClr val="accent1"/>
+          </a:fillRef>
+          <a:effectRef idx="0">
+            <a:schemeClr val="accent1"/>
+          </a:effectRef>
+          <a:fontRef idx="minor">
+            <a:schemeClr val="lt1"/>
+          </a:fontRef>
+        </p:style>
+        <p:txBody>
+          <a:bodyPr rtlCol="0" anchor="ctr"/>
+          <a:lstStyle/>
+          <a:p>
+            <a:pPr algn="ctr"/>
+            <a:endParaRPr lang="en-US"/>
+          </a:p>
+        </p:txBody>
+      </p:sp>
+      <p:cxnSp>
+        <p:nvCxnSpPr>
+          <p:cNvPr id="71" name="Straight Arrow Connector 70">
+            <a:extLst>
+              <a:ext uri="{FF2B5EF4-FFF2-40B4-BE49-F238E27FC236}">
+                <a16:creationId xmlns:a16="http://schemas.microsoft.com/office/drawing/2014/main" id="{137C6A51-8E19-4AB8-D505-DBDE984182DD}"/>
+              </a:ext>
+            </a:extLst>
+          </p:cNvPr>
+          <p:cNvCxnSpPr>
+            <a:cxnSpLocks/>
+          </p:cNvCxnSpPr>
+          <p:nvPr/>
+        </p:nvCxnSpPr>
+        <p:spPr>
+          <a:xfrm flipH="1">
+            <a:off x="8361228" y="3246964"/>
+            <a:ext cx="408122" cy="0"/>
+          </a:xfrm>
+          <a:prstGeom prst="straightConnector1">
+            <a:avLst/>
+          </a:prstGeom>
+          <a:ln w="28575">
+            <a:solidFill>
+              <a:schemeClr val="tx1"/>
+            </a:solidFill>
+            <a:prstDash val="solid"/>
+            <a:headEnd type="stealth" w="med" len="lg"/>
+            <a:tailEnd type="none" w="med" len="sm"/>
+          </a:ln>
+        </p:spPr>
+        <p:style>
+          <a:lnRef idx="1">
+            <a:schemeClr val="accent1"/>
+          </a:lnRef>
+          <a:fillRef idx="0">
+            <a:schemeClr val="accent1"/>
+          </a:fillRef>
+          <a:effectRef idx="0">
+            <a:schemeClr val="accent1"/>
+          </a:effectRef>
+          <a:fontRef idx="minor">
+            <a:schemeClr val="tx1"/>
+          </a:fontRef>
+        </p:style>
+      </p:cxnSp>
+      <mc:AlternateContent xmlns:mc="http://schemas.openxmlformats.org/markup-compatibility/2006">
+        <mc:Choice xmlns:a14="http://schemas.microsoft.com/office/drawing/2010/main" Requires="a14">
+          <p:sp>
+            <p:nvSpPr>
+              <p:cNvPr id="72" name="TextBox 71">
+                <a:extLst>
+                  <a:ext uri="{FF2B5EF4-FFF2-40B4-BE49-F238E27FC236}">
+                    <a16:creationId xmlns:a16="http://schemas.microsoft.com/office/drawing/2014/main" id="{CDE4F9CB-7161-90A0-9AC7-7065D0914B59}"/>
+                  </a:ext>
+                </a:extLst>
+              </p:cNvPr>
+              <p:cNvSpPr txBox="1"/>
+              <p:nvPr/>
+            </p:nvSpPr>
+            <p:spPr>
+              <a:xfrm>
+                <a:off x="7868629" y="2992369"/>
+                <a:ext cx="1322743" cy="246221"/>
+              </a:xfrm>
+              <a:prstGeom prst="rect">
+                <a:avLst/>
+              </a:prstGeom>
+              <a:noFill/>
+            </p:spPr>
+            <p:txBody>
+              <a:bodyPr wrap="square" lIns="0" tIns="0" rIns="0" bIns="0" rtlCol="0">
+                <a:spAutoFit/>
+              </a:bodyPr>
+              <a:lstStyle/>
+              <a:p>
+                <a:pPr/>
+                <a14:m>
+                  <m:oMathPara xmlns:m="http://schemas.openxmlformats.org/officeDocument/2006/math">
+                    <m:oMathParaPr>
+                      <m:jc m:val="centerGroup"/>
+                    </m:oMathParaPr>
+                    <m:oMath xmlns:m="http://schemas.openxmlformats.org/officeDocument/2006/math">
+                      <m:r>
+                        <a:rPr lang="en-US" sz="1600" b="0" i="1" smtClean="0">
+                          <a:latin typeface="Cambria Math" panose="02040503050406030204" pitchFamily="18" charset="0"/>
+                        </a:rPr>
+                        <m:t>𝑚</m:t>
+                      </m:r>
+                      <m:acc>
+                        <m:accPr>
+                          <m:chr m:val="⃗"/>
+                          <m:ctrlPr>
+                            <a:rPr lang="en-US" sz="1600" i="1" smtClean="0">
+                              <a:latin typeface="Cambria Math" panose="02040503050406030204" pitchFamily="18" charset="0"/>
+                            </a:rPr>
+                          </m:ctrlPr>
+                        </m:accPr>
+                        <m:e>
+                          <m:r>
+                            <a:rPr lang="en-US" sz="1600" b="0" i="1" smtClean="0">
+                              <a:latin typeface="Cambria Math" panose="02040503050406030204" pitchFamily="18" charset="0"/>
+                            </a:rPr>
+                            <m:t>𝑣</m:t>
+                          </m:r>
+                        </m:e>
+                      </m:acc>
+                    </m:oMath>
+                  </m:oMathPara>
+                </a14:m>
+                <a:endParaRPr lang="en-US" sz="1600" dirty="0"/>
+              </a:p>
+            </p:txBody>
+          </p:sp>
+        </mc:Choice>
+        <mc:Fallback>
+          <p:sp>
+            <p:nvSpPr>
+              <p:cNvPr id="72" name="TextBox 71">
+                <a:extLst>
+                  <a:ext uri="{FF2B5EF4-FFF2-40B4-BE49-F238E27FC236}">
+                    <a16:creationId xmlns:a16="http://schemas.microsoft.com/office/drawing/2014/main" id="{CDE4F9CB-7161-90A0-9AC7-7065D0914B59}"/>
+                  </a:ext>
+                </a:extLst>
+              </p:cNvPr>
+              <p:cNvSpPr txBox="1">
+                <a:spLocks noRot="1" noChangeAspect="1" noMove="1" noResize="1" noEditPoints="1" noAdjustHandles="1" noChangeArrowheads="1" noChangeShapeType="1" noTextEdit="1"/>
+              </p:cNvSpPr>
+              <p:nvPr/>
+            </p:nvSpPr>
+            <p:spPr>
+              <a:xfrm>
+                <a:off x="7868629" y="2992369"/>
+                <a:ext cx="1322743" cy="246221"/>
+              </a:xfrm>
+              <a:prstGeom prst="rect">
+                <a:avLst/>
+              </a:prstGeom>
+              <a:blipFill>
+                <a:blip r:embed="rId10"/>
+                <a:stretch>
+                  <a:fillRect t="-40000" b="-2500"/>
+                </a:stretch>
+              </a:blipFill>
+            </p:spPr>
+            <p:txBody>
+              <a:bodyPr/>
+              <a:lstStyle/>
+              <a:p>
+                <a:r>
+                  <a:rPr lang="en-US">
+                    <a:noFill/>
+                  </a:rPr>
+                  <a:t> </a:t>
+                </a:r>
+              </a:p>
+            </p:txBody>
+          </p:sp>
+        </mc:Fallback>
+      </mc:AlternateContent>
+      <p:sp>
+        <p:nvSpPr>
+          <p:cNvPr id="75" name="Rectangle 69">
+            <a:extLst>
+              <a:ext uri="{FF2B5EF4-FFF2-40B4-BE49-F238E27FC236}">
+                <a16:creationId xmlns:a16="http://schemas.microsoft.com/office/drawing/2014/main" id="{A338DB2A-FA10-7A33-A42E-BAC88A18AF57}"/>
+              </a:ext>
+            </a:extLst>
+          </p:cNvPr>
+          <p:cNvSpPr/>
+          <p:nvPr/>
+        </p:nvSpPr>
+        <p:spPr>
+          <a:xfrm>
+            <a:off x="8975747" y="3208596"/>
+            <a:ext cx="215901" cy="76736"/>
+          </a:xfrm>
+          <a:custGeom>
+            <a:avLst/>
+            <a:gdLst>
+              <a:gd name="connsiteX0" fmla="*/ 0 w 495300"/>
+              <a:gd name="connsiteY0" fmla="*/ 0 h 186574"/>
+              <a:gd name="connsiteX1" fmla="*/ 495300 w 495300"/>
+              <a:gd name="connsiteY1" fmla="*/ 0 h 186574"/>
+              <a:gd name="connsiteX2" fmla="*/ 495300 w 495300"/>
+              <a:gd name="connsiteY2" fmla="*/ 186574 h 186574"/>
+              <a:gd name="connsiteX3" fmla="*/ 0 w 495300"/>
+              <a:gd name="connsiteY3" fmla="*/ 186574 h 186574"/>
+              <a:gd name="connsiteX4" fmla="*/ 0 w 495300"/>
+              <a:gd name="connsiteY4" fmla="*/ 0 h 186574"/>
+              <a:gd name="connsiteX0" fmla="*/ 0 w 495300"/>
+              <a:gd name="connsiteY0" fmla="*/ 0 h 186574"/>
+              <a:gd name="connsiteX1" fmla="*/ 342900 w 495300"/>
+              <a:gd name="connsiteY1" fmla="*/ 2117 h 186574"/>
+              <a:gd name="connsiteX2" fmla="*/ 495300 w 495300"/>
+              <a:gd name="connsiteY2" fmla="*/ 186574 h 186574"/>
+              <a:gd name="connsiteX3" fmla="*/ 0 w 495300"/>
+              <a:gd name="connsiteY3" fmla="*/ 186574 h 186574"/>
+              <a:gd name="connsiteX4" fmla="*/ 0 w 495300"/>
+              <a:gd name="connsiteY4" fmla="*/ 0 h 186574"/>
+              <a:gd name="connsiteX0" fmla="*/ 0 w 522816"/>
+              <a:gd name="connsiteY0" fmla="*/ 0 h 186574"/>
+              <a:gd name="connsiteX1" fmla="*/ 342900 w 522816"/>
+              <a:gd name="connsiteY1" fmla="*/ 2117 h 186574"/>
+              <a:gd name="connsiteX2" fmla="*/ 522816 w 522816"/>
+              <a:gd name="connsiteY2" fmla="*/ 97674 h 186574"/>
+              <a:gd name="connsiteX3" fmla="*/ 0 w 522816"/>
+              <a:gd name="connsiteY3" fmla="*/ 186574 h 186574"/>
+              <a:gd name="connsiteX4" fmla="*/ 0 w 522816"/>
+              <a:gd name="connsiteY4" fmla="*/ 0 h 186574"/>
+              <a:gd name="connsiteX0" fmla="*/ 0 w 505883"/>
+              <a:gd name="connsiteY0" fmla="*/ 0 h 186574"/>
+              <a:gd name="connsiteX1" fmla="*/ 342900 w 505883"/>
+              <a:gd name="connsiteY1" fmla="*/ 2117 h 186574"/>
+              <a:gd name="connsiteX2" fmla="*/ 505883 w 505883"/>
+              <a:gd name="connsiteY2" fmla="*/ 84974 h 186574"/>
+              <a:gd name="connsiteX3" fmla="*/ 0 w 505883"/>
+              <a:gd name="connsiteY3" fmla="*/ 186574 h 186574"/>
+              <a:gd name="connsiteX4" fmla="*/ 0 w 505883"/>
+              <a:gd name="connsiteY4" fmla="*/ 0 h 186574"/>
+              <a:gd name="connsiteX0" fmla="*/ 0 w 505883"/>
+              <a:gd name="connsiteY0" fmla="*/ 0 h 186574"/>
+              <a:gd name="connsiteX1" fmla="*/ 342900 w 505883"/>
+              <a:gd name="connsiteY1" fmla="*/ 2117 h 186574"/>
+              <a:gd name="connsiteX2" fmla="*/ 505883 w 505883"/>
+              <a:gd name="connsiteY2" fmla="*/ 84974 h 186574"/>
+              <a:gd name="connsiteX3" fmla="*/ 0 w 505883"/>
+              <a:gd name="connsiteY3" fmla="*/ 186574 h 186574"/>
+              <a:gd name="connsiteX4" fmla="*/ 0 w 505883"/>
+              <a:gd name="connsiteY4" fmla="*/ 0 h 186574"/>
+              <a:gd name="connsiteX0" fmla="*/ 0 w 524933"/>
+              <a:gd name="connsiteY0" fmla="*/ 0 h 186574"/>
+              <a:gd name="connsiteX1" fmla="*/ 342900 w 524933"/>
+              <a:gd name="connsiteY1" fmla="*/ 2117 h 186574"/>
+              <a:gd name="connsiteX2" fmla="*/ 524933 w 524933"/>
+              <a:gd name="connsiteY2" fmla="*/ 84974 h 186574"/>
+              <a:gd name="connsiteX3" fmla="*/ 0 w 524933"/>
+              <a:gd name="connsiteY3" fmla="*/ 186574 h 186574"/>
+              <a:gd name="connsiteX4" fmla="*/ 0 w 524933"/>
+              <a:gd name="connsiteY4" fmla="*/ 0 h 186574"/>
+              <a:gd name="connsiteX0" fmla="*/ 0 w 524933"/>
+              <a:gd name="connsiteY0" fmla="*/ 0 h 186574"/>
+              <a:gd name="connsiteX1" fmla="*/ 342900 w 524933"/>
+              <a:gd name="connsiteY1" fmla="*/ 2117 h 186574"/>
+              <a:gd name="connsiteX2" fmla="*/ 524933 w 524933"/>
+              <a:gd name="connsiteY2" fmla="*/ 84974 h 186574"/>
+              <a:gd name="connsiteX3" fmla="*/ 0 w 524933"/>
+              <a:gd name="connsiteY3" fmla="*/ 186574 h 186574"/>
+              <a:gd name="connsiteX4" fmla="*/ 0 w 524933"/>
+              <a:gd name="connsiteY4" fmla="*/ 0 h 186574"/>
+              <a:gd name="connsiteX0" fmla="*/ 0 w 524933"/>
+              <a:gd name="connsiteY0" fmla="*/ 0 h 186574"/>
+              <a:gd name="connsiteX1" fmla="*/ 342900 w 524933"/>
+              <a:gd name="connsiteY1" fmla="*/ 2117 h 186574"/>
+              <a:gd name="connsiteX2" fmla="*/ 524933 w 524933"/>
+              <a:gd name="connsiteY2" fmla="*/ 84974 h 186574"/>
+              <a:gd name="connsiteX3" fmla="*/ 0 w 524933"/>
+              <a:gd name="connsiteY3" fmla="*/ 186574 h 186574"/>
+              <a:gd name="connsiteX4" fmla="*/ 0 w 524933"/>
+              <a:gd name="connsiteY4" fmla="*/ 0 h 186574"/>
+            </a:gdLst>
+            <a:ahLst/>
+            <a:cxnLst>
+              <a:cxn ang="0">
+                <a:pos x="connsiteX0" y="connsiteY0"/>
+              </a:cxn>
+              <a:cxn ang="0">
+                <a:pos x="connsiteX1" y="connsiteY1"/>
+              </a:cxn>
+              <a:cxn ang="0">
+                <a:pos x="connsiteX2" y="connsiteY2"/>
+              </a:cxn>
+              <a:cxn ang="0">
+                <a:pos x="connsiteX3" y="connsiteY3"/>
+              </a:cxn>
+              <a:cxn ang="0">
+                <a:pos x="connsiteX4" y="connsiteY4"/>
+              </a:cxn>
+            </a:cxnLst>
+            <a:rect l="l" t="t" r="r" b="b"/>
+            <a:pathLst>
+              <a:path w="524933" h="186574">
+                <a:moveTo>
+                  <a:pt x="0" y="0"/>
+                </a:moveTo>
+                <a:lnTo>
+                  <a:pt x="342900" y="2117"/>
+                </a:lnTo>
+                <a:cubicBezTo>
+                  <a:pt x="522111" y="40319"/>
+                  <a:pt x="517172" y="40422"/>
+                  <a:pt x="524933" y="84974"/>
+                </a:cubicBezTo>
+                <a:cubicBezTo>
+                  <a:pt x="449438" y="222557"/>
+                  <a:pt x="168628" y="152707"/>
+                  <a:pt x="0" y="186574"/>
+                </a:cubicBezTo>
+                <a:lnTo>
+                  <a:pt x="0" y="0"/>
+                </a:lnTo>
+                <a:close/>
+              </a:path>
+            </a:pathLst>
+          </a:custGeom>
+          <a:solidFill>
+            <a:srgbClr val="7030A0">
+              <a:alpha val="27000"/>
+            </a:srgbClr>
+          </a:solidFill>
+          <a:ln w="6350">
+            <a:prstDash val="dash"/>
+          </a:ln>
+        </p:spPr>
+        <p:style>
+          <a:lnRef idx="2">
+            <a:schemeClr val="accent1">
+              <a:shade val="15000"/>
+            </a:schemeClr>
+          </a:lnRef>
+          <a:fillRef idx="1">
+            <a:schemeClr val="accent1"/>
+          </a:fillRef>
+          <a:effectRef idx="0">
+            <a:schemeClr val="accent1"/>
+          </a:effectRef>
+          <a:fontRef idx="minor">
+            <a:schemeClr val="lt1"/>
+          </a:fontRef>
+        </p:style>
+        <p:txBody>
+          <a:bodyPr rtlCol="0" anchor="ctr"/>
+          <a:lstStyle/>
+          <a:p>
+            <a:pPr algn="ctr"/>
+            <a:endParaRPr lang="en-US"/>
+          </a:p>
+        </p:txBody>
+      </p:sp>
+      <p:cxnSp>
+        <p:nvCxnSpPr>
+          <p:cNvPr id="76" name="Straight Arrow Connector 75">
+            <a:extLst>
+              <a:ext uri="{FF2B5EF4-FFF2-40B4-BE49-F238E27FC236}">
+                <a16:creationId xmlns:a16="http://schemas.microsoft.com/office/drawing/2014/main" id="{31833968-1179-82D8-2842-AD4EB29349A3}"/>
+              </a:ext>
+            </a:extLst>
+          </p:cNvPr>
+          <p:cNvCxnSpPr>
+            <a:cxnSpLocks/>
+          </p:cNvCxnSpPr>
+          <p:nvPr/>
+        </p:nvCxnSpPr>
+        <p:spPr>
+          <a:xfrm flipH="1" flipV="1">
+            <a:off x="8858178" y="3208595"/>
+            <a:ext cx="183986" cy="794"/>
+          </a:xfrm>
+          <a:prstGeom prst="straightConnector1">
+            <a:avLst/>
+          </a:prstGeom>
+          <a:ln w="6350">
+            <a:solidFill>
+              <a:schemeClr val="tx1"/>
+            </a:solidFill>
+            <a:prstDash val="dash"/>
+            <a:headEnd type="none" w="med" len="lg"/>
+            <a:tailEnd type="none" w="med" len="sm"/>
+          </a:ln>
+        </p:spPr>
+        <p:style>
+          <a:lnRef idx="1">
+            <a:schemeClr val="accent1"/>
+          </a:lnRef>
+          <a:fillRef idx="0">
+            <a:schemeClr val="accent1"/>
+          </a:fillRef>
+          <a:effectRef idx="0">
+            <a:schemeClr val="accent1"/>
+          </a:effectRef>
+          <a:fontRef idx="minor">
+            <a:schemeClr val="tx1"/>
+          </a:fontRef>
+        </p:style>
+      </p:cxnSp>
+      <p:cxnSp>
+        <p:nvCxnSpPr>
+          <p:cNvPr id="81" name="Straight Arrow Connector 80">
+            <a:extLst>
+              <a:ext uri="{FF2B5EF4-FFF2-40B4-BE49-F238E27FC236}">
+                <a16:creationId xmlns:a16="http://schemas.microsoft.com/office/drawing/2014/main" id="{835538DC-FBAA-0D93-9514-62FEBFBD1C7D}"/>
+              </a:ext>
+            </a:extLst>
+          </p:cNvPr>
+          <p:cNvCxnSpPr>
+            <a:cxnSpLocks/>
+          </p:cNvCxnSpPr>
+          <p:nvPr/>
+        </p:nvCxnSpPr>
+        <p:spPr>
+          <a:xfrm flipH="1" flipV="1">
+            <a:off x="8858178" y="3281714"/>
+            <a:ext cx="176045" cy="2382"/>
+          </a:xfrm>
+          <a:prstGeom prst="straightConnector1">
+            <a:avLst/>
+          </a:prstGeom>
+          <a:ln w="6350">
+            <a:solidFill>
+              <a:schemeClr val="tx1"/>
+            </a:solidFill>
+            <a:prstDash val="dash"/>
+            <a:headEnd type="none" w="med" len="lg"/>
+            <a:tailEnd type="none" w="med" len="sm"/>
+          </a:ln>
+        </p:spPr>
+        <p:style>
+          <a:lnRef idx="1">
+            <a:schemeClr val="accent1"/>
+          </a:lnRef>
+          <a:fillRef idx="0">
+            <a:schemeClr val="accent1"/>
+          </a:fillRef>
+          <a:effectRef idx="0">
+            <a:schemeClr val="accent1"/>
+          </a:effectRef>
+          <a:fontRef idx="minor">
+            <a:schemeClr val="tx1"/>
+          </a:fontRef>
+        </p:style>
+      </p:cxnSp>
+    </p:spTree>
+    <p:extLst>
+      <p:ext uri="{BB962C8B-B14F-4D97-AF65-F5344CB8AC3E}">
+        <p14:creationId xmlns:p14="http://schemas.microsoft.com/office/powerpoint/2010/main" val="912194697"/>
       </p:ext>
     </p:extLst>
   </p:cSld>

</xml_diff>

<commit_message>
Conservation of energy&angular momentum @ Dinamics
</commit_message>
<xml_diff>
--- a/theory/lecture-drawings.pptx
+++ b/theory/lecture-drawings.pptx
@@ -28,6 +28,8 @@
     <p:sldId id="277" r:id="rId22"/>
     <p:sldId id="278" r:id="rId23"/>
     <p:sldId id="279" r:id="rId24"/>
+    <p:sldId id="280" r:id="rId25"/>
+    <p:sldId id="281" r:id="rId26"/>
   </p:sldIdLst>
   <p:sldSz cx="12192000" cy="6858000"/>
   <p:notesSz cx="6858000" cy="9144000"/>
@@ -281,7 +283,7 @@
           <a:p>
             <a:fld id="{2FDE7089-442F-4E99-86D8-0A1D11EB158F}" type="datetimeFigureOut">
               <a:rPr lang="en-US" smtClean="0"/>
-              <a:t>9/25/2024</a:t>
+              <a:t>9/27/2024</a:t>
             </a:fld>
             <a:endParaRPr lang="en-US"/>
           </a:p>
@@ -479,7 +481,7 @@
           <a:p>
             <a:fld id="{2FDE7089-442F-4E99-86D8-0A1D11EB158F}" type="datetimeFigureOut">
               <a:rPr lang="en-US" smtClean="0"/>
-              <a:t>9/25/2024</a:t>
+              <a:t>9/27/2024</a:t>
             </a:fld>
             <a:endParaRPr lang="en-US"/>
           </a:p>
@@ -687,7 +689,7 @@
           <a:p>
             <a:fld id="{2FDE7089-442F-4E99-86D8-0A1D11EB158F}" type="datetimeFigureOut">
               <a:rPr lang="en-US" smtClean="0"/>
-              <a:t>9/25/2024</a:t>
+              <a:t>9/27/2024</a:t>
             </a:fld>
             <a:endParaRPr lang="en-US"/>
           </a:p>
@@ -885,7 +887,7 @@
           <a:p>
             <a:fld id="{2FDE7089-442F-4E99-86D8-0A1D11EB158F}" type="datetimeFigureOut">
               <a:rPr lang="en-US" smtClean="0"/>
-              <a:t>9/25/2024</a:t>
+              <a:t>9/27/2024</a:t>
             </a:fld>
             <a:endParaRPr lang="en-US"/>
           </a:p>
@@ -1160,7 +1162,7 @@
           <a:p>
             <a:fld id="{2FDE7089-442F-4E99-86D8-0A1D11EB158F}" type="datetimeFigureOut">
               <a:rPr lang="en-US" smtClean="0"/>
-              <a:t>9/25/2024</a:t>
+              <a:t>9/27/2024</a:t>
             </a:fld>
             <a:endParaRPr lang="en-US"/>
           </a:p>
@@ -1425,7 +1427,7 @@
           <a:p>
             <a:fld id="{2FDE7089-442F-4E99-86D8-0A1D11EB158F}" type="datetimeFigureOut">
               <a:rPr lang="en-US" smtClean="0"/>
-              <a:t>9/25/2024</a:t>
+              <a:t>9/27/2024</a:t>
             </a:fld>
             <a:endParaRPr lang="en-US"/>
           </a:p>
@@ -1837,7 +1839,7 @@
           <a:p>
             <a:fld id="{2FDE7089-442F-4E99-86D8-0A1D11EB158F}" type="datetimeFigureOut">
               <a:rPr lang="en-US" smtClean="0"/>
-              <a:t>9/25/2024</a:t>
+              <a:t>9/27/2024</a:t>
             </a:fld>
             <a:endParaRPr lang="en-US"/>
           </a:p>
@@ -1978,7 +1980,7 @@
           <a:p>
             <a:fld id="{2FDE7089-442F-4E99-86D8-0A1D11EB158F}" type="datetimeFigureOut">
               <a:rPr lang="en-US" smtClean="0"/>
-              <a:t>9/25/2024</a:t>
+              <a:t>9/27/2024</a:t>
             </a:fld>
             <a:endParaRPr lang="en-US"/>
           </a:p>
@@ -2091,7 +2093,7 @@
           <a:p>
             <a:fld id="{2FDE7089-442F-4E99-86D8-0A1D11EB158F}" type="datetimeFigureOut">
               <a:rPr lang="en-US" smtClean="0"/>
-              <a:t>9/25/2024</a:t>
+              <a:t>9/27/2024</a:t>
             </a:fld>
             <a:endParaRPr lang="en-US"/>
           </a:p>
@@ -2402,7 +2404,7 @@
           <a:p>
             <a:fld id="{2FDE7089-442F-4E99-86D8-0A1D11EB158F}" type="datetimeFigureOut">
               <a:rPr lang="en-US" smtClean="0"/>
-              <a:t>9/25/2024</a:t>
+              <a:t>9/27/2024</a:t>
             </a:fld>
             <a:endParaRPr lang="en-US"/>
           </a:p>
@@ -2690,7 +2692,7 @@
           <a:p>
             <a:fld id="{2FDE7089-442F-4E99-86D8-0A1D11EB158F}" type="datetimeFigureOut">
               <a:rPr lang="en-US" smtClean="0"/>
-              <a:t>9/25/2024</a:t>
+              <a:t>9/27/2024</a:t>
             </a:fld>
             <a:endParaRPr lang="en-US"/>
           </a:p>
@@ -2931,7 +2933,7 @@
           <a:p>
             <a:fld id="{2FDE7089-442F-4E99-86D8-0A1D11EB158F}" type="datetimeFigureOut">
               <a:rPr lang="en-US" smtClean="0"/>
-              <a:t>9/25/2024</a:t>
+              <a:t>9/27/2024</a:t>
             </a:fld>
             <a:endParaRPr lang="en-US"/>
           </a:p>
@@ -27252,8 +27254,8 @@
           </a:p>
         </p:txBody>
       </p:sp>
-      <mc:AlternateContent xmlns:mc="http://schemas.openxmlformats.org/markup-compatibility/2006">
-        <mc:Choice xmlns:a14="http://schemas.microsoft.com/office/drawing/2010/main" Requires="a14">
+      <mc:AlternateContent xmlns:mc="http://schemas.openxmlformats.org/markup-compatibility/2006" xmlns:a14="http://schemas.microsoft.com/office/drawing/2010/main">
+        <mc:Choice Requires="a14">
           <p:sp>
             <p:nvSpPr>
               <p:cNvPr id="12" name="TextBox 11">
@@ -27282,6 +27284,7 @@
               </a:bodyPr>
               <a:lstStyle/>
               <a:p>
+                <a:pPr/>
                 <a14:m>
                   <m:oMathPara xmlns:m="http://schemas.openxmlformats.org/officeDocument/2006/math">
                     <m:oMathParaPr>
@@ -27302,7 +27305,7 @@
             </p:txBody>
           </p:sp>
         </mc:Choice>
-        <mc:Fallback>
+        <mc:Fallback xmlns="">
           <p:sp>
             <p:nvSpPr>
               <p:cNvPr id="12" name="TextBox 11">
@@ -27347,8 +27350,8 @@
           </p:sp>
         </mc:Fallback>
       </mc:AlternateContent>
-      <mc:AlternateContent xmlns:mc="http://schemas.openxmlformats.org/markup-compatibility/2006">
-        <mc:Choice xmlns:a14="http://schemas.microsoft.com/office/drawing/2010/main" Requires="a14">
+      <mc:AlternateContent xmlns:mc="http://schemas.openxmlformats.org/markup-compatibility/2006" xmlns:a14="http://schemas.microsoft.com/office/drawing/2010/main">
+        <mc:Choice Requires="a14">
           <p:sp>
             <p:nvSpPr>
               <p:cNvPr id="13" name="TextBox 12">
@@ -27377,6 +27380,7 @@
               </a:bodyPr>
               <a:lstStyle/>
               <a:p>
+                <a:pPr/>
                 <a14:m>
                   <m:oMathPara xmlns:m="http://schemas.openxmlformats.org/officeDocument/2006/math">
                     <m:oMathParaPr>
@@ -27397,7 +27401,7 @@
             </p:txBody>
           </p:sp>
         </mc:Choice>
-        <mc:Fallback>
+        <mc:Fallback xmlns="">
           <p:sp>
             <p:nvSpPr>
               <p:cNvPr id="13" name="TextBox 12">
@@ -27442,8 +27446,8 @@
           </p:sp>
         </mc:Fallback>
       </mc:AlternateContent>
-      <mc:AlternateContent xmlns:mc="http://schemas.openxmlformats.org/markup-compatibility/2006">
-        <mc:Choice xmlns:a14="http://schemas.microsoft.com/office/drawing/2010/main" Requires="a14">
+      <mc:AlternateContent xmlns:mc="http://schemas.openxmlformats.org/markup-compatibility/2006" xmlns:a14="http://schemas.microsoft.com/office/drawing/2010/main">
+        <mc:Choice Requires="a14">
           <p:sp>
             <p:nvSpPr>
               <p:cNvPr id="14" name="TextBox 13">
@@ -27472,6 +27476,7 @@
               </a:bodyPr>
               <a:lstStyle/>
               <a:p>
+                <a:pPr/>
                 <a14:m>
                   <m:oMathPara xmlns:m="http://schemas.openxmlformats.org/officeDocument/2006/math">
                     <m:oMathParaPr>
@@ -27492,7 +27497,7 @@
             </p:txBody>
           </p:sp>
         </mc:Choice>
-        <mc:Fallback>
+        <mc:Fallback xmlns="">
           <p:sp>
             <p:nvSpPr>
               <p:cNvPr id="14" name="TextBox 13">
@@ -27963,8 +27968,8 @@
           </a:fontRef>
         </p:style>
       </p:cxnSp>
-      <mc:AlternateContent xmlns:mc="http://schemas.openxmlformats.org/markup-compatibility/2006">
-        <mc:Choice xmlns:a14="http://schemas.microsoft.com/office/drawing/2010/main" Requires="a14">
+      <mc:AlternateContent xmlns:mc="http://schemas.openxmlformats.org/markup-compatibility/2006" xmlns:a14="http://schemas.microsoft.com/office/drawing/2010/main">
+        <mc:Choice Requires="a14">
           <p:sp>
             <p:nvSpPr>
               <p:cNvPr id="53" name="TextBox 52">
@@ -28032,7 +28037,7 @@
             </p:txBody>
           </p:sp>
         </mc:Choice>
-        <mc:Fallback>
+        <mc:Fallback xmlns="">
           <p:sp>
             <p:nvSpPr>
               <p:cNvPr id="53" name="TextBox 52">
@@ -28123,8 +28128,8 @@
           </a:fontRef>
         </p:style>
       </p:cxnSp>
-      <mc:AlternateContent xmlns:mc="http://schemas.openxmlformats.org/markup-compatibility/2006">
-        <mc:Choice xmlns:a14="http://schemas.microsoft.com/office/drawing/2010/main" Requires="a14">
+      <mc:AlternateContent xmlns:mc="http://schemas.openxmlformats.org/markup-compatibility/2006" xmlns:a14="http://schemas.microsoft.com/office/drawing/2010/main">
+        <mc:Choice Requires="a14">
           <p:sp>
             <p:nvSpPr>
               <p:cNvPr id="55" name="TextBox 54">
@@ -28192,7 +28197,7 @@
             </p:txBody>
           </p:sp>
         </mc:Choice>
-        <mc:Fallback>
+        <mc:Fallback xmlns="">
           <p:sp>
             <p:nvSpPr>
               <p:cNvPr id="55" name="TextBox 54">
@@ -28237,8 +28242,8 @@
           </p:sp>
         </mc:Fallback>
       </mc:AlternateContent>
-      <mc:AlternateContent xmlns:mc="http://schemas.openxmlformats.org/markup-compatibility/2006">
-        <mc:Choice xmlns:a14="http://schemas.microsoft.com/office/drawing/2010/main" Requires="a14">
+      <mc:AlternateContent xmlns:mc="http://schemas.openxmlformats.org/markup-compatibility/2006" xmlns:a14="http://schemas.microsoft.com/office/drawing/2010/main">
+        <mc:Choice Requires="a14">
           <p:sp>
             <p:nvSpPr>
               <p:cNvPr id="56" name="TextBox 55">
@@ -28303,7 +28308,7 @@
             </p:txBody>
           </p:sp>
         </mc:Choice>
-        <mc:Fallback>
+        <mc:Fallback xmlns="">
           <p:sp>
             <p:nvSpPr>
               <p:cNvPr id="56" name="TextBox 55">
@@ -28348,8 +28353,8 @@
           </p:sp>
         </mc:Fallback>
       </mc:AlternateContent>
-      <mc:AlternateContent xmlns:mc="http://schemas.openxmlformats.org/markup-compatibility/2006">
-        <mc:Choice xmlns:a14="http://schemas.microsoft.com/office/drawing/2010/main" Requires="a14">
+      <mc:AlternateContent xmlns:mc="http://schemas.openxmlformats.org/markup-compatibility/2006" xmlns:a14="http://schemas.microsoft.com/office/drawing/2010/main">
+        <mc:Choice Requires="a14">
           <p:sp>
             <p:nvSpPr>
               <p:cNvPr id="58" name="TextBox 57">
@@ -28414,7 +28419,7 @@
             </p:txBody>
           </p:sp>
         </mc:Choice>
-        <mc:Fallback>
+        <mc:Fallback xmlns="">
           <p:sp>
             <p:nvSpPr>
               <p:cNvPr id="58" name="TextBox 57">
@@ -28618,8 +28623,8 @@
           </a:p>
         </p:txBody>
       </p:sp>
-      <mc:AlternateContent xmlns:mc="http://schemas.openxmlformats.org/markup-compatibility/2006">
-        <mc:Choice xmlns:a14="http://schemas.microsoft.com/office/drawing/2010/main" Requires="a14">
+      <mc:AlternateContent xmlns:mc="http://schemas.openxmlformats.org/markup-compatibility/2006" xmlns:a14="http://schemas.microsoft.com/office/drawing/2010/main">
+        <mc:Choice Requires="a14">
           <p:sp>
             <p:nvSpPr>
               <p:cNvPr id="65" name="TextBox 64">
@@ -28684,7 +28689,7 @@
             </p:txBody>
           </p:sp>
         </mc:Choice>
-        <mc:Fallback>
+        <mc:Fallback xmlns="">
           <p:sp>
             <p:nvSpPr>
               <p:cNvPr id="65" name="TextBox 64">
@@ -28995,8 +29000,8 @@
           </a:fontRef>
         </p:style>
       </p:cxnSp>
-      <mc:AlternateContent xmlns:mc="http://schemas.openxmlformats.org/markup-compatibility/2006">
-        <mc:Choice xmlns:a14="http://schemas.microsoft.com/office/drawing/2010/main" Requires="a14">
+      <mc:AlternateContent xmlns:mc="http://schemas.openxmlformats.org/markup-compatibility/2006" xmlns:a14="http://schemas.microsoft.com/office/drawing/2010/main">
+        <mc:Choice Requires="a14">
           <p:sp>
             <p:nvSpPr>
               <p:cNvPr id="72" name="TextBox 71">
@@ -29064,7 +29069,7 @@
             </p:txBody>
           </p:sp>
         </mc:Choice>
-        <mc:Fallback>
+        <mc:Fallback xmlns="">
           <p:sp>
             <p:nvSpPr>
               <p:cNvPr id="72" name="TextBox 71">
@@ -29384,6 +29389,3939 @@
     <p:extLst>
       <p:ext uri="{BB962C8B-B14F-4D97-AF65-F5344CB8AC3E}">
         <p14:creationId xmlns:p14="http://schemas.microsoft.com/office/powerpoint/2010/main" val="912194697"/>
+      </p:ext>
+    </p:extLst>
+  </p:cSld>
+  <p:clrMapOvr>
+    <a:masterClrMapping/>
+  </p:clrMapOvr>
+</p:sld>
+</file>
+
+<file path=ppt/slides/slide24.xml><?xml version="1.0" encoding="utf-8"?>
+<p:sld xmlns:a="http://schemas.openxmlformats.org/drawingml/2006/main" xmlns:r="http://schemas.openxmlformats.org/officeDocument/2006/relationships" xmlns:p="http://schemas.openxmlformats.org/presentationml/2006/main">
+  <p:cSld>
+    <p:spTree>
+      <p:nvGrpSpPr>
+        <p:cNvPr id="1" name=""/>
+        <p:cNvGrpSpPr/>
+        <p:nvPr/>
+      </p:nvGrpSpPr>
+      <p:grpSpPr>
+        <a:xfrm>
+          <a:off x="0" y="0"/>
+          <a:ext cx="0" cy="0"/>
+          <a:chOff x="0" y="0"/>
+          <a:chExt cx="0" cy="0"/>
+        </a:xfrm>
+      </p:grpSpPr>
+      <p:sp>
+        <p:nvSpPr>
+          <p:cNvPr id="3" name="Oval 2">
+            <a:extLst>
+              <a:ext uri="{FF2B5EF4-FFF2-40B4-BE49-F238E27FC236}">
+                <a16:creationId xmlns:a16="http://schemas.microsoft.com/office/drawing/2014/main" id="{3212D5D3-6C52-479C-8639-AF26E830764B}"/>
+              </a:ext>
+            </a:extLst>
+          </p:cNvPr>
+          <p:cNvSpPr/>
+          <p:nvPr/>
+        </p:nvSpPr>
+        <p:spPr>
+          <a:xfrm>
+            <a:off x="5742622" y="1796514"/>
+            <a:ext cx="70183" cy="66067"/>
+          </a:xfrm>
+          <a:prstGeom prst="ellipse">
+            <a:avLst/>
+          </a:prstGeom>
+          <a:solidFill>
+            <a:schemeClr val="tx1"/>
+          </a:solidFill>
+          <a:ln>
+            <a:noFill/>
+          </a:ln>
+        </p:spPr>
+        <p:style>
+          <a:lnRef idx="2">
+            <a:schemeClr val="accent1">
+              <a:shade val="15000"/>
+            </a:schemeClr>
+          </a:lnRef>
+          <a:fillRef idx="1">
+            <a:schemeClr val="accent1"/>
+          </a:fillRef>
+          <a:effectRef idx="0">
+            <a:schemeClr val="accent1"/>
+          </a:effectRef>
+          <a:fontRef idx="minor">
+            <a:schemeClr val="lt1"/>
+          </a:fontRef>
+        </p:style>
+        <p:txBody>
+          <a:bodyPr rtlCol="0" anchor="ctr"/>
+          <a:lstStyle/>
+          <a:p>
+            <a:pPr algn="ctr"/>
+            <a:endParaRPr lang="en-US"/>
+          </a:p>
+        </p:txBody>
+      </p:sp>
+      <p:grpSp>
+        <p:nvGrpSpPr>
+          <p:cNvPr id="5" name="Group 4">
+            <a:extLst>
+              <a:ext uri="{FF2B5EF4-FFF2-40B4-BE49-F238E27FC236}">
+                <a16:creationId xmlns:a16="http://schemas.microsoft.com/office/drawing/2014/main" id="{2FA9EAEE-C374-5482-8E61-80AFCA3FAE89}"/>
+              </a:ext>
+            </a:extLst>
+          </p:cNvPr>
+          <p:cNvGrpSpPr/>
+          <p:nvPr/>
+        </p:nvGrpSpPr>
+        <p:grpSpPr>
+          <a:xfrm rot="17006950">
+            <a:off x="4867982" y="906574"/>
+            <a:ext cx="1851237" cy="1980507"/>
+            <a:chOff x="5393276" y="3052210"/>
+            <a:chExt cx="1851237" cy="1980507"/>
+          </a:xfrm>
+        </p:grpSpPr>
+        <p:grpSp>
+          <p:nvGrpSpPr>
+            <p:cNvPr id="6" name="Group 5">
+              <a:extLst>
+                <a:ext uri="{FF2B5EF4-FFF2-40B4-BE49-F238E27FC236}">
+                  <a16:creationId xmlns:a16="http://schemas.microsoft.com/office/drawing/2014/main" id="{8D53BECB-3DA0-44FE-0E6B-0946C63C321C}"/>
+                </a:ext>
+              </a:extLst>
+            </p:cNvPr>
+            <p:cNvGrpSpPr/>
+            <p:nvPr/>
+          </p:nvGrpSpPr>
+          <p:grpSpPr>
+            <a:xfrm rot="783338">
+              <a:off x="5393276" y="3052210"/>
+              <a:ext cx="1851237" cy="1980507"/>
+              <a:chOff x="5393276" y="3052210"/>
+              <a:chExt cx="1851237" cy="1980507"/>
+            </a:xfrm>
+          </p:grpSpPr>
+          <p:grpSp>
+            <p:nvGrpSpPr>
+              <p:cNvPr id="8" name="Group 7">
+                <a:extLst>
+                  <a:ext uri="{FF2B5EF4-FFF2-40B4-BE49-F238E27FC236}">
+                    <a16:creationId xmlns:a16="http://schemas.microsoft.com/office/drawing/2014/main" id="{5AF350E9-19A6-3897-4093-4179A72DE46E}"/>
+                  </a:ext>
+                </a:extLst>
+              </p:cNvPr>
+              <p:cNvGrpSpPr/>
+              <p:nvPr/>
+            </p:nvGrpSpPr>
+            <p:grpSpPr>
+              <a:xfrm rot="300842">
+                <a:off x="5393276" y="3052210"/>
+                <a:ext cx="1851237" cy="1980507"/>
+                <a:chOff x="5393276" y="3052210"/>
+                <a:chExt cx="1851237" cy="1980507"/>
+              </a:xfrm>
+            </p:grpSpPr>
+            <p:grpSp>
+              <p:nvGrpSpPr>
+                <p:cNvPr id="10" name="Group 9">
+                  <a:extLst>
+                    <a:ext uri="{FF2B5EF4-FFF2-40B4-BE49-F238E27FC236}">
+                      <a16:creationId xmlns:a16="http://schemas.microsoft.com/office/drawing/2014/main" id="{40C79852-00DE-B525-A3A0-1D1DC4C27F7A}"/>
+                    </a:ext>
+                  </a:extLst>
+                </p:cNvPr>
+                <p:cNvGrpSpPr/>
+                <p:nvPr/>
+              </p:nvGrpSpPr>
+              <p:grpSpPr>
+                <a:xfrm rot="699529">
+                  <a:off x="5393276" y="3052210"/>
+                  <a:ext cx="1851237" cy="1955246"/>
+                  <a:chOff x="5395000" y="3052297"/>
+                  <a:chExt cx="1851237" cy="1955246"/>
+                </a:xfrm>
+              </p:grpSpPr>
+              <p:grpSp>
+                <p:nvGrpSpPr>
+                  <p:cNvPr id="12" name="Group 11">
+                    <a:extLst>
+                      <a:ext uri="{FF2B5EF4-FFF2-40B4-BE49-F238E27FC236}">
+                        <a16:creationId xmlns:a16="http://schemas.microsoft.com/office/drawing/2014/main" id="{CCF6FBB6-38A2-4C22-6B6D-FDF39E658FF4}"/>
+                      </a:ext>
+                    </a:extLst>
+                  </p:cNvPr>
+                  <p:cNvGrpSpPr/>
+                  <p:nvPr/>
+                </p:nvGrpSpPr>
+                <p:grpSpPr>
+                  <a:xfrm rot="320053">
+                    <a:off x="5395000" y="3052297"/>
+                    <a:ext cx="1851237" cy="1928959"/>
+                    <a:chOff x="5394565" y="3052277"/>
+                    <a:chExt cx="1851237" cy="1928959"/>
+                  </a:xfrm>
+                </p:grpSpPr>
+                <p:grpSp>
+                  <p:nvGrpSpPr>
+                    <p:cNvPr id="14" name="Group 13">
+                      <a:extLst>
+                        <a:ext uri="{FF2B5EF4-FFF2-40B4-BE49-F238E27FC236}">
+                          <a16:creationId xmlns:a16="http://schemas.microsoft.com/office/drawing/2014/main" id="{18867AAE-87D6-34D9-2797-180B81181C56}"/>
+                        </a:ext>
+                      </a:extLst>
+                    </p:cNvPr>
+                    <p:cNvGrpSpPr/>
+                    <p:nvPr/>
+                  </p:nvGrpSpPr>
+                  <p:grpSpPr>
+                    <a:xfrm rot="1277091">
+                      <a:off x="5394565" y="3052277"/>
+                      <a:ext cx="1851237" cy="1928959"/>
+                      <a:chOff x="5394565" y="3052277"/>
+                      <a:chExt cx="1851237" cy="1928959"/>
+                    </a:xfrm>
+                  </p:grpSpPr>
+                  <p:grpSp>
+                    <p:nvGrpSpPr>
+                      <p:cNvPr id="16" name="Group 15">
+                        <a:extLst>
+                          <a:ext uri="{FF2B5EF4-FFF2-40B4-BE49-F238E27FC236}">
+                            <a16:creationId xmlns:a16="http://schemas.microsoft.com/office/drawing/2014/main" id="{D36FA588-6CEC-9E49-40BF-3627559468A7}"/>
+                          </a:ext>
+                        </a:extLst>
+                      </p:cNvPr>
+                      <p:cNvGrpSpPr/>
+                      <p:nvPr/>
+                    </p:nvGrpSpPr>
+                    <p:grpSpPr>
+                      <a:xfrm rot="413313">
+                        <a:off x="5394565" y="3052277"/>
+                        <a:ext cx="1851237" cy="1928959"/>
+                        <a:chOff x="5394565" y="3052277"/>
+                        <a:chExt cx="1851237" cy="1928959"/>
+                      </a:xfrm>
+                    </p:grpSpPr>
+                    <p:grpSp>
+                      <p:nvGrpSpPr>
+                        <p:cNvPr id="18" name="Group 17">
+                          <a:extLst>
+                            <a:ext uri="{FF2B5EF4-FFF2-40B4-BE49-F238E27FC236}">
+                              <a16:creationId xmlns:a16="http://schemas.microsoft.com/office/drawing/2014/main" id="{514F5CCA-147C-4BA1-F68D-21262DCB4758}"/>
+                            </a:ext>
+                          </a:extLst>
+                        </p:cNvPr>
+                        <p:cNvGrpSpPr/>
+                        <p:nvPr/>
+                      </p:nvGrpSpPr>
+                      <p:grpSpPr>
+                        <a:xfrm rot="582989">
+                          <a:off x="5394565" y="3052277"/>
+                          <a:ext cx="1851237" cy="1926123"/>
+                          <a:chOff x="5394565" y="3052277"/>
+                          <a:chExt cx="1851237" cy="1926123"/>
+                        </a:xfrm>
+                      </p:grpSpPr>
+                      <p:sp>
+                        <p:nvSpPr>
+                          <p:cNvPr id="20" name="Oval 19">
+                            <a:extLst>
+                              <a:ext uri="{FF2B5EF4-FFF2-40B4-BE49-F238E27FC236}">
+                                <a16:creationId xmlns:a16="http://schemas.microsoft.com/office/drawing/2014/main" id="{CBC62BFA-9F81-0E8E-72C5-DEFDE6D2D43D}"/>
+                              </a:ext>
+                            </a:extLst>
+                          </p:cNvPr>
+                          <p:cNvSpPr/>
+                          <p:nvPr/>
+                        </p:nvSpPr>
+                        <p:spPr>
+                          <a:xfrm>
+                            <a:off x="5394565" y="3052277"/>
+                            <a:ext cx="1851237" cy="1851237"/>
+                          </a:xfrm>
+                          <a:prstGeom prst="ellipse">
+                            <a:avLst/>
+                          </a:prstGeom>
+                          <a:noFill/>
+                        </p:spPr>
+                        <p:style>
+                          <a:lnRef idx="2">
+                            <a:schemeClr val="accent1">
+                              <a:shade val="15000"/>
+                            </a:schemeClr>
+                          </a:lnRef>
+                          <a:fillRef idx="1">
+                            <a:schemeClr val="accent1"/>
+                          </a:fillRef>
+                          <a:effectRef idx="0">
+                            <a:schemeClr val="accent1"/>
+                          </a:effectRef>
+                          <a:fontRef idx="minor">
+                            <a:schemeClr val="lt1"/>
+                          </a:fontRef>
+                        </p:style>
+                        <p:txBody>
+                          <a:bodyPr rtlCol="0" anchor="ctr"/>
+                          <a:lstStyle/>
+                          <a:p>
+                            <a:pPr algn="ctr"/>
+                            <a:endParaRPr lang="en-US"/>
+                          </a:p>
+                        </p:txBody>
+                      </p:sp>
+                      <p:cxnSp>
+                        <p:nvCxnSpPr>
+                          <p:cNvPr id="21" name="Straight Arrow Connector 20">
+                            <a:extLst>
+                              <a:ext uri="{FF2B5EF4-FFF2-40B4-BE49-F238E27FC236}">
+                                <a16:creationId xmlns:a16="http://schemas.microsoft.com/office/drawing/2014/main" id="{B9A18AA0-4A62-C01F-9B50-E663F1292AE2}"/>
+                              </a:ext>
+                            </a:extLst>
+                          </p:cNvPr>
+                          <p:cNvCxnSpPr>
+                            <a:cxnSpLocks/>
+                          </p:cNvCxnSpPr>
+                          <p:nvPr/>
+                        </p:nvCxnSpPr>
+                        <p:spPr>
+                          <a:xfrm>
+                            <a:off x="6302772" y="4830063"/>
+                            <a:ext cx="0" cy="148337"/>
+                          </a:xfrm>
+                          <a:prstGeom prst="straightConnector1">
+                            <a:avLst/>
+                          </a:prstGeom>
+                          <a:ln w="22225">
+                            <a:solidFill>
+                              <a:schemeClr val="tx1"/>
+                            </a:solidFill>
+                            <a:tailEnd type="none" w="med" len="lg"/>
+                          </a:ln>
+                        </p:spPr>
+                        <p:style>
+                          <a:lnRef idx="2">
+                            <a:schemeClr val="accent1"/>
+                          </a:lnRef>
+                          <a:fillRef idx="0">
+                            <a:schemeClr val="accent1"/>
+                          </a:fillRef>
+                          <a:effectRef idx="1">
+                            <a:schemeClr val="accent1"/>
+                          </a:effectRef>
+                          <a:fontRef idx="minor">
+                            <a:schemeClr val="tx1"/>
+                          </a:fontRef>
+                        </p:style>
+                      </p:cxnSp>
+                    </p:grpSp>
+                    <p:cxnSp>
+                      <p:nvCxnSpPr>
+                        <p:cNvPr id="19" name="Straight Arrow Connector 18">
+                          <a:extLst>
+                            <a:ext uri="{FF2B5EF4-FFF2-40B4-BE49-F238E27FC236}">
+                              <a16:creationId xmlns:a16="http://schemas.microsoft.com/office/drawing/2014/main" id="{3C1DF725-E5F0-B4CE-3AC9-AFA35CC079F7}"/>
+                            </a:ext>
+                          </a:extLst>
+                        </p:cNvPr>
+                        <p:cNvCxnSpPr>
+                          <a:cxnSpLocks/>
+                        </p:cNvCxnSpPr>
+                        <p:nvPr/>
+                      </p:nvCxnSpPr>
+                      <p:spPr>
+                        <a:xfrm>
+                          <a:off x="6372622" y="4832899"/>
+                          <a:ext cx="0" cy="148337"/>
+                        </a:xfrm>
+                        <a:prstGeom prst="straightConnector1">
+                          <a:avLst/>
+                        </a:prstGeom>
+                        <a:ln w="22225">
+                          <a:solidFill>
+                            <a:schemeClr val="tx1"/>
+                          </a:solidFill>
+                          <a:tailEnd type="none" w="med" len="lg"/>
+                        </a:ln>
+                      </p:spPr>
+                      <p:style>
+                        <a:lnRef idx="2">
+                          <a:schemeClr val="accent1"/>
+                        </a:lnRef>
+                        <a:fillRef idx="0">
+                          <a:schemeClr val="accent1"/>
+                        </a:fillRef>
+                        <a:effectRef idx="1">
+                          <a:schemeClr val="accent1"/>
+                        </a:effectRef>
+                        <a:fontRef idx="minor">
+                          <a:schemeClr val="tx1"/>
+                        </a:fontRef>
+                      </p:style>
+                    </p:cxnSp>
+                  </p:grpSp>
+                  <p:cxnSp>
+                    <p:nvCxnSpPr>
+                      <p:cNvPr id="17" name="Straight Arrow Connector 16">
+                        <a:extLst>
+                          <a:ext uri="{FF2B5EF4-FFF2-40B4-BE49-F238E27FC236}">
+                            <a16:creationId xmlns:a16="http://schemas.microsoft.com/office/drawing/2014/main" id="{A158966E-E955-34C4-6FA2-D3985D16EAD9}"/>
+                          </a:ext>
+                        </a:extLst>
+                      </p:cNvPr>
+                      <p:cNvCxnSpPr>
+                        <a:cxnSpLocks/>
+                      </p:cNvCxnSpPr>
+                      <p:nvPr/>
+                    </p:nvCxnSpPr>
+                    <p:spPr>
+                      <a:xfrm>
+                        <a:off x="6446705" y="4831924"/>
+                        <a:ext cx="0" cy="148337"/>
+                      </a:xfrm>
+                      <a:prstGeom prst="straightConnector1">
+                        <a:avLst/>
+                      </a:prstGeom>
+                      <a:ln w="22225">
+                        <a:solidFill>
+                          <a:schemeClr val="tx1"/>
+                        </a:solidFill>
+                        <a:tailEnd type="none" w="med" len="lg"/>
+                      </a:ln>
+                    </p:spPr>
+                    <p:style>
+                      <a:lnRef idx="2">
+                        <a:schemeClr val="accent1"/>
+                      </a:lnRef>
+                      <a:fillRef idx="0">
+                        <a:schemeClr val="accent1"/>
+                      </a:fillRef>
+                      <a:effectRef idx="1">
+                        <a:schemeClr val="accent1"/>
+                      </a:effectRef>
+                      <a:fontRef idx="minor">
+                        <a:schemeClr val="tx1"/>
+                      </a:fontRef>
+                    </p:style>
+                  </p:cxnSp>
+                </p:grpSp>
+                <p:cxnSp>
+                  <p:nvCxnSpPr>
+                    <p:cNvPr id="15" name="Straight Arrow Connector 14">
+                      <a:extLst>
+                        <a:ext uri="{FF2B5EF4-FFF2-40B4-BE49-F238E27FC236}">
+                          <a16:creationId xmlns:a16="http://schemas.microsoft.com/office/drawing/2014/main" id="{331FEB9B-BE5A-B621-B748-54002BA46D74}"/>
+                        </a:ext>
+                      </a:extLst>
+                    </p:cNvPr>
+                    <p:cNvCxnSpPr>
+                      <a:cxnSpLocks/>
+                    </p:cNvCxnSpPr>
+                    <p:nvPr/>
+                  </p:nvCxnSpPr>
+                  <p:spPr>
+                    <a:xfrm rot="20580418" flipH="1">
+                      <a:off x="6216757" y="4848642"/>
+                      <a:ext cx="62135" cy="123257"/>
+                    </a:xfrm>
+                    <a:prstGeom prst="straightConnector1">
+                      <a:avLst/>
+                    </a:prstGeom>
+                    <a:ln w="22225">
+                      <a:solidFill>
+                        <a:schemeClr val="tx1"/>
+                      </a:solidFill>
+                      <a:tailEnd type="none" w="med" len="lg"/>
+                    </a:ln>
+                  </p:spPr>
+                  <p:style>
+                    <a:lnRef idx="2">
+                      <a:schemeClr val="accent1"/>
+                    </a:lnRef>
+                    <a:fillRef idx="0">
+                      <a:schemeClr val="accent1"/>
+                    </a:fillRef>
+                    <a:effectRef idx="1">
+                      <a:schemeClr val="accent1"/>
+                    </a:effectRef>
+                    <a:fontRef idx="minor">
+                      <a:schemeClr val="tx1"/>
+                    </a:fontRef>
+                  </p:style>
+                </p:cxnSp>
+              </p:grpSp>
+              <p:cxnSp>
+                <p:nvCxnSpPr>
+                  <p:cNvPr id="13" name="Straight Arrow Connector 12">
+                    <a:extLst>
+                      <a:ext uri="{FF2B5EF4-FFF2-40B4-BE49-F238E27FC236}">
+                        <a16:creationId xmlns:a16="http://schemas.microsoft.com/office/drawing/2014/main" id="{8174FEE3-8FB8-967B-D368-67E08FFAA4BC}"/>
+                      </a:ext>
+                    </a:extLst>
+                  </p:cNvPr>
+                  <p:cNvCxnSpPr>
+                    <a:cxnSpLocks/>
+                  </p:cNvCxnSpPr>
+                  <p:nvPr/>
+                </p:nvCxnSpPr>
+                <p:spPr>
+                  <a:xfrm>
+                    <a:off x="6307246" y="4859206"/>
+                    <a:ext cx="0" cy="148337"/>
+                  </a:xfrm>
+                  <a:prstGeom prst="straightConnector1">
+                    <a:avLst/>
+                  </a:prstGeom>
+                  <a:ln w="22225">
+                    <a:solidFill>
+                      <a:schemeClr val="tx1"/>
+                    </a:solidFill>
+                    <a:tailEnd type="none" w="med" len="lg"/>
+                  </a:ln>
+                </p:spPr>
+                <p:style>
+                  <a:lnRef idx="2">
+                    <a:schemeClr val="accent1"/>
+                  </a:lnRef>
+                  <a:fillRef idx="0">
+                    <a:schemeClr val="accent1"/>
+                  </a:fillRef>
+                  <a:effectRef idx="1">
+                    <a:schemeClr val="accent1"/>
+                  </a:effectRef>
+                  <a:fontRef idx="minor">
+                    <a:schemeClr val="tx1"/>
+                  </a:fontRef>
+                </p:style>
+              </p:cxnSp>
+            </p:grpSp>
+            <p:cxnSp>
+              <p:nvCxnSpPr>
+                <p:cNvPr id="11" name="Straight Arrow Connector 10">
+                  <a:extLst>
+                    <a:ext uri="{FF2B5EF4-FFF2-40B4-BE49-F238E27FC236}">
+                      <a16:creationId xmlns:a16="http://schemas.microsoft.com/office/drawing/2014/main" id="{927C89D5-7784-034E-2FA0-1157DE5C828E}"/>
+                    </a:ext>
+                  </a:extLst>
+                </p:cNvPr>
+                <p:cNvCxnSpPr>
+                  <a:cxnSpLocks/>
+                </p:cNvCxnSpPr>
+                <p:nvPr/>
+              </p:nvCxnSpPr>
+              <p:spPr>
+                <a:xfrm>
+                  <a:off x="6280547" y="4884380"/>
+                  <a:ext cx="0" cy="148337"/>
+                </a:xfrm>
+                <a:prstGeom prst="straightConnector1">
+                  <a:avLst/>
+                </a:prstGeom>
+                <a:ln w="22225">
+                  <a:solidFill>
+                    <a:schemeClr val="tx1"/>
+                  </a:solidFill>
+                  <a:tailEnd type="none" w="med" len="lg"/>
+                </a:ln>
+              </p:spPr>
+              <p:style>
+                <a:lnRef idx="2">
+                  <a:schemeClr val="accent1"/>
+                </a:lnRef>
+                <a:fillRef idx="0">
+                  <a:schemeClr val="accent1"/>
+                </a:fillRef>
+                <a:effectRef idx="1">
+                  <a:schemeClr val="accent1"/>
+                </a:effectRef>
+                <a:fontRef idx="minor">
+                  <a:schemeClr val="tx1"/>
+                </a:fontRef>
+              </p:style>
+            </p:cxnSp>
+          </p:grpSp>
+          <p:cxnSp>
+            <p:nvCxnSpPr>
+              <p:cNvPr id="9" name="Straight Arrow Connector 8">
+                <a:extLst>
+                  <a:ext uri="{FF2B5EF4-FFF2-40B4-BE49-F238E27FC236}">
+                    <a16:creationId xmlns:a16="http://schemas.microsoft.com/office/drawing/2014/main" id="{5744E1BF-A4A4-9864-E853-491B64A6CC31}"/>
+                  </a:ext>
+                </a:extLst>
+              </p:cNvPr>
+              <p:cNvCxnSpPr>
+                <a:cxnSpLocks/>
+              </p:cNvCxnSpPr>
+              <p:nvPr/>
+            </p:nvCxnSpPr>
+            <p:spPr>
+              <a:xfrm>
+                <a:off x="6366115" y="4869685"/>
+                <a:ext cx="0" cy="148337"/>
+              </a:xfrm>
+              <a:prstGeom prst="straightConnector1">
+                <a:avLst/>
+              </a:prstGeom>
+              <a:ln w="22225">
+                <a:solidFill>
+                  <a:schemeClr val="tx1"/>
+                </a:solidFill>
+                <a:tailEnd type="none" w="med" len="lg"/>
+              </a:ln>
+            </p:spPr>
+            <p:style>
+              <a:lnRef idx="2">
+                <a:schemeClr val="accent1"/>
+              </a:lnRef>
+              <a:fillRef idx="0">
+                <a:schemeClr val="accent1"/>
+              </a:fillRef>
+              <a:effectRef idx="1">
+                <a:schemeClr val="accent1"/>
+              </a:effectRef>
+              <a:fontRef idx="minor">
+                <a:schemeClr val="tx1"/>
+              </a:fontRef>
+            </p:style>
+          </p:cxnSp>
+        </p:grpSp>
+        <p:cxnSp>
+          <p:nvCxnSpPr>
+            <p:cNvPr id="7" name="Straight Arrow Connector 6">
+              <a:extLst>
+                <a:ext uri="{FF2B5EF4-FFF2-40B4-BE49-F238E27FC236}">
+                  <a16:creationId xmlns:a16="http://schemas.microsoft.com/office/drawing/2014/main" id="{8AB62B57-051A-ED9B-5786-17164882A20A}"/>
+                </a:ext>
+              </a:extLst>
+            </p:cNvPr>
+            <p:cNvCxnSpPr>
+              <a:cxnSpLocks/>
+            </p:cNvCxnSpPr>
+            <p:nvPr/>
+          </p:nvCxnSpPr>
+          <p:spPr>
+            <a:xfrm>
+              <a:off x="6322880" y="4874630"/>
+              <a:ext cx="0" cy="148337"/>
+            </a:xfrm>
+            <a:prstGeom prst="straightConnector1">
+              <a:avLst/>
+            </a:prstGeom>
+            <a:ln w="22225">
+              <a:solidFill>
+                <a:schemeClr val="tx1"/>
+              </a:solidFill>
+              <a:tailEnd type="none" w="med" len="lg"/>
+            </a:ln>
+          </p:spPr>
+          <p:style>
+            <a:lnRef idx="2">
+              <a:schemeClr val="accent1"/>
+            </a:lnRef>
+            <a:fillRef idx="0">
+              <a:schemeClr val="accent1"/>
+            </a:fillRef>
+            <a:effectRef idx="1">
+              <a:schemeClr val="accent1"/>
+            </a:effectRef>
+            <a:fontRef idx="minor">
+              <a:schemeClr val="tx1"/>
+            </a:fontRef>
+          </p:style>
+        </p:cxnSp>
+      </p:grpSp>
+      <mc:AlternateContent xmlns:mc="http://schemas.openxmlformats.org/markup-compatibility/2006">
+        <mc:Choice xmlns:a14="http://schemas.microsoft.com/office/drawing/2010/main" Requires="a14">
+          <p:sp>
+            <p:nvSpPr>
+              <p:cNvPr id="22" name="TextBox 21">
+                <a:extLst>
+                  <a:ext uri="{FF2B5EF4-FFF2-40B4-BE49-F238E27FC236}">
+                    <a16:creationId xmlns:a16="http://schemas.microsoft.com/office/drawing/2014/main" id="{0213B6BF-CD55-6EE4-9FE7-B6A1E84A6605}"/>
+                  </a:ext>
+                </a:extLst>
+              </p:cNvPr>
+              <p:cNvSpPr txBox="1"/>
+              <p:nvPr/>
+            </p:nvSpPr>
+            <p:spPr>
+              <a:xfrm>
+                <a:off x="6640193" y="2223736"/>
+                <a:ext cx="315086" cy="276999"/>
+              </a:xfrm>
+              <a:prstGeom prst="rect">
+                <a:avLst/>
+              </a:prstGeom>
+              <a:noFill/>
+            </p:spPr>
+            <p:txBody>
+              <a:bodyPr wrap="none" lIns="0" tIns="0" rIns="0" bIns="0" rtlCol="0">
+                <a:spAutoFit/>
+              </a:bodyPr>
+              <a:lstStyle/>
+              <a:p>
+                <a:pPr/>
+                <a14:m>
+                  <m:oMathPara xmlns:m="http://schemas.openxmlformats.org/officeDocument/2006/math">
+                    <m:oMathParaPr>
+                      <m:jc m:val="centerGroup"/>
+                    </m:oMathParaPr>
+                    <m:oMath xmlns:m="http://schemas.openxmlformats.org/officeDocument/2006/math">
+                      <m:sSub>
+                        <m:sSubPr>
+                          <m:ctrlPr>
+                            <a:rPr lang="en-US" i="1" smtClean="0">
+                              <a:latin typeface="Cambria Math" panose="02040503050406030204" pitchFamily="18" charset="0"/>
+                              <a:ea typeface="Cambria Math" panose="02040503050406030204" pitchFamily="18" charset="0"/>
+                            </a:rPr>
+                          </m:ctrlPr>
+                        </m:sSubPr>
+                        <m:e>
+                          <m:r>
+                            <a:rPr lang="en-US" i="1">
+                              <a:latin typeface="Cambria Math" panose="02040503050406030204" pitchFamily="18" charset="0"/>
+                              <a:ea typeface="Cambria Math" panose="02040503050406030204" pitchFamily="18" charset="0"/>
+                            </a:rPr>
+                            <m:t>𝑚</m:t>
+                          </m:r>
+                        </m:e>
+                        <m:sub>
+                          <m:r>
+                            <a:rPr lang="en-US" b="0" i="1" smtClean="0">
+                              <a:latin typeface="Cambria Math" panose="02040503050406030204" pitchFamily="18" charset="0"/>
+                              <a:ea typeface="Cambria Math" panose="02040503050406030204" pitchFamily="18" charset="0"/>
+                            </a:rPr>
+                            <m:t>𝑖</m:t>
+                          </m:r>
+                        </m:sub>
+                      </m:sSub>
+                    </m:oMath>
+                  </m:oMathPara>
+                </a14:m>
+                <a:endParaRPr lang="en-US" dirty="0"/>
+              </a:p>
+            </p:txBody>
+          </p:sp>
+        </mc:Choice>
+        <mc:Fallback>
+          <p:sp>
+            <p:nvSpPr>
+              <p:cNvPr id="22" name="TextBox 21">
+                <a:extLst>
+                  <a:ext uri="{FF2B5EF4-FFF2-40B4-BE49-F238E27FC236}">
+                    <a16:creationId xmlns:a16="http://schemas.microsoft.com/office/drawing/2014/main" id="{0213B6BF-CD55-6EE4-9FE7-B6A1E84A6605}"/>
+                  </a:ext>
+                </a:extLst>
+              </p:cNvPr>
+              <p:cNvSpPr txBox="1">
+                <a:spLocks noRot="1" noChangeAspect="1" noMove="1" noResize="1" noEditPoints="1" noAdjustHandles="1" noChangeArrowheads="1" noChangeShapeType="1" noTextEdit="1"/>
+              </p:cNvSpPr>
+              <p:nvPr/>
+            </p:nvSpPr>
+            <p:spPr>
+              <a:xfrm>
+                <a:off x="6640193" y="2223736"/>
+                <a:ext cx="315086" cy="276999"/>
+              </a:xfrm>
+              <a:prstGeom prst="rect">
+                <a:avLst/>
+              </a:prstGeom>
+              <a:blipFill>
+                <a:blip r:embed="rId2"/>
+                <a:stretch>
+                  <a:fillRect l="-11538" r="-9615" b="-17778"/>
+                </a:stretch>
+              </a:blipFill>
+            </p:spPr>
+            <p:txBody>
+              <a:bodyPr/>
+              <a:lstStyle/>
+              <a:p>
+                <a:r>
+                  <a:rPr lang="en-US">
+                    <a:noFill/>
+                  </a:rPr>
+                  <a:t> </a:t>
+                </a:r>
+              </a:p>
+            </p:txBody>
+          </p:sp>
+        </mc:Fallback>
+      </mc:AlternateContent>
+      <p:cxnSp>
+        <p:nvCxnSpPr>
+          <p:cNvPr id="23" name="Straight Arrow Connector 22">
+            <a:extLst>
+              <a:ext uri="{FF2B5EF4-FFF2-40B4-BE49-F238E27FC236}">
+                <a16:creationId xmlns:a16="http://schemas.microsoft.com/office/drawing/2014/main" id="{1973B3B4-764D-DE91-BED9-C6F15BB7AB4A}"/>
+              </a:ext>
+            </a:extLst>
+          </p:cNvPr>
+          <p:cNvCxnSpPr>
+            <a:cxnSpLocks/>
+          </p:cNvCxnSpPr>
+          <p:nvPr/>
+        </p:nvCxnSpPr>
+        <p:spPr>
+          <a:xfrm flipV="1">
+            <a:off x="6617714" y="1736084"/>
+            <a:ext cx="174190" cy="513317"/>
+          </a:xfrm>
+          <a:prstGeom prst="straightConnector1">
+            <a:avLst/>
+          </a:prstGeom>
+          <a:ln w="25400">
+            <a:solidFill>
+              <a:schemeClr val="tx1"/>
+            </a:solidFill>
+            <a:tailEnd type="stealth" w="med" len="lg"/>
+          </a:ln>
+        </p:spPr>
+        <p:style>
+          <a:lnRef idx="2">
+            <a:schemeClr val="accent1"/>
+          </a:lnRef>
+          <a:fillRef idx="0">
+            <a:schemeClr val="accent1"/>
+          </a:fillRef>
+          <a:effectRef idx="1">
+            <a:schemeClr val="accent1"/>
+          </a:effectRef>
+          <a:fontRef idx="minor">
+            <a:schemeClr val="tx1"/>
+          </a:fontRef>
+        </p:style>
+      </p:cxnSp>
+      <mc:AlternateContent xmlns:mc="http://schemas.openxmlformats.org/markup-compatibility/2006">
+        <mc:Choice xmlns:a14="http://schemas.microsoft.com/office/drawing/2010/main" Requires="a14">
+          <p:sp>
+            <p:nvSpPr>
+              <p:cNvPr id="26" name="TextBox 25">
+                <a:extLst>
+                  <a:ext uri="{FF2B5EF4-FFF2-40B4-BE49-F238E27FC236}">
+                    <a16:creationId xmlns:a16="http://schemas.microsoft.com/office/drawing/2014/main" id="{F489F450-DAAF-C910-4B77-B29A40C7BE90}"/>
+                  </a:ext>
+                </a:extLst>
+              </p:cNvPr>
+              <p:cNvSpPr txBox="1"/>
+              <p:nvPr/>
+            </p:nvSpPr>
+            <p:spPr>
+              <a:xfrm>
+                <a:off x="6793820" y="1746359"/>
+                <a:ext cx="243913" cy="276999"/>
+              </a:xfrm>
+              <a:prstGeom prst="rect">
+                <a:avLst/>
+              </a:prstGeom>
+              <a:noFill/>
+            </p:spPr>
+            <p:txBody>
+              <a:bodyPr wrap="none" lIns="0" tIns="0" rIns="0" bIns="0" rtlCol="0">
+                <a:spAutoFit/>
+              </a:bodyPr>
+              <a:lstStyle/>
+              <a:p>
+                <a:pPr/>
+                <a14:m>
+                  <m:oMathPara xmlns:m="http://schemas.openxmlformats.org/officeDocument/2006/math">
+                    <m:oMathParaPr>
+                      <m:jc m:val="centerGroup"/>
+                    </m:oMathParaPr>
+                    <m:oMath xmlns:m="http://schemas.openxmlformats.org/officeDocument/2006/math">
+                      <m:acc>
+                        <m:accPr>
+                          <m:chr m:val="⃗"/>
+                          <m:ctrlPr>
+                            <a:rPr lang="en-US" i="1" smtClean="0">
+                              <a:latin typeface="Cambria Math" panose="02040503050406030204" pitchFamily="18" charset="0"/>
+                              <a:ea typeface="Cambria Math" panose="02040503050406030204" pitchFamily="18" charset="0"/>
+                            </a:rPr>
+                          </m:ctrlPr>
+                        </m:accPr>
+                        <m:e>
+                          <m:sSub>
+                            <m:sSubPr>
+                              <m:ctrlPr>
+                                <a:rPr lang="en-US" i="1">
+                                  <a:latin typeface="Cambria Math" panose="02040503050406030204" pitchFamily="18" charset="0"/>
+                                  <a:ea typeface="Cambria Math" panose="02040503050406030204" pitchFamily="18" charset="0"/>
+                                </a:rPr>
+                              </m:ctrlPr>
+                            </m:sSubPr>
+                            <m:e>
+                              <m:r>
+                                <a:rPr lang="en-US" i="1">
+                                  <a:latin typeface="Cambria Math" panose="02040503050406030204" pitchFamily="18" charset="0"/>
+                                  <a:ea typeface="Cambria Math" panose="02040503050406030204" pitchFamily="18" charset="0"/>
+                                </a:rPr>
+                                <m:t>𝑣</m:t>
+                              </m:r>
+                            </m:e>
+                            <m:sub>
+                              <m:r>
+                                <a:rPr lang="en-US" i="1">
+                                  <a:latin typeface="Cambria Math" panose="02040503050406030204" pitchFamily="18" charset="0"/>
+                                  <a:ea typeface="Cambria Math" panose="02040503050406030204" pitchFamily="18" charset="0"/>
+                                </a:rPr>
+                                <m:t>𝑖</m:t>
+                              </m:r>
+                            </m:sub>
+                          </m:sSub>
+                        </m:e>
+                      </m:acc>
+                    </m:oMath>
+                  </m:oMathPara>
+                </a14:m>
+                <a:endParaRPr lang="en-US" dirty="0"/>
+              </a:p>
+            </p:txBody>
+          </p:sp>
+        </mc:Choice>
+        <mc:Fallback>
+          <p:sp>
+            <p:nvSpPr>
+              <p:cNvPr id="26" name="TextBox 25">
+                <a:extLst>
+                  <a:ext uri="{FF2B5EF4-FFF2-40B4-BE49-F238E27FC236}">
+                    <a16:creationId xmlns:a16="http://schemas.microsoft.com/office/drawing/2014/main" id="{F489F450-DAAF-C910-4B77-B29A40C7BE90}"/>
+                  </a:ext>
+                </a:extLst>
+              </p:cNvPr>
+              <p:cNvSpPr txBox="1">
+                <a:spLocks noRot="1" noChangeAspect="1" noMove="1" noResize="1" noEditPoints="1" noAdjustHandles="1" noChangeArrowheads="1" noChangeShapeType="1" noTextEdit="1"/>
+              </p:cNvSpPr>
+              <p:nvPr/>
+            </p:nvSpPr>
+            <p:spPr>
+              <a:xfrm>
+                <a:off x="6793820" y="1746359"/>
+                <a:ext cx="243913" cy="276999"/>
+              </a:xfrm>
+              <a:prstGeom prst="rect">
+                <a:avLst/>
+              </a:prstGeom>
+              <a:blipFill>
+                <a:blip r:embed="rId3"/>
+                <a:stretch>
+                  <a:fillRect l="-15000" r="-12500" b="-17391"/>
+                </a:stretch>
+              </a:blipFill>
+            </p:spPr>
+            <p:txBody>
+              <a:bodyPr/>
+              <a:lstStyle/>
+              <a:p>
+                <a:r>
+                  <a:rPr lang="en-US">
+                    <a:noFill/>
+                  </a:rPr>
+                  <a:t> </a:t>
+                </a:r>
+              </a:p>
+            </p:txBody>
+          </p:sp>
+        </mc:Fallback>
+      </mc:AlternateContent>
+      <p:cxnSp>
+        <p:nvCxnSpPr>
+          <p:cNvPr id="27" name="Straight Arrow Connector 26">
+            <a:extLst>
+              <a:ext uri="{FF2B5EF4-FFF2-40B4-BE49-F238E27FC236}">
+                <a16:creationId xmlns:a16="http://schemas.microsoft.com/office/drawing/2014/main" id="{B0B9EED6-2552-823D-306A-2D5928F2AACE}"/>
+              </a:ext>
+            </a:extLst>
+          </p:cNvPr>
+          <p:cNvCxnSpPr>
+            <a:cxnSpLocks/>
+          </p:cNvCxnSpPr>
+          <p:nvPr/>
+        </p:nvCxnSpPr>
+        <p:spPr>
+          <a:xfrm>
+            <a:off x="5770571" y="1825754"/>
+            <a:ext cx="828987" cy="423647"/>
+          </a:xfrm>
+          <a:prstGeom prst="straightConnector1">
+            <a:avLst/>
+          </a:prstGeom>
+          <a:ln w="12700">
+            <a:solidFill>
+              <a:schemeClr val="tx1"/>
+            </a:solidFill>
+            <a:tailEnd type="none" w="med" len="lg"/>
+          </a:ln>
+        </p:spPr>
+        <p:style>
+          <a:lnRef idx="2">
+            <a:schemeClr val="accent1"/>
+          </a:lnRef>
+          <a:fillRef idx="0">
+            <a:schemeClr val="accent1"/>
+          </a:fillRef>
+          <a:effectRef idx="1">
+            <a:schemeClr val="accent1"/>
+          </a:effectRef>
+          <a:fontRef idx="minor">
+            <a:schemeClr val="tx1"/>
+          </a:fontRef>
+        </p:style>
+      </p:cxnSp>
+      <p:cxnSp>
+        <p:nvCxnSpPr>
+          <p:cNvPr id="30" name="Straight Arrow Connector 29">
+            <a:extLst>
+              <a:ext uri="{FF2B5EF4-FFF2-40B4-BE49-F238E27FC236}">
+                <a16:creationId xmlns:a16="http://schemas.microsoft.com/office/drawing/2014/main" id="{C941764F-804B-1631-65AC-60EA7918A541}"/>
+              </a:ext>
+            </a:extLst>
+          </p:cNvPr>
+          <p:cNvCxnSpPr>
+            <a:cxnSpLocks/>
+            <a:stCxn id="3" idx="1"/>
+          </p:cNvCxnSpPr>
+          <p:nvPr/>
+        </p:nvCxnSpPr>
+        <p:spPr>
+          <a:xfrm>
+            <a:off x="5752900" y="1806189"/>
+            <a:ext cx="773791" cy="585160"/>
+          </a:xfrm>
+          <a:prstGeom prst="straightConnector1">
+            <a:avLst/>
+          </a:prstGeom>
+          <a:ln w="12700">
+            <a:solidFill>
+              <a:schemeClr val="tx1"/>
+            </a:solidFill>
+            <a:tailEnd type="none" w="med" len="lg"/>
+          </a:ln>
+        </p:spPr>
+        <p:style>
+          <a:lnRef idx="2">
+            <a:schemeClr val="accent1"/>
+          </a:lnRef>
+          <a:fillRef idx="0">
+            <a:schemeClr val="accent1"/>
+          </a:fillRef>
+          <a:effectRef idx="1">
+            <a:schemeClr val="accent1"/>
+          </a:effectRef>
+          <a:fontRef idx="minor">
+            <a:schemeClr val="tx1"/>
+          </a:fontRef>
+        </p:style>
+      </p:cxnSp>
+      <p:cxnSp>
+        <p:nvCxnSpPr>
+          <p:cNvPr id="36" name="Straight Arrow Connector 35">
+            <a:extLst>
+              <a:ext uri="{FF2B5EF4-FFF2-40B4-BE49-F238E27FC236}">
+                <a16:creationId xmlns:a16="http://schemas.microsoft.com/office/drawing/2014/main" id="{DF6B4F70-78C0-D5A3-E25F-B6ACAF97BDB0}"/>
+              </a:ext>
+            </a:extLst>
+          </p:cNvPr>
+          <p:cNvCxnSpPr>
+            <a:cxnSpLocks/>
+            <a:stCxn id="3" idx="1"/>
+          </p:cNvCxnSpPr>
+          <p:nvPr/>
+        </p:nvCxnSpPr>
+        <p:spPr>
+          <a:xfrm>
+            <a:off x="5752900" y="1806189"/>
+            <a:ext cx="669789" cy="698805"/>
+          </a:xfrm>
+          <a:prstGeom prst="straightConnector1">
+            <a:avLst/>
+          </a:prstGeom>
+          <a:ln w="12700">
+            <a:solidFill>
+              <a:schemeClr val="tx1"/>
+            </a:solidFill>
+            <a:tailEnd type="none" w="med" len="lg"/>
+          </a:ln>
+        </p:spPr>
+        <p:style>
+          <a:lnRef idx="2">
+            <a:schemeClr val="accent1"/>
+          </a:lnRef>
+          <a:fillRef idx="0">
+            <a:schemeClr val="accent1"/>
+          </a:fillRef>
+          <a:effectRef idx="1">
+            <a:schemeClr val="accent1"/>
+          </a:effectRef>
+          <a:fontRef idx="minor">
+            <a:schemeClr val="tx1"/>
+          </a:fontRef>
+        </p:style>
+      </p:cxnSp>
+      <p:cxnSp>
+        <p:nvCxnSpPr>
+          <p:cNvPr id="43" name="Straight Arrow Connector 42">
+            <a:extLst>
+              <a:ext uri="{FF2B5EF4-FFF2-40B4-BE49-F238E27FC236}">
+                <a16:creationId xmlns:a16="http://schemas.microsoft.com/office/drawing/2014/main" id="{45BD039D-8624-5400-4162-0EE5330E0E54}"/>
+              </a:ext>
+            </a:extLst>
+          </p:cNvPr>
+          <p:cNvCxnSpPr>
+            <a:cxnSpLocks/>
+            <a:stCxn id="3" idx="1"/>
+          </p:cNvCxnSpPr>
+          <p:nvPr/>
+        </p:nvCxnSpPr>
+        <p:spPr>
+          <a:xfrm>
+            <a:off x="5752900" y="1806189"/>
+            <a:ext cx="558647" cy="798668"/>
+          </a:xfrm>
+          <a:prstGeom prst="straightConnector1">
+            <a:avLst/>
+          </a:prstGeom>
+          <a:ln w="12700">
+            <a:solidFill>
+              <a:schemeClr val="tx1"/>
+            </a:solidFill>
+            <a:tailEnd type="none" w="med" len="lg"/>
+          </a:ln>
+        </p:spPr>
+        <p:style>
+          <a:lnRef idx="2">
+            <a:schemeClr val="accent1"/>
+          </a:lnRef>
+          <a:fillRef idx="0">
+            <a:schemeClr val="accent1"/>
+          </a:fillRef>
+          <a:effectRef idx="1">
+            <a:schemeClr val="accent1"/>
+          </a:effectRef>
+          <a:fontRef idx="minor">
+            <a:schemeClr val="tx1"/>
+          </a:fontRef>
+        </p:style>
+      </p:cxnSp>
+      <p:cxnSp>
+        <p:nvCxnSpPr>
+          <p:cNvPr id="45" name="Straight Arrow Connector 44">
+            <a:extLst>
+              <a:ext uri="{FF2B5EF4-FFF2-40B4-BE49-F238E27FC236}">
+                <a16:creationId xmlns:a16="http://schemas.microsoft.com/office/drawing/2014/main" id="{703043B9-1D8E-4D4A-39BF-FD371FCB65A4}"/>
+              </a:ext>
+            </a:extLst>
+          </p:cNvPr>
+          <p:cNvCxnSpPr>
+            <a:cxnSpLocks/>
+            <a:stCxn id="3" idx="1"/>
+          </p:cNvCxnSpPr>
+          <p:nvPr/>
+        </p:nvCxnSpPr>
+        <p:spPr>
+          <a:xfrm>
+            <a:off x="5752900" y="1806189"/>
+            <a:ext cx="443776" cy="861488"/>
+          </a:xfrm>
+          <a:prstGeom prst="straightConnector1">
+            <a:avLst/>
+          </a:prstGeom>
+          <a:ln w="12700">
+            <a:solidFill>
+              <a:schemeClr val="tx1"/>
+            </a:solidFill>
+            <a:tailEnd type="none" w="med" len="lg"/>
+          </a:ln>
+        </p:spPr>
+        <p:style>
+          <a:lnRef idx="2">
+            <a:schemeClr val="accent1"/>
+          </a:lnRef>
+          <a:fillRef idx="0">
+            <a:schemeClr val="accent1"/>
+          </a:fillRef>
+          <a:effectRef idx="1">
+            <a:schemeClr val="accent1"/>
+          </a:effectRef>
+          <a:fontRef idx="minor">
+            <a:schemeClr val="tx1"/>
+          </a:fontRef>
+        </p:style>
+      </p:cxnSp>
+      <p:cxnSp>
+        <p:nvCxnSpPr>
+          <p:cNvPr id="47" name="Straight Arrow Connector 46">
+            <a:extLst>
+              <a:ext uri="{FF2B5EF4-FFF2-40B4-BE49-F238E27FC236}">
+                <a16:creationId xmlns:a16="http://schemas.microsoft.com/office/drawing/2014/main" id="{71852EF3-EF0F-EDCE-4EE1-A75E8E619F8A}"/>
+              </a:ext>
+            </a:extLst>
+          </p:cNvPr>
+          <p:cNvCxnSpPr>
+            <a:cxnSpLocks/>
+            <a:stCxn id="3" idx="0"/>
+          </p:cNvCxnSpPr>
+          <p:nvPr/>
+        </p:nvCxnSpPr>
+        <p:spPr>
+          <a:xfrm>
+            <a:off x="5777714" y="1796514"/>
+            <a:ext cx="241280" cy="927555"/>
+          </a:xfrm>
+          <a:prstGeom prst="straightConnector1">
+            <a:avLst/>
+          </a:prstGeom>
+          <a:ln w="12700">
+            <a:solidFill>
+              <a:schemeClr val="tx1"/>
+            </a:solidFill>
+            <a:tailEnd type="none" w="med" len="lg"/>
+          </a:ln>
+        </p:spPr>
+        <p:style>
+          <a:lnRef idx="2">
+            <a:schemeClr val="accent1"/>
+          </a:lnRef>
+          <a:fillRef idx="0">
+            <a:schemeClr val="accent1"/>
+          </a:fillRef>
+          <a:effectRef idx="1">
+            <a:schemeClr val="accent1"/>
+          </a:effectRef>
+          <a:fontRef idx="minor">
+            <a:schemeClr val="tx1"/>
+          </a:fontRef>
+        </p:style>
+      </p:cxnSp>
+      <p:cxnSp>
+        <p:nvCxnSpPr>
+          <p:cNvPr id="50" name="Straight Arrow Connector 49">
+            <a:extLst>
+              <a:ext uri="{FF2B5EF4-FFF2-40B4-BE49-F238E27FC236}">
+                <a16:creationId xmlns:a16="http://schemas.microsoft.com/office/drawing/2014/main" id="{541836D4-82B2-DFAA-A538-87257A053EB9}"/>
+              </a:ext>
+            </a:extLst>
+          </p:cNvPr>
+          <p:cNvCxnSpPr>
+            <a:cxnSpLocks/>
+            <a:stCxn id="3" idx="0"/>
+          </p:cNvCxnSpPr>
+          <p:nvPr/>
+        </p:nvCxnSpPr>
+        <p:spPr>
+          <a:xfrm>
+            <a:off x="5777714" y="1796514"/>
+            <a:ext cx="33881" cy="974715"/>
+          </a:xfrm>
+          <a:prstGeom prst="straightConnector1">
+            <a:avLst/>
+          </a:prstGeom>
+          <a:ln w="12700">
+            <a:solidFill>
+              <a:schemeClr val="tx1"/>
+            </a:solidFill>
+            <a:tailEnd type="none" w="med" len="lg"/>
+          </a:ln>
+        </p:spPr>
+        <p:style>
+          <a:lnRef idx="2">
+            <a:schemeClr val="accent1"/>
+          </a:lnRef>
+          <a:fillRef idx="0">
+            <a:schemeClr val="accent1"/>
+          </a:fillRef>
+          <a:effectRef idx="1">
+            <a:schemeClr val="accent1"/>
+          </a:effectRef>
+          <a:fontRef idx="minor">
+            <a:schemeClr val="tx1"/>
+          </a:fontRef>
+        </p:style>
+      </p:cxnSp>
+      <mc:AlternateContent xmlns:mc="http://schemas.openxmlformats.org/markup-compatibility/2006">
+        <mc:Choice xmlns:a14="http://schemas.microsoft.com/office/drawing/2010/main" Requires="a14">
+          <p:sp>
+            <p:nvSpPr>
+              <p:cNvPr id="58" name="TextBox 57">
+                <a:extLst>
+                  <a:ext uri="{FF2B5EF4-FFF2-40B4-BE49-F238E27FC236}">
+                    <a16:creationId xmlns:a16="http://schemas.microsoft.com/office/drawing/2014/main" id="{26A1C35B-A7B3-F78B-8F50-C812E20E1679}"/>
+                  </a:ext>
+                </a:extLst>
+              </p:cNvPr>
+              <p:cNvSpPr txBox="1"/>
+              <p:nvPr/>
+            </p:nvSpPr>
+            <p:spPr>
+              <a:xfrm>
+                <a:off x="6229284" y="1789277"/>
+                <a:ext cx="264623" cy="310598"/>
+              </a:xfrm>
+              <a:prstGeom prst="rect">
+                <a:avLst/>
+              </a:prstGeom>
+              <a:noFill/>
+            </p:spPr>
+            <p:txBody>
+              <a:bodyPr wrap="none" lIns="0" tIns="0" rIns="0" bIns="0" rtlCol="0">
+                <a:spAutoFit/>
+              </a:bodyPr>
+              <a:lstStyle/>
+              <a:p>
+                <a:pPr/>
+                <a14:m>
+                  <m:oMathPara xmlns:m="http://schemas.openxmlformats.org/officeDocument/2006/math">
+                    <m:oMathParaPr>
+                      <m:jc m:val="centerGroup"/>
+                    </m:oMathParaPr>
+                    <m:oMath xmlns:m="http://schemas.openxmlformats.org/officeDocument/2006/math">
+                      <m:acc>
+                        <m:accPr>
+                          <m:chr m:val="⃗"/>
+                          <m:ctrlPr>
+                            <a:rPr lang="en-US" i="1" smtClean="0">
+                              <a:latin typeface="Cambria Math" panose="02040503050406030204" pitchFamily="18" charset="0"/>
+                              <a:ea typeface="Cambria Math" panose="02040503050406030204" pitchFamily="18" charset="0"/>
+                            </a:rPr>
+                          </m:ctrlPr>
+                        </m:accPr>
+                        <m:e>
+                          <m:sSub>
+                            <m:sSubPr>
+                              <m:ctrlPr>
+                                <a:rPr lang="en-US" i="1">
+                                  <a:latin typeface="Cambria Math" panose="02040503050406030204" pitchFamily="18" charset="0"/>
+                                  <a:ea typeface="Cambria Math" panose="02040503050406030204" pitchFamily="18" charset="0"/>
+                                </a:rPr>
+                              </m:ctrlPr>
+                            </m:sSubPr>
+                            <m:e>
+                              <m:r>
+                                <a:rPr lang="en-US" b="0" i="1" smtClean="0">
+                                  <a:latin typeface="Cambria Math" panose="02040503050406030204" pitchFamily="18" charset="0"/>
+                                  <a:ea typeface="Cambria Math" panose="02040503050406030204" pitchFamily="18" charset="0"/>
+                                </a:rPr>
+                                <m:t>𝑅</m:t>
+                              </m:r>
+                            </m:e>
+                            <m:sub>
+                              <m:r>
+                                <a:rPr lang="en-US" i="1">
+                                  <a:latin typeface="Cambria Math" panose="02040503050406030204" pitchFamily="18" charset="0"/>
+                                  <a:ea typeface="Cambria Math" panose="02040503050406030204" pitchFamily="18" charset="0"/>
+                                </a:rPr>
+                                <m:t>𝑖</m:t>
+                              </m:r>
+                            </m:sub>
+                          </m:sSub>
+                        </m:e>
+                      </m:acc>
+                    </m:oMath>
+                  </m:oMathPara>
+                </a14:m>
+                <a:endParaRPr lang="en-US" dirty="0"/>
+              </a:p>
+            </p:txBody>
+          </p:sp>
+        </mc:Choice>
+        <mc:Fallback>
+          <p:sp>
+            <p:nvSpPr>
+              <p:cNvPr id="58" name="TextBox 57">
+                <a:extLst>
+                  <a:ext uri="{FF2B5EF4-FFF2-40B4-BE49-F238E27FC236}">
+                    <a16:creationId xmlns:a16="http://schemas.microsoft.com/office/drawing/2014/main" id="{26A1C35B-A7B3-F78B-8F50-C812E20E1679}"/>
+                  </a:ext>
+                </a:extLst>
+              </p:cNvPr>
+              <p:cNvSpPr txBox="1">
+                <a:spLocks noRot="1" noChangeAspect="1" noMove="1" noResize="1" noEditPoints="1" noAdjustHandles="1" noChangeArrowheads="1" noChangeShapeType="1" noTextEdit="1"/>
+              </p:cNvSpPr>
+              <p:nvPr/>
+            </p:nvSpPr>
+            <p:spPr>
+              <a:xfrm>
+                <a:off x="6229284" y="1789277"/>
+                <a:ext cx="264623" cy="310598"/>
+              </a:xfrm>
+              <a:prstGeom prst="rect">
+                <a:avLst/>
+              </a:prstGeom>
+              <a:blipFill>
+                <a:blip r:embed="rId4"/>
+                <a:stretch>
+                  <a:fillRect l="-23256" r="-9302" b="-16000"/>
+                </a:stretch>
+              </a:blipFill>
+            </p:spPr>
+            <p:txBody>
+              <a:bodyPr/>
+              <a:lstStyle/>
+              <a:p>
+                <a:r>
+                  <a:rPr lang="en-US">
+                    <a:noFill/>
+                  </a:rPr>
+                  <a:t> </a:t>
+                </a:r>
+              </a:p>
+            </p:txBody>
+          </p:sp>
+        </mc:Fallback>
+      </mc:AlternateContent>
+      <mc:AlternateContent xmlns:mc="http://schemas.openxmlformats.org/markup-compatibility/2006">
+        <mc:Choice xmlns:a14="http://schemas.microsoft.com/office/drawing/2010/main" Requires="a14">
+          <p:sp>
+            <p:nvSpPr>
+              <p:cNvPr id="59" name="TextBox 58">
+                <a:extLst>
+                  <a:ext uri="{FF2B5EF4-FFF2-40B4-BE49-F238E27FC236}">
+                    <a16:creationId xmlns:a16="http://schemas.microsoft.com/office/drawing/2014/main" id="{D00E6E8C-6DC6-6309-CC98-62BB4DE0E85A}"/>
+                  </a:ext>
+                </a:extLst>
+              </p:cNvPr>
+              <p:cNvSpPr txBox="1"/>
+              <p:nvPr/>
+            </p:nvSpPr>
+            <p:spPr>
+              <a:xfrm>
+                <a:off x="5095410" y="1806077"/>
+                <a:ext cx="171596" cy="276999"/>
+              </a:xfrm>
+              <a:prstGeom prst="rect">
+                <a:avLst/>
+              </a:prstGeom>
+              <a:noFill/>
+            </p:spPr>
+            <p:txBody>
+              <a:bodyPr wrap="square" lIns="0" tIns="0" rIns="0" bIns="0" rtlCol="0">
+                <a:spAutoFit/>
+              </a:bodyPr>
+              <a:lstStyle/>
+              <a:p>
+                <a14:m>
+                  <m:oMathPara xmlns:m="http://schemas.openxmlformats.org/officeDocument/2006/math">
+                    <m:oMathParaPr>
+                      <m:jc m:val="centerGroup"/>
+                    </m:oMathParaPr>
+                    <m:oMath xmlns:m="http://schemas.openxmlformats.org/officeDocument/2006/math">
+                      <m:r>
+                        <a:rPr lang="en-US" i="1" smtClean="0">
+                          <a:solidFill>
+                            <a:schemeClr val="accent5">
+                              <a:lumMod val="50000"/>
+                            </a:schemeClr>
+                          </a:solidFill>
+                          <a:latin typeface="Cambria Math" panose="02040503050406030204" pitchFamily="18" charset="0"/>
+                          <a:ea typeface="Cambria Math" panose="02040503050406030204" pitchFamily="18" charset="0"/>
+                        </a:rPr>
+                        <m:t>⊙</m:t>
+                      </m:r>
+                    </m:oMath>
+                  </m:oMathPara>
+                </a14:m>
+                <a:endParaRPr lang="en-US" dirty="0">
+                  <a:solidFill>
+                    <a:schemeClr val="accent5">
+                      <a:lumMod val="50000"/>
+                    </a:schemeClr>
+                  </a:solidFill>
+                </a:endParaRPr>
+              </a:p>
+            </p:txBody>
+          </p:sp>
+        </mc:Choice>
+        <mc:Fallback>
+          <p:sp>
+            <p:nvSpPr>
+              <p:cNvPr id="59" name="TextBox 58">
+                <a:extLst>
+                  <a:ext uri="{FF2B5EF4-FFF2-40B4-BE49-F238E27FC236}">
+                    <a16:creationId xmlns:a16="http://schemas.microsoft.com/office/drawing/2014/main" id="{D00E6E8C-6DC6-6309-CC98-62BB4DE0E85A}"/>
+                  </a:ext>
+                </a:extLst>
+              </p:cNvPr>
+              <p:cNvSpPr txBox="1">
+                <a:spLocks noRot="1" noChangeAspect="1" noMove="1" noResize="1" noEditPoints="1" noAdjustHandles="1" noChangeArrowheads="1" noChangeShapeType="1" noTextEdit="1"/>
+              </p:cNvSpPr>
+              <p:nvPr/>
+            </p:nvSpPr>
+            <p:spPr>
+              <a:xfrm>
+                <a:off x="5095410" y="1806077"/>
+                <a:ext cx="171596" cy="276999"/>
+              </a:xfrm>
+              <a:prstGeom prst="rect">
+                <a:avLst/>
+              </a:prstGeom>
+              <a:blipFill>
+                <a:blip r:embed="rId5"/>
+                <a:stretch>
+                  <a:fillRect l="-60714" r="-92857" b="-23913"/>
+                </a:stretch>
+              </a:blipFill>
+            </p:spPr>
+            <p:txBody>
+              <a:bodyPr/>
+              <a:lstStyle/>
+              <a:p>
+                <a:r>
+                  <a:rPr lang="en-US">
+                    <a:noFill/>
+                  </a:rPr>
+                  <a:t> </a:t>
+                </a:r>
+              </a:p>
+            </p:txBody>
+          </p:sp>
+        </mc:Fallback>
+      </mc:AlternateContent>
+      <mc:AlternateContent xmlns:mc="http://schemas.openxmlformats.org/markup-compatibility/2006">
+        <mc:Choice xmlns:a14="http://schemas.microsoft.com/office/drawing/2010/main" Requires="a14">
+          <p:sp>
+            <p:nvSpPr>
+              <p:cNvPr id="60" name="TextBox 59">
+                <a:extLst>
+                  <a:ext uri="{FF2B5EF4-FFF2-40B4-BE49-F238E27FC236}">
+                    <a16:creationId xmlns:a16="http://schemas.microsoft.com/office/drawing/2014/main" id="{C01C73EE-EC39-09A8-E87C-1FCCB58D935A}"/>
+                  </a:ext>
+                </a:extLst>
+              </p:cNvPr>
+              <p:cNvSpPr txBox="1"/>
+              <p:nvPr/>
+            </p:nvSpPr>
+            <p:spPr>
+              <a:xfrm>
+                <a:off x="5206633" y="1580785"/>
+                <a:ext cx="244554" cy="310598"/>
+              </a:xfrm>
+              <a:prstGeom prst="rect">
+                <a:avLst/>
+              </a:prstGeom>
+              <a:noFill/>
+            </p:spPr>
+            <p:txBody>
+              <a:bodyPr wrap="none" lIns="0" tIns="0" rIns="0" bIns="0" rtlCol="0">
+                <a:spAutoFit/>
+              </a:bodyPr>
+              <a:lstStyle/>
+              <a:p>
+                <a:pPr/>
+                <a14:m>
+                  <m:oMathPara xmlns:m="http://schemas.openxmlformats.org/officeDocument/2006/math">
+                    <m:oMathParaPr>
+                      <m:jc m:val="centerGroup"/>
+                    </m:oMathParaPr>
+                    <m:oMath xmlns:m="http://schemas.openxmlformats.org/officeDocument/2006/math">
+                      <m:acc>
+                        <m:accPr>
+                          <m:chr m:val="⃗"/>
+                          <m:ctrlPr>
+                            <a:rPr lang="en-US" i="1" smtClean="0">
+                              <a:solidFill>
+                                <a:schemeClr val="accent5">
+                                  <a:lumMod val="50000"/>
+                                </a:schemeClr>
+                              </a:solidFill>
+                              <a:latin typeface="Cambria Math" panose="02040503050406030204" pitchFamily="18" charset="0"/>
+                              <a:ea typeface="Cambria Math" panose="02040503050406030204" pitchFamily="18" charset="0"/>
+                            </a:rPr>
+                          </m:ctrlPr>
+                        </m:accPr>
+                        <m:e>
+                          <m:sSub>
+                            <m:sSubPr>
+                              <m:ctrlPr>
+                                <a:rPr lang="en-US" i="1" smtClean="0">
+                                  <a:solidFill>
+                                    <a:schemeClr val="accent5">
+                                      <a:lumMod val="50000"/>
+                                    </a:schemeClr>
+                                  </a:solidFill>
+                                  <a:latin typeface="Cambria Math" panose="02040503050406030204" pitchFamily="18" charset="0"/>
+                                  <a:ea typeface="Cambria Math" panose="02040503050406030204" pitchFamily="18" charset="0"/>
+                                </a:rPr>
+                              </m:ctrlPr>
+                            </m:sSubPr>
+                            <m:e>
+                              <m:r>
+                                <a:rPr lang="en-US" b="0" i="1" smtClean="0">
+                                  <a:solidFill>
+                                    <a:schemeClr val="accent5">
+                                      <a:lumMod val="50000"/>
+                                    </a:schemeClr>
+                                  </a:solidFill>
+                                  <a:latin typeface="Cambria Math" panose="02040503050406030204" pitchFamily="18" charset="0"/>
+                                  <a:ea typeface="Cambria Math" panose="02040503050406030204" pitchFamily="18" charset="0"/>
+                                </a:rPr>
+                                <m:t>𝐿</m:t>
+                              </m:r>
+                            </m:e>
+                            <m:sub>
+                              <m:r>
+                                <a:rPr lang="en-US" i="1">
+                                  <a:solidFill>
+                                    <a:schemeClr val="accent5">
+                                      <a:lumMod val="50000"/>
+                                    </a:schemeClr>
+                                  </a:solidFill>
+                                  <a:latin typeface="Cambria Math" panose="02040503050406030204" pitchFamily="18" charset="0"/>
+                                  <a:ea typeface="Cambria Math" panose="02040503050406030204" pitchFamily="18" charset="0"/>
+                                </a:rPr>
+                                <m:t>𝑖</m:t>
+                              </m:r>
+                            </m:sub>
+                          </m:sSub>
+                        </m:e>
+                      </m:acc>
+                    </m:oMath>
+                  </m:oMathPara>
+                </a14:m>
+                <a:endParaRPr lang="en-US" dirty="0">
+                  <a:solidFill>
+                    <a:schemeClr val="accent5">
+                      <a:lumMod val="50000"/>
+                    </a:schemeClr>
+                  </a:solidFill>
+                </a:endParaRPr>
+              </a:p>
+            </p:txBody>
+          </p:sp>
+        </mc:Choice>
+        <mc:Fallback>
+          <p:sp>
+            <p:nvSpPr>
+              <p:cNvPr id="60" name="TextBox 59">
+                <a:extLst>
+                  <a:ext uri="{FF2B5EF4-FFF2-40B4-BE49-F238E27FC236}">
+                    <a16:creationId xmlns:a16="http://schemas.microsoft.com/office/drawing/2014/main" id="{C01C73EE-EC39-09A8-E87C-1FCCB58D935A}"/>
+                  </a:ext>
+                </a:extLst>
+              </p:cNvPr>
+              <p:cNvSpPr txBox="1">
+                <a:spLocks noRot="1" noChangeAspect="1" noMove="1" noResize="1" noEditPoints="1" noAdjustHandles="1" noChangeArrowheads="1" noChangeShapeType="1" noTextEdit="1"/>
+              </p:cNvSpPr>
+              <p:nvPr/>
+            </p:nvSpPr>
+            <p:spPr>
+              <a:xfrm>
+                <a:off x="5206633" y="1580785"/>
+                <a:ext cx="244554" cy="310598"/>
+              </a:xfrm>
+              <a:prstGeom prst="rect">
+                <a:avLst/>
+              </a:prstGeom>
+              <a:blipFill>
+                <a:blip r:embed="rId6"/>
+                <a:stretch>
+                  <a:fillRect l="-22500" r="-12500" b="-15686"/>
+                </a:stretch>
+              </a:blipFill>
+            </p:spPr>
+            <p:txBody>
+              <a:bodyPr/>
+              <a:lstStyle/>
+              <a:p>
+                <a:r>
+                  <a:rPr lang="en-US">
+                    <a:noFill/>
+                  </a:rPr>
+                  <a:t> </a:t>
+                </a:r>
+              </a:p>
+            </p:txBody>
+          </p:sp>
+        </mc:Fallback>
+      </mc:AlternateContent>
+      <p:sp>
+        <p:nvSpPr>
+          <p:cNvPr id="61" name="Arc 60">
+            <a:extLst>
+              <a:ext uri="{FF2B5EF4-FFF2-40B4-BE49-F238E27FC236}">
+                <a16:creationId xmlns:a16="http://schemas.microsoft.com/office/drawing/2014/main" id="{8B9F3AA5-4D6B-E90A-24E5-C5F11052E339}"/>
+              </a:ext>
+            </a:extLst>
+          </p:cNvPr>
+          <p:cNvSpPr/>
+          <p:nvPr/>
+        </p:nvSpPr>
+        <p:spPr>
+          <a:xfrm rot="1063478">
+            <a:off x="5264498" y="1235688"/>
+            <a:ext cx="1146027" cy="1099135"/>
+          </a:xfrm>
+          <a:prstGeom prst="arc">
+            <a:avLst>
+              <a:gd name="adj1" fmla="val 13444534"/>
+              <a:gd name="adj2" fmla="val 16976159"/>
+            </a:avLst>
+          </a:prstGeom>
+          <a:ln w="19050">
+            <a:solidFill>
+              <a:schemeClr val="tx1"/>
+            </a:solidFill>
+            <a:headEnd type="stealth"/>
+            <a:tailEnd type="none"/>
+          </a:ln>
+        </p:spPr>
+        <p:style>
+          <a:lnRef idx="2">
+            <a:schemeClr val="accent1"/>
+          </a:lnRef>
+          <a:fillRef idx="0">
+            <a:schemeClr val="accent1"/>
+          </a:fillRef>
+          <a:effectRef idx="1">
+            <a:schemeClr val="accent1"/>
+          </a:effectRef>
+          <a:fontRef idx="minor">
+            <a:schemeClr val="tx1"/>
+          </a:fontRef>
+        </p:style>
+        <p:txBody>
+          <a:bodyPr rtlCol="0" anchor="ctr"/>
+          <a:lstStyle/>
+          <a:p>
+            <a:pPr algn="ctr"/>
+            <a:endParaRPr lang="en-US"/>
+          </a:p>
+        </p:txBody>
+      </p:sp>
+      <mc:AlternateContent xmlns:mc="http://schemas.openxmlformats.org/markup-compatibility/2006">
+        <mc:Choice xmlns:a14="http://schemas.microsoft.com/office/drawing/2010/main" Requires="a14">
+          <p:sp>
+            <p:nvSpPr>
+              <p:cNvPr id="62" name="TextBox 61">
+                <a:extLst>
+                  <a:ext uri="{FF2B5EF4-FFF2-40B4-BE49-F238E27FC236}">
+                    <a16:creationId xmlns:a16="http://schemas.microsoft.com/office/drawing/2014/main" id="{0A33EF18-5AA3-DDBE-12D2-BA513861B8F7}"/>
+                  </a:ext>
+                </a:extLst>
+              </p:cNvPr>
+              <p:cNvSpPr txBox="1"/>
+              <p:nvPr/>
+            </p:nvSpPr>
+            <p:spPr>
+              <a:xfrm>
+                <a:off x="5752900" y="975949"/>
+                <a:ext cx="195245" cy="246221"/>
+              </a:xfrm>
+              <a:prstGeom prst="rect">
+                <a:avLst/>
+              </a:prstGeom>
+              <a:noFill/>
+            </p:spPr>
+            <p:txBody>
+              <a:bodyPr wrap="none" lIns="0" tIns="0" rIns="0" bIns="0" rtlCol="0">
+                <a:spAutoFit/>
+              </a:bodyPr>
+              <a:lstStyle/>
+              <a:p>
+                <a:pPr/>
+                <a14:m>
+                  <m:oMathPara xmlns:m="http://schemas.openxmlformats.org/officeDocument/2006/math">
+                    <m:oMathParaPr>
+                      <m:jc m:val="centerGroup"/>
+                    </m:oMathParaPr>
+                    <m:oMath xmlns:m="http://schemas.openxmlformats.org/officeDocument/2006/math">
+                      <m:r>
+                        <a:rPr lang="en-US" sz="1600" i="1">
+                          <a:latin typeface="Cambria Math" panose="02040503050406030204" pitchFamily="18" charset="0"/>
+                          <a:ea typeface="Cambria Math" panose="02040503050406030204" pitchFamily="18" charset="0"/>
+                        </a:rPr>
+                        <m:t>𝜔</m:t>
+                      </m:r>
+                    </m:oMath>
+                  </m:oMathPara>
+                </a14:m>
+                <a:endParaRPr lang="en-US" sz="1600" dirty="0"/>
+              </a:p>
+            </p:txBody>
+          </p:sp>
+        </mc:Choice>
+        <mc:Fallback>
+          <p:sp>
+            <p:nvSpPr>
+              <p:cNvPr id="62" name="TextBox 61">
+                <a:extLst>
+                  <a:ext uri="{FF2B5EF4-FFF2-40B4-BE49-F238E27FC236}">
+                    <a16:creationId xmlns:a16="http://schemas.microsoft.com/office/drawing/2014/main" id="{0A33EF18-5AA3-DDBE-12D2-BA513861B8F7}"/>
+                  </a:ext>
+                </a:extLst>
+              </p:cNvPr>
+              <p:cNvSpPr txBox="1">
+                <a:spLocks noRot="1" noChangeAspect="1" noMove="1" noResize="1" noEditPoints="1" noAdjustHandles="1" noChangeArrowheads="1" noChangeShapeType="1" noTextEdit="1"/>
+              </p:cNvSpPr>
+              <p:nvPr/>
+            </p:nvSpPr>
+            <p:spPr>
+              <a:xfrm>
+                <a:off x="5752900" y="975949"/>
+                <a:ext cx="195245" cy="246221"/>
+              </a:xfrm>
+              <a:prstGeom prst="rect">
+                <a:avLst/>
+              </a:prstGeom>
+              <a:blipFill>
+                <a:blip r:embed="rId7"/>
+                <a:stretch>
+                  <a:fillRect l="-18750" r="-9375"/>
+                </a:stretch>
+              </a:blipFill>
+            </p:spPr>
+            <p:txBody>
+              <a:bodyPr/>
+              <a:lstStyle/>
+              <a:p>
+                <a:r>
+                  <a:rPr lang="en-US">
+                    <a:noFill/>
+                  </a:rPr>
+                  <a:t> </a:t>
+                </a:r>
+              </a:p>
+            </p:txBody>
+          </p:sp>
+        </mc:Fallback>
+      </mc:AlternateContent>
+      <p:sp>
+        <p:nvSpPr>
+          <p:cNvPr id="63" name="Oval 62">
+            <a:extLst>
+              <a:ext uri="{FF2B5EF4-FFF2-40B4-BE49-F238E27FC236}">
+                <a16:creationId xmlns:a16="http://schemas.microsoft.com/office/drawing/2014/main" id="{93D2A921-90C9-3AD6-165B-9D9D7B4DBBD5}"/>
+              </a:ext>
+            </a:extLst>
+          </p:cNvPr>
+          <p:cNvSpPr/>
+          <p:nvPr/>
+        </p:nvSpPr>
+        <p:spPr>
+          <a:xfrm>
+            <a:off x="7896080" y="1474363"/>
+            <a:ext cx="2060874" cy="523441"/>
+          </a:xfrm>
+          <a:prstGeom prst="ellipse">
+            <a:avLst/>
+          </a:prstGeom>
+          <a:noFill/>
+        </p:spPr>
+        <p:style>
+          <a:lnRef idx="2">
+            <a:schemeClr val="accent1">
+              <a:shade val="15000"/>
+            </a:schemeClr>
+          </a:lnRef>
+          <a:fillRef idx="1">
+            <a:schemeClr val="accent1"/>
+          </a:fillRef>
+          <a:effectRef idx="0">
+            <a:schemeClr val="accent1"/>
+          </a:effectRef>
+          <a:fontRef idx="minor">
+            <a:schemeClr val="lt1"/>
+          </a:fontRef>
+        </p:style>
+        <p:txBody>
+          <a:bodyPr rtlCol="0" anchor="ctr"/>
+          <a:lstStyle/>
+          <a:p>
+            <a:pPr algn="ctr"/>
+            <a:endParaRPr lang="en-US"/>
+          </a:p>
+        </p:txBody>
+      </p:sp>
+      <p:cxnSp>
+        <p:nvCxnSpPr>
+          <p:cNvPr id="64" name="Straight Arrow Connector 63">
+            <a:extLst>
+              <a:ext uri="{FF2B5EF4-FFF2-40B4-BE49-F238E27FC236}">
+                <a16:creationId xmlns:a16="http://schemas.microsoft.com/office/drawing/2014/main" id="{3AB266D3-E989-9167-2EFB-D157C09570DD}"/>
+              </a:ext>
+            </a:extLst>
+          </p:cNvPr>
+          <p:cNvCxnSpPr>
+            <a:cxnSpLocks/>
+          </p:cNvCxnSpPr>
+          <p:nvPr/>
+        </p:nvCxnSpPr>
+        <p:spPr>
+          <a:xfrm flipV="1">
+            <a:off x="9815059" y="1807507"/>
+            <a:ext cx="107950" cy="60325"/>
+          </a:xfrm>
+          <a:prstGeom prst="straightConnector1">
+            <a:avLst/>
+          </a:prstGeom>
+          <a:ln w="19050">
+            <a:solidFill>
+              <a:schemeClr val="tx1"/>
+            </a:solidFill>
+            <a:tailEnd type="stealth" w="lg" len="lg"/>
+          </a:ln>
+        </p:spPr>
+        <p:style>
+          <a:lnRef idx="2">
+            <a:schemeClr val="accent1"/>
+          </a:lnRef>
+          <a:fillRef idx="0">
+            <a:schemeClr val="accent1"/>
+          </a:fillRef>
+          <a:effectRef idx="1">
+            <a:schemeClr val="accent1"/>
+          </a:effectRef>
+          <a:fontRef idx="minor">
+            <a:schemeClr val="tx1"/>
+          </a:fontRef>
+        </p:style>
+      </p:cxnSp>
+      <p:cxnSp>
+        <p:nvCxnSpPr>
+          <p:cNvPr id="65" name="Straight Arrow Connector 64">
+            <a:extLst>
+              <a:ext uri="{FF2B5EF4-FFF2-40B4-BE49-F238E27FC236}">
+                <a16:creationId xmlns:a16="http://schemas.microsoft.com/office/drawing/2014/main" id="{63986B49-E890-FCFD-DFA3-2D0279ADEDD0}"/>
+              </a:ext>
+            </a:extLst>
+          </p:cNvPr>
+          <p:cNvCxnSpPr>
+            <a:cxnSpLocks/>
+            <a:stCxn id="63" idx="1"/>
+          </p:cNvCxnSpPr>
+          <p:nvPr/>
+        </p:nvCxnSpPr>
+        <p:spPr>
+          <a:xfrm flipH="1">
+            <a:off x="8067530" y="1551019"/>
+            <a:ext cx="130358" cy="48540"/>
+          </a:xfrm>
+          <a:prstGeom prst="straightConnector1">
+            <a:avLst/>
+          </a:prstGeom>
+          <a:ln w="19050">
+            <a:solidFill>
+              <a:schemeClr val="tx1"/>
+            </a:solidFill>
+            <a:tailEnd type="stealth" w="lg" len="lg"/>
+          </a:ln>
+        </p:spPr>
+        <p:style>
+          <a:lnRef idx="2">
+            <a:schemeClr val="accent1"/>
+          </a:lnRef>
+          <a:fillRef idx="0">
+            <a:schemeClr val="accent1"/>
+          </a:fillRef>
+          <a:effectRef idx="1">
+            <a:schemeClr val="accent1"/>
+          </a:effectRef>
+          <a:fontRef idx="minor">
+            <a:schemeClr val="tx1"/>
+          </a:fontRef>
+        </p:style>
+      </p:cxnSp>
+      <p:sp>
+        <p:nvSpPr>
+          <p:cNvPr id="66" name="Arc 65">
+            <a:extLst>
+              <a:ext uri="{FF2B5EF4-FFF2-40B4-BE49-F238E27FC236}">
+                <a16:creationId xmlns:a16="http://schemas.microsoft.com/office/drawing/2014/main" id="{13DD0F48-3A8A-9ECA-4A4C-5C9FB60298C7}"/>
+              </a:ext>
+            </a:extLst>
+          </p:cNvPr>
+          <p:cNvSpPr/>
+          <p:nvPr/>
+        </p:nvSpPr>
+        <p:spPr>
+          <a:xfrm rot="11401623">
+            <a:off x="8224680" y="1662615"/>
+            <a:ext cx="569601" cy="197265"/>
+          </a:xfrm>
+          <a:prstGeom prst="arc">
+            <a:avLst>
+              <a:gd name="adj1" fmla="val 16200000"/>
+              <a:gd name="adj2" fmla="val 485002"/>
+            </a:avLst>
+          </a:prstGeom>
+          <a:ln>
+            <a:solidFill>
+              <a:schemeClr val="tx1"/>
+            </a:solidFill>
+            <a:headEnd type="stealth"/>
+          </a:ln>
+        </p:spPr>
+        <p:style>
+          <a:lnRef idx="2">
+            <a:schemeClr val="accent1"/>
+          </a:lnRef>
+          <a:fillRef idx="0">
+            <a:schemeClr val="accent1"/>
+          </a:fillRef>
+          <a:effectRef idx="1">
+            <a:schemeClr val="accent1"/>
+          </a:effectRef>
+          <a:fontRef idx="minor">
+            <a:schemeClr val="tx1"/>
+          </a:fontRef>
+        </p:style>
+        <p:txBody>
+          <a:bodyPr rtlCol="0" anchor="ctr"/>
+          <a:lstStyle/>
+          <a:p>
+            <a:pPr algn="ctr"/>
+            <a:endParaRPr lang="en-US"/>
+          </a:p>
+        </p:txBody>
+      </p:sp>
+      <mc:AlternateContent xmlns:mc="http://schemas.openxmlformats.org/markup-compatibility/2006">
+        <mc:Choice xmlns:a14="http://schemas.microsoft.com/office/drawing/2010/main" Requires="a14">
+          <p:sp>
+            <p:nvSpPr>
+              <p:cNvPr id="67" name="TextBox 66">
+                <a:extLst>
+                  <a:ext uri="{FF2B5EF4-FFF2-40B4-BE49-F238E27FC236}">
+                    <a16:creationId xmlns:a16="http://schemas.microsoft.com/office/drawing/2014/main" id="{4437510C-D9E7-B97F-3EC7-F93D078C02E5}"/>
+                  </a:ext>
+                </a:extLst>
+              </p:cNvPr>
+              <p:cNvSpPr txBox="1"/>
+              <p:nvPr/>
+            </p:nvSpPr>
+            <p:spPr>
+              <a:xfrm>
+                <a:off x="8400347" y="1590833"/>
+                <a:ext cx="218265" cy="276999"/>
+              </a:xfrm>
+              <a:prstGeom prst="rect">
+                <a:avLst/>
+              </a:prstGeom>
+              <a:noFill/>
+            </p:spPr>
+            <p:txBody>
+              <a:bodyPr wrap="none" lIns="0" tIns="0" rIns="0" bIns="0" rtlCol="0">
+                <a:spAutoFit/>
+              </a:bodyPr>
+              <a:lstStyle/>
+              <a:p>
+                <a:pPr/>
+                <a14:m>
+                  <m:oMathPara xmlns:m="http://schemas.openxmlformats.org/officeDocument/2006/math">
+                    <m:oMathParaPr>
+                      <m:jc m:val="centerGroup"/>
+                    </m:oMathParaPr>
+                    <m:oMath xmlns:m="http://schemas.openxmlformats.org/officeDocument/2006/math">
+                      <m:r>
+                        <a:rPr lang="en-US" i="1" smtClean="0">
+                          <a:latin typeface="Cambria Math" panose="02040503050406030204" pitchFamily="18" charset="0"/>
+                          <a:ea typeface="Cambria Math" panose="02040503050406030204" pitchFamily="18" charset="0"/>
+                        </a:rPr>
+                        <m:t>𝜔</m:t>
+                      </m:r>
+                    </m:oMath>
+                  </m:oMathPara>
+                </a14:m>
+                <a:endParaRPr lang="en-US" dirty="0"/>
+              </a:p>
+            </p:txBody>
+          </p:sp>
+        </mc:Choice>
+        <mc:Fallback>
+          <p:sp>
+            <p:nvSpPr>
+              <p:cNvPr id="67" name="TextBox 66">
+                <a:extLst>
+                  <a:ext uri="{FF2B5EF4-FFF2-40B4-BE49-F238E27FC236}">
+                    <a16:creationId xmlns:a16="http://schemas.microsoft.com/office/drawing/2014/main" id="{4437510C-D9E7-B97F-3EC7-F93D078C02E5}"/>
+                  </a:ext>
+                </a:extLst>
+              </p:cNvPr>
+              <p:cNvSpPr txBox="1">
+                <a:spLocks noRot="1" noChangeAspect="1" noMove="1" noResize="1" noEditPoints="1" noAdjustHandles="1" noChangeArrowheads="1" noChangeShapeType="1" noTextEdit="1"/>
+              </p:cNvSpPr>
+              <p:nvPr/>
+            </p:nvSpPr>
+            <p:spPr>
+              <a:xfrm>
+                <a:off x="8400347" y="1590833"/>
+                <a:ext cx="218265" cy="276999"/>
+              </a:xfrm>
+              <a:prstGeom prst="rect">
+                <a:avLst/>
+              </a:prstGeom>
+              <a:blipFill>
+                <a:blip r:embed="rId8"/>
+                <a:stretch>
+                  <a:fillRect l="-16667" r="-16667"/>
+                </a:stretch>
+              </a:blipFill>
+            </p:spPr>
+            <p:txBody>
+              <a:bodyPr/>
+              <a:lstStyle/>
+              <a:p>
+                <a:r>
+                  <a:rPr lang="en-US">
+                    <a:noFill/>
+                  </a:rPr>
+                  <a:t> </a:t>
+                </a:r>
+              </a:p>
+            </p:txBody>
+          </p:sp>
+        </mc:Fallback>
+      </mc:AlternateContent>
+      <p:sp>
+        <p:nvSpPr>
+          <p:cNvPr id="68" name="Oval 67">
+            <a:extLst>
+              <a:ext uri="{FF2B5EF4-FFF2-40B4-BE49-F238E27FC236}">
+                <a16:creationId xmlns:a16="http://schemas.microsoft.com/office/drawing/2014/main" id="{7035536D-D43C-722F-62E1-430507F9397C}"/>
+              </a:ext>
+            </a:extLst>
+          </p:cNvPr>
+          <p:cNvSpPr/>
+          <p:nvPr/>
+        </p:nvSpPr>
+        <p:spPr>
+          <a:xfrm>
+            <a:off x="8902719" y="1703940"/>
+            <a:ext cx="53948" cy="50784"/>
+          </a:xfrm>
+          <a:prstGeom prst="ellipse">
+            <a:avLst/>
+          </a:prstGeom>
+          <a:solidFill>
+            <a:schemeClr val="tx1"/>
+          </a:solidFill>
+          <a:ln>
+            <a:noFill/>
+          </a:ln>
+        </p:spPr>
+        <p:style>
+          <a:lnRef idx="2">
+            <a:schemeClr val="accent1">
+              <a:shade val="15000"/>
+            </a:schemeClr>
+          </a:lnRef>
+          <a:fillRef idx="1">
+            <a:schemeClr val="accent1"/>
+          </a:fillRef>
+          <a:effectRef idx="0">
+            <a:schemeClr val="accent1"/>
+          </a:effectRef>
+          <a:fontRef idx="minor">
+            <a:schemeClr val="lt1"/>
+          </a:fontRef>
+        </p:style>
+        <p:txBody>
+          <a:bodyPr rtlCol="0" anchor="ctr"/>
+          <a:lstStyle/>
+          <a:p>
+            <a:pPr algn="ctr"/>
+            <a:endParaRPr lang="en-US"/>
+          </a:p>
+        </p:txBody>
+      </p:sp>
+      <p:cxnSp>
+        <p:nvCxnSpPr>
+          <p:cNvPr id="69" name="Straight Arrow Connector 68">
+            <a:extLst>
+              <a:ext uri="{FF2B5EF4-FFF2-40B4-BE49-F238E27FC236}">
+                <a16:creationId xmlns:a16="http://schemas.microsoft.com/office/drawing/2014/main" id="{19E1F9FE-4046-F7A4-67B0-506AAA88DC85}"/>
+              </a:ext>
+            </a:extLst>
+          </p:cNvPr>
+          <p:cNvCxnSpPr>
+            <a:cxnSpLocks/>
+          </p:cNvCxnSpPr>
+          <p:nvPr/>
+        </p:nvCxnSpPr>
+        <p:spPr>
+          <a:xfrm flipV="1">
+            <a:off x="8931769" y="1519229"/>
+            <a:ext cx="0" cy="210103"/>
+          </a:xfrm>
+          <a:prstGeom prst="straightConnector1">
+            <a:avLst/>
+          </a:prstGeom>
+          <a:ln w="19050">
+            <a:solidFill>
+              <a:schemeClr val="tx1"/>
+            </a:solidFill>
+            <a:tailEnd type="stealth" w="med" len="lg"/>
+          </a:ln>
+        </p:spPr>
+        <p:style>
+          <a:lnRef idx="2">
+            <a:schemeClr val="accent1"/>
+          </a:lnRef>
+          <a:fillRef idx="0">
+            <a:schemeClr val="accent1"/>
+          </a:fillRef>
+          <a:effectRef idx="1">
+            <a:schemeClr val="accent1"/>
+          </a:effectRef>
+          <a:fontRef idx="minor">
+            <a:schemeClr val="tx1"/>
+          </a:fontRef>
+        </p:style>
+      </p:cxnSp>
+      <mc:AlternateContent xmlns:mc="http://schemas.openxmlformats.org/markup-compatibility/2006">
+        <mc:Choice xmlns:a14="http://schemas.microsoft.com/office/drawing/2010/main" Requires="a14">
+          <p:sp>
+            <p:nvSpPr>
+              <p:cNvPr id="71" name="TextBox 70">
+                <a:extLst>
+                  <a:ext uri="{FF2B5EF4-FFF2-40B4-BE49-F238E27FC236}">
+                    <a16:creationId xmlns:a16="http://schemas.microsoft.com/office/drawing/2014/main" id="{2C751199-5A53-30A8-6097-EB142A7D3F11}"/>
+                  </a:ext>
+                </a:extLst>
+              </p:cNvPr>
+              <p:cNvSpPr txBox="1"/>
+              <p:nvPr/>
+            </p:nvSpPr>
+            <p:spPr>
+              <a:xfrm>
+                <a:off x="8990916" y="975949"/>
+                <a:ext cx="244554" cy="310598"/>
+              </a:xfrm>
+              <a:prstGeom prst="rect">
+                <a:avLst/>
+              </a:prstGeom>
+              <a:noFill/>
+            </p:spPr>
+            <p:txBody>
+              <a:bodyPr wrap="none" lIns="0" tIns="0" rIns="0" bIns="0" rtlCol="0">
+                <a:spAutoFit/>
+              </a:bodyPr>
+              <a:lstStyle/>
+              <a:p>
+                <a:pPr/>
+                <a14:m>
+                  <m:oMathPara xmlns:m="http://schemas.openxmlformats.org/officeDocument/2006/math">
+                    <m:oMathParaPr>
+                      <m:jc m:val="centerGroup"/>
+                    </m:oMathParaPr>
+                    <m:oMath xmlns:m="http://schemas.openxmlformats.org/officeDocument/2006/math">
+                      <m:acc>
+                        <m:accPr>
+                          <m:chr m:val="⃗"/>
+                          <m:ctrlPr>
+                            <a:rPr lang="en-US" i="1" smtClean="0">
+                              <a:solidFill>
+                                <a:schemeClr val="tx1"/>
+                              </a:solidFill>
+                              <a:latin typeface="Cambria Math" panose="02040503050406030204" pitchFamily="18" charset="0"/>
+                              <a:ea typeface="Cambria Math" panose="02040503050406030204" pitchFamily="18" charset="0"/>
+                            </a:rPr>
+                          </m:ctrlPr>
+                        </m:accPr>
+                        <m:e>
+                          <m:sSub>
+                            <m:sSubPr>
+                              <m:ctrlPr>
+                                <a:rPr lang="en-US" i="1" smtClean="0">
+                                  <a:solidFill>
+                                    <a:schemeClr val="tx1"/>
+                                  </a:solidFill>
+                                  <a:latin typeface="Cambria Math" panose="02040503050406030204" pitchFamily="18" charset="0"/>
+                                  <a:ea typeface="Cambria Math" panose="02040503050406030204" pitchFamily="18" charset="0"/>
+                                </a:rPr>
+                              </m:ctrlPr>
+                            </m:sSubPr>
+                            <m:e>
+                              <m:r>
+                                <a:rPr lang="en-US" b="0" i="1" smtClean="0">
+                                  <a:solidFill>
+                                    <a:schemeClr val="tx1"/>
+                                  </a:solidFill>
+                                  <a:latin typeface="Cambria Math" panose="02040503050406030204" pitchFamily="18" charset="0"/>
+                                  <a:ea typeface="Cambria Math" panose="02040503050406030204" pitchFamily="18" charset="0"/>
+                                </a:rPr>
+                                <m:t>𝐿</m:t>
+                              </m:r>
+                            </m:e>
+                            <m:sub>
+                              <m:r>
+                                <a:rPr lang="en-US" i="1">
+                                  <a:solidFill>
+                                    <a:schemeClr val="tx1"/>
+                                  </a:solidFill>
+                                  <a:latin typeface="Cambria Math" panose="02040503050406030204" pitchFamily="18" charset="0"/>
+                                  <a:ea typeface="Cambria Math" panose="02040503050406030204" pitchFamily="18" charset="0"/>
+                                </a:rPr>
+                                <m:t>𝑖</m:t>
+                              </m:r>
+                            </m:sub>
+                          </m:sSub>
+                        </m:e>
+                      </m:acc>
+                    </m:oMath>
+                  </m:oMathPara>
+                </a14:m>
+                <a:endParaRPr lang="en-US" dirty="0">
+                  <a:solidFill>
+                    <a:schemeClr val="tx1"/>
+                  </a:solidFill>
+                </a:endParaRPr>
+              </a:p>
+            </p:txBody>
+          </p:sp>
+        </mc:Choice>
+        <mc:Fallback>
+          <p:sp>
+            <p:nvSpPr>
+              <p:cNvPr id="71" name="TextBox 70">
+                <a:extLst>
+                  <a:ext uri="{FF2B5EF4-FFF2-40B4-BE49-F238E27FC236}">
+                    <a16:creationId xmlns:a16="http://schemas.microsoft.com/office/drawing/2014/main" id="{2C751199-5A53-30A8-6097-EB142A7D3F11}"/>
+                  </a:ext>
+                </a:extLst>
+              </p:cNvPr>
+              <p:cNvSpPr txBox="1">
+                <a:spLocks noRot="1" noChangeAspect="1" noMove="1" noResize="1" noEditPoints="1" noAdjustHandles="1" noChangeArrowheads="1" noChangeShapeType="1" noTextEdit="1"/>
+              </p:cNvSpPr>
+              <p:nvPr/>
+            </p:nvSpPr>
+            <p:spPr>
+              <a:xfrm>
+                <a:off x="8990916" y="975949"/>
+                <a:ext cx="244554" cy="310598"/>
+              </a:xfrm>
+              <a:prstGeom prst="rect">
+                <a:avLst/>
+              </a:prstGeom>
+              <a:blipFill>
+                <a:blip r:embed="rId9"/>
+                <a:stretch>
+                  <a:fillRect l="-25000" r="-10000" b="-15686"/>
+                </a:stretch>
+              </a:blipFill>
+            </p:spPr>
+            <p:txBody>
+              <a:bodyPr/>
+              <a:lstStyle/>
+              <a:p>
+                <a:r>
+                  <a:rPr lang="en-US">
+                    <a:noFill/>
+                  </a:rPr>
+                  <a:t> </a:t>
+                </a:r>
+              </a:p>
+            </p:txBody>
+          </p:sp>
+        </mc:Fallback>
+      </mc:AlternateContent>
+      <p:cxnSp>
+        <p:nvCxnSpPr>
+          <p:cNvPr id="73" name="Straight Arrow Connector 72">
+            <a:extLst>
+              <a:ext uri="{FF2B5EF4-FFF2-40B4-BE49-F238E27FC236}">
+                <a16:creationId xmlns:a16="http://schemas.microsoft.com/office/drawing/2014/main" id="{9A0E17A5-FBEC-569B-B522-2FEBE74C8AE6}"/>
+              </a:ext>
+            </a:extLst>
+          </p:cNvPr>
+          <p:cNvCxnSpPr>
+            <a:cxnSpLocks/>
+          </p:cNvCxnSpPr>
+          <p:nvPr/>
+        </p:nvCxnSpPr>
+        <p:spPr>
+          <a:xfrm flipV="1">
+            <a:off x="8931755" y="1340916"/>
+            <a:ext cx="0" cy="210103"/>
+          </a:xfrm>
+          <a:prstGeom prst="straightConnector1">
+            <a:avLst/>
+          </a:prstGeom>
+          <a:ln w="19050">
+            <a:solidFill>
+              <a:schemeClr val="tx1"/>
+            </a:solidFill>
+            <a:tailEnd type="stealth" w="med" len="lg"/>
+          </a:ln>
+        </p:spPr>
+        <p:style>
+          <a:lnRef idx="2">
+            <a:schemeClr val="accent1"/>
+          </a:lnRef>
+          <a:fillRef idx="0">
+            <a:schemeClr val="accent1"/>
+          </a:fillRef>
+          <a:effectRef idx="1">
+            <a:schemeClr val="accent1"/>
+          </a:effectRef>
+          <a:fontRef idx="minor">
+            <a:schemeClr val="tx1"/>
+          </a:fontRef>
+        </p:style>
+      </p:cxnSp>
+      <p:cxnSp>
+        <p:nvCxnSpPr>
+          <p:cNvPr id="76" name="Straight Arrow Connector 75">
+            <a:extLst>
+              <a:ext uri="{FF2B5EF4-FFF2-40B4-BE49-F238E27FC236}">
+                <a16:creationId xmlns:a16="http://schemas.microsoft.com/office/drawing/2014/main" id="{5540BD48-56DF-0589-0438-5CB4675EB027}"/>
+              </a:ext>
+            </a:extLst>
+          </p:cNvPr>
+          <p:cNvCxnSpPr>
+            <a:cxnSpLocks/>
+          </p:cNvCxnSpPr>
+          <p:nvPr/>
+        </p:nvCxnSpPr>
+        <p:spPr>
+          <a:xfrm flipV="1">
+            <a:off x="8931766" y="1163906"/>
+            <a:ext cx="0" cy="210103"/>
+          </a:xfrm>
+          <a:prstGeom prst="straightConnector1">
+            <a:avLst/>
+          </a:prstGeom>
+          <a:ln w="19050">
+            <a:solidFill>
+              <a:schemeClr val="tx1"/>
+            </a:solidFill>
+            <a:tailEnd type="stealth" w="med" len="lg"/>
+          </a:ln>
+        </p:spPr>
+        <p:style>
+          <a:lnRef idx="2">
+            <a:schemeClr val="accent1"/>
+          </a:lnRef>
+          <a:fillRef idx="0">
+            <a:schemeClr val="accent1"/>
+          </a:fillRef>
+          <a:effectRef idx="1">
+            <a:schemeClr val="accent1"/>
+          </a:effectRef>
+          <a:fontRef idx="minor">
+            <a:schemeClr val="tx1"/>
+          </a:fontRef>
+        </p:style>
+      </p:cxnSp>
+      <p:cxnSp>
+        <p:nvCxnSpPr>
+          <p:cNvPr id="77" name="Straight Arrow Connector 76">
+            <a:extLst>
+              <a:ext uri="{FF2B5EF4-FFF2-40B4-BE49-F238E27FC236}">
+                <a16:creationId xmlns:a16="http://schemas.microsoft.com/office/drawing/2014/main" id="{DF539F19-16BB-4E55-5206-74A4050D658B}"/>
+              </a:ext>
+            </a:extLst>
+          </p:cNvPr>
+          <p:cNvCxnSpPr>
+            <a:cxnSpLocks/>
+          </p:cNvCxnSpPr>
+          <p:nvPr/>
+        </p:nvCxnSpPr>
+        <p:spPr>
+          <a:xfrm flipV="1">
+            <a:off x="8931752" y="985593"/>
+            <a:ext cx="0" cy="210103"/>
+          </a:xfrm>
+          <a:prstGeom prst="straightConnector1">
+            <a:avLst/>
+          </a:prstGeom>
+          <a:ln w="19050">
+            <a:solidFill>
+              <a:schemeClr val="tx1"/>
+            </a:solidFill>
+            <a:tailEnd type="stealth" w="med" len="lg"/>
+          </a:ln>
+        </p:spPr>
+        <p:style>
+          <a:lnRef idx="2">
+            <a:schemeClr val="accent1"/>
+          </a:lnRef>
+          <a:fillRef idx="0">
+            <a:schemeClr val="accent1"/>
+          </a:fillRef>
+          <a:effectRef idx="1">
+            <a:schemeClr val="accent1"/>
+          </a:effectRef>
+          <a:fontRef idx="minor">
+            <a:schemeClr val="tx1"/>
+          </a:fontRef>
+        </p:style>
+      </p:cxnSp>
+      <p:cxnSp>
+        <p:nvCxnSpPr>
+          <p:cNvPr id="80" name="Straight Connector 79">
+            <a:extLst>
+              <a:ext uri="{FF2B5EF4-FFF2-40B4-BE49-F238E27FC236}">
+                <a16:creationId xmlns:a16="http://schemas.microsoft.com/office/drawing/2014/main" id="{DBDBAB9A-4B7A-4458-A260-734A5BC96E9A}"/>
+              </a:ext>
+            </a:extLst>
+          </p:cNvPr>
+          <p:cNvCxnSpPr>
+            <a:cxnSpLocks/>
+          </p:cNvCxnSpPr>
+          <p:nvPr/>
+        </p:nvCxnSpPr>
+        <p:spPr>
+          <a:xfrm>
+            <a:off x="1037539" y="6031110"/>
+            <a:ext cx="2353168" cy="0"/>
+          </a:xfrm>
+          <a:prstGeom prst="line">
+            <a:avLst/>
+          </a:prstGeom>
+          <a:ln>
+            <a:solidFill>
+              <a:schemeClr val="tx1"/>
+            </a:solidFill>
+          </a:ln>
+        </p:spPr>
+        <p:style>
+          <a:lnRef idx="2">
+            <a:schemeClr val="accent1"/>
+          </a:lnRef>
+          <a:fillRef idx="0">
+            <a:schemeClr val="accent1"/>
+          </a:fillRef>
+          <a:effectRef idx="1">
+            <a:schemeClr val="accent1"/>
+          </a:effectRef>
+          <a:fontRef idx="minor">
+            <a:schemeClr val="tx1"/>
+          </a:fontRef>
+        </p:style>
+      </p:cxnSp>
+      <p:sp>
+        <p:nvSpPr>
+          <p:cNvPr id="81" name="Rectangle 80">
+            <a:extLst>
+              <a:ext uri="{FF2B5EF4-FFF2-40B4-BE49-F238E27FC236}">
+                <a16:creationId xmlns:a16="http://schemas.microsoft.com/office/drawing/2014/main" id="{1DD36C60-F9C9-A238-3DDB-3A99133397E2}"/>
+              </a:ext>
+            </a:extLst>
+          </p:cNvPr>
+          <p:cNvSpPr/>
+          <p:nvPr/>
+        </p:nvSpPr>
+        <p:spPr>
+          <a:xfrm>
+            <a:off x="1478585" y="5454125"/>
+            <a:ext cx="943276" cy="558265"/>
+          </a:xfrm>
+          <a:prstGeom prst="rect">
+            <a:avLst/>
+          </a:prstGeom>
+          <a:solidFill>
+            <a:schemeClr val="accent6">
+              <a:lumMod val="60000"/>
+              <a:lumOff val="40000"/>
+              <a:alpha val="48000"/>
+            </a:schemeClr>
+          </a:solidFill>
+        </p:spPr>
+        <p:style>
+          <a:lnRef idx="2">
+            <a:schemeClr val="accent1">
+              <a:shade val="15000"/>
+            </a:schemeClr>
+          </a:lnRef>
+          <a:fillRef idx="1">
+            <a:schemeClr val="accent1"/>
+          </a:fillRef>
+          <a:effectRef idx="0">
+            <a:schemeClr val="accent1"/>
+          </a:effectRef>
+          <a:fontRef idx="minor">
+            <a:schemeClr val="lt1"/>
+          </a:fontRef>
+        </p:style>
+        <p:txBody>
+          <a:bodyPr rtlCol="0" anchor="ctr"/>
+          <a:lstStyle/>
+          <a:p>
+            <a:pPr algn="ctr"/>
+            <a:endParaRPr lang="en-US"/>
+          </a:p>
+        </p:txBody>
+      </p:sp>
+      <p:cxnSp>
+        <p:nvCxnSpPr>
+          <p:cNvPr id="82" name="Straight Arrow Connector 81">
+            <a:extLst>
+              <a:ext uri="{FF2B5EF4-FFF2-40B4-BE49-F238E27FC236}">
+                <a16:creationId xmlns:a16="http://schemas.microsoft.com/office/drawing/2014/main" id="{2B1313FA-5C64-5373-0B11-B51333C03A26}"/>
+              </a:ext>
+            </a:extLst>
+          </p:cNvPr>
+          <p:cNvCxnSpPr>
+            <a:cxnSpLocks/>
+          </p:cNvCxnSpPr>
+          <p:nvPr/>
+        </p:nvCxnSpPr>
+        <p:spPr>
+          <a:xfrm flipH="1">
+            <a:off x="1891485" y="4840514"/>
+            <a:ext cx="943275" cy="927097"/>
+          </a:xfrm>
+          <a:prstGeom prst="straightConnector1">
+            <a:avLst/>
+          </a:prstGeom>
+          <a:ln w="28575">
+            <a:solidFill>
+              <a:schemeClr val="tx1"/>
+            </a:solidFill>
+            <a:prstDash val="solid"/>
+            <a:headEnd type="stealth" w="med" len="lg"/>
+            <a:tailEnd type="none" w="med" len="sm"/>
+          </a:ln>
+        </p:spPr>
+        <p:style>
+          <a:lnRef idx="1">
+            <a:schemeClr val="accent1"/>
+          </a:lnRef>
+          <a:fillRef idx="0">
+            <a:schemeClr val="accent1"/>
+          </a:fillRef>
+          <a:effectRef idx="0">
+            <a:schemeClr val="accent1"/>
+          </a:effectRef>
+          <a:fontRef idx="minor">
+            <a:schemeClr val="tx1"/>
+          </a:fontRef>
+        </p:style>
+      </p:cxnSp>
+      <p:cxnSp>
+        <p:nvCxnSpPr>
+          <p:cNvPr id="83" name="Straight Arrow Connector 82">
+            <a:extLst>
+              <a:ext uri="{FF2B5EF4-FFF2-40B4-BE49-F238E27FC236}">
+                <a16:creationId xmlns:a16="http://schemas.microsoft.com/office/drawing/2014/main" id="{D93E8367-7543-582E-5DB3-1C587A5922D1}"/>
+              </a:ext>
+            </a:extLst>
+          </p:cNvPr>
+          <p:cNvCxnSpPr>
+            <a:cxnSpLocks/>
+          </p:cNvCxnSpPr>
+          <p:nvPr/>
+        </p:nvCxnSpPr>
+        <p:spPr>
+          <a:xfrm flipH="1">
+            <a:off x="1891484" y="5776858"/>
+            <a:ext cx="1049473" cy="0"/>
+          </a:xfrm>
+          <a:prstGeom prst="straightConnector1">
+            <a:avLst/>
+          </a:prstGeom>
+          <a:ln w="28575">
+            <a:solidFill>
+              <a:schemeClr val="tx1"/>
+            </a:solidFill>
+            <a:prstDash val="solid"/>
+            <a:headEnd type="stealth" w="med" len="lg"/>
+            <a:tailEnd type="none" w="med" len="sm"/>
+          </a:ln>
+        </p:spPr>
+        <p:style>
+          <a:lnRef idx="1">
+            <a:schemeClr val="accent1"/>
+          </a:lnRef>
+          <a:fillRef idx="0">
+            <a:schemeClr val="accent1"/>
+          </a:fillRef>
+          <a:effectRef idx="0">
+            <a:schemeClr val="accent1"/>
+          </a:effectRef>
+          <a:fontRef idx="minor">
+            <a:schemeClr val="tx1"/>
+          </a:fontRef>
+        </p:style>
+      </p:cxnSp>
+      <p:sp>
+        <p:nvSpPr>
+          <p:cNvPr id="84" name="Arc 83">
+            <a:extLst>
+              <a:ext uri="{FF2B5EF4-FFF2-40B4-BE49-F238E27FC236}">
+                <a16:creationId xmlns:a16="http://schemas.microsoft.com/office/drawing/2014/main" id="{EE8791AD-E2D5-2C55-6705-91B9068708F2}"/>
+              </a:ext>
+            </a:extLst>
+          </p:cNvPr>
+          <p:cNvSpPr/>
+          <p:nvPr/>
+        </p:nvSpPr>
+        <p:spPr>
+          <a:xfrm rot="976525">
+            <a:off x="1885097" y="5580560"/>
+            <a:ext cx="320629" cy="309148"/>
+          </a:xfrm>
+          <a:prstGeom prst="arc">
+            <a:avLst/>
+          </a:prstGeom>
+          <a:ln>
+            <a:solidFill>
+              <a:schemeClr val="tx1"/>
+            </a:solidFill>
+          </a:ln>
+        </p:spPr>
+        <p:style>
+          <a:lnRef idx="2">
+            <a:schemeClr val="accent1"/>
+          </a:lnRef>
+          <a:fillRef idx="0">
+            <a:schemeClr val="accent1"/>
+          </a:fillRef>
+          <a:effectRef idx="1">
+            <a:schemeClr val="accent1"/>
+          </a:effectRef>
+          <a:fontRef idx="minor">
+            <a:schemeClr val="tx1"/>
+          </a:fontRef>
+        </p:style>
+        <p:txBody>
+          <a:bodyPr rtlCol="0" anchor="ctr"/>
+          <a:lstStyle/>
+          <a:p>
+            <a:pPr algn="ctr"/>
+            <a:endParaRPr lang="en-US"/>
+          </a:p>
+        </p:txBody>
+      </p:sp>
+      <mc:AlternateContent xmlns:mc="http://schemas.openxmlformats.org/markup-compatibility/2006">
+        <mc:Choice xmlns:a14="http://schemas.microsoft.com/office/drawing/2010/main" Requires="a14">
+          <p:sp>
+            <p:nvSpPr>
+              <p:cNvPr id="85" name="TextBox 84">
+                <a:extLst>
+                  <a:ext uri="{FF2B5EF4-FFF2-40B4-BE49-F238E27FC236}">
+                    <a16:creationId xmlns:a16="http://schemas.microsoft.com/office/drawing/2014/main" id="{2CD88B43-27A3-DCE4-5586-C1EBA4E3B28D}"/>
+                  </a:ext>
+                </a:extLst>
+              </p:cNvPr>
+              <p:cNvSpPr txBox="1"/>
+              <p:nvPr/>
+            </p:nvSpPr>
+            <p:spPr>
+              <a:xfrm>
+                <a:off x="2165701" y="5386477"/>
+                <a:ext cx="256160" cy="369332"/>
+              </a:xfrm>
+              <a:prstGeom prst="rect">
+                <a:avLst/>
+              </a:prstGeom>
+              <a:noFill/>
+            </p:spPr>
+            <p:txBody>
+              <a:bodyPr wrap="none" lIns="0" tIns="0" rIns="0" bIns="0" rtlCol="0">
+                <a:spAutoFit/>
+              </a:bodyPr>
+              <a:lstStyle/>
+              <a:p>
+                <a:pPr/>
+                <a14:m>
+                  <m:oMathPara xmlns:m="http://schemas.openxmlformats.org/officeDocument/2006/math">
+                    <m:oMathParaPr>
+                      <m:jc m:val="centerGroup"/>
+                    </m:oMathParaPr>
+                    <m:oMath xmlns:m="http://schemas.openxmlformats.org/officeDocument/2006/math">
+                      <m:r>
+                        <a:rPr lang="en-US" sz="2400" i="1" smtClean="0">
+                          <a:latin typeface="Cambria Math" panose="02040503050406030204" pitchFamily="18" charset="0"/>
+                          <a:ea typeface="Cambria Math" panose="02040503050406030204" pitchFamily="18" charset="0"/>
+                        </a:rPr>
+                        <m:t>𝛼</m:t>
+                      </m:r>
+                    </m:oMath>
+                  </m:oMathPara>
+                </a14:m>
+                <a:endParaRPr lang="en-US" sz="2400" dirty="0"/>
+              </a:p>
+            </p:txBody>
+          </p:sp>
+        </mc:Choice>
+        <mc:Fallback>
+          <p:sp>
+            <p:nvSpPr>
+              <p:cNvPr id="85" name="TextBox 84">
+                <a:extLst>
+                  <a:ext uri="{FF2B5EF4-FFF2-40B4-BE49-F238E27FC236}">
+                    <a16:creationId xmlns:a16="http://schemas.microsoft.com/office/drawing/2014/main" id="{2CD88B43-27A3-DCE4-5586-C1EBA4E3B28D}"/>
+                  </a:ext>
+                </a:extLst>
+              </p:cNvPr>
+              <p:cNvSpPr txBox="1">
+                <a:spLocks noRot="1" noChangeAspect="1" noMove="1" noResize="1" noEditPoints="1" noAdjustHandles="1" noChangeArrowheads="1" noChangeShapeType="1" noTextEdit="1"/>
+              </p:cNvSpPr>
+              <p:nvPr/>
+            </p:nvSpPr>
+            <p:spPr>
+              <a:xfrm>
+                <a:off x="2165701" y="5386477"/>
+                <a:ext cx="256160" cy="369332"/>
+              </a:xfrm>
+              <a:prstGeom prst="rect">
+                <a:avLst/>
+              </a:prstGeom>
+              <a:blipFill>
+                <a:blip r:embed="rId10"/>
+                <a:stretch>
+                  <a:fillRect l="-16667" r="-14286"/>
+                </a:stretch>
+              </a:blipFill>
+            </p:spPr>
+            <p:txBody>
+              <a:bodyPr/>
+              <a:lstStyle/>
+              <a:p>
+                <a:r>
+                  <a:rPr lang="en-US">
+                    <a:noFill/>
+                  </a:rPr>
+                  <a:t> </a:t>
+                </a:r>
+              </a:p>
+            </p:txBody>
+          </p:sp>
+        </mc:Fallback>
+      </mc:AlternateContent>
+      <mc:AlternateContent xmlns:mc="http://schemas.openxmlformats.org/markup-compatibility/2006">
+        <mc:Choice xmlns:a14="http://schemas.microsoft.com/office/drawing/2010/main" Requires="a14">
+          <p:sp>
+            <p:nvSpPr>
+              <p:cNvPr id="86" name="TextBox 85">
+                <a:extLst>
+                  <a:ext uri="{FF2B5EF4-FFF2-40B4-BE49-F238E27FC236}">
+                    <a16:creationId xmlns:a16="http://schemas.microsoft.com/office/drawing/2014/main" id="{B026C1E6-5E46-2017-72F7-D9DE292E6A0F}"/>
+                  </a:ext>
+                </a:extLst>
+              </p:cNvPr>
+              <p:cNvSpPr txBox="1"/>
+              <p:nvPr/>
+            </p:nvSpPr>
+            <p:spPr>
+              <a:xfrm>
+                <a:off x="2471740" y="4586262"/>
+                <a:ext cx="262123" cy="414088"/>
+              </a:xfrm>
+              <a:prstGeom prst="rect">
+                <a:avLst/>
+              </a:prstGeom>
+              <a:noFill/>
+            </p:spPr>
+            <p:txBody>
+              <a:bodyPr wrap="none" lIns="0" tIns="0" rIns="0" bIns="0" rtlCol="0">
+                <a:spAutoFit/>
+              </a:bodyPr>
+              <a:lstStyle/>
+              <a:p>
+                <a:pPr/>
+                <a14:m>
+                  <m:oMathPara xmlns:m="http://schemas.openxmlformats.org/officeDocument/2006/math">
+                    <m:oMathParaPr>
+                      <m:jc m:val="centerGroup"/>
+                    </m:oMathParaPr>
+                    <m:oMath xmlns:m="http://schemas.openxmlformats.org/officeDocument/2006/math">
+                      <m:acc>
+                        <m:accPr>
+                          <m:chr m:val="⃗"/>
+                          <m:ctrlPr>
+                            <a:rPr lang="en-US" sz="2400" i="1" smtClean="0">
+                              <a:latin typeface="Cambria Math" panose="02040503050406030204" pitchFamily="18" charset="0"/>
+                              <a:ea typeface="Cambria Math" panose="02040503050406030204" pitchFamily="18" charset="0"/>
+                            </a:rPr>
+                          </m:ctrlPr>
+                        </m:accPr>
+                        <m:e>
+                          <m:r>
+                            <a:rPr lang="en-US" sz="2400" b="0" i="1" smtClean="0">
+                              <a:latin typeface="Cambria Math" panose="02040503050406030204" pitchFamily="18" charset="0"/>
+                              <a:ea typeface="Cambria Math" panose="02040503050406030204" pitchFamily="18" charset="0"/>
+                            </a:rPr>
+                            <m:t>𝐹</m:t>
+                          </m:r>
+                        </m:e>
+                      </m:acc>
+                    </m:oMath>
+                  </m:oMathPara>
+                </a14:m>
+                <a:endParaRPr lang="en-US" sz="2400" dirty="0"/>
+              </a:p>
+            </p:txBody>
+          </p:sp>
+        </mc:Choice>
+        <mc:Fallback>
+          <p:sp>
+            <p:nvSpPr>
+              <p:cNvPr id="86" name="TextBox 85">
+                <a:extLst>
+                  <a:ext uri="{FF2B5EF4-FFF2-40B4-BE49-F238E27FC236}">
+                    <a16:creationId xmlns:a16="http://schemas.microsoft.com/office/drawing/2014/main" id="{B026C1E6-5E46-2017-72F7-D9DE292E6A0F}"/>
+                  </a:ext>
+                </a:extLst>
+              </p:cNvPr>
+              <p:cNvSpPr txBox="1">
+                <a:spLocks noRot="1" noChangeAspect="1" noMove="1" noResize="1" noEditPoints="1" noAdjustHandles="1" noChangeArrowheads="1" noChangeShapeType="1" noTextEdit="1"/>
+              </p:cNvSpPr>
+              <p:nvPr/>
+            </p:nvSpPr>
+            <p:spPr>
+              <a:xfrm>
+                <a:off x="2471740" y="4586262"/>
+                <a:ext cx="262123" cy="414088"/>
+              </a:xfrm>
+              <a:prstGeom prst="rect">
+                <a:avLst/>
+              </a:prstGeom>
+              <a:blipFill>
+                <a:blip r:embed="rId11"/>
+                <a:stretch>
+                  <a:fillRect/>
+                </a:stretch>
+              </a:blipFill>
+            </p:spPr>
+            <p:txBody>
+              <a:bodyPr/>
+              <a:lstStyle/>
+              <a:p>
+                <a:r>
+                  <a:rPr lang="en-US">
+                    <a:noFill/>
+                  </a:rPr>
+                  <a:t> </a:t>
+                </a:r>
+              </a:p>
+            </p:txBody>
+          </p:sp>
+        </mc:Fallback>
+      </mc:AlternateContent>
+      <mc:AlternateContent xmlns:mc="http://schemas.openxmlformats.org/markup-compatibility/2006">
+        <mc:Choice xmlns:a14="http://schemas.microsoft.com/office/drawing/2010/main" Requires="a14">
+          <p:sp>
+            <p:nvSpPr>
+              <p:cNvPr id="87" name="TextBox 86">
+                <a:extLst>
+                  <a:ext uri="{FF2B5EF4-FFF2-40B4-BE49-F238E27FC236}">
+                    <a16:creationId xmlns:a16="http://schemas.microsoft.com/office/drawing/2014/main" id="{309EE3EB-B09E-B7B1-8C5E-D274E033E9C6}"/>
+                  </a:ext>
+                </a:extLst>
+              </p:cNvPr>
+              <p:cNvSpPr txBox="1"/>
+              <p:nvPr/>
+            </p:nvSpPr>
+            <p:spPr>
+              <a:xfrm>
+                <a:off x="2617837" y="5362881"/>
+                <a:ext cx="232051" cy="416524"/>
+              </a:xfrm>
+              <a:prstGeom prst="rect">
+                <a:avLst/>
+              </a:prstGeom>
+              <a:noFill/>
+            </p:spPr>
+            <p:txBody>
+              <a:bodyPr wrap="none" lIns="0" tIns="0" rIns="0" bIns="0" rtlCol="0">
+                <a:spAutoFit/>
+              </a:bodyPr>
+              <a:lstStyle/>
+              <a:p>
+                <a:pPr/>
+                <a14:m>
+                  <m:oMathPara xmlns:m="http://schemas.openxmlformats.org/officeDocument/2006/math">
+                    <m:oMathParaPr>
+                      <m:jc m:val="centerGroup"/>
+                    </m:oMathParaPr>
+                    <m:oMath xmlns:m="http://schemas.openxmlformats.org/officeDocument/2006/math">
+                      <m:acc>
+                        <m:accPr>
+                          <m:chr m:val="⃗"/>
+                          <m:ctrlPr>
+                            <a:rPr lang="en-US" sz="2400" i="1" smtClean="0">
+                              <a:latin typeface="Cambria Math" panose="02040503050406030204" pitchFamily="18" charset="0"/>
+                              <a:ea typeface="Cambria Math" panose="02040503050406030204" pitchFamily="18" charset="0"/>
+                            </a:rPr>
+                          </m:ctrlPr>
+                        </m:accPr>
+                        <m:e>
+                          <m:r>
+                            <a:rPr lang="en-US" sz="2400" b="0" i="1" smtClean="0">
+                              <a:latin typeface="Cambria Math" panose="02040503050406030204" pitchFamily="18" charset="0"/>
+                              <a:ea typeface="Cambria Math" panose="02040503050406030204" pitchFamily="18" charset="0"/>
+                            </a:rPr>
+                            <m:t>𝑆</m:t>
+                          </m:r>
+                        </m:e>
+                      </m:acc>
+                    </m:oMath>
+                  </m:oMathPara>
+                </a14:m>
+                <a:endParaRPr lang="en-US" sz="2400" dirty="0"/>
+              </a:p>
+            </p:txBody>
+          </p:sp>
+        </mc:Choice>
+        <mc:Fallback>
+          <p:sp>
+            <p:nvSpPr>
+              <p:cNvPr id="87" name="TextBox 86">
+                <a:extLst>
+                  <a:ext uri="{FF2B5EF4-FFF2-40B4-BE49-F238E27FC236}">
+                    <a16:creationId xmlns:a16="http://schemas.microsoft.com/office/drawing/2014/main" id="{309EE3EB-B09E-B7B1-8C5E-D274E033E9C6}"/>
+                  </a:ext>
+                </a:extLst>
+              </p:cNvPr>
+              <p:cNvSpPr txBox="1">
+                <a:spLocks noRot="1" noChangeAspect="1" noMove="1" noResize="1" noEditPoints="1" noAdjustHandles="1" noChangeArrowheads="1" noChangeShapeType="1" noTextEdit="1"/>
+              </p:cNvSpPr>
+              <p:nvPr/>
+            </p:nvSpPr>
+            <p:spPr>
+              <a:xfrm>
+                <a:off x="2617837" y="5362881"/>
+                <a:ext cx="232051" cy="416524"/>
+              </a:xfrm>
+              <a:prstGeom prst="rect">
+                <a:avLst/>
+              </a:prstGeom>
+              <a:blipFill>
+                <a:blip r:embed="rId12"/>
+                <a:stretch>
+                  <a:fillRect/>
+                </a:stretch>
+              </a:blipFill>
+            </p:spPr>
+            <p:txBody>
+              <a:bodyPr/>
+              <a:lstStyle/>
+              <a:p>
+                <a:r>
+                  <a:rPr lang="en-US">
+                    <a:noFill/>
+                  </a:rPr>
+                  <a:t> </a:t>
+                </a:r>
+              </a:p>
+            </p:txBody>
+          </p:sp>
+        </mc:Fallback>
+      </mc:AlternateContent>
+      <p:cxnSp>
+        <p:nvCxnSpPr>
+          <p:cNvPr id="88" name="Straight Connector 87">
+            <a:extLst>
+              <a:ext uri="{FF2B5EF4-FFF2-40B4-BE49-F238E27FC236}">
+                <a16:creationId xmlns:a16="http://schemas.microsoft.com/office/drawing/2014/main" id="{622CD8FC-B84A-C5C2-6031-6C96C56A7C77}"/>
+              </a:ext>
+            </a:extLst>
+          </p:cNvPr>
+          <p:cNvCxnSpPr>
+            <a:cxnSpLocks/>
+          </p:cNvCxnSpPr>
+          <p:nvPr/>
+        </p:nvCxnSpPr>
+        <p:spPr>
+          <a:xfrm>
+            <a:off x="6448127" y="6012390"/>
+            <a:ext cx="4742387" cy="0"/>
+          </a:xfrm>
+          <a:prstGeom prst="line">
+            <a:avLst/>
+          </a:prstGeom>
+          <a:ln>
+            <a:solidFill>
+              <a:schemeClr val="tx1"/>
+            </a:solidFill>
+          </a:ln>
+        </p:spPr>
+        <p:style>
+          <a:lnRef idx="2">
+            <a:schemeClr val="accent1"/>
+          </a:lnRef>
+          <a:fillRef idx="0">
+            <a:schemeClr val="accent1"/>
+          </a:fillRef>
+          <a:effectRef idx="1">
+            <a:schemeClr val="accent1"/>
+          </a:effectRef>
+          <a:fontRef idx="minor">
+            <a:schemeClr val="tx1"/>
+          </a:fontRef>
+        </p:style>
+      </p:cxnSp>
+      <p:sp>
+        <p:nvSpPr>
+          <p:cNvPr id="89" name="Rectangle 88">
+            <a:extLst>
+              <a:ext uri="{FF2B5EF4-FFF2-40B4-BE49-F238E27FC236}">
+                <a16:creationId xmlns:a16="http://schemas.microsoft.com/office/drawing/2014/main" id="{DD3DFC24-EEFD-8F65-0BC7-A52905C11CEE}"/>
+              </a:ext>
+            </a:extLst>
+          </p:cNvPr>
+          <p:cNvSpPr/>
+          <p:nvPr/>
+        </p:nvSpPr>
+        <p:spPr>
+          <a:xfrm>
+            <a:off x="6889173" y="5577146"/>
+            <a:ext cx="943276" cy="416524"/>
+          </a:xfrm>
+          <a:prstGeom prst="rect">
+            <a:avLst/>
+          </a:prstGeom>
+          <a:solidFill>
+            <a:schemeClr val="accent4">
+              <a:lumMod val="60000"/>
+              <a:lumOff val="40000"/>
+              <a:alpha val="48000"/>
+            </a:schemeClr>
+          </a:solidFill>
+        </p:spPr>
+        <p:style>
+          <a:lnRef idx="2">
+            <a:schemeClr val="accent1">
+              <a:shade val="15000"/>
+            </a:schemeClr>
+          </a:lnRef>
+          <a:fillRef idx="1">
+            <a:schemeClr val="accent1"/>
+          </a:fillRef>
+          <a:effectRef idx="0">
+            <a:schemeClr val="accent1"/>
+          </a:effectRef>
+          <a:fontRef idx="minor">
+            <a:schemeClr val="lt1"/>
+          </a:fontRef>
+        </p:style>
+        <p:txBody>
+          <a:bodyPr rtlCol="0" anchor="ctr"/>
+          <a:lstStyle/>
+          <a:p>
+            <a:pPr algn="ctr"/>
+            <a:endParaRPr lang="en-US"/>
+          </a:p>
+        </p:txBody>
+      </p:sp>
+      <p:sp>
+        <p:nvSpPr>
+          <p:cNvPr id="97" name="Rectangle 96">
+            <a:extLst>
+              <a:ext uri="{FF2B5EF4-FFF2-40B4-BE49-F238E27FC236}">
+                <a16:creationId xmlns:a16="http://schemas.microsoft.com/office/drawing/2014/main" id="{61634C32-9B64-9911-545E-23983663C57C}"/>
+              </a:ext>
+            </a:extLst>
+          </p:cNvPr>
+          <p:cNvSpPr/>
+          <p:nvPr/>
+        </p:nvSpPr>
+        <p:spPr>
+          <a:xfrm>
+            <a:off x="9675916" y="5588032"/>
+            <a:ext cx="943276" cy="416524"/>
+          </a:xfrm>
+          <a:prstGeom prst="rect">
+            <a:avLst/>
+          </a:prstGeom>
+          <a:solidFill>
+            <a:schemeClr val="accent5">
+              <a:lumMod val="60000"/>
+              <a:lumOff val="40000"/>
+              <a:alpha val="48000"/>
+            </a:schemeClr>
+          </a:solidFill>
+        </p:spPr>
+        <p:style>
+          <a:lnRef idx="2">
+            <a:schemeClr val="accent1">
+              <a:shade val="15000"/>
+            </a:schemeClr>
+          </a:lnRef>
+          <a:fillRef idx="1">
+            <a:schemeClr val="accent1"/>
+          </a:fillRef>
+          <a:effectRef idx="0">
+            <a:schemeClr val="accent1"/>
+          </a:effectRef>
+          <a:fontRef idx="minor">
+            <a:schemeClr val="lt1"/>
+          </a:fontRef>
+        </p:style>
+        <p:txBody>
+          <a:bodyPr rtlCol="0" anchor="ctr"/>
+          <a:lstStyle/>
+          <a:p>
+            <a:pPr algn="ctr"/>
+            <a:endParaRPr lang="en-US"/>
+          </a:p>
+        </p:txBody>
+      </p:sp>
+      <p:cxnSp>
+        <p:nvCxnSpPr>
+          <p:cNvPr id="98" name="Straight Arrow Connector 97">
+            <a:extLst>
+              <a:ext uri="{FF2B5EF4-FFF2-40B4-BE49-F238E27FC236}">
+                <a16:creationId xmlns:a16="http://schemas.microsoft.com/office/drawing/2014/main" id="{FAF72760-D88A-F438-FE1D-2280AC533815}"/>
+              </a:ext>
+            </a:extLst>
+          </p:cNvPr>
+          <p:cNvCxnSpPr>
+            <a:cxnSpLocks/>
+          </p:cNvCxnSpPr>
+          <p:nvPr/>
+        </p:nvCxnSpPr>
+        <p:spPr>
+          <a:xfrm flipH="1">
+            <a:off x="7350874" y="5811109"/>
+            <a:ext cx="901065" cy="0"/>
+          </a:xfrm>
+          <a:prstGeom prst="straightConnector1">
+            <a:avLst/>
+          </a:prstGeom>
+          <a:ln w="28575">
+            <a:solidFill>
+              <a:schemeClr val="tx1"/>
+            </a:solidFill>
+            <a:prstDash val="solid"/>
+            <a:headEnd type="stealth" w="med" len="lg"/>
+            <a:tailEnd type="none" w="med" len="sm"/>
+          </a:ln>
+        </p:spPr>
+        <p:style>
+          <a:lnRef idx="1">
+            <a:schemeClr val="accent1"/>
+          </a:lnRef>
+          <a:fillRef idx="0">
+            <a:schemeClr val="accent1"/>
+          </a:fillRef>
+          <a:effectRef idx="0">
+            <a:schemeClr val="accent1"/>
+          </a:effectRef>
+          <a:fontRef idx="minor">
+            <a:schemeClr val="tx1"/>
+          </a:fontRef>
+        </p:style>
+      </p:cxnSp>
+      <mc:AlternateContent xmlns:mc="http://schemas.openxmlformats.org/markup-compatibility/2006">
+        <mc:Choice xmlns:a14="http://schemas.microsoft.com/office/drawing/2010/main" Requires="a14">
+          <p:sp>
+            <p:nvSpPr>
+              <p:cNvPr id="99" name="TextBox 98">
+                <a:extLst>
+                  <a:ext uri="{FF2B5EF4-FFF2-40B4-BE49-F238E27FC236}">
+                    <a16:creationId xmlns:a16="http://schemas.microsoft.com/office/drawing/2014/main" id="{C03C4B26-4F77-DABA-0C1D-36D622EBEA32}"/>
+                  </a:ext>
+                </a:extLst>
+              </p:cNvPr>
+              <p:cNvSpPr txBox="1"/>
+              <p:nvPr/>
+            </p:nvSpPr>
+            <p:spPr>
+              <a:xfrm>
+                <a:off x="7896080" y="5416076"/>
+                <a:ext cx="368819" cy="369332"/>
+              </a:xfrm>
+              <a:prstGeom prst="rect">
+                <a:avLst/>
+              </a:prstGeom>
+              <a:noFill/>
+            </p:spPr>
+            <p:txBody>
+              <a:bodyPr wrap="none" lIns="0" tIns="0" rIns="0" bIns="0" rtlCol="0">
+                <a:spAutoFit/>
+              </a:bodyPr>
+              <a:lstStyle/>
+              <a:p>
+                <a:pPr/>
+                <a14:m>
+                  <m:oMathPara xmlns:m="http://schemas.openxmlformats.org/officeDocument/2006/math">
+                    <m:oMathParaPr>
+                      <m:jc m:val="centerGroup"/>
+                    </m:oMathParaPr>
+                    <m:oMath xmlns:m="http://schemas.openxmlformats.org/officeDocument/2006/math">
+                      <m:acc>
+                        <m:accPr>
+                          <m:chr m:val="⃗"/>
+                          <m:ctrlPr>
+                            <a:rPr lang="en-US" sz="2400" i="1" smtClean="0">
+                              <a:latin typeface="Cambria Math" panose="02040503050406030204" pitchFamily="18" charset="0"/>
+                              <a:ea typeface="Cambria Math" panose="02040503050406030204" pitchFamily="18" charset="0"/>
+                            </a:rPr>
+                          </m:ctrlPr>
+                        </m:accPr>
+                        <m:e>
+                          <m:sSub>
+                            <m:sSubPr>
+                              <m:ctrlPr>
+                                <a:rPr lang="en-US" sz="2400" i="1" smtClean="0">
+                                  <a:latin typeface="Cambria Math" panose="02040503050406030204" pitchFamily="18" charset="0"/>
+                                  <a:ea typeface="Cambria Math" panose="02040503050406030204" pitchFamily="18" charset="0"/>
+                                </a:rPr>
+                              </m:ctrlPr>
+                            </m:sSubPr>
+                            <m:e>
+                              <m:r>
+                                <a:rPr lang="en-US" sz="2400" b="0" i="1" smtClean="0">
+                                  <a:latin typeface="Cambria Math" panose="02040503050406030204" pitchFamily="18" charset="0"/>
+                                  <a:ea typeface="Cambria Math" panose="02040503050406030204" pitchFamily="18" charset="0"/>
+                                </a:rPr>
+                                <m:t>𝑣</m:t>
+                              </m:r>
+                            </m:e>
+                            <m:sub>
+                              <m:r>
+                                <a:rPr lang="en-US" sz="2400" b="0" i="1" smtClean="0">
+                                  <a:latin typeface="Cambria Math" panose="02040503050406030204" pitchFamily="18" charset="0"/>
+                                  <a:ea typeface="Cambria Math" panose="02040503050406030204" pitchFamily="18" charset="0"/>
+                                </a:rPr>
+                                <m:t>0</m:t>
+                              </m:r>
+                            </m:sub>
+                          </m:sSub>
+                        </m:e>
+                      </m:acc>
+                    </m:oMath>
+                  </m:oMathPara>
+                </a14:m>
+                <a:endParaRPr lang="en-US" sz="2400" dirty="0"/>
+              </a:p>
+            </p:txBody>
+          </p:sp>
+        </mc:Choice>
+        <mc:Fallback>
+          <p:sp>
+            <p:nvSpPr>
+              <p:cNvPr id="99" name="TextBox 98">
+                <a:extLst>
+                  <a:ext uri="{FF2B5EF4-FFF2-40B4-BE49-F238E27FC236}">
+                    <a16:creationId xmlns:a16="http://schemas.microsoft.com/office/drawing/2014/main" id="{C03C4B26-4F77-DABA-0C1D-36D622EBEA32}"/>
+                  </a:ext>
+                </a:extLst>
+              </p:cNvPr>
+              <p:cNvSpPr txBox="1">
+                <a:spLocks noRot="1" noChangeAspect="1" noMove="1" noResize="1" noEditPoints="1" noAdjustHandles="1" noChangeArrowheads="1" noChangeShapeType="1" noTextEdit="1"/>
+              </p:cNvSpPr>
+              <p:nvPr/>
+            </p:nvSpPr>
+            <p:spPr>
+              <a:xfrm>
+                <a:off x="7896080" y="5416076"/>
+                <a:ext cx="368819" cy="369332"/>
+              </a:xfrm>
+              <a:prstGeom prst="rect">
+                <a:avLst/>
+              </a:prstGeom>
+              <a:blipFill>
+                <a:blip r:embed="rId13"/>
+                <a:stretch>
+                  <a:fillRect l="-13115" r="-6557" b="-11475"/>
+                </a:stretch>
+              </a:blipFill>
+            </p:spPr>
+            <p:txBody>
+              <a:bodyPr/>
+              <a:lstStyle/>
+              <a:p>
+                <a:r>
+                  <a:rPr lang="en-US">
+                    <a:noFill/>
+                  </a:rPr>
+                  <a:t> </a:t>
+                </a:r>
+              </a:p>
+            </p:txBody>
+          </p:sp>
+        </mc:Fallback>
+      </mc:AlternateContent>
+      <p:cxnSp>
+        <p:nvCxnSpPr>
+          <p:cNvPr id="101" name="Straight Arrow Connector 100">
+            <a:extLst>
+              <a:ext uri="{FF2B5EF4-FFF2-40B4-BE49-F238E27FC236}">
+                <a16:creationId xmlns:a16="http://schemas.microsoft.com/office/drawing/2014/main" id="{B69ABA0D-6F35-5D9D-A4DA-C387323012E0}"/>
+              </a:ext>
+            </a:extLst>
+          </p:cNvPr>
+          <p:cNvCxnSpPr>
+            <a:cxnSpLocks/>
+          </p:cNvCxnSpPr>
+          <p:nvPr/>
+        </p:nvCxnSpPr>
+        <p:spPr>
+          <a:xfrm>
+            <a:off x="9175750" y="5811109"/>
+            <a:ext cx="971804" cy="0"/>
+          </a:xfrm>
+          <a:prstGeom prst="straightConnector1">
+            <a:avLst/>
+          </a:prstGeom>
+          <a:ln w="28575">
+            <a:solidFill>
+              <a:schemeClr val="tx1"/>
+            </a:solidFill>
+            <a:prstDash val="solid"/>
+            <a:headEnd type="stealth" w="med" len="lg"/>
+            <a:tailEnd type="none" w="med" len="sm"/>
+          </a:ln>
+        </p:spPr>
+        <p:style>
+          <a:lnRef idx="1">
+            <a:schemeClr val="accent1"/>
+          </a:lnRef>
+          <a:fillRef idx="0">
+            <a:schemeClr val="accent1"/>
+          </a:fillRef>
+          <a:effectRef idx="0">
+            <a:schemeClr val="accent1"/>
+          </a:effectRef>
+          <a:fontRef idx="minor">
+            <a:schemeClr val="tx1"/>
+          </a:fontRef>
+        </p:style>
+      </p:cxnSp>
+      <mc:AlternateContent xmlns:mc="http://schemas.openxmlformats.org/markup-compatibility/2006">
+        <mc:Choice xmlns:a14="http://schemas.microsoft.com/office/drawing/2010/main" Requires="a14">
+          <p:sp>
+            <p:nvSpPr>
+              <p:cNvPr id="103" name="TextBox 102">
+                <a:extLst>
+                  <a:ext uri="{FF2B5EF4-FFF2-40B4-BE49-F238E27FC236}">
+                    <a16:creationId xmlns:a16="http://schemas.microsoft.com/office/drawing/2014/main" id="{E0E5CB96-E097-FCD0-BEDE-E3C29506EF5B}"/>
+                  </a:ext>
+                </a:extLst>
+              </p:cNvPr>
+              <p:cNvSpPr txBox="1"/>
+              <p:nvPr/>
+            </p:nvSpPr>
+            <p:spPr>
+              <a:xfrm>
+                <a:off x="9299347" y="5395666"/>
+                <a:ext cx="394659" cy="376898"/>
+              </a:xfrm>
+              <a:prstGeom prst="rect">
+                <a:avLst/>
+              </a:prstGeom>
+              <a:noFill/>
+            </p:spPr>
+            <p:txBody>
+              <a:bodyPr wrap="none" lIns="0" tIns="0" rIns="0" bIns="0" rtlCol="0">
+                <a:spAutoFit/>
+              </a:bodyPr>
+              <a:lstStyle/>
+              <a:p>
+                <a:pPr/>
+                <a14:m>
+                  <m:oMathPara xmlns:m="http://schemas.openxmlformats.org/officeDocument/2006/math">
+                    <m:oMathParaPr>
+                      <m:jc m:val="centerGroup"/>
+                    </m:oMathParaPr>
+                    <m:oMath xmlns:m="http://schemas.openxmlformats.org/officeDocument/2006/math">
+                      <m:acc>
+                        <m:accPr>
+                          <m:chr m:val="⃗"/>
+                          <m:ctrlPr>
+                            <a:rPr lang="en-US" sz="2000" i="1" smtClean="0">
+                              <a:latin typeface="Cambria Math" panose="02040503050406030204" pitchFamily="18" charset="0"/>
+                              <a:ea typeface="Cambria Math" panose="02040503050406030204" pitchFamily="18" charset="0"/>
+                            </a:rPr>
+                          </m:ctrlPr>
+                        </m:accPr>
+                        <m:e>
+                          <m:sSub>
+                            <m:sSubPr>
+                              <m:ctrlPr>
+                                <a:rPr lang="en-US" sz="2000" i="1" smtClean="0">
+                                  <a:latin typeface="Cambria Math" panose="02040503050406030204" pitchFamily="18" charset="0"/>
+                                  <a:ea typeface="Cambria Math" panose="02040503050406030204" pitchFamily="18" charset="0"/>
+                                </a:rPr>
+                              </m:ctrlPr>
+                            </m:sSubPr>
+                            <m:e>
+                              <m:r>
+                                <a:rPr lang="en-US" sz="2000" b="0" i="1" smtClean="0">
+                                  <a:latin typeface="Cambria Math" panose="02040503050406030204" pitchFamily="18" charset="0"/>
+                                  <a:ea typeface="Cambria Math" panose="02040503050406030204" pitchFamily="18" charset="0"/>
+                                </a:rPr>
+                                <m:t>𝐹</m:t>
+                              </m:r>
+                            </m:e>
+                            <m:sub>
+                              <m:r>
+                                <a:rPr lang="en-US" sz="2000" b="0" i="1" smtClean="0">
+                                  <a:latin typeface="Cambria Math" panose="02040503050406030204" pitchFamily="18" charset="0"/>
+                                  <a:ea typeface="Cambria Math" panose="02040503050406030204" pitchFamily="18" charset="0"/>
+                                </a:rPr>
+                                <m:t>𝑓𝑟</m:t>
+                              </m:r>
+                            </m:sub>
+                          </m:sSub>
+                        </m:e>
+                      </m:acc>
+                    </m:oMath>
+                  </m:oMathPara>
+                </a14:m>
+                <a:endParaRPr lang="en-US" sz="2000" dirty="0"/>
+              </a:p>
+            </p:txBody>
+          </p:sp>
+        </mc:Choice>
+        <mc:Fallback>
+          <p:sp>
+            <p:nvSpPr>
+              <p:cNvPr id="103" name="TextBox 102">
+                <a:extLst>
+                  <a:ext uri="{FF2B5EF4-FFF2-40B4-BE49-F238E27FC236}">
+                    <a16:creationId xmlns:a16="http://schemas.microsoft.com/office/drawing/2014/main" id="{E0E5CB96-E097-FCD0-BEDE-E3C29506EF5B}"/>
+                  </a:ext>
+                </a:extLst>
+              </p:cNvPr>
+              <p:cNvSpPr txBox="1">
+                <a:spLocks noRot="1" noChangeAspect="1" noMove="1" noResize="1" noEditPoints="1" noAdjustHandles="1" noChangeArrowheads="1" noChangeShapeType="1" noTextEdit="1"/>
+              </p:cNvSpPr>
+              <p:nvPr/>
+            </p:nvSpPr>
+            <p:spPr>
+              <a:xfrm>
+                <a:off x="9299347" y="5395666"/>
+                <a:ext cx="394659" cy="376898"/>
+              </a:xfrm>
+              <a:prstGeom prst="rect">
+                <a:avLst/>
+              </a:prstGeom>
+              <a:blipFill>
+                <a:blip r:embed="rId14"/>
+                <a:stretch>
+                  <a:fillRect l="-13846" r="-10769" b="-22581"/>
+                </a:stretch>
+              </a:blipFill>
+            </p:spPr>
+            <p:txBody>
+              <a:bodyPr/>
+              <a:lstStyle/>
+              <a:p>
+                <a:r>
+                  <a:rPr lang="en-US">
+                    <a:noFill/>
+                  </a:rPr>
+                  <a:t> </a:t>
+                </a:r>
+              </a:p>
+            </p:txBody>
+          </p:sp>
+        </mc:Fallback>
+      </mc:AlternateContent>
+      <p:cxnSp>
+        <p:nvCxnSpPr>
+          <p:cNvPr id="104" name="Straight Arrow Connector 103">
+            <a:extLst>
+              <a:ext uri="{FF2B5EF4-FFF2-40B4-BE49-F238E27FC236}">
+                <a16:creationId xmlns:a16="http://schemas.microsoft.com/office/drawing/2014/main" id="{2D4AFD25-0765-F583-F45D-69B37208D7BB}"/>
+              </a:ext>
+            </a:extLst>
+          </p:cNvPr>
+          <p:cNvCxnSpPr>
+            <a:cxnSpLocks/>
+          </p:cNvCxnSpPr>
+          <p:nvPr/>
+        </p:nvCxnSpPr>
+        <p:spPr>
+          <a:xfrm flipH="1">
+            <a:off x="7553406" y="6446109"/>
+            <a:ext cx="2536744" cy="0"/>
+          </a:xfrm>
+          <a:prstGeom prst="straightConnector1">
+            <a:avLst/>
+          </a:prstGeom>
+          <a:ln w="28575">
+            <a:solidFill>
+              <a:schemeClr val="tx1"/>
+            </a:solidFill>
+            <a:prstDash val="solid"/>
+            <a:headEnd type="stealth" w="med" len="lg"/>
+            <a:tailEnd type="stealth" w="med" len="lg"/>
+          </a:ln>
+        </p:spPr>
+        <p:style>
+          <a:lnRef idx="1">
+            <a:schemeClr val="accent1"/>
+          </a:lnRef>
+          <a:fillRef idx="0">
+            <a:schemeClr val="accent1"/>
+          </a:fillRef>
+          <a:effectRef idx="0">
+            <a:schemeClr val="accent1"/>
+          </a:effectRef>
+          <a:fontRef idx="minor">
+            <a:schemeClr val="tx1"/>
+          </a:fontRef>
+        </p:style>
+      </p:cxnSp>
+      <p:cxnSp>
+        <p:nvCxnSpPr>
+          <p:cNvPr id="108" name="Straight Arrow Connector 107">
+            <a:extLst>
+              <a:ext uri="{FF2B5EF4-FFF2-40B4-BE49-F238E27FC236}">
+                <a16:creationId xmlns:a16="http://schemas.microsoft.com/office/drawing/2014/main" id="{2C14002B-BBFB-4865-CD09-186106FBA62A}"/>
+              </a:ext>
+            </a:extLst>
+          </p:cNvPr>
+          <p:cNvCxnSpPr>
+            <a:cxnSpLocks/>
+          </p:cNvCxnSpPr>
+          <p:nvPr/>
+        </p:nvCxnSpPr>
+        <p:spPr>
+          <a:xfrm flipV="1">
+            <a:off x="7350874" y="5811109"/>
+            <a:ext cx="0" cy="733624"/>
+          </a:xfrm>
+          <a:prstGeom prst="straightConnector1">
+            <a:avLst/>
+          </a:prstGeom>
+          <a:ln w="28575">
+            <a:solidFill>
+              <a:schemeClr val="tx1"/>
+            </a:solidFill>
+            <a:prstDash val="solid"/>
+            <a:headEnd type="none" w="med" len="lg"/>
+            <a:tailEnd type="none" w="med" len="sm"/>
+          </a:ln>
+        </p:spPr>
+        <p:style>
+          <a:lnRef idx="1">
+            <a:schemeClr val="accent1"/>
+          </a:lnRef>
+          <a:fillRef idx="0">
+            <a:schemeClr val="accent1"/>
+          </a:fillRef>
+          <a:effectRef idx="0">
+            <a:schemeClr val="accent1"/>
+          </a:effectRef>
+          <a:fontRef idx="minor">
+            <a:schemeClr val="tx1"/>
+          </a:fontRef>
+        </p:style>
+      </p:cxnSp>
+      <mc:AlternateContent xmlns:mc="http://schemas.openxmlformats.org/markup-compatibility/2006">
+        <mc:Choice xmlns:a14="http://schemas.microsoft.com/office/drawing/2010/main" Requires="a14">
+          <p:sp>
+            <p:nvSpPr>
+              <p:cNvPr id="110" name="TextBox 109">
+                <a:extLst>
+                  <a:ext uri="{FF2B5EF4-FFF2-40B4-BE49-F238E27FC236}">
+                    <a16:creationId xmlns:a16="http://schemas.microsoft.com/office/drawing/2014/main" id="{8DC2C85E-15E7-8500-860B-A73991954EA0}"/>
+                  </a:ext>
+                </a:extLst>
+              </p:cNvPr>
+              <p:cNvSpPr txBox="1"/>
+              <p:nvPr/>
+            </p:nvSpPr>
+            <p:spPr>
+              <a:xfrm>
+                <a:off x="8786693" y="6093896"/>
+                <a:ext cx="232051" cy="369332"/>
+              </a:xfrm>
+              <a:prstGeom prst="rect">
+                <a:avLst/>
+              </a:prstGeom>
+              <a:noFill/>
+            </p:spPr>
+            <p:txBody>
+              <a:bodyPr wrap="none" lIns="0" tIns="0" rIns="0" bIns="0" rtlCol="0">
+                <a:spAutoFit/>
+              </a:bodyPr>
+              <a:lstStyle/>
+              <a:p>
+                <a:pPr/>
+                <a14:m>
+                  <m:oMathPara xmlns:m="http://schemas.openxmlformats.org/officeDocument/2006/math">
+                    <m:oMathParaPr>
+                      <m:jc m:val="centerGroup"/>
+                    </m:oMathParaPr>
+                    <m:oMath xmlns:m="http://schemas.openxmlformats.org/officeDocument/2006/math">
+                      <m:r>
+                        <a:rPr lang="en-US" sz="2400" i="1" smtClean="0">
+                          <a:latin typeface="Cambria Math" panose="02040503050406030204" pitchFamily="18" charset="0"/>
+                          <a:ea typeface="Cambria Math" panose="02040503050406030204" pitchFamily="18" charset="0"/>
+                        </a:rPr>
+                        <m:t>𝑆</m:t>
+                      </m:r>
+                    </m:oMath>
+                  </m:oMathPara>
+                </a14:m>
+                <a:endParaRPr lang="en-US" sz="2400" dirty="0"/>
+              </a:p>
+            </p:txBody>
+          </p:sp>
+        </mc:Choice>
+        <mc:Fallback>
+          <p:sp>
+            <p:nvSpPr>
+              <p:cNvPr id="110" name="TextBox 109">
+                <a:extLst>
+                  <a:ext uri="{FF2B5EF4-FFF2-40B4-BE49-F238E27FC236}">
+                    <a16:creationId xmlns:a16="http://schemas.microsoft.com/office/drawing/2014/main" id="{8DC2C85E-15E7-8500-860B-A73991954EA0}"/>
+                  </a:ext>
+                </a:extLst>
+              </p:cNvPr>
+              <p:cNvSpPr txBox="1">
+                <a:spLocks noRot="1" noChangeAspect="1" noMove="1" noResize="1" noEditPoints="1" noAdjustHandles="1" noChangeArrowheads="1" noChangeShapeType="1" noTextEdit="1"/>
+              </p:cNvSpPr>
+              <p:nvPr/>
+            </p:nvSpPr>
+            <p:spPr>
+              <a:xfrm>
+                <a:off x="8786693" y="6093896"/>
+                <a:ext cx="232051" cy="369332"/>
+              </a:xfrm>
+              <a:prstGeom prst="rect">
+                <a:avLst/>
+              </a:prstGeom>
+              <a:blipFill>
+                <a:blip r:embed="rId15"/>
+                <a:stretch>
+                  <a:fillRect l="-31579" r="-28947" b="-5000"/>
+                </a:stretch>
+              </a:blipFill>
+            </p:spPr>
+            <p:txBody>
+              <a:bodyPr/>
+              <a:lstStyle/>
+              <a:p>
+                <a:r>
+                  <a:rPr lang="en-US">
+                    <a:noFill/>
+                  </a:rPr>
+                  <a:t> </a:t>
+                </a:r>
+              </a:p>
+            </p:txBody>
+          </p:sp>
+        </mc:Fallback>
+      </mc:AlternateContent>
+      <mc:AlternateContent xmlns:mc="http://schemas.openxmlformats.org/markup-compatibility/2006">
+        <mc:Choice xmlns:a14="http://schemas.microsoft.com/office/drawing/2010/main" Requires="a14">
+          <p:sp>
+            <p:nvSpPr>
+              <p:cNvPr id="112" name="TextBox 111">
+                <a:extLst>
+                  <a:ext uri="{FF2B5EF4-FFF2-40B4-BE49-F238E27FC236}">
+                    <a16:creationId xmlns:a16="http://schemas.microsoft.com/office/drawing/2014/main" id="{CB9B5ECD-8033-B75A-6533-C6FA24976B9E}"/>
+                  </a:ext>
+                </a:extLst>
+              </p:cNvPr>
+              <p:cNvSpPr txBox="1"/>
+              <p:nvPr/>
+            </p:nvSpPr>
+            <p:spPr>
+              <a:xfrm>
+                <a:off x="7104404" y="5191200"/>
+                <a:ext cx="325858" cy="369332"/>
+              </a:xfrm>
+              <a:prstGeom prst="rect">
+                <a:avLst/>
+              </a:prstGeom>
+              <a:noFill/>
+            </p:spPr>
+            <p:txBody>
+              <a:bodyPr wrap="none" lIns="0" tIns="0" rIns="0" bIns="0" rtlCol="0">
+                <a:spAutoFit/>
+              </a:bodyPr>
+              <a:lstStyle/>
+              <a:p>
+                <a:pPr/>
+                <a14:m>
+                  <m:oMathPara xmlns:m="http://schemas.openxmlformats.org/officeDocument/2006/math">
+                    <m:oMathParaPr>
+                      <m:jc m:val="centerGroup"/>
+                    </m:oMathParaPr>
+                    <m:oMath xmlns:m="http://schemas.openxmlformats.org/officeDocument/2006/math">
+                      <m:r>
+                        <a:rPr lang="en-US" sz="2400" i="1" smtClean="0">
+                          <a:latin typeface="Cambria Math" panose="02040503050406030204" pitchFamily="18" charset="0"/>
+                          <a:ea typeface="Cambria Math" panose="02040503050406030204" pitchFamily="18" charset="0"/>
+                        </a:rPr>
+                        <m:t>𝑚</m:t>
+                      </m:r>
+                    </m:oMath>
+                  </m:oMathPara>
+                </a14:m>
+                <a:endParaRPr lang="en-US" sz="2400" dirty="0"/>
+              </a:p>
+            </p:txBody>
+          </p:sp>
+        </mc:Choice>
+        <mc:Fallback>
+          <p:sp>
+            <p:nvSpPr>
+              <p:cNvPr id="112" name="TextBox 111">
+                <a:extLst>
+                  <a:ext uri="{FF2B5EF4-FFF2-40B4-BE49-F238E27FC236}">
+                    <a16:creationId xmlns:a16="http://schemas.microsoft.com/office/drawing/2014/main" id="{CB9B5ECD-8033-B75A-6533-C6FA24976B9E}"/>
+                  </a:ext>
+                </a:extLst>
+              </p:cNvPr>
+              <p:cNvSpPr txBox="1">
+                <a:spLocks noRot="1" noChangeAspect="1" noMove="1" noResize="1" noEditPoints="1" noAdjustHandles="1" noChangeArrowheads="1" noChangeShapeType="1" noTextEdit="1"/>
+              </p:cNvSpPr>
+              <p:nvPr/>
+            </p:nvSpPr>
+            <p:spPr>
+              <a:xfrm>
+                <a:off x="7104404" y="5191200"/>
+                <a:ext cx="325858" cy="369332"/>
+              </a:xfrm>
+              <a:prstGeom prst="rect">
+                <a:avLst/>
+              </a:prstGeom>
+              <a:blipFill>
+                <a:blip r:embed="rId16"/>
+                <a:stretch>
+                  <a:fillRect l="-12963" r="-11111"/>
+                </a:stretch>
+              </a:blipFill>
+            </p:spPr>
+            <p:txBody>
+              <a:bodyPr/>
+              <a:lstStyle/>
+              <a:p>
+                <a:r>
+                  <a:rPr lang="en-US">
+                    <a:noFill/>
+                  </a:rPr>
+                  <a:t> </a:t>
+                </a:r>
+              </a:p>
+            </p:txBody>
+          </p:sp>
+        </mc:Fallback>
+      </mc:AlternateContent>
+      <mc:AlternateContent xmlns:mc="http://schemas.openxmlformats.org/markup-compatibility/2006">
+        <mc:Choice xmlns:a14="http://schemas.microsoft.com/office/drawing/2010/main" Requires="a14">
+          <p:sp>
+            <p:nvSpPr>
+              <p:cNvPr id="113" name="TextBox 112">
+                <a:extLst>
+                  <a:ext uri="{FF2B5EF4-FFF2-40B4-BE49-F238E27FC236}">
+                    <a16:creationId xmlns:a16="http://schemas.microsoft.com/office/drawing/2014/main" id="{D7166BF0-B40E-0094-EDBC-ECF86EB5391A}"/>
+                  </a:ext>
+                </a:extLst>
+              </p:cNvPr>
+              <p:cNvSpPr txBox="1"/>
+              <p:nvPr/>
+            </p:nvSpPr>
+            <p:spPr>
+              <a:xfrm>
+                <a:off x="6436905" y="5928443"/>
+                <a:ext cx="239103" cy="369332"/>
+              </a:xfrm>
+              <a:prstGeom prst="rect">
+                <a:avLst/>
+              </a:prstGeom>
+              <a:noFill/>
+            </p:spPr>
+            <p:txBody>
+              <a:bodyPr wrap="none" lIns="0" tIns="0" rIns="0" bIns="0" rtlCol="0">
+                <a:spAutoFit/>
+              </a:bodyPr>
+              <a:lstStyle/>
+              <a:p>
+                <a:pPr/>
+                <a14:m>
+                  <m:oMathPara xmlns:m="http://schemas.openxmlformats.org/officeDocument/2006/math">
+                    <m:oMathParaPr>
+                      <m:jc m:val="centerGroup"/>
+                    </m:oMathParaPr>
+                    <m:oMath xmlns:m="http://schemas.openxmlformats.org/officeDocument/2006/math">
+                      <m:r>
+                        <a:rPr lang="en-US" sz="2400" i="1" smtClean="0">
+                          <a:latin typeface="Cambria Math" panose="02040503050406030204" pitchFamily="18" charset="0"/>
+                          <a:ea typeface="Cambria Math" panose="02040503050406030204" pitchFamily="18" charset="0"/>
+                        </a:rPr>
+                        <m:t>𝜇</m:t>
+                      </m:r>
+                    </m:oMath>
+                  </m:oMathPara>
+                </a14:m>
+                <a:endParaRPr lang="en-US" sz="2400" dirty="0"/>
+              </a:p>
+            </p:txBody>
+          </p:sp>
+        </mc:Choice>
+        <mc:Fallback>
+          <p:sp>
+            <p:nvSpPr>
+              <p:cNvPr id="113" name="TextBox 112">
+                <a:extLst>
+                  <a:ext uri="{FF2B5EF4-FFF2-40B4-BE49-F238E27FC236}">
+                    <a16:creationId xmlns:a16="http://schemas.microsoft.com/office/drawing/2014/main" id="{D7166BF0-B40E-0094-EDBC-ECF86EB5391A}"/>
+                  </a:ext>
+                </a:extLst>
+              </p:cNvPr>
+              <p:cNvSpPr txBox="1">
+                <a:spLocks noRot="1" noChangeAspect="1" noMove="1" noResize="1" noEditPoints="1" noAdjustHandles="1" noChangeArrowheads="1" noChangeShapeType="1" noTextEdit="1"/>
+              </p:cNvSpPr>
+              <p:nvPr/>
+            </p:nvSpPr>
+            <p:spPr>
+              <a:xfrm>
+                <a:off x="6436905" y="5928443"/>
+                <a:ext cx="239103" cy="369332"/>
+              </a:xfrm>
+              <a:prstGeom prst="rect">
+                <a:avLst/>
+              </a:prstGeom>
+              <a:blipFill>
+                <a:blip r:embed="rId17"/>
+                <a:stretch>
+                  <a:fillRect l="-33333" r="-25641" b="-21667"/>
+                </a:stretch>
+              </a:blipFill>
+            </p:spPr>
+            <p:txBody>
+              <a:bodyPr/>
+              <a:lstStyle/>
+              <a:p>
+                <a:r>
+                  <a:rPr lang="en-US">
+                    <a:noFill/>
+                  </a:rPr>
+                  <a:t> </a:t>
+                </a:r>
+              </a:p>
+            </p:txBody>
+          </p:sp>
+        </mc:Fallback>
+      </mc:AlternateContent>
+    </p:spTree>
+    <p:extLst>
+      <p:ext uri="{BB962C8B-B14F-4D97-AF65-F5344CB8AC3E}">
+        <p14:creationId xmlns:p14="http://schemas.microsoft.com/office/powerpoint/2010/main" val="3206780011"/>
+      </p:ext>
+    </p:extLst>
+  </p:cSld>
+  <p:clrMapOvr>
+    <a:masterClrMapping/>
+  </p:clrMapOvr>
+</p:sld>
+</file>
+
+<file path=ppt/slides/slide25.xml><?xml version="1.0" encoding="utf-8"?>
+<p:sld xmlns:a="http://schemas.openxmlformats.org/drawingml/2006/main" xmlns:r="http://schemas.openxmlformats.org/officeDocument/2006/relationships" xmlns:p="http://schemas.openxmlformats.org/presentationml/2006/main">
+  <p:cSld>
+    <p:spTree>
+      <p:nvGrpSpPr>
+        <p:cNvPr id="1" name=""/>
+        <p:cNvGrpSpPr/>
+        <p:nvPr/>
+      </p:nvGrpSpPr>
+      <p:grpSpPr>
+        <a:xfrm>
+          <a:off x="0" y="0"/>
+          <a:ext cx="0" cy="0"/>
+          <a:chOff x="0" y="0"/>
+          <a:chExt cx="0" cy="0"/>
+        </a:xfrm>
+      </p:grpSpPr>
+    </p:spTree>
+    <p:extLst>
+      <p:ext uri="{BB962C8B-B14F-4D97-AF65-F5344CB8AC3E}">
+        <p14:creationId xmlns:p14="http://schemas.microsoft.com/office/powerpoint/2010/main" val="3085883213"/>
       </p:ext>
     </p:extLst>
   </p:cSld>

</xml_diff>

<commit_message>
"Braking distance of the vehicle" example @ theory
</commit_message>
<xml_diff>
--- a/theory/lecture-drawings.pptx
+++ b/theory/lecture-drawings.pptx
@@ -283,7 +283,7 @@
           <a:p>
             <a:fld id="{2FDE7089-442F-4E99-86D8-0A1D11EB158F}" type="datetimeFigureOut">
               <a:rPr lang="en-US" smtClean="0"/>
-              <a:t>9/27/2024</a:t>
+              <a:t>10/4/2024</a:t>
             </a:fld>
             <a:endParaRPr lang="en-US"/>
           </a:p>
@@ -481,7 +481,7 @@
           <a:p>
             <a:fld id="{2FDE7089-442F-4E99-86D8-0A1D11EB158F}" type="datetimeFigureOut">
               <a:rPr lang="en-US" smtClean="0"/>
-              <a:t>9/27/2024</a:t>
+              <a:t>10/4/2024</a:t>
             </a:fld>
             <a:endParaRPr lang="en-US"/>
           </a:p>
@@ -689,7 +689,7 @@
           <a:p>
             <a:fld id="{2FDE7089-442F-4E99-86D8-0A1D11EB158F}" type="datetimeFigureOut">
               <a:rPr lang="en-US" smtClean="0"/>
-              <a:t>9/27/2024</a:t>
+              <a:t>10/4/2024</a:t>
             </a:fld>
             <a:endParaRPr lang="en-US"/>
           </a:p>
@@ -887,7 +887,7 @@
           <a:p>
             <a:fld id="{2FDE7089-442F-4E99-86D8-0A1D11EB158F}" type="datetimeFigureOut">
               <a:rPr lang="en-US" smtClean="0"/>
-              <a:t>9/27/2024</a:t>
+              <a:t>10/4/2024</a:t>
             </a:fld>
             <a:endParaRPr lang="en-US"/>
           </a:p>
@@ -1162,7 +1162,7 @@
           <a:p>
             <a:fld id="{2FDE7089-442F-4E99-86D8-0A1D11EB158F}" type="datetimeFigureOut">
               <a:rPr lang="en-US" smtClean="0"/>
-              <a:t>9/27/2024</a:t>
+              <a:t>10/4/2024</a:t>
             </a:fld>
             <a:endParaRPr lang="en-US"/>
           </a:p>
@@ -1427,7 +1427,7 @@
           <a:p>
             <a:fld id="{2FDE7089-442F-4E99-86D8-0A1D11EB158F}" type="datetimeFigureOut">
               <a:rPr lang="en-US" smtClean="0"/>
-              <a:t>9/27/2024</a:t>
+              <a:t>10/4/2024</a:t>
             </a:fld>
             <a:endParaRPr lang="en-US"/>
           </a:p>
@@ -1839,7 +1839,7 @@
           <a:p>
             <a:fld id="{2FDE7089-442F-4E99-86D8-0A1D11EB158F}" type="datetimeFigureOut">
               <a:rPr lang="en-US" smtClean="0"/>
-              <a:t>9/27/2024</a:t>
+              <a:t>10/4/2024</a:t>
             </a:fld>
             <a:endParaRPr lang="en-US"/>
           </a:p>
@@ -1980,7 +1980,7 @@
           <a:p>
             <a:fld id="{2FDE7089-442F-4E99-86D8-0A1D11EB158F}" type="datetimeFigureOut">
               <a:rPr lang="en-US" smtClean="0"/>
-              <a:t>9/27/2024</a:t>
+              <a:t>10/4/2024</a:t>
             </a:fld>
             <a:endParaRPr lang="en-US"/>
           </a:p>
@@ -2093,7 +2093,7 @@
           <a:p>
             <a:fld id="{2FDE7089-442F-4E99-86D8-0A1D11EB158F}" type="datetimeFigureOut">
               <a:rPr lang="en-US" smtClean="0"/>
-              <a:t>9/27/2024</a:t>
+              <a:t>10/4/2024</a:t>
             </a:fld>
             <a:endParaRPr lang="en-US"/>
           </a:p>
@@ -2404,7 +2404,7 @@
           <a:p>
             <a:fld id="{2FDE7089-442F-4E99-86D8-0A1D11EB158F}" type="datetimeFigureOut">
               <a:rPr lang="en-US" smtClean="0"/>
-              <a:t>9/27/2024</a:t>
+              <a:t>10/4/2024</a:t>
             </a:fld>
             <a:endParaRPr lang="en-US"/>
           </a:p>
@@ -2692,7 +2692,7 @@
           <a:p>
             <a:fld id="{2FDE7089-442F-4E99-86D8-0A1D11EB158F}" type="datetimeFigureOut">
               <a:rPr lang="en-US" smtClean="0"/>
-              <a:t>9/27/2024</a:t>
+              <a:t>10/4/2024</a:t>
             </a:fld>
             <a:endParaRPr lang="en-US"/>
           </a:p>
@@ -2933,7 +2933,7 @@
           <a:p>
             <a:fld id="{2FDE7089-442F-4E99-86D8-0A1D11EB158F}" type="datetimeFigureOut">
               <a:rPr lang="en-US" smtClean="0"/>
-              <a:t>9/27/2024</a:t>
+              <a:t>10/4/2024</a:t>
             </a:fld>
             <a:endParaRPr lang="en-US"/>
           </a:p>
@@ -30034,8 +30034,8 @@
           </p:style>
         </p:cxnSp>
       </p:grpSp>
-      <mc:AlternateContent xmlns:mc="http://schemas.openxmlformats.org/markup-compatibility/2006">
-        <mc:Choice xmlns:a14="http://schemas.microsoft.com/office/drawing/2010/main" Requires="a14">
+      <mc:AlternateContent xmlns:mc="http://schemas.openxmlformats.org/markup-compatibility/2006" xmlns:a14="http://schemas.microsoft.com/office/drawing/2010/main">
+        <mc:Choice Requires="a14">
           <p:sp>
             <p:nvSpPr>
               <p:cNvPr id="22" name="TextBox 21">
@@ -30107,7 +30107,7 @@
             </p:txBody>
           </p:sp>
         </mc:Choice>
-        <mc:Fallback>
+        <mc:Fallback xmlns="">
           <p:sp>
             <p:nvSpPr>
               <p:cNvPr id="22" name="TextBox 21">
@@ -30196,8 +30196,8 @@
           </a:fontRef>
         </p:style>
       </p:cxnSp>
-      <mc:AlternateContent xmlns:mc="http://schemas.openxmlformats.org/markup-compatibility/2006">
-        <mc:Choice xmlns:a14="http://schemas.microsoft.com/office/drawing/2010/main" Requires="a14">
+      <mc:AlternateContent xmlns:mc="http://schemas.openxmlformats.org/markup-compatibility/2006" xmlns:a14="http://schemas.microsoft.com/office/drawing/2010/main">
+        <mc:Choice Requires="a14">
           <p:sp>
             <p:nvSpPr>
               <p:cNvPr id="26" name="TextBox 25">
@@ -30282,7 +30282,7 @@
             </p:txBody>
           </p:sp>
         </mc:Choice>
-        <mc:Fallback>
+        <mc:Fallback xmlns="">
           <p:sp>
             <p:nvSpPr>
               <p:cNvPr id="26" name="TextBox 25">
@@ -30641,8 +30641,8 @@
           </a:fontRef>
         </p:style>
       </p:cxnSp>
-      <mc:AlternateContent xmlns:mc="http://schemas.openxmlformats.org/markup-compatibility/2006">
-        <mc:Choice xmlns:a14="http://schemas.microsoft.com/office/drawing/2010/main" Requires="a14">
+      <mc:AlternateContent xmlns:mc="http://schemas.openxmlformats.org/markup-compatibility/2006" xmlns:a14="http://schemas.microsoft.com/office/drawing/2010/main">
+        <mc:Choice Requires="a14">
           <p:sp>
             <p:nvSpPr>
               <p:cNvPr id="58" name="TextBox 57">
@@ -30727,7 +30727,7 @@
             </p:txBody>
           </p:sp>
         </mc:Choice>
-        <mc:Fallback>
+        <mc:Fallback xmlns="">
           <p:sp>
             <p:nvSpPr>
               <p:cNvPr id="58" name="TextBox 57">
@@ -30772,8 +30772,8 @@
           </p:sp>
         </mc:Fallback>
       </mc:AlternateContent>
-      <mc:AlternateContent xmlns:mc="http://schemas.openxmlformats.org/markup-compatibility/2006">
-        <mc:Choice xmlns:a14="http://schemas.microsoft.com/office/drawing/2010/main" Requires="a14">
+      <mc:AlternateContent xmlns:mc="http://schemas.openxmlformats.org/markup-compatibility/2006" xmlns:a14="http://schemas.microsoft.com/office/drawing/2010/main">
+        <mc:Choice Requires="a14">
           <p:sp>
             <p:nvSpPr>
               <p:cNvPr id="59" name="TextBox 58">
@@ -30802,6 +30802,7 @@
               </a:bodyPr>
               <a:lstStyle/>
               <a:p>
+                <a:pPr/>
                 <a14:m>
                   <m:oMathPara xmlns:m="http://schemas.openxmlformats.org/officeDocument/2006/math">
                     <m:oMathParaPr>
@@ -30834,7 +30835,7 @@
             </p:txBody>
           </p:sp>
         </mc:Choice>
-        <mc:Fallback>
+        <mc:Fallback xmlns="">
           <p:sp>
             <p:nvSpPr>
               <p:cNvPr id="59" name="TextBox 58">
@@ -30879,8 +30880,8 @@
           </p:sp>
         </mc:Fallback>
       </mc:AlternateContent>
-      <mc:AlternateContent xmlns:mc="http://schemas.openxmlformats.org/markup-compatibility/2006">
-        <mc:Choice xmlns:a14="http://schemas.microsoft.com/office/drawing/2010/main" Requires="a14">
+      <mc:AlternateContent xmlns:mc="http://schemas.openxmlformats.org/markup-compatibility/2006" xmlns:a14="http://schemas.microsoft.com/office/drawing/2010/main">
+        <mc:Choice Requires="a14">
           <p:sp>
             <p:nvSpPr>
               <p:cNvPr id="60" name="TextBox 59">
@@ -30991,7 +30992,7 @@
             </p:txBody>
           </p:sp>
         </mc:Choice>
-        <mc:Fallback>
+        <mc:Fallback xmlns="">
           <p:sp>
             <p:nvSpPr>
               <p:cNvPr id="60" name="TextBox 59">
@@ -31090,8 +31091,8 @@
           </a:p>
         </p:txBody>
       </p:sp>
-      <mc:AlternateContent xmlns:mc="http://schemas.openxmlformats.org/markup-compatibility/2006">
-        <mc:Choice xmlns:a14="http://schemas.microsoft.com/office/drawing/2010/main" Requires="a14">
+      <mc:AlternateContent xmlns:mc="http://schemas.openxmlformats.org/markup-compatibility/2006" xmlns:a14="http://schemas.microsoft.com/office/drawing/2010/main">
+        <mc:Choice Requires="a14">
           <p:sp>
             <p:nvSpPr>
               <p:cNvPr id="62" name="TextBox 61">
@@ -31142,7 +31143,7 @@
             </p:txBody>
           </p:sp>
         </mc:Choice>
-        <mc:Fallback>
+        <mc:Fallback xmlns="">
           <p:sp>
             <p:nvSpPr>
               <p:cNvPr id="62" name="TextBox 61">
@@ -31376,8 +31377,8 @@
           </a:p>
         </p:txBody>
       </p:sp>
-      <mc:AlternateContent xmlns:mc="http://schemas.openxmlformats.org/markup-compatibility/2006">
-        <mc:Choice xmlns:a14="http://schemas.microsoft.com/office/drawing/2010/main" Requires="a14">
+      <mc:AlternateContent xmlns:mc="http://schemas.openxmlformats.org/markup-compatibility/2006" xmlns:a14="http://schemas.microsoft.com/office/drawing/2010/main">
+        <mc:Choice Requires="a14">
           <p:sp>
             <p:nvSpPr>
               <p:cNvPr id="67" name="TextBox 66">
@@ -31428,7 +31429,7 @@
             </p:txBody>
           </p:sp>
         </mc:Choice>
-        <mc:Fallback>
+        <mc:Fallback xmlns="">
           <p:sp>
             <p:nvSpPr>
               <p:cNvPr id="67" name="TextBox 66">
@@ -31569,8 +31570,8 @@
           </a:fontRef>
         </p:style>
       </p:cxnSp>
-      <mc:AlternateContent xmlns:mc="http://schemas.openxmlformats.org/markup-compatibility/2006">
-        <mc:Choice xmlns:a14="http://schemas.microsoft.com/office/drawing/2010/main" Requires="a14">
+      <mc:AlternateContent xmlns:mc="http://schemas.openxmlformats.org/markup-compatibility/2006" xmlns:a14="http://schemas.microsoft.com/office/drawing/2010/main">
+        <mc:Choice Requires="a14">
           <p:sp>
             <p:nvSpPr>
               <p:cNvPr id="71" name="TextBox 70">
@@ -31671,7 +31672,7 @@
             </p:txBody>
           </p:sp>
         </mc:Choice>
-        <mc:Fallback>
+        <mc:Fallback xmlns="">
           <p:sp>
             <p:nvSpPr>
               <p:cNvPr id="71" name="TextBox 70">
@@ -32085,8 +32086,8 @@
           </a:p>
         </p:txBody>
       </p:sp>
-      <mc:AlternateContent xmlns:mc="http://schemas.openxmlformats.org/markup-compatibility/2006">
-        <mc:Choice xmlns:a14="http://schemas.microsoft.com/office/drawing/2010/main" Requires="a14">
+      <mc:AlternateContent xmlns:mc="http://schemas.openxmlformats.org/markup-compatibility/2006" xmlns:a14="http://schemas.microsoft.com/office/drawing/2010/main">
+        <mc:Choice Requires="a14">
           <p:sp>
             <p:nvSpPr>
               <p:cNvPr id="85" name="TextBox 84">
@@ -32137,7 +32138,7 @@
             </p:txBody>
           </p:sp>
         </mc:Choice>
-        <mc:Fallback>
+        <mc:Fallback xmlns="">
           <p:sp>
             <p:nvSpPr>
               <p:cNvPr id="85" name="TextBox 84">
@@ -32182,8 +32183,8 @@
           </p:sp>
         </mc:Fallback>
       </mc:AlternateContent>
-      <mc:AlternateContent xmlns:mc="http://schemas.openxmlformats.org/markup-compatibility/2006">
-        <mc:Choice xmlns:a14="http://schemas.microsoft.com/office/drawing/2010/main" Requires="a14">
+      <mc:AlternateContent xmlns:mc="http://schemas.openxmlformats.org/markup-compatibility/2006" xmlns:a14="http://schemas.microsoft.com/office/drawing/2010/main">
+        <mc:Choice Requires="a14">
           <p:sp>
             <p:nvSpPr>
               <p:cNvPr id="86" name="TextBox 85">
@@ -32247,7 +32248,7 @@
             </p:txBody>
           </p:sp>
         </mc:Choice>
-        <mc:Fallback>
+        <mc:Fallback xmlns="">
           <p:sp>
             <p:nvSpPr>
               <p:cNvPr id="86" name="TextBox 85">
@@ -32292,8 +32293,8 @@
           </p:sp>
         </mc:Fallback>
       </mc:AlternateContent>
-      <mc:AlternateContent xmlns:mc="http://schemas.openxmlformats.org/markup-compatibility/2006">
-        <mc:Choice xmlns:a14="http://schemas.microsoft.com/office/drawing/2010/main" Requires="a14">
+      <mc:AlternateContent xmlns:mc="http://schemas.openxmlformats.org/markup-compatibility/2006" xmlns:a14="http://schemas.microsoft.com/office/drawing/2010/main">
+        <mc:Choice Requires="a14">
           <p:sp>
             <p:nvSpPr>
               <p:cNvPr id="87" name="TextBox 86">
@@ -32357,7 +32358,7 @@
             </p:txBody>
           </p:sp>
         </mc:Choice>
-        <mc:Fallback>
+        <mc:Fallback xmlns="">
           <p:sp>
             <p:nvSpPr>
               <p:cNvPr id="87" name="TextBox 86">
@@ -32597,8 +32598,8 @@
           </a:fontRef>
         </p:style>
       </p:cxnSp>
-      <mc:AlternateContent xmlns:mc="http://schemas.openxmlformats.org/markup-compatibility/2006">
-        <mc:Choice xmlns:a14="http://schemas.microsoft.com/office/drawing/2010/main" Requires="a14">
+      <mc:AlternateContent xmlns:mc="http://schemas.openxmlformats.org/markup-compatibility/2006" xmlns:a14="http://schemas.microsoft.com/office/drawing/2010/main">
+        <mc:Choice Requires="a14">
           <p:sp>
             <p:nvSpPr>
               <p:cNvPr id="99" name="TextBox 98">
@@ -32683,7 +32684,7 @@
             </p:txBody>
           </p:sp>
         </mc:Choice>
-        <mc:Fallback>
+        <mc:Fallback xmlns="">
           <p:sp>
             <p:nvSpPr>
               <p:cNvPr id="99" name="TextBox 98">
@@ -32774,8 +32775,8 @@
           </a:fontRef>
         </p:style>
       </p:cxnSp>
-      <mc:AlternateContent xmlns:mc="http://schemas.openxmlformats.org/markup-compatibility/2006">
-        <mc:Choice xmlns:a14="http://schemas.microsoft.com/office/drawing/2010/main" Requires="a14">
+      <mc:AlternateContent xmlns:mc="http://schemas.openxmlformats.org/markup-compatibility/2006" xmlns:a14="http://schemas.microsoft.com/office/drawing/2010/main">
+        <mc:Choice Requires="a14">
           <p:sp>
             <p:nvSpPr>
               <p:cNvPr id="103" name="TextBox 102">
@@ -32860,7 +32861,7 @@
             </p:txBody>
           </p:sp>
         </mc:Choice>
-        <mc:Fallback>
+        <mc:Fallback xmlns="">
           <p:sp>
             <p:nvSpPr>
               <p:cNvPr id="103" name="TextBox 102">
@@ -32997,8 +32998,8 @@
           </a:fontRef>
         </p:style>
       </p:cxnSp>
-      <mc:AlternateContent xmlns:mc="http://schemas.openxmlformats.org/markup-compatibility/2006">
-        <mc:Choice xmlns:a14="http://schemas.microsoft.com/office/drawing/2010/main" Requires="a14">
+      <mc:AlternateContent xmlns:mc="http://schemas.openxmlformats.org/markup-compatibility/2006" xmlns:a14="http://schemas.microsoft.com/office/drawing/2010/main">
+        <mc:Choice Requires="a14">
           <p:sp>
             <p:nvSpPr>
               <p:cNvPr id="110" name="TextBox 109">
@@ -33049,7 +33050,7 @@
             </p:txBody>
           </p:sp>
         </mc:Choice>
-        <mc:Fallback>
+        <mc:Fallback xmlns="">
           <p:sp>
             <p:nvSpPr>
               <p:cNvPr id="110" name="TextBox 109">
@@ -33094,8 +33095,8 @@
           </p:sp>
         </mc:Fallback>
       </mc:AlternateContent>
-      <mc:AlternateContent xmlns:mc="http://schemas.openxmlformats.org/markup-compatibility/2006">
-        <mc:Choice xmlns:a14="http://schemas.microsoft.com/office/drawing/2010/main" Requires="a14">
+      <mc:AlternateContent xmlns:mc="http://schemas.openxmlformats.org/markup-compatibility/2006" xmlns:a14="http://schemas.microsoft.com/office/drawing/2010/main">
+        <mc:Choice Requires="a14">
           <p:sp>
             <p:nvSpPr>
               <p:cNvPr id="112" name="TextBox 111">
@@ -33146,7 +33147,7 @@
             </p:txBody>
           </p:sp>
         </mc:Choice>
-        <mc:Fallback>
+        <mc:Fallback xmlns="">
           <p:sp>
             <p:nvSpPr>
               <p:cNvPr id="112" name="TextBox 111">
@@ -33191,8 +33192,8 @@
           </p:sp>
         </mc:Fallback>
       </mc:AlternateContent>
-      <mc:AlternateContent xmlns:mc="http://schemas.openxmlformats.org/markup-compatibility/2006">
-        <mc:Choice xmlns:a14="http://schemas.microsoft.com/office/drawing/2010/main" Requires="a14">
+      <mc:AlternateContent xmlns:mc="http://schemas.openxmlformats.org/markup-compatibility/2006" xmlns:a14="http://schemas.microsoft.com/office/drawing/2010/main">
+        <mc:Choice Requires="a14">
           <p:sp>
             <p:nvSpPr>
               <p:cNvPr id="113" name="TextBox 112">
@@ -33243,7 +33244,7 @@
             </p:txBody>
           </p:sp>
         </mc:Choice>
-        <mc:Fallback>
+        <mc:Fallback xmlns="">
           <p:sp>
             <p:nvSpPr>
               <p:cNvPr id="113" name="TextBox 112">

</xml_diff>

<commit_message>
Added gravitational energy theory
</commit_message>
<xml_diff>
--- a/theory/lecture-drawings.pptx
+++ b/theory/lecture-drawings.pptx
@@ -30,6 +30,7 @@
     <p:sldId id="279" r:id="rId24"/>
     <p:sldId id="280" r:id="rId25"/>
     <p:sldId id="281" r:id="rId26"/>
+    <p:sldId id="282" r:id="rId27"/>
   </p:sldIdLst>
   <p:sldSz cx="12192000" cy="6858000"/>
   <p:notesSz cx="6858000" cy="9144000"/>
@@ -283,7 +284,7 @@
           <a:p>
             <a:fld id="{2FDE7089-442F-4E99-86D8-0A1D11EB158F}" type="datetimeFigureOut">
               <a:rPr lang="en-US" smtClean="0"/>
-              <a:t>10/4/2024</a:t>
+              <a:t>10/10/2024</a:t>
             </a:fld>
             <a:endParaRPr lang="en-US"/>
           </a:p>
@@ -481,7 +482,7 @@
           <a:p>
             <a:fld id="{2FDE7089-442F-4E99-86D8-0A1D11EB158F}" type="datetimeFigureOut">
               <a:rPr lang="en-US" smtClean="0"/>
-              <a:t>10/4/2024</a:t>
+              <a:t>10/10/2024</a:t>
             </a:fld>
             <a:endParaRPr lang="en-US"/>
           </a:p>
@@ -689,7 +690,7 @@
           <a:p>
             <a:fld id="{2FDE7089-442F-4E99-86D8-0A1D11EB158F}" type="datetimeFigureOut">
               <a:rPr lang="en-US" smtClean="0"/>
-              <a:t>10/4/2024</a:t>
+              <a:t>10/10/2024</a:t>
             </a:fld>
             <a:endParaRPr lang="en-US"/>
           </a:p>
@@ -887,7 +888,7 @@
           <a:p>
             <a:fld id="{2FDE7089-442F-4E99-86D8-0A1D11EB158F}" type="datetimeFigureOut">
               <a:rPr lang="en-US" smtClean="0"/>
-              <a:t>10/4/2024</a:t>
+              <a:t>10/10/2024</a:t>
             </a:fld>
             <a:endParaRPr lang="en-US"/>
           </a:p>
@@ -1162,7 +1163,7 @@
           <a:p>
             <a:fld id="{2FDE7089-442F-4E99-86D8-0A1D11EB158F}" type="datetimeFigureOut">
               <a:rPr lang="en-US" smtClean="0"/>
-              <a:t>10/4/2024</a:t>
+              <a:t>10/10/2024</a:t>
             </a:fld>
             <a:endParaRPr lang="en-US"/>
           </a:p>
@@ -1427,7 +1428,7 @@
           <a:p>
             <a:fld id="{2FDE7089-442F-4E99-86D8-0A1D11EB158F}" type="datetimeFigureOut">
               <a:rPr lang="en-US" smtClean="0"/>
-              <a:t>10/4/2024</a:t>
+              <a:t>10/10/2024</a:t>
             </a:fld>
             <a:endParaRPr lang="en-US"/>
           </a:p>
@@ -1839,7 +1840,7 @@
           <a:p>
             <a:fld id="{2FDE7089-442F-4E99-86D8-0A1D11EB158F}" type="datetimeFigureOut">
               <a:rPr lang="en-US" smtClean="0"/>
-              <a:t>10/4/2024</a:t>
+              <a:t>10/10/2024</a:t>
             </a:fld>
             <a:endParaRPr lang="en-US"/>
           </a:p>
@@ -1980,7 +1981,7 @@
           <a:p>
             <a:fld id="{2FDE7089-442F-4E99-86D8-0A1D11EB158F}" type="datetimeFigureOut">
               <a:rPr lang="en-US" smtClean="0"/>
-              <a:t>10/4/2024</a:t>
+              <a:t>10/10/2024</a:t>
             </a:fld>
             <a:endParaRPr lang="en-US"/>
           </a:p>
@@ -2093,7 +2094,7 @@
           <a:p>
             <a:fld id="{2FDE7089-442F-4E99-86D8-0A1D11EB158F}" type="datetimeFigureOut">
               <a:rPr lang="en-US" smtClean="0"/>
-              <a:t>10/4/2024</a:t>
+              <a:t>10/10/2024</a:t>
             </a:fld>
             <a:endParaRPr lang="en-US"/>
           </a:p>
@@ -2404,7 +2405,7 @@
           <a:p>
             <a:fld id="{2FDE7089-442F-4E99-86D8-0A1D11EB158F}" type="datetimeFigureOut">
               <a:rPr lang="en-US" smtClean="0"/>
-              <a:t>10/4/2024</a:t>
+              <a:t>10/10/2024</a:t>
             </a:fld>
             <a:endParaRPr lang="en-US"/>
           </a:p>
@@ -2692,7 +2693,7 @@
           <a:p>
             <a:fld id="{2FDE7089-442F-4E99-86D8-0A1D11EB158F}" type="datetimeFigureOut">
               <a:rPr lang="en-US" smtClean="0"/>
-              <a:t>10/4/2024</a:t>
+              <a:t>10/10/2024</a:t>
             </a:fld>
             <a:endParaRPr lang="en-US"/>
           </a:p>
@@ -2933,7 +2934,7 @@
           <a:p>
             <a:fld id="{2FDE7089-442F-4E99-86D8-0A1D11EB158F}" type="datetimeFigureOut">
               <a:rPr lang="en-US" smtClean="0"/>
-              <a:t>10/4/2024</a:t>
+              <a:t>10/10/2024</a:t>
             </a:fld>
             <a:endParaRPr lang="en-US"/>
           </a:p>
@@ -33319,10 +33320,1773 @@
           <a:chExt cx="0" cy="0"/>
         </a:xfrm>
       </p:grpSpPr>
+      <p:sp>
+        <p:nvSpPr>
+          <p:cNvPr id="19" name="Oval 18">
+            <a:extLst>
+              <a:ext uri="{FF2B5EF4-FFF2-40B4-BE49-F238E27FC236}">
+                <a16:creationId xmlns:a16="http://schemas.microsoft.com/office/drawing/2014/main" id="{372250D4-42B0-FF42-6BA0-8EF187297F62}"/>
+              </a:ext>
+            </a:extLst>
+          </p:cNvPr>
+          <p:cNvSpPr/>
+          <p:nvPr/>
+        </p:nvSpPr>
+        <p:spPr>
+          <a:xfrm>
+            <a:off x="2090058" y="1513114"/>
+            <a:ext cx="1763486" cy="1763486"/>
+          </a:xfrm>
+          <a:prstGeom prst="ellipse">
+            <a:avLst/>
+          </a:prstGeom>
+          <a:noFill/>
+          <a:ln>
+            <a:solidFill>
+              <a:schemeClr val="tx1"/>
+            </a:solidFill>
+          </a:ln>
+        </p:spPr>
+        <p:style>
+          <a:lnRef idx="2">
+            <a:schemeClr val="accent1">
+              <a:shade val="15000"/>
+            </a:schemeClr>
+          </a:lnRef>
+          <a:fillRef idx="1">
+            <a:schemeClr val="accent1"/>
+          </a:fillRef>
+          <a:effectRef idx="0">
+            <a:schemeClr val="accent1"/>
+          </a:effectRef>
+          <a:fontRef idx="minor">
+            <a:schemeClr val="lt1"/>
+          </a:fontRef>
+        </p:style>
+        <p:txBody>
+          <a:bodyPr rtlCol="0" anchor="ctr"/>
+          <a:lstStyle/>
+          <a:p>
+            <a:pPr algn="ctr"/>
+            <a:endParaRPr lang="en-US"/>
+          </a:p>
+        </p:txBody>
+      </p:sp>
+      <p:cxnSp>
+        <p:nvCxnSpPr>
+          <p:cNvPr id="20" name="Straight Arrow Connector 19">
+            <a:extLst>
+              <a:ext uri="{FF2B5EF4-FFF2-40B4-BE49-F238E27FC236}">
+                <a16:creationId xmlns:a16="http://schemas.microsoft.com/office/drawing/2014/main" id="{E2B83D68-4661-354C-3939-66C242DEB96B}"/>
+              </a:ext>
+            </a:extLst>
+          </p:cNvPr>
+          <p:cNvCxnSpPr>
+            <a:cxnSpLocks/>
+          </p:cNvCxnSpPr>
+          <p:nvPr/>
+        </p:nvCxnSpPr>
+        <p:spPr>
+          <a:xfrm flipH="1">
+            <a:off x="2997202" y="1583267"/>
+            <a:ext cx="351365" cy="811590"/>
+          </a:xfrm>
+          <a:prstGeom prst="straightConnector1">
+            <a:avLst/>
+          </a:prstGeom>
+          <a:ln w="22225">
+            <a:solidFill>
+              <a:schemeClr val="tx1"/>
+            </a:solidFill>
+            <a:tailEnd type="none" w="med" len="lg"/>
+          </a:ln>
+        </p:spPr>
+        <p:style>
+          <a:lnRef idx="2">
+            <a:schemeClr val="accent1"/>
+          </a:lnRef>
+          <a:fillRef idx="0">
+            <a:schemeClr val="accent1"/>
+          </a:fillRef>
+          <a:effectRef idx="1">
+            <a:schemeClr val="accent1"/>
+          </a:effectRef>
+          <a:fontRef idx="minor">
+            <a:schemeClr val="tx1"/>
+          </a:fontRef>
+        </p:style>
+      </p:cxnSp>
+      <mc:AlternateContent xmlns:mc="http://schemas.openxmlformats.org/markup-compatibility/2006">
+        <mc:Choice xmlns:a14="http://schemas.microsoft.com/office/drawing/2010/main" Requires="a14">
+          <p:sp>
+            <p:nvSpPr>
+              <p:cNvPr id="23" name="TextBox 22">
+                <a:extLst>
+                  <a:ext uri="{FF2B5EF4-FFF2-40B4-BE49-F238E27FC236}">
+                    <a16:creationId xmlns:a16="http://schemas.microsoft.com/office/drawing/2014/main" id="{BBD7418E-6657-1744-715A-58F07A9FDC1D}"/>
+                  </a:ext>
+                </a:extLst>
+              </p:cNvPr>
+              <p:cNvSpPr txBox="1"/>
+              <p:nvPr/>
+            </p:nvSpPr>
+            <p:spPr>
+              <a:xfrm>
+                <a:off x="2905760" y="1704646"/>
+                <a:ext cx="267124" cy="369332"/>
+              </a:xfrm>
+              <a:prstGeom prst="rect">
+                <a:avLst/>
+              </a:prstGeom>
+              <a:noFill/>
+            </p:spPr>
+            <p:txBody>
+              <a:bodyPr wrap="none" lIns="0" tIns="0" rIns="0" bIns="0" rtlCol="0">
+                <a:spAutoFit/>
+              </a:bodyPr>
+              <a:lstStyle/>
+              <a:p>
+                <a:pPr/>
+                <a14:m>
+                  <m:oMathPara xmlns:m="http://schemas.openxmlformats.org/officeDocument/2006/math">
+                    <m:oMathParaPr>
+                      <m:jc m:val="centerGroup"/>
+                    </m:oMathParaPr>
+                    <m:oMath xmlns:m="http://schemas.openxmlformats.org/officeDocument/2006/math">
+                      <m:r>
+                        <a:rPr lang="en-US" sz="2400" i="1" smtClean="0">
+                          <a:latin typeface="Cambria Math" panose="02040503050406030204" pitchFamily="18" charset="0"/>
+                          <a:ea typeface="Cambria Math" panose="02040503050406030204" pitchFamily="18" charset="0"/>
+                        </a:rPr>
+                        <m:t>𝑅</m:t>
+                      </m:r>
+                    </m:oMath>
+                  </m:oMathPara>
+                </a14:m>
+                <a:endParaRPr lang="en-US" sz="2400" dirty="0"/>
+              </a:p>
+            </p:txBody>
+          </p:sp>
+        </mc:Choice>
+        <mc:Fallback>
+          <p:sp>
+            <p:nvSpPr>
+              <p:cNvPr id="23" name="TextBox 22">
+                <a:extLst>
+                  <a:ext uri="{FF2B5EF4-FFF2-40B4-BE49-F238E27FC236}">
+                    <a16:creationId xmlns:a16="http://schemas.microsoft.com/office/drawing/2014/main" id="{BBD7418E-6657-1744-715A-58F07A9FDC1D}"/>
+                  </a:ext>
+                </a:extLst>
+              </p:cNvPr>
+              <p:cNvSpPr txBox="1">
+                <a:spLocks noRot="1" noChangeAspect="1" noMove="1" noResize="1" noEditPoints="1" noAdjustHandles="1" noChangeArrowheads="1" noChangeShapeType="1" noTextEdit="1"/>
+              </p:cNvSpPr>
+              <p:nvPr/>
+            </p:nvSpPr>
+            <p:spPr>
+              <a:xfrm>
+                <a:off x="2905760" y="1704646"/>
+                <a:ext cx="267124" cy="369332"/>
+              </a:xfrm>
+              <a:prstGeom prst="rect">
+                <a:avLst/>
+              </a:prstGeom>
+              <a:blipFill>
+                <a:blip r:embed="rId2"/>
+                <a:stretch>
+                  <a:fillRect l="-30233" r="-25581" b="-5000"/>
+                </a:stretch>
+              </a:blipFill>
+            </p:spPr>
+            <p:txBody>
+              <a:bodyPr/>
+              <a:lstStyle/>
+              <a:p>
+                <a:r>
+                  <a:rPr lang="en-US">
+                    <a:noFill/>
+                  </a:rPr>
+                  <a:t> </a:t>
+                </a:r>
+              </a:p>
+            </p:txBody>
+          </p:sp>
+        </mc:Fallback>
+      </mc:AlternateContent>
+      <p:cxnSp>
+        <p:nvCxnSpPr>
+          <p:cNvPr id="24" name="Straight Arrow Connector 23">
+            <a:extLst>
+              <a:ext uri="{FF2B5EF4-FFF2-40B4-BE49-F238E27FC236}">
+                <a16:creationId xmlns:a16="http://schemas.microsoft.com/office/drawing/2014/main" id="{096ACADD-E170-13BA-E617-64627459449A}"/>
+              </a:ext>
+            </a:extLst>
+          </p:cNvPr>
+          <p:cNvCxnSpPr>
+            <a:cxnSpLocks/>
+          </p:cNvCxnSpPr>
+          <p:nvPr/>
+        </p:nvCxnSpPr>
+        <p:spPr>
+          <a:xfrm flipH="1">
+            <a:off x="3004159" y="2394857"/>
+            <a:ext cx="2336191" cy="0"/>
+          </a:xfrm>
+          <a:prstGeom prst="straightConnector1">
+            <a:avLst/>
+          </a:prstGeom>
+          <a:ln w="19050">
+            <a:solidFill>
+              <a:schemeClr val="tx1"/>
+            </a:solidFill>
+            <a:tailEnd type="none" w="med" len="lg"/>
+          </a:ln>
+        </p:spPr>
+        <p:style>
+          <a:lnRef idx="2">
+            <a:schemeClr val="accent1"/>
+          </a:lnRef>
+          <a:fillRef idx="0">
+            <a:schemeClr val="accent1"/>
+          </a:fillRef>
+          <a:effectRef idx="1">
+            <a:schemeClr val="accent1"/>
+          </a:effectRef>
+          <a:fontRef idx="minor">
+            <a:schemeClr val="tx1"/>
+          </a:fontRef>
+        </p:style>
+      </p:cxnSp>
+      <p:cxnSp>
+        <p:nvCxnSpPr>
+          <p:cNvPr id="26" name="Straight Arrow Connector 25">
+            <a:extLst>
+              <a:ext uri="{FF2B5EF4-FFF2-40B4-BE49-F238E27FC236}">
+                <a16:creationId xmlns:a16="http://schemas.microsoft.com/office/drawing/2014/main" id="{931D2879-BD7E-6873-A603-7CB85AF4C9F7}"/>
+              </a:ext>
+            </a:extLst>
+          </p:cNvPr>
+          <p:cNvCxnSpPr>
+            <a:cxnSpLocks/>
+          </p:cNvCxnSpPr>
+          <p:nvPr/>
+        </p:nvCxnSpPr>
+        <p:spPr>
+          <a:xfrm flipH="1">
+            <a:off x="5340350" y="2394857"/>
+            <a:ext cx="1023015" cy="0"/>
+          </a:xfrm>
+          <a:prstGeom prst="straightConnector1">
+            <a:avLst/>
+          </a:prstGeom>
+          <a:ln w="28575">
+            <a:solidFill>
+              <a:schemeClr val="tx1"/>
+            </a:solidFill>
+            <a:prstDash val="solid"/>
+            <a:headEnd type="stealth" w="med" len="lg"/>
+            <a:tailEnd type="none" w="med" len="sm"/>
+          </a:ln>
+        </p:spPr>
+        <p:style>
+          <a:lnRef idx="1">
+            <a:schemeClr val="accent1"/>
+          </a:lnRef>
+          <a:fillRef idx="0">
+            <a:schemeClr val="accent1"/>
+          </a:fillRef>
+          <a:effectRef idx="0">
+            <a:schemeClr val="accent1"/>
+          </a:effectRef>
+          <a:fontRef idx="minor">
+            <a:schemeClr val="tx1"/>
+          </a:fontRef>
+        </p:style>
+      </p:cxnSp>
+      <mc:AlternateContent xmlns:mc="http://schemas.openxmlformats.org/markup-compatibility/2006">
+        <mc:Choice xmlns:a14="http://schemas.microsoft.com/office/drawing/2010/main" Requires="a14">
+          <p:sp>
+            <p:nvSpPr>
+              <p:cNvPr id="28" name="TextBox 27">
+                <a:extLst>
+                  <a:ext uri="{FF2B5EF4-FFF2-40B4-BE49-F238E27FC236}">
+                    <a16:creationId xmlns:a16="http://schemas.microsoft.com/office/drawing/2014/main" id="{F70A8ECF-D261-5530-B8FA-42758E401B56}"/>
+                  </a:ext>
+                </a:extLst>
+              </p:cNvPr>
+              <p:cNvSpPr txBox="1"/>
+              <p:nvPr/>
+            </p:nvSpPr>
+            <p:spPr>
+              <a:xfrm>
+                <a:off x="4495565" y="2057471"/>
+                <a:ext cx="215123" cy="369332"/>
+              </a:xfrm>
+              <a:prstGeom prst="rect">
+                <a:avLst/>
+              </a:prstGeom>
+              <a:noFill/>
+            </p:spPr>
+            <p:txBody>
+              <a:bodyPr wrap="none" lIns="0" tIns="0" rIns="0" bIns="0" rtlCol="0">
+                <a:spAutoFit/>
+              </a:bodyPr>
+              <a:lstStyle/>
+              <a:p>
+                <a:pPr/>
+                <a14:m>
+                  <m:oMathPara xmlns:m="http://schemas.openxmlformats.org/officeDocument/2006/math">
+                    <m:oMathParaPr>
+                      <m:jc m:val="centerGroup"/>
+                    </m:oMathParaPr>
+                    <m:oMath xmlns:m="http://schemas.openxmlformats.org/officeDocument/2006/math">
+                      <m:r>
+                        <a:rPr lang="en-US" sz="2400" b="0" i="1" smtClean="0">
+                          <a:latin typeface="Cambria Math" panose="02040503050406030204" pitchFamily="18" charset="0"/>
+                          <a:ea typeface="Cambria Math" panose="02040503050406030204" pitchFamily="18" charset="0"/>
+                        </a:rPr>
+                        <m:t>𝑟</m:t>
+                      </m:r>
+                    </m:oMath>
+                  </m:oMathPara>
+                </a14:m>
+                <a:endParaRPr lang="en-US" sz="2400" dirty="0"/>
+              </a:p>
+            </p:txBody>
+          </p:sp>
+        </mc:Choice>
+        <mc:Fallback>
+          <p:sp>
+            <p:nvSpPr>
+              <p:cNvPr id="28" name="TextBox 27">
+                <a:extLst>
+                  <a:ext uri="{FF2B5EF4-FFF2-40B4-BE49-F238E27FC236}">
+                    <a16:creationId xmlns:a16="http://schemas.microsoft.com/office/drawing/2014/main" id="{F70A8ECF-D261-5530-B8FA-42758E401B56}"/>
+                  </a:ext>
+                </a:extLst>
+              </p:cNvPr>
+              <p:cNvSpPr txBox="1">
+                <a:spLocks noRot="1" noChangeAspect="1" noMove="1" noResize="1" noEditPoints="1" noAdjustHandles="1" noChangeArrowheads="1" noChangeShapeType="1" noTextEdit="1"/>
+              </p:cNvSpPr>
+              <p:nvPr/>
+            </p:nvSpPr>
+            <p:spPr>
+              <a:xfrm>
+                <a:off x="4495565" y="2057471"/>
+                <a:ext cx="215123" cy="369332"/>
+              </a:xfrm>
+              <a:prstGeom prst="rect">
+                <a:avLst/>
+              </a:prstGeom>
+              <a:blipFill>
+                <a:blip r:embed="rId3"/>
+                <a:stretch>
+                  <a:fillRect l="-19444" r="-16667"/>
+                </a:stretch>
+              </a:blipFill>
+            </p:spPr>
+            <p:txBody>
+              <a:bodyPr/>
+              <a:lstStyle/>
+              <a:p>
+                <a:r>
+                  <a:rPr lang="en-US">
+                    <a:noFill/>
+                  </a:rPr>
+                  <a:t> </a:t>
+                </a:r>
+              </a:p>
+            </p:txBody>
+          </p:sp>
+        </mc:Fallback>
+      </mc:AlternateContent>
+      <p:sp>
+        <p:nvSpPr>
+          <p:cNvPr id="29" name="Oval 28">
+            <a:extLst>
+              <a:ext uri="{FF2B5EF4-FFF2-40B4-BE49-F238E27FC236}">
+                <a16:creationId xmlns:a16="http://schemas.microsoft.com/office/drawing/2014/main" id="{4F31BE4C-5942-CFEC-D144-1F92028FD979}"/>
+              </a:ext>
+            </a:extLst>
+          </p:cNvPr>
+          <p:cNvSpPr/>
+          <p:nvPr/>
+        </p:nvSpPr>
+        <p:spPr>
+          <a:xfrm>
+            <a:off x="5305258" y="2363230"/>
+            <a:ext cx="70183" cy="66067"/>
+          </a:xfrm>
+          <a:prstGeom prst="ellipse">
+            <a:avLst/>
+          </a:prstGeom>
+          <a:solidFill>
+            <a:schemeClr val="tx1"/>
+          </a:solidFill>
+          <a:ln>
+            <a:noFill/>
+          </a:ln>
+        </p:spPr>
+        <p:style>
+          <a:lnRef idx="2">
+            <a:schemeClr val="accent1">
+              <a:shade val="15000"/>
+            </a:schemeClr>
+          </a:lnRef>
+          <a:fillRef idx="1">
+            <a:schemeClr val="accent1"/>
+          </a:fillRef>
+          <a:effectRef idx="0">
+            <a:schemeClr val="accent1"/>
+          </a:effectRef>
+          <a:fontRef idx="minor">
+            <a:schemeClr val="lt1"/>
+          </a:fontRef>
+        </p:style>
+        <p:txBody>
+          <a:bodyPr rtlCol="0" anchor="ctr"/>
+          <a:lstStyle/>
+          <a:p>
+            <a:pPr algn="ctr"/>
+            <a:endParaRPr lang="en-US"/>
+          </a:p>
+        </p:txBody>
+      </p:sp>
+      <mc:AlternateContent xmlns:mc="http://schemas.openxmlformats.org/markup-compatibility/2006">
+        <mc:Choice xmlns:a14="http://schemas.microsoft.com/office/drawing/2010/main" Requires="a14">
+          <p:sp>
+            <p:nvSpPr>
+              <p:cNvPr id="30" name="TextBox 29">
+                <a:extLst>
+                  <a:ext uri="{FF2B5EF4-FFF2-40B4-BE49-F238E27FC236}">
+                    <a16:creationId xmlns:a16="http://schemas.microsoft.com/office/drawing/2014/main" id="{33127470-809A-AFF2-96F7-DCD0B68D11E8}"/>
+                  </a:ext>
+                </a:extLst>
+              </p:cNvPr>
+              <p:cNvSpPr txBox="1"/>
+              <p:nvPr/>
+            </p:nvSpPr>
+            <p:spPr>
+              <a:xfrm>
+                <a:off x="5567714" y="2057471"/>
+                <a:ext cx="397866" cy="369332"/>
+              </a:xfrm>
+              <a:prstGeom prst="rect">
+                <a:avLst/>
+              </a:prstGeom>
+              <a:noFill/>
+            </p:spPr>
+            <p:txBody>
+              <a:bodyPr wrap="none" lIns="0" tIns="0" rIns="0" bIns="0" rtlCol="0">
+                <a:spAutoFit/>
+              </a:bodyPr>
+              <a:lstStyle/>
+              <a:p>
+                <a:pPr/>
+                <a14:m>
+                  <m:oMathPara xmlns:m="http://schemas.openxmlformats.org/officeDocument/2006/math">
+                    <m:oMathParaPr>
+                      <m:jc m:val="centerGroup"/>
+                    </m:oMathParaPr>
+                    <m:oMath xmlns:m="http://schemas.openxmlformats.org/officeDocument/2006/math">
+                      <m:r>
+                        <a:rPr lang="en-US" sz="2400" b="0" i="1" smtClean="0">
+                          <a:latin typeface="Cambria Math" panose="02040503050406030204" pitchFamily="18" charset="0"/>
+                          <a:ea typeface="Cambria Math" panose="02040503050406030204" pitchFamily="18" charset="0"/>
+                        </a:rPr>
+                        <m:t>∆</m:t>
+                      </m:r>
+                      <m:r>
+                        <a:rPr lang="en-US" sz="2400" b="0" i="1" smtClean="0">
+                          <a:latin typeface="Cambria Math" panose="02040503050406030204" pitchFamily="18" charset="0"/>
+                          <a:ea typeface="Cambria Math" panose="02040503050406030204" pitchFamily="18" charset="0"/>
+                        </a:rPr>
+                        <m:t>𝑟</m:t>
+                      </m:r>
+                    </m:oMath>
+                  </m:oMathPara>
+                </a14:m>
+                <a:endParaRPr lang="en-US" sz="2400" dirty="0"/>
+              </a:p>
+            </p:txBody>
+          </p:sp>
+        </mc:Choice>
+        <mc:Fallback>
+          <p:sp>
+            <p:nvSpPr>
+              <p:cNvPr id="30" name="TextBox 29">
+                <a:extLst>
+                  <a:ext uri="{FF2B5EF4-FFF2-40B4-BE49-F238E27FC236}">
+                    <a16:creationId xmlns:a16="http://schemas.microsoft.com/office/drawing/2014/main" id="{33127470-809A-AFF2-96F7-DCD0B68D11E8}"/>
+                  </a:ext>
+                </a:extLst>
+              </p:cNvPr>
+              <p:cNvSpPr txBox="1">
+                <a:spLocks noRot="1" noChangeAspect="1" noMove="1" noResize="1" noEditPoints="1" noAdjustHandles="1" noChangeArrowheads="1" noChangeShapeType="1" noTextEdit="1"/>
+              </p:cNvSpPr>
+              <p:nvPr/>
+            </p:nvSpPr>
+            <p:spPr>
+              <a:xfrm>
+                <a:off x="5567714" y="2057471"/>
+                <a:ext cx="397866" cy="369332"/>
+              </a:xfrm>
+              <a:prstGeom prst="rect">
+                <a:avLst/>
+              </a:prstGeom>
+              <a:blipFill>
+                <a:blip r:embed="rId4"/>
+                <a:stretch>
+                  <a:fillRect l="-18182" r="-9091" b="-5000"/>
+                </a:stretch>
+              </a:blipFill>
+            </p:spPr>
+            <p:txBody>
+              <a:bodyPr/>
+              <a:lstStyle/>
+              <a:p>
+                <a:r>
+                  <a:rPr lang="en-US">
+                    <a:noFill/>
+                  </a:rPr>
+                  <a:t> </a:t>
+                </a:r>
+              </a:p>
+            </p:txBody>
+          </p:sp>
+        </mc:Fallback>
+      </mc:AlternateContent>
+      <p:sp>
+        <p:nvSpPr>
+          <p:cNvPr id="32" name="Oval 31">
+            <a:extLst>
+              <a:ext uri="{FF2B5EF4-FFF2-40B4-BE49-F238E27FC236}">
+                <a16:creationId xmlns:a16="http://schemas.microsoft.com/office/drawing/2014/main" id="{AA526F24-6F8F-FF35-C6B7-4717529FC264}"/>
+              </a:ext>
+            </a:extLst>
+          </p:cNvPr>
+          <p:cNvSpPr/>
+          <p:nvPr/>
+        </p:nvSpPr>
+        <p:spPr>
+          <a:xfrm>
+            <a:off x="2962110" y="2361521"/>
+            <a:ext cx="70183" cy="66067"/>
+          </a:xfrm>
+          <a:prstGeom prst="ellipse">
+            <a:avLst/>
+          </a:prstGeom>
+          <a:solidFill>
+            <a:schemeClr val="tx1"/>
+          </a:solidFill>
+          <a:ln>
+            <a:noFill/>
+          </a:ln>
+        </p:spPr>
+        <p:style>
+          <a:lnRef idx="2">
+            <a:schemeClr val="accent1">
+              <a:shade val="15000"/>
+            </a:schemeClr>
+          </a:lnRef>
+          <a:fillRef idx="1">
+            <a:schemeClr val="accent1"/>
+          </a:fillRef>
+          <a:effectRef idx="0">
+            <a:schemeClr val="accent1"/>
+          </a:effectRef>
+          <a:fontRef idx="minor">
+            <a:schemeClr val="lt1"/>
+          </a:fontRef>
+        </p:style>
+        <p:txBody>
+          <a:bodyPr rtlCol="0" anchor="ctr"/>
+          <a:lstStyle/>
+          <a:p>
+            <a:pPr algn="ctr"/>
+            <a:endParaRPr lang="en-US"/>
+          </a:p>
+        </p:txBody>
+      </p:sp>
     </p:spTree>
     <p:extLst>
       <p:ext uri="{BB962C8B-B14F-4D97-AF65-F5344CB8AC3E}">
         <p14:creationId xmlns:p14="http://schemas.microsoft.com/office/powerpoint/2010/main" val="3085883213"/>
+      </p:ext>
+    </p:extLst>
+  </p:cSld>
+  <p:clrMapOvr>
+    <a:masterClrMapping/>
+  </p:clrMapOvr>
+</p:sld>
+</file>
+
+<file path=ppt/slides/slide26.xml><?xml version="1.0" encoding="utf-8"?>
+<p:sld xmlns:a="http://schemas.openxmlformats.org/drawingml/2006/main" xmlns:r="http://schemas.openxmlformats.org/officeDocument/2006/relationships" xmlns:p="http://schemas.openxmlformats.org/presentationml/2006/main">
+  <p:cSld>
+    <p:spTree>
+      <p:nvGrpSpPr>
+        <p:cNvPr id="1" name=""/>
+        <p:cNvGrpSpPr/>
+        <p:nvPr/>
+      </p:nvGrpSpPr>
+      <p:grpSpPr>
+        <a:xfrm>
+          <a:off x="0" y="0"/>
+          <a:ext cx="0" cy="0"/>
+          <a:chOff x="0" y="0"/>
+          <a:chExt cx="0" cy="0"/>
+        </a:xfrm>
+      </p:grpSpPr>
+      <p:cxnSp>
+        <p:nvCxnSpPr>
+          <p:cNvPr id="20" name="Straight Connector 19">
+            <a:extLst>
+              <a:ext uri="{FF2B5EF4-FFF2-40B4-BE49-F238E27FC236}">
+                <a16:creationId xmlns:a16="http://schemas.microsoft.com/office/drawing/2014/main" id="{3097782A-A343-0EB2-DAE5-3C11E54D7C14}"/>
+              </a:ext>
+            </a:extLst>
+          </p:cNvPr>
+          <p:cNvCxnSpPr>
+            <a:cxnSpLocks/>
+          </p:cNvCxnSpPr>
+          <p:nvPr/>
+        </p:nvCxnSpPr>
+        <p:spPr>
+          <a:xfrm flipH="1">
+            <a:off x="6015695" y="2977922"/>
+            <a:ext cx="925736" cy="1110041"/>
+          </a:xfrm>
+          <a:prstGeom prst="line">
+            <a:avLst/>
+          </a:prstGeom>
+          <a:ln w="19050">
+            <a:solidFill>
+              <a:schemeClr val="tx1"/>
+            </a:solidFill>
+            <a:prstDash val="solid"/>
+          </a:ln>
+        </p:spPr>
+        <p:style>
+          <a:lnRef idx="1">
+            <a:schemeClr val="accent1"/>
+          </a:lnRef>
+          <a:fillRef idx="0">
+            <a:schemeClr val="accent1"/>
+          </a:fillRef>
+          <a:effectRef idx="0">
+            <a:schemeClr val="accent1"/>
+          </a:effectRef>
+          <a:fontRef idx="minor">
+            <a:schemeClr val="tx1"/>
+          </a:fontRef>
+        </p:style>
+      </p:cxnSp>
+      <p:cxnSp>
+        <p:nvCxnSpPr>
+          <p:cNvPr id="4" name="Straight Connector 3">
+            <a:extLst>
+              <a:ext uri="{FF2B5EF4-FFF2-40B4-BE49-F238E27FC236}">
+                <a16:creationId xmlns:a16="http://schemas.microsoft.com/office/drawing/2014/main" id="{EBFEBC60-8E2D-8368-BFAF-8C24B4AAF351}"/>
+              </a:ext>
+            </a:extLst>
+          </p:cNvPr>
+          <p:cNvCxnSpPr>
+            <a:cxnSpLocks/>
+            <a:stCxn id="6" idx="0"/>
+            <a:endCxn id="6" idx="4"/>
+          </p:cNvCxnSpPr>
+          <p:nvPr/>
+        </p:nvCxnSpPr>
+        <p:spPr>
+          <a:xfrm flipV="1">
+            <a:off x="2899973" y="2955549"/>
+            <a:ext cx="4707328" cy="1"/>
+          </a:xfrm>
+          <a:prstGeom prst="line">
+            <a:avLst/>
+          </a:prstGeom>
+          <a:ln w="15875">
+            <a:solidFill>
+              <a:schemeClr val="tx1"/>
+            </a:solidFill>
+            <a:prstDash val="dash"/>
+          </a:ln>
+        </p:spPr>
+        <p:style>
+          <a:lnRef idx="1">
+            <a:schemeClr val="accent1"/>
+          </a:lnRef>
+          <a:fillRef idx="0">
+            <a:schemeClr val="accent1"/>
+          </a:fillRef>
+          <a:effectRef idx="0">
+            <a:schemeClr val="accent1"/>
+          </a:effectRef>
+          <a:fontRef idx="minor">
+            <a:schemeClr val="tx1"/>
+          </a:fontRef>
+        </p:style>
+      </p:cxnSp>
+      <p:sp>
+        <p:nvSpPr>
+          <p:cNvPr id="6" name="Oval 5">
+            <a:extLst>
+              <a:ext uri="{FF2B5EF4-FFF2-40B4-BE49-F238E27FC236}">
+                <a16:creationId xmlns:a16="http://schemas.microsoft.com/office/drawing/2014/main" id="{A8CB709D-D53C-A484-7B77-B03DFC8F4B1E}"/>
+              </a:ext>
+            </a:extLst>
+          </p:cNvPr>
+          <p:cNvSpPr/>
+          <p:nvPr/>
+        </p:nvSpPr>
+        <p:spPr>
+          <a:xfrm rot="16200000">
+            <a:off x="4081086" y="601886"/>
+            <a:ext cx="2345101" cy="4707328"/>
+          </a:xfrm>
+          <a:prstGeom prst="ellipse">
+            <a:avLst/>
+          </a:prstGeom>
+          <a:noFill/>
+          <a:ln w="38100">
+            <a:solidFill>
+              <a:schemeClr val="tx1"/>
+            </a:solidFill>
+            <a:prstDash val="solid"/>
+          </a:ln>
+        </p:spPr>
+        <p:style>
+          <a:lnRef idx="2">
+            <a:schemeClr val="accent1">
+              <a:shade val="15000"/>
+            </a:schemeClr>
+          </a:lnRef>
+          <a:fillRef idx="1">
+            <a:schemeClr val="accent1"/>
+          </a:fillRef>
+          <a:effectRef idx="0">
+            <a:schemeClr val="accent1"/>
+          </a:effectRef>
+          <a:fontRef idx="minor">
+            <a:schemeClr val="lt1"/>
+          </a:fontRef>
+        </p:style>
+        <p:txBody>
+          <a:bodyPr rtlCol="0" anchor="ctr"/>
+          <a:lstStyle/>
+          <a:p>
+            <a:pPr algn="ctr"/>
+            <a:endParaRPr lang="en-US"/>
+          </a:p>
+        </p:txBody>
+      </p:sp>
+      <p:sp>
+        <p:nvSpPr>
+          <p:cNvPr id="7" name="Oval 6">
+            <a:extLst>
+              <a:ext uri="{FF2B5EF4-FFF2-40B4-BE49-F238E27FC236}">
+                <a16:creationId xmlns:a16="http://schemas.microsoft.com/office/drawing/2014/main" id="{9CFF764C-5DF5-92CD-D35F-8EBFEFF8C29C}"/>
+              </a:ext>
+            </a:extLst>
+          </p:cNvPr>
+          <p:cNvSpPr/>
+          <p:nvPr/>
+        </p:nvSpPr>
+        <p:spPr>
+          <a:xfrm>
+            <a:off x="5225202" y="2920160"/>
+            <a:ext cx="56867" cy="58829"/>
+          </a:xfrm>
+          <a:prstGeom prst="ellipse">
+            <a:avLst/>
+          </a:prstGeom>
+          <a:solidFill>
+            <a:schemeClr val="tx1"/>
+          </a:solidFill>
+          <a:ln>
+            <a:solidFill>
+              <a:schemeClr val="tx1"/>
+            </a:solidFill>
+          </a:ln>
+        </p:spPr>
+        <p:style>
+          <a:lnRef idx="2">
+            <a:schemeClr val="accent1">
+              <a:shade val="50000"/>
+            </a:schemeClr>
+          </a:lnRef>
+          <a:fillRef idx="1">
+            <a:schemeClr val="accent1"/>
+          </a:fillRef>
+          <a:effectRef idx="0">
+            <a:schemeClr val="accent1"/>
+          </a:effectRef>
+          <a:fontRef idx="minor">
+            <a:schemeClr val="lt1"/>
+          </a:fontRef>
+        </p:style>
+        <p:txBody>
+          <a:bodyPr rtlCol="0" anchor="ctr"/>
+          <a:lstStyle/>
+          <a:p>
+            <a:pPr algn="ctr"/>
+            <a:endParaRPr lang="en-US"/>
+          </a:p>
+        </p:txBody>
+      </p:sp>
+      <p:cxnSp>
+        <p:nvCxnSpPr>
+          <p:cNvPr id="9" name="Straight Arrow Connector 8">
+            <a:extLst>
+              <a:ext uri="{FF2B5EF4-FFF2-40B4-BE49-F238E27FC236}">
+                <a16:creationId xmlns:a16="http://schemas.microsoft.com/office/drawing/2014/main" id="{4C24E4B9-B60B-E83B-282C-86A29040E2B6}"/>
+              </a:ext>
+            </a:extLst>
+          </p:cNvPr>
+          <p:cNvCxnSpPr>
+            <a:cxnSpLocks/>
+          </p:cNvCxnSpPr>
+          <p:nvPr/>
+        </p:nvCxnSpPr>
+        <p:spPr>
+          <a:xfrm flipV="1">
+            <a:off x="3744383" y="1802561"/>
+            <a:ext cx="842951" cy="120820"/>
+          </a:xfrm>
+          <a:prstGeom prst="straightConnector1">
+            <a:avLst/>
+          </a:prstGeom>
+          <a:ln w="38100">
+            <a:solidFill>
+              <a:schemeClr val="tx1"/>
+            </a:solidFill>
+            <a:prstDash val="solid"/>
+            <a:headEnd type="stealth" w="med" len="lg"/>
+            <a:tailEnd type="none" w="med" len="med"/>
+          </a:ln>
+        </p:spPr>
+        <p:style>
+          <a:lnRef idx="1">
+            <a:schemeClr val="accent1"/>
+          </a:lnRef>
+          <a:fillRef idx="0">
+            <a:schemeClr val="accent1"/>
+          </a:fillRef>
+          <a:effectRef idx="0">
+            <a:schemeClr val="accent1"/>
+          </a:effectRef>
+          <a:fontRef idx="minor">
+            <a:schemeClr val="tx1"/>
+          </a:fontRef>
+        </p:style>
+      </p:cxnSp>
+      <p:cxnSp>
+        <p:nvCxnSpPr>
+          <p:cNvPr id="11" name="Straight Connector 10">
+            <a:extLst>
+              <a:ext uri="{FF2B5EF4-FFF2-40B4-BE49-F238E27FC236}">
+                <a16:creationId xmlns:a16="http://schemas.microsoft.com/office/drawing/2014/main" id="{546C8D70-64AE-F697-8ECD-0076AC6FC11C}"/>
+              </a:ext>
+            </a:extLst>
+          </p:cNvPr>
+          <p:cNvCxnSpPr>
+            <a:cxnSpLocks/>
+          </p:cNvCxnSpPr>
+          <p:nvPr/>
+        </p:nvCxnSpPr>
+        <p:spPr>
+          <a:xfrm>
+            <a:off x="5253635" y="1803850"/>
+            <a:ext cx="2" cy="2324251"/>
+          </a:xfrm>
+          <a:prstGeom prst="line">
+            <a:avLst/>
+          </a:prstGeom>
+          <a:ln w="15875">
+            <a:solidFill>
+              <a:schemeClr val="tx1"/>
+            </a:solidFill>
+            <a:prstDash val="dash"/>
+          </a:ln>
+        </p:spPr>
+        <p:style>
+          <a:lnRef idx="1">
+            <a:schemeClr val="accent1"/>
+          </a:lnRef>
+          <a:fillRef idx="0">
+            <a:schemeClr val="accent1"/>
+          </a:fillRef>
+          <a:effectRef idx="0">
+            <a:schemeClr val="accent1"/>
+          </a:effectRef>
+          <a:fontRef idx="minor">
+            <a:schemeClr val="tx1"/>
+          </a:fontRef>
+        </p:style>
+      </p:cxnSp>
+      <mc:AlternateContent xmlns:mc="http://schemas.openxmlformats.org/markup-compatibility/2006">
+        <mc:Choice xmlns:a14="http://schemas.microsoft.com/office/drawing/2010/main" Requires="a14">
+          <p:sp>
+            <p:nvSpPr>
+              <p:cNvPr id="12" name="TextBox 11">
+                <a:extLst>
+                  <a:ext uri="{FF2B5EF4-FFF2-40B4-BE49-F238E27FC236}">
+                    <a16:creationId xmlns:a16="http://schemas.microsoft.com/office/drawing/2014/main" id="{042F10E4-8644-A6C2-EBC8-D300D4790301}"/>
+                  </a:ext>
+                </a:extLst>
+              </p:cNvPr>
+              <p:cNvSpPr txBox="1"/>
+              <p:nvPr/>
+            </p:nvSpPr>
+            <p:spPr>
+              <a:xfrm>
+                <a:off x="3774614" y="1468785"/>
+                <a:ext cx="452207" cy="369332"/>
+              </a:xfrm>
+              <a:prstGeom prst="rect">
+                <a:avLst/>
+              </a:prstGeom>
+              <a:noFill/>
+            </p:spPr>
+            <p:txBody>
+              <a:bodyPr wrap="square" lIns="0" tIns="0" rIns="0" bIns="0" rtlCol="0">
+                <a:spAutoFit/>
+              </a:bodyPr>
+              <a:lstStyle/>
+              <a:p>
+                <a:pPr/>
+                <a14:m>
+                  <m:oMathPara xmlns:m="http://schemas.openxmlformats.org/officeDocument/2006/math">
+                    <m:oMathParaPr>
+                      <m:jc m:val="centerGroup"/>
+                    </m:oMathParaPr>
+                    <m:oMath xmlns:m="http://schemas.openxmlformats.org/officeDocument/2006/math">
+                      <m:sSub>
+                        <m:sSubPr>
+                          <m:ctrlPr>
+                            <a:rPr lang="en-US" sz="2400" i="1" smtClean="0">
+                              <a:latin typeface="Cambria Math" panose="02040503050406030204" pitchFamily="18" charset="0"/>
+                            </a:rPr>
+                          </m:ctrlPr>
+                        </m:sSubPr>
+                        <m:e>
+                          <m:acc>
+                            <m:accPr>
+                              <m:chr m:val="⃗"/>
+                              <m:ctrlPr>
+                                <a:rPr lang="en-US" sz="2400" i="1">
+                                  <a:latin typeface="Cambria Math" panose="02040503050406030204" pitchFamily="18" charset="0"/>
+                                </a:rPr>
+                              </m:ctrlPr>
+                            </m:accPr>
+                            <m:e>
+                              <m:r>
+                                <a:rPr lang="en-US" sz="2400" i="1" smtClean="0">
+                                  <a:latin typeface="Cambria Math" panose="02040503050406030204" pitchFamily="18" charset="0"/>
+                                </a:rPr>
+                                <m:t>𝑣</m:t>
+                              </m:r>
+                            </m:e>
+                          </m:acc>
+                        </m:e>
+                        <m:sub>
+                          <m:r>
+                            <a:rPr lang="en-US" sz="2400" b="0" i="1" smtClean="0">
+                              <a:latin typeface="Cambria Math" panose="02040503050406030204" pitchFamily="18" charset="0"/>
+                            </a:rPr>
+                            <m:t>1</m:t>
+                          </m:r>
+                        </m:sub>
+                      </m:sSub>
+                    </m:oMath>
+                  </m:oMathPara>
+                </a14:m>
+                <a:endParaRPr lang="en-US" sz="2400" dirty="0">
+                  <a:solidFill>
+                    <a:schemeClr val="tx1"/>
+                  </a:solidFill>
+                </a:endParaRPr>
+              </a:p>
+            </p:txBody>
+          </p:sp>
+        </mc:Choice>
+        <mc:Fallback>
+          <p:sp>
+            <p:nvSpPr>
+              <p:cNvPr id="12" name="TextBox 11">
+                <a:extLst>
+                  <a:ext uri="{FF2B5EF4-FFF2-40B4-BE49-F238E27FC236}">
+                    <a16:creationId xmlns:a16="http://schemas.microsoft.com/office/drawing/2014/main" id="{042F10E4-8644-A6C2-EBC8-D300D4790301}"/>
+                  </a:ext>
+                </a:extLst>
+              </p:cNvPr>
+              <p:cNvSpPr txBox="1">
+                <a:spLocks noRot="1" noChangeAspect="1" noMove="1" noResize="1" noEditPoints="1" noAdjustHandles="1" noChangeArrowheads="1" noChangeShapeType="1" noTextEdit="1"/>
+              </p:cNvSpPr>
+              <p:nvPr/>
+            </p:nvSpPr>
+            <p:spPr>
+              <a:xfrm>
+                <a:off x="3774614" y="1468785"/>
+                <a:ext cx="452207" cy="369332"/>
+              </a:xfrm>
+              <a:prstGeom prst="rect">
+                <a:avLst/>
+              </a:prstGeom>
+              <a:blipFill>
+                <a:blip r:embed="rId2"/>
+                <a:stretch>
+                  <a:fillRect l="-2703" t="-39344" r="-63514" b="-11475"/>
+                </a:stretch>
+              </a:blipFill>
+            </p:spPr>
+            <p:txBody>
+              <a:bodyPr/>
+              <a:lstStyle/>
+              <a:p>
+                <a:r>
+                  <a:rPr lang="en-US">
+                    <a:noFill/>
+                  </a:rPr>
+                  <a:t> </a:t>
+                </a:r>
+              </a:p>
+            </p:txBody>
+          </p:sp>
+        </mc:Fallback>
+      </mc:AlternateContent>
+      <mc:AlternateContent xmlns:mc="http://schemas.openxmlformats.org/markup-compatibility/2006">
+        <mc:Choice xmlns:a14="http://schemas.microsoft.com/office/drawing/2010/main" Requires="a14">
+          <p:sp>
+            <p:nvSpPr>
+              <p:cNvPr id="13" name="TextBox 12">
+                <a:extLst>
+                  <a:ext uri="{FF2B5EF4-FFF2-40B4-BE49-F238E27FC236}">
+                    <a16:creationId xmlns:a16="http://schemas.microsoft.com/office/drawing/2014/main" id="{0325DDEA-A382-3D52-E563-874C82425397}"/>
+                  </a:ext>
+                </a:extLst>
+              </p:cNvPr>
+              <p:cNvSpPr txBox="1"/>
+              <p:nvPr/>
+            </p:nvSpPr>
+            <p:spPr>
+              <a:xfrm>
+                <a:off x="6985408" y="3040284"/>
+                <a:ext cx="452207" cy="369332"/>
+              </a:xfrm>
+              <a:prstGeom prst="rect">
+                <a:avLst/>
+              </a:prstGeom>
+              <a:noFill/>
+            </p:spPr>
+            <p:txBody>
+              <a:bodyPr wrap="square" lIns="0" tIns="0" rIns="0" bIns="0" rtlCol="0">
+                <a:spAutoFit/>
+              </a:bodyPr>
+              <a:lstStyle/>
+              <a:p>
+                <a:pPr/>
+                <a14:m>
+                  <m:oMathPara xmlns:m="http://schemas.openxmlformats.org/officeDocument/2006/math">
+                    <m:oMathParaPr>
+                      <m:jc m:val="centerGroup"/>
+                    </m:oMathParaPr>
+                    <m:oMath xmlns:m="http://schemas.openxmlformats.org/officeDocument/2006/math">
+                      <m:r>
+                        <a:rPr lang="en-US" sz="2400" b="0" i="1" smtClean="0">
+                          <a:solidFill>
+                            <a:schemeClr val="tx1"/>
+                          </a:solidFill>
+                          <a:latin typeface="Cambria Math" panose="02040503050406030204" pitchFamily="18" charset="0"/>
+                        </a:rPr>
+                        <m:t>𝑆</m:t>
+                      </m:r>
+                    </m:oMath>
+                  </m:oMathPara>
+                </a14:m>
+                <a:endParaRPr lang="en-US" sz="2400" dirty="0">
+                  <a:solidFill>
+                    <a:schemeClr val="tx1"/>
+                  </a:solidFill>
+                </a:endParaRPr>
+              </a:p>
+            </p:txBody>
+          </p:sp>
+        </mc:Choice>
+        <mc:Fallback>
+          <p:sp>
+            <p:nvSpPr>
+              <p:cNvPr id="13" name="TextBox 12">
+                <a:extLst>
+                  <a:ext uri="{FF2B5EF4-FFF2-40B4-BE49-F238E27FC236}">
+                    <a16:creationId xmlns:a16="http://schemas.microsoft.com/office/drawing/2014/main" id="{0325DDEA-A382-3D52-E563-874C82425397}"/>
+                  </a:ext>
+                </a:extLst>
+              </p:cNvPr>
+              <p:cNvSpPr txBox="1">
+                <a:spLocks noRot="1" noChangeAspect="1" noMove="1" noResize="1" noEditPoints="1" noAdjustHandles="1" noChangeArrowheads="1" noChangeShapeType="1" noTextEdit="1"/>
+              </p:cNvSpPr>
+              <p:nvPr/>
+            </p:nvSpPr>
+            <p:spPr>
+              <a:xfrm>
+                <a:off x="6985408" y="3040284"/>
+                <a:ext cx="452207" cy="369332"/>
+              </a:xfrm>
+              <a:prstGeom prst="rect">
+                <a:avLst/>
+              </a:prstGeom>
+              <a:blipFill>
+                <a:blip r:embed="rId3"/>
+                <a:stretch>
+                  <a:fillRect b="-5000"/>
+                </a:stretch>
+              </a:blipFill>
+            </p:spPr>
+            <p:txBody>
+              <a:bodyPr/>
+              <a:lstStyle/>
+              <a:p>
+                <a:r>
+                  <a:rPr lang="en-US">
+                    <a:noFill/>
+                  </a:rPr>
+                  <a:t> </a:t>
+                </a:r>
+              </a:p>
+            </p:txBody>
+          </p:sp>
+        </mc:Fallback>
+      </mc:AlternateContent>
+      <p:cxnSp>
+        <p:nvCxnSpPr>
+          <p:cNvPr id="14" name="Straight Connector 13">
+            <a:extLst>
+              <a:ext uri="{FF2B5EF4-FFF2-40B4-BE49-F238E27FC236}">
+                <a16:creationId xmlns:a16="http://schemas.microsoft.com/office/drawing/2014/main" id="{CB3A6F02-3C13-D527-78E1-967B805817AA}"/>
+              </a:ext>
+            </a:extLst>
+          </p:cNvPr>
+          <p:cNvCxnSpPr>
+            <a:cxnSpLocks/>
+          </p:cNvCxnSpPr>
+          <p:nvPr/>
+        </p:nvCxnSpPr>
+        <p:spPr>
+          <a:xfrm>
+            <a:off x="4597494" y="1850098"/>
+            <a:ext cx="2416279" cy="1116384"/>
+          </a:xfrm>
+          <a:prstGeom prst="line">
+            <a:avLst/>
+          </a:prstGeom>
+          <a:ln w="19050">
+            <a:solidFill>
+              <a:schemeClr val="tx1"/>
+            </a:solidFill>
+            <a:prstDash val="solid"/>
+          </a:ln>
+        </p:spPr>
+        <p:style>
+          <a:lnRef idx="1">
+            <a:schemeClr val="accent1"/>
+          </a:lnRef>
+          <a:fillRef idx="0">
+            <a:schemeClr val="accent1"/>
+          </a:fillRef>
+          <a:effectRef idx="0">
+            <a:schemeClr val="accent1"/>
+          </a:effectRef>
+          <a:fontRef idx="minor">
+            <a:schemeClr val="tx1"/>
+          </a:fontRef>
+        </p:style>
+      </p:cxnSp>
+      <p:sp>
+        <p:nvSpPr>
+          <p:cNvPr id="8" name="Oval 7">
+            <a:extLst>
+              <a:ext uri="{FF2B5EF4-FFF2-40B4-BE49-F238E27FC236}">
+                <a16:creationId xmlns:a16="http://schemas.microsoft.com/office/drawing/2014/main" id="{93EAD591-544C-05C7-1C86-68D8CD9B6134}"/>
+              </a:ext>
+            </a:extLst>
+          </p:cNvPr>
+          <p:cNvSpPr/>
+          <p:nvPr/>
+        </p:nvSpPr>
+        <p:spPr>
+          <a:xfrm rot="5400000">
+            <a:off x="6825595" y="2829214"/>
+            <a:ext cx="319626" cy="330656"/>
+          </a:xfrm>
+          <a:prstGeom prst="ellipse">
+            <a:avLst/>
+          </a:prstGeom>
+          <a:blipFill>
+            <a:blip r:embed="rId4"/>
+            <a:stretch>
+              <a:fillRect/>
+            </a:stretch>
+          </a:blipFill>
+          <a:ln>
+            <a:noFill/>
+          </a:ln>
+        </p:spPr>
+        <p:style>
+          <a:lnRef idx="2">
+            <a:schemeClr val="accent1">
+              <a:shade val="50000"/>
+            </a:schemeClr>
+          </a:lnRef>
+          <a:fillRef idx="1">
+            <a:schemeClr val="accent1"/>
+          </a:fillRef>
+          <a:effectRef idx="0">
+            <a:schemeClr val="accent1"/>
+          </a:effectRef>
+          <a:fontRef idx="minor">
+            <a:schemeClr val="lt1"/>
+          </a:fontRef>
+        </p:style>
+        <p:txBody>
+          <a:bodyPr rtlCol="0" anchor="ctr"/>
+          <a:lstStyle/>
+          <a:p>
+            <a:pPr algn="ctr"/>
+            <a:endParaRPr lang="en-US" dirty="0"/>
+          </a:p>
+        </p:txBody>
+      </p:sp>
+      <p:cxnSp>
+        <p:nvCxnSpPr>
+          <p:cNvPr id="17" name="Straight Arrow Connector 16">
+            <a:extLst>
+              <a:ext uri="{FF2B5EF4-FFF2-40B4-BE49-F238E27FC236}">
+                <a16:creationId xmlns:a16="http://schemas.microsoft.com/office/drawing/2014/main" id="{2DA70E6B-B3EE-E6FF-0C4B-8AAEF2E69DB4}"/>
+              </a:ext>
+            </a:extLst>
+          </p:cNvPr>
+          <p:cNvCxnSpPr>
+            <a:cxnSpLocks/>
+          </p:cNvCxnSpPr>
+          <p:nvPr/>
+        </p:nvCxnSpPr>
+        <p:spPr>
+          <a:xfrm flipH="1">
+            <a:off x="6036858" y="3891351"/>
+            <a:ext cx="685675" cy="196612"/>
+          </a:xfrm>
+          <a:prstGeom prst="straightConnector1">
+            <a:avLst/>
+          </a:prstGeom>
+          <a:ln w="38100">
+            <a:solidFill>
+              <a:schemeClr val="tx1"/>
+            </a:solidFill>
+            <a:prstDash val="solid"/>
+            <a:headEnd type="stealth" w="med" len="lg"/>
+            <a:tailEnd type="none" w="med" len="med"/>
+          </a:ln>
+        </p:spPr>
+        <p:style>
+          <a:lnRef idx="1">
+            <a:schemeClr val="accent1"/>
+          </a:lnRef>
+          <a:fillRef idx="0">
+            <a:schemeClr val="accent1"/>
+          </a:fillRef>
+          <a:effectRef idx="0">
+            <a:schemeClr val="accent1"/>
+          </a:effectRef>
+          <a:fontRef idx="minor">
+            <a:schemeClr val="tx1"/>
+          </a:fontRef>
+        </p:style>
+      </p:cxnSp>
+      <p:sp>
+        <p:nvSpPr>
+          <p:cNvPr id="16" name="Oval 15">
+            <a:extLst>
+              <a:ext uri="{FF2B5EF4-FFF2-40B4-BE49-F238E27FC236}">
+                <a16:creationId xmlns:a16="http://schemas.microsoft.com/office/drawing/2014/main" id="{FCC2BF1B-4077-9693-7195-B94A624A61A8}"/>
+              </a:ext>
+            </a:extLst>
+          </p:cNvPr>
+          <p:cNvSpPr/>
+          <p:nvPr/>
+        </p:nvSpPr>
+        <p:spPr>
+          <a:xfrm rot="10800000" flipH="1">
+            <a:off x="5795908" y="3902283"/>
+            <a:ext cx="454917" cy="339300"/>
+          </a:xfrm>
+          <a:prstGeom prst="ellipse">
+            <a:avLst/>
+          </a:prstGeom>
+          <a:blipFill>
+            <a:blip r:embed="rId5"/>
+            <a:stretch>
+              <a:fillRect/>
+            </a:stretch>
+          </a:blipFill>
+          <a:ln>
+            <a:noFill/>
+          </a:ln>
+        </p:spPr>
+        <p:style>
+          <a:lnRef idx="2">
+            <a:schemeClr val="accent1">
+              <a:shade val="50000"/>
+            </a:schemeClr>
+          </a:lnRef>
+          <a:fillRef idx="1">
+            <a:schemeClr val="accent1"/>
+          </a:fillRef>
+          <a:effectRef idx="0">
+            <a:schemeClr val="accent1"/>
+          </a:effectRef>
+          <a:fontRef idx="minor">
+            <a:schemeClr val="lt1"/>
+          </a:fontRef>
+        </p:style>
+        <p:txBody>
+          <a:bodyPr rtlCol="0" anchor="ctr"/>
+          <a:lstStyle/>
+          <a:p>
+            <a:pPr algn="ctr"/>
+            <a:endParaRPr lang="en-US"/>
+          </a:p>
+        </p:txBody>
+      </p:sp>
+      <p:sp>
+        <p:nvSpPr>
+          <p:cNvPr id="10" name="Oval 9">
+            <a:extLst>
+              <a:ext uri="{FF2B5EF4-FFF2-40B4-BE49-F238E27FC236}">
+                <a16:creationId xmlns:a16="http://schemas.microsoft.com/office/drawing/2014/main" id="{8D990D23-E0BF-699E-C375-D496E14B0718}"/>
+              </a:ext>
+            </a:extLst>
+          </p:cNvPr>
+          <p:cNvSpPr/>
+          <p:nvPr/>
+        </p:nvSpPr>
+        <p:spPr>
+          <a:xfrm rot="15895864" flipH="1">
+            <a:off x="4342242" y="1637838"/>
+            <a:ext cx="454917" cy="339300"/>
+          </a:xfrm>
+          <a:prstGeom prst="ellipse">
+            <a:avLst/>
+          </a:prstGeom>
+          <a:blipFill>
+            <a:blip r:embed="rId5"/>
+            <a:stretch>
+              <a:fillRect/>
+            </a:stretch>
+          </a:blipFill>
+          <a:ln>
+            <a:noFill/>
+          </a:ln>
+        </p:spPr>
+        <p:style>
+          <a:lnRef idx="2">
+            <a:schemeClr val="accent1">
+              <a:shade val="50000"/>
+            </a:schemeClr>
+          </a:lnRef>
+          <a:fillRef idx="1">
+            <a:schemeClr val="accent1"/>
+          </a:fillRef>
+          <a:effectRef idx="0">
+            <a:schemeClr val="accent1"/>
+          </a:effectRef>
+          <a:fontRef idx="minor">
+            <a:schemeClr val="lt1"/>
+          </a:fontRef>
+        </p:style>
+        <p:txBody>
+          <a:bodyPr rtlCol="0" anchor="ctr"/>
+          <a:lstStyle/>
+          <a:p>
+            <a:pPr algn="ctr"/>
+            <a:endParaRPr lang="en-US"/>
+          </a:p>
+        </p:txBody>
+      </p:sp>
+      <mc:AlternateContent xmlns:mc="http://schemas.openxmlformats.org/markup-compatibility/2006">
+        <mc:Choice xmlns:a14="http://schemas.microsoft.com/office/drawing/2010/main" Requires="a14">
+          <p:sp>
+            <p:nvSpPr>
+              <p:cNvPr id="19" name="TextBox 18">
+                <a:extLst>
+                  <a:ext uri="{FF2B5EF4-FFF2-40B4-BE49-F238E27FC236}">
+                    <a16:creationId xmlns:a16="http://schemas.microsoft.com/office/drawing/2014/main" id="{104CE83B-B3F3-D6D7-501E-F72E86E2AB08}"/>
+                  </a:ext>
+                </a:extLst>
+              </p:cNvPr>
+              <p:cNvSpPr txBox="1"/>
+              <p:nvPr/>
+            </p:nvSpPr>
+            <p:spPr>
+              <a:xfrm>
+                <a:off x="6388161" y="3957573"/>
+                <a:ext cx="452207" cy="369332"/>
+              </a:xfrm>
+              <a:prstGeom prst="rect">
+                <a:avLst/>
+              </a:prstGeom>
+              <a:noFill/>
+            </p:spPr>
+            <p:txBody>
+              <a:bodyPr wrap="square" lIns="0" tIns="0" rIns="0" bIns="0" rtlCol="0">
+                <a:spAutoFit/>
+              </a:bodyPr>
+              <a:lstStyle/>
+              <a:p>
+                <a:pPr/>
+                <a14:m>
+                  <m:oMathPara xmlns:m="http://schemas.openxmlformats.org/officeDocument/2006/math">
+                    <m:oMathParaPr>
+                      <m:jc m:val="centerGroup"/>
+                    </m:oMathParaPr>
+                    <m:oMath xmlns:m="http://schemas.openxmlformats.org/officeDocument/2006/math">
+                      <m:sSub>
+                        <m:sSubPr>
+                          <m:ctrlPr>
+                            <a:rPr lang="en-US" sz="2400" i="1" smtClean="0">
+                              <a:latin typeface="Cambria Math" panose="02040503050406030204" pitchFamily="18" charset="0"/>
+                            </a:rPr>
+                          </m:ctrlPr>
+                        </m:sSubPr>
+                        <m:e>
+                          <m:acc>
+                            <m:accPr>
+                              <m:chr m:val="⃗"/>
+                              <m:ctrlPr>
+                                <a:rPr lang="en-US" sz="2400" i="1">
+                                  <a:latin typeface="Cambria Math" panose="02040503050406030204" pitchFamily="18" charset="0"/>
+                                </a:rPr>
+                              </m:ctrlPr>
+                            </m:accPr>
+                            <m:e>
+                              <m:r>
+                                <a:rPr lang="en-US" sz="2400" i="1" smtClean="0">
+                                  <a:latin typeface="Cambria Math" panose="02040503050406030204" pitchFamily="18" charset="0"/>
+                                </a:rPr>
+                                <m:t>𝑣</m:t>
+                              </m:r>
+                            </m:e>
+                          </m:acc>
+                        </m:e>
+                        <m:sub>
+                          <m:r>
+                            <a:rPr lang="en-US" sz="2400" b="0" i="1" smtClean="0">
+                              <a:latin typeface="Cambria Math" panose="02040503050406030204" pitchFamily="18" charset="0"/>
+                            </a:rPr>
+                            <m:t>2</m:t>
+                          </m:r>
+                        </m:sub>
+                      </m:sSub>
+                    </m:oMath>
+                  </m:oMathPara>
+                </a14:m>
+                <a:endParaRPr lang="en-US" sz="2400" dirty="0">
+                  <a:solidFill>
+                    <a:schemeClr val="tx1"/>
+                  </a:solidFill>
+                </a:endParaRPr>
+              </a:p>
+            </p:txBody>
+          </p:sp>
+        </mc:Choice>
+        <mc:Fallback>
+          <p:sp>
+            <p:nvSpPr>
+              <p:cNvPr id="19" name="TextBox 18">
+                <a:extLst>
+                  <a:ext uri="{FF2B5EF4-FFF2-40B4-BE49-F238E27FC236}">
+                    <a16:creationId xmlns:a16="http://schemas.microsoft.com/office/drawing/2014/main" id="{104CE83B-B3F3-D6D7-501E-F72E86E2AB08}"/>
+                  </a:ext>
+                </a:extLst>
+              </p:cNvPr>
+              <p:cNvSpPr txBox="1">
+                <a:spLocks noRot="1" noChangeAspect="1" noMove="1" noResize="1" noEditPoints="1" noAdjustHandles="1" noChangeArrowheads="1" noChangeShapeType="1" noTextEdit="1"/>
+              </p:cNvSpPr>
+              <p:nvPr/>
+            </p:nvSpPr>
+            <p:spPr>
+              <a:xfrm>
+                <a:off x="6388161" y="3957573"/>
+                <a:ext cx="452207" cy="369332"/>
+              </a:xfrm>
+              <a:prstGeom prst="rect">
+                <a:avLst/>
+              </a:prstGeom>
+              <a:blipFill>
+                <a:blip r:embed="rId6"/>
+                <a:stretch>
+                  <a:fillRect l="-5405" t="-37705" r="-60811" b="-11475"/>
+                </a:stretch>
+              </a:blipFill>
+            </p:spPr>
+            <p:txBody>
+              <a:bodyPr/>
+              <a:lstStyle/>
+              <a:p>
+                <a:r>
+                  <a:rPr lang="en-US">
+                    <a:noFill/>
+                  </a:rPr>
+                  <a:t> </a:t>
+                </a:r>
+              </a:p>
+            </p:txBody>
+          </p:sp>
+        </mc:Fallback>
+      </mc:AlternateContent>
+      <mc:AlternateContent xmlns:mc="http://schemas.openxmlformats.org/markup-compatibility/2006">
+        <mc:Choice xmlns:a14="http://schemas.microsoft.com/office/drawing/2010/main" Requires="a14">
+          <p:sp>
+            <p:nvSpPr>
+              <p:cNvPr id="22" name="TextBox 21">
+                <a:extLst>
+                  <a:ext uri="{FF2B5EF4-FFF2-40B4-BE49-F238E27FC236}">
+                    <a16:creationId xmlns:a16="http://schemas.microsoft.com/office/drawing/2014/main" id="{07CAEB9B-8197-6A9A-F91F-7B0861DB4C37}"/>
+                  </a:ext>
+                </a:extLst>
+              </p:cNvPr>
+              <p:cNvSpPr txBox="1"/>
+              <p:nvPr/>
+            </p:nvSpPr>
+            <p:spPr>
+              <a:xfrm>
+                <a:off x="6053667" y="3262292"/>
+                <a:ext cx="452207" cy="369332"/>
+              </a:xfrm>
+              <a:prstGeom prst="rect">
+                <a:avLst/>
+              </a:prstGeom>
+              <a:noFill/>
+            </p:spPr>
+            <p:txBody>
+              <a:bodyPr wrap="square" lIns="0" tIns="0" rIns="0" bIns="0" rtlCol="0">
+                <a:spAutoFit/>
+              </a:bodyPr>
+              <a:lstStyle/>
+              <a:p>
+                <a:pPr/>
+                <a14:m>
+                  <m:oMathPara xmlns:m="http://schemas.openxmlformats.org/officeDocument/2006/math">
+                    <m:oMathParaPr>
+                      <m:jc m:val="centerGroup"/>
+                    </m:oMathParaPr>
+                    <m:oMath xmlns:m="http://schemas.openxmlformats.org/officeDocument/2006/math">
+                      <m:sSub>
+                        <m:sSubPr>
+                          <m:ctrlPr>
+                            <a:rPr lang="en-US" sz="2400" i="1" smtClean="0">
+                              <a:latin typeface="Cambria Math" panose="02040503050406030204" pitchFamily="18" charset="0"/>
+                            </a:rPr>
+                          </m:ctrlPr>
+                        </m:sSubPr>
+                        <m:e>
+                          <m:r>
+                            <a:rPr lang="en-US" sz="2400" b="0" i="1" smtClean="0">
+                              <a:latin typeface="Cambria Math" panose="02040503050406030204" pitchFamily="18" charset="0"/>
+                            </a:rPr>
+                            <m:t>𝑟</m:t>
+                          </m:r>
+                        </m:e>
+                        <m:sub>
+                          <m:r>
+                            <a:rPr lang="en-US" sz="2400" b="0" i="1" smtClean="0">
+                              <a:latin typeface="Cambria Math" panose="02040503050406030204" pitchFamily="18" charset="0"/>
+                            </a:rPr>
+                            <m:t>2</m:t>
+                          </m:r>
+                        </m:sub>
+                      </m:sSub>
+                    </m:oMath>
+                  </m:oMathPara>
+                </a14:m>
+                <a:endParaRPr lang="en-US" sz="2400" dirty="0">
+                  <a:solidFill>
+                    <a:schemeClr val="tx1"/>
+                  </a:solidFill>
+                </a:endParaRPr>
+              </a:p>
+            </p:txBody>
+          </p:sp>
+        </mc:Choice>
+        <mc:Fallback>
+          <p:sp>
+            <p:nvSpPr>
+              <p:cNvPr id="22" name="TextBox 21">
+                <a:extLst>
+                  <a:ext uri="{FF2B5EF4-FFF2-40B4-BE49-F238E27FC236}">
+                    <a16:creationId xmlns:a16="http://schemas.microsoft.com/office/drawing/2014/main" id="{07CAEB9B-8197-6A9A-F91F-7B0861DB4C37}"/>
+                  </a:ext>
+                </a:extLst>
+              </p:cNvPr>
+              <p:cNvSpPr txBox="1">
+                <a:spLocks noRot="1" noChangeAspect="1" noMove="1" noResize="1" noEditPoints="1" noAdjustHandles="1" noChangeArrowheads="1" noChangeShapeType="1" noTextEdit="1"/>
+              </p:cNvSpPr>
+              <p:nvPr/>
+            </p:nvSpPr>
+            <p:spPr>
+              <a:xfrm>
+                <a:off x="6053667" y="3262292"/>
+                <a:ext cx="452207" cy="369332"/>
+              </a:xfrm>
+              <a:prstGeom prst="rect">
+                <a:avLst/>
+              </a:prstGeom>
+              <a:blipFill>
+                <a:blip r:embed="rId7"/>
+                <a:stretch>
+                  <a:fillRect b="-11475"/>
+                </a:stretch>
+              </a:blipFill>
+            </p:spPr>
+            <p:txBody>
+              <a:bodyPr/>
+              <a:lstStyle/>
+              <a:p>
+                <a:r>
+                  <a:rPr lang="en-US">
+                    <a:noFill/>
+                  </a:rPr>
+                  <a:t> </a:t>
+                </a:r>
+              </a:p>
+            </p:txBody>
+          </p:sp>
+        </mc:Fallback>
+      </mc:AlternateContent>
+      <mc:AlternateContent xmlns:mc="http://schemas.openxmlformats.org/markup-compatibility/2006">
+        <mc:Choice xmlns:a14="http://schemas.microsoft.com/office/drawing/2010/main" Requires="a14">
+          <p:sp>
+            <p:nvSpPr>
+              <p:cNvPr id="23" name="TextBox 22">
+                <a:extLst>
+                  <a:ext uri="{FF2B5EF4-FFF2-40B4-BE49-F238E27FC236}">
+                    <a16:creationId xmlns:a16="http://schemas.microsoft.com/office/drawing/2014/main" id="{175150F4-79F8-A901-4D52-3781E1DCD484}"/>
+                  </a:ext>
+                </a:extLst>
+              </p:cNvPr>
+              <p:cNvSpPr txBox="1"/>
+              <p:nvPr/>
+            </p:nvSpPr>
+            <p:spPr>
+              <a:xfrm>
+                <a:off x="5805633" y="2089742"/>
+                <a:ext cx="452207" cy="369332"/>
+              </a:xfrm>
+              <a:prstGeom prst="rect">
+                <a:avLst/>
+              </a:prstGeom>
+              <a:noFill/>
+            </p:spPr>
+            <p:txBody>
+              <a:bodyPr wrap="square" lIns="0" tIns="0" rIns="0" bIns="0" rtlCol="0">
+                <a:spAutoFit/>
+              </a:bodyPr>
+              <a:lstStyle/>
+              <a:p>
+                <a:pPr/>
+                <a14:m>
+                  <m:oMathPara xmlns:m="http://schemas.openxmlformats.org/officeDocument/2006/math">
+                    <m:oMathParaPr>
+                      <m:jc m:val="centerGroup"/>
+                    </m:oMathParaPr>
+                    <m:oMath xmlns:m="http://schemas.openxmlformats.org/officeDocument/2006/math">
+                      <m:sSub>
+                        <m:sSubPr>
+                          <m:ctrlPr>
+                            <a:rPr lang="en-US" sz="2400" i="1" smtClean="0">
+                              <a:latin typeface="Cambria Math" panose="02040503050406030204" pitchFamily="18" charset="0"/>
+                            </a:rPr>
+                          </m:ctrlPr>
+                        </m:sSubPr>
+                        <m:e>
+                          <m:r>
+                            <a:rPr lang="en-US" sz="2400" b="0" i="1" smtClean="0">
+                              <a:latin typeface="Cambria Math" panose="02040503050406030204" pitchFamily="18" charset="0"/>
+                            </a:rPr>
+                            <m:t>𝑟</m:t>
+                          </m:r>
+                        </m:e>
+                        <m:sub>
+                          <m:r>
+                            <a:rPr lang="en-US" sz="2400" b="0" i="1" smtClean="0">
+                              <a:latin typeface="Cambria Math" panose="02040503050406030204" pitchFamily="18" charset="0"/>
+                            </a:rPr>
+                            <m:t>1</m:t>
+                          </m:r>
+                        </m:sub>
+                      </m:sSub>
+                    </m:oMath>
+                  </m:oMathPara>
+                </a14:m>
+                <a:endParaRPr lang="en-US" sz="2400" dirty="0">
+                  <a:solidFill>
+                    <a:schemeClr val="tx1"/>
+                  </a:solidFill>
+                </a:endParaRPr>
+              </a:p>
+            </p:txBody>
+          </p:sp>
+        </mc:Choice>
+        <mc:Fallback>
+          <p:sp>
+            <p:nvSpPr>
+              <p:cNvPr id="23" name="TextBox 22">
+                <a:extLst>
+                  <a:ext uri="{FF2B5EF4-FFF2-40B4-BE49-F238E27FC236}">
+                    <a16:creationId xmlns:a16="http://schemas.microsoft.com/office/drawing/2014/main" id="{175150F4-79F8-A901-4D52-3781E1DCD484}"/>
+                  </a:ext>
+                </a:extLst>
+              </p:cNvPr>
+              <p:cNvSpPr txBox="1">
+                <a:spLocks noRot="1" noChangeAspect="1" noMove="1" noResize="1" noEditPoints="1" noAdjustHandles="1" noChangeArrowheads="1" noChangeShapeType="1" noTextEdit="1"/>
+              </p:cNvSpPr>
+              <p:nvPr/>
+            </p:nvSpPr>
+            <p:spPr>
+              <a:xfrm>
+                <a:off x="5805633" y="2089742"/>
+                <a:ext cx="452207" cy="369332"/>
+              </a:xfrm>
+              <a:prstGeom prst="rect">
+                <a:avLst/>
+              </a:prstGeom>
+              <a:blipFill>
+                <a:blip r:embed="rId8"/>
+                <a:stretch>
+                  <a:fillRect b="-13333"/>
+                </a:stretch>
+              </a:blipFill>
+            </p:spPr>
+            <p:txBody>
+              <a:bodyPr/>
+              <a:lstStyle/>
+              <a:p>
+                <a:r>
+                  <a:rPr lang="en-US">
+                    <a:noFill/>
+                  </a:rPr>
+                  <a:t> </a:t>
+                </a:r>
+              </a:p>
+            </p:txBody>
+          </p:sp>
+        </mc:Fallback>
+      </mc:AlternateContent>
+    </p:spTree>
+    <p:extLst>
+      <p:ext uri="{BB962C8B-B14F-4D97-AF65-F5344CB8AC3E}">
+        <p14:creationId xmlns:p14="http://schemas.microsoft.com/office/powerpoint/2010/main" val="1190079514"/>
       </p:ext>
     </p:extLst>
   </p:cSld>

</xml_diff>